<commit_message>
finished the section related to cryptography and started the next section related to message integrity and digital signature
</commit_message>
<xml_diff>
--- a/TLS.pptx
+++ b/TLS.pptx
@@ -29,6 +29,13 @@
     <p:sldId id="276" r:id="rId23"/>
     <p:sldId id="277" r:id="rId24"/>
     <p:sldId id="278" r:id="rId25"/>
+    <p:sldId id="279" r:id="rId26"/>
+    <p:sldId id="280" r:id="rId27"/>
+    <p:sldId id="281" r:id="rId28"/>
+    <p:sldId id="282" r:id="rId29"/>
+    <p:sldId id="283" r:id="rId30"/>
+    <p:sldId id="284" r:id="rId31"/>
+    <p:sldId id="285" r:id="rId32"/>
   </p:sldIdLst>
   <p:sldSz cx="12192000" cy="6858000"/>
   <p:notesSz cx="6858000" cy="9144000"/>
@@ -163,9 +170,23 @@
             <p14:sldId id="276"/>
             <p14:sldId id="277"/>
             <p14:sldId id="278"/>
+            <p14:sldId id="279"/>
+            <p14:sldId id="280"/>
+            <p14:sldId id="281"/>
+          </p14:sldIdLst>
+        </p14:section>
+        <p14:section name="Message Integrity and Digital Signatures" id="{CE33E389-59BB-43E6-80E4-99C1B1C8D773}">
+          <p14:sldIdLst>
+            <p14:sldId id="282"/>
+            <p14:sldId id="283"/>
+            <p14:sldId id="284"/>
+            <p14:sldId id="285"/>
           </p14:sldIdLst>
         </p14:section>
       </p14:sectionLst>
+    </p:ext>
+    <p:ext uri="{EFAFB233-063F-42B5-8137-9DF3F51BA10A}">
+      <p15:sldGuideLst xmlns:p15="http://schemas.microsoft.com/office/powerpoint/2012/main"/>
     </p:ext>
   </p:extLst>
 </p:presentation>
@@ -228,7 +249,7 @@
           <a:noFill/>
           <a:extLst>
             <a:ext uri="{909E8E84-426E-40dd-AFC4-6F175D3DCCD1}">
-              <a14:hiddenFill xmlns:a14="http://schemas.microsoft.com/office/drawing/2010/main" xmlns="">
+              <a14:hiddenFill xmlns="" xmlns:a14="http://schemas.microsoft.com/office/drawing/2010/main">
                 <a:solidFill>
                   <a:srgbClr val="FFFFFF"/>
                 </a:solidFill>
@@ -287,7 +308,7 @@
             </a:ln>
             <a:extLst>
               <a:ext uri="{91240B29-F687-4f45-9708-019B960494DF}">
-                <a14:hiddenLine xmlns:a14="http://schemas.microsoft.com/office/drawing/2010/main" xmlns="" w="9525">
+                <a14:hiddenLine xmlns="" xmlns:a14="http://schemas.microsoft.com/office/drawing/2010/main" w="9525">
                   <a:solidFill>
                     <a:srgbClr val="000000"/>
                   </a:solidFill>
@@ -377,7 +398,7 @@
             </a:ln>
             <a:extLst>
               <a:ext uri="{91240B29-F687-4f45-9708-019B960494DF}">
-                <a14:hiddenLine xmlns:a14="http://schemas.microsoft.com/office/drawing/2010/main" xmlns="" w="9525">
+                <a14:hiddenLine xmlns="" xmlns:a14="http://schemas.microsoft.com/office/drawing/2010/main" w="9525">
                   <a:solidFill>
                     <a:srgbClr val="000000"/>
                   </a:solidFill>
@@ -467,7 +488,7 @@
             </a:ln>
             <a:extLst>
               <a:ext uri="{91240B29-F687-4f45-9708-019B960494DF}">
-                <a14:hiddenLine xmlns:a14="http://schemas.microsoft.com/office/drawing/2010/main" xmlns="" w="9525">
+                <a14:hiddenLine xmlns="" xmlns:a14="http://schemas.microsoft.com/office/drawing/2010/main" w="9525">
                   <a:solidFill>
                     <a:srgbClr val="000000"/>
                   </a:solidFill>
@@ -501,7 +522,7 @@
             </a:ln>
             <a:extLst>
               <a:ext uri="{91240B29-F687-4f45-9708-019B960494DF}">
-                <a14:hiddenLine xmlns:a14="http://schemas.microsoft.com/office/drawing/2010/main" xmlns="" w="9525">
+                <a14:hiddenLine xmlns="" xmlns:a14="http://schemas.microsoft.com/office/drawing/2010/main" w="9525">
                   <a:solidFill>
                     <a:srgbClr val="000000"/>
                   </a:solidFill>
@@ -591,7 +612,7 @@
             </a:ln>
             <a:extLst>
               <a:ext uri="{91240B29-F687-4f45-9708-019B960494DF}">
-                <a14:hiddenLine xmlns:a14="http://schemas.microsoft.com/office/drawing/2010/main" xmlns="" w="9525">
+                <a14:hiddenLine xmlns="" xmlns:a14="http://schemas.microsoft.com/office/drawing/2010/main" w="9525">
                   <a:solidFill>
                     <a:srgbClr val="000000"/>
                   </a:solidFill>
@@ -653,7 +674,7 @@
             </a:ln>
             <a:extLst>
               <a:ext uri="{91240B29-F687-4f45-9708-019B960494DF}">
-                <a14:hiddenLine xmlns:a14="http://schemas.microsoft.com/office/drawing/2010/main" xmlns="" w="9525">
+                <a14:hiddenLine xmlns="" xmlns:a14="http://schemas.microsoft.com/office/drawing/2010/main" w="9525">
                   <a:solidFill>
                     <a:srgbClr val="000000"/>
                   </a:solidFill>
@@ -715,7 +736,7 @@
             </a:ln>
             <a:extLst>
               <a:ext uri="{91240B29-F687-4f45-9708-019B960494DF}">
-                <a14:hiddenLine xmlns:a14="http://schemas.microsoft.com/office/drawing/2010/main" xmlns="" w="9525">
+                <a14:hiddenLine xmlns="" xmlns:a14="http://schemas.microsoft.com/office/drawing/2010/main" w="9525">
                   <a:solidFill>
                     <a:srgbClr val="000000"/>
                   </a:solidFill>
@@ -805,7 +826,7 @@
             </a:ln>
             <a:extLst>
               <a:ext uri="{91240B29-F687-4f45-9708-019B960494DF}">
-                <a14:hiddenLine xmlns:a14="http://schemas.microsoft.com/office/drawing/2010/main" xmlns="" w="9525">
+                <a14:hiddenLine xmlns="" xmlns:a14="http://schemas.microsoft.com/office/drawing/2010/main" w="9525">
                   <a:solidFill>
                     <a:srgbClr val="000000"/>
                   </a:solidFill>
@@ -867,7 +888,7 @@
             </a:ln>
             <a:extLst>
               <a:ext uri="{91240B29-F687-4f45-9708-019B960494DF}">
-                <a14:hiddenLine xmlns:a14="http://schemas.microsoft.com/office/drawing/2010/main" xmlns="" w="9525">
+                <a14:hiddenLine xmlns="" xmlns:a14="http://schemas.microsoft.com/office/drawing/2010/main" w="9525">
                   <a:solidFill>
                     <a:srgbClr val="000000"/>
                   </a:solidFill>
@@ -929,7 +950,7 @@
             </a:ln>
             <a:extLst>
               <a:ext uri="{91240B29-F687-4f45-9708-019B960494DF}">
-                <a14:hiddenLine xmlns:a14="http://schemas.microsoft.com/office/drawing/2010/main" xmlns="" w="9525">
+                <a14:hiddenLine xmlns="" xmlns:a14="http://schemas.microsoft.com/office/drawing/2010/main" w="9525">
                   <a:solidFill>
                     <a:srgbClr val="000000"/>
                   </a:solidFill>
@@ -1019,7 +1040,7 @@
             </a:ln>
             <a:extLst>
               <a:ext uri="{91240B29-F687-4f45-9708-019B960494DF}">
-                <a14:hiddenLine xmlns:a14="http://schemas.microsoft.com/office/drawing/2010/main" xmlns="" w="9525">
+                <a14:hiddenLine xmlns="" xmlns:a14="http://schemas.microsoft.com/office/drawing/2010/main" w="9525">
                   <a:solidFill>
                     <a:srgbClr val="000000"/>
                   </a:solidFill>
@@ -1109,7 +1130,7 @@
             </a:ln>
             <a:extLst>
               <a:ext uri="{91240B29-F687-4f45-9708-019B960494DF}">
-                <a14:hiddenLine xmlns:a14="http://schemas.microsoft.com/office/drawing/2010/main" xmlns="" w="9525">
+                <a14:hiddenLine xmlns="" xmlns:a14="http://schemas.microsoft.com/office/drawing/2010/main" w="9525">
                   <a:solidFill>
                     <a:srgbClr val="000000"/>
                   </a:solidFill>
@@ -1171,7 +1192,7 @@
             </a:ln>
             <a:extLst>
               <a:ext uri="{91240B29-F687-4f45-9708-019B960494DF}">
-                <a14:hiddenLine xmlns:a14="http://schemas.microsoft.com/office/drawing/2010/main" xmlns="" w="9525">
+                <a14:hiddenLine xmlns="" xmlns:a14="http://schemas.microsoft.com/office/drawing/2010/main" w="9525">
                   <a:solidFill>
                     <a:srgbClr val="000000"/>
                   </a:solidFill>
@@ -1281,7 +1302,7 @@
             </a:ln>
             <a:extLst>
               <a:ext uri="{91240B29-F687-4f45-9708-019B960494DF}">
-                <a14:hiddenLine xmlns:a14="http://schemas.microsoft.com/office/drawing/2010/main" xmlns="" w="9525">
+                <a14:hiddenLine xmlns="" xmlns:a14="http://schemas.microsoft.com/office/drawing/2010/main" w="9525">
                   <a:solidFill>
                     <a:srgbClr val="000000"/>
                   </a:solidFill>
@@ -1343,7 +1364,7 @@
             </a:ln>
             <a:extLst>
               <a:ext uri="{91240B29-F687-4f45-9708-019B960494DF}">
-                <a14:hiddenLine xmlns:a14="http://schemas.microsoft.com/office/drawing/2010/main" xmlns="" w="9525">
+                <a14:hiddenLine xmlns="" xmlns:a14="http://schemas.microsoft.com/office/drawing/2010/main" w="9525">
                   <a:solidFill>
                     <a:srgbClr val="000000"/>
                   </a:solidFill>
@@ -1433,7 +1454,7 @@
             </a:ln>
             <a:extLst>
               <a:ext uri="{91240B29-F687-4f45-9708-019B960494DF}">
-                <a14:hiddenLine xmlns:a14="http://schemas.microsoft.com/office/drawing/2010/main" xmlns="" w="9525">
+                <a14:hiddenLine xmlns="" xmlns:a14="http://schemas.microsoft.com/office/drawing/2010/main" w="9525">
                   <a:solidFill>
                     <a:srgbClr val="000000"/>
                   </a:solidFill>
@@ -1523,7 +1544,7 @@
             </a:ln>
             <a:extLst>
               <a:ext uri="{91240B29-F687-4f45-9708-019B960494DF}">
-                <a14:hiddenLine xmlns:a14="http://schemas.microsoft.com/office/drawing/2010/main" xmlns="" w="9525">
+                <a14:hiddenLine xmlns="" xmlns:a14="http://schemas.microsoft.com/office/drawing/2010/main" w="9525">
                   <a:solidFill>
                     <a:srgbClr val="000000"/>
                   </a:solidFill>
@@ -1585,7 +1606,7 @@
             </a:ln>
             <a:extLst>
               <a:ext uri="{91240B29-F687-4f45-9708-019B960494DF}">
-                <a14:hiddenLine xmlns:a14="http://schemas.microsoft.com/office/drawing/2010/main" xmlns="" w="9525">
+                <a14:hiddenLine xmlns="" xmlns:a14="http://schemas.microsoft.com/office/drawing/2010/main" w="9525">
                   <a:solidFill>
                     <a:srgbClr val="000000"/>
                   </a:solidFill>
@@ -1675,7 +1696,7 @@
             </a:ln>
             <a:extLst>
               <a:ext uri="{91240B29-F687-4f45-9708-019B960494DF}">
-                <a14:hiddenLine xmlns:a14="http://schemas.microsoft.com/office/drawing/2010/main" xmlns="" w="9525">
+                <a14:hiddenLine xmlns="" xmlns:a14="http://schemas.microsoft.com/office/drawing/2010/main" w="9525">
                   <a:solidFill>
                     <a:srgbClr val="000000"/>
                   </a:solidFill>
@@ -1765,7 +1786,7 @@
             </a:ln>
             <a:extLst>
               <a:ext uri="{91240B29-F687-4f45-9708-019B960494DF}">
-                <a14:hiddenLine xmlns:a14="http://schemas.microsoft.com/office/drawing/2010/main" xmlns="" w="9525">
+                <a14:hiddenLine xmlns="" xmlns:a14="http://schemas.microsoft.com/office/drawing/2010/main" w="9525">
                   <a:solidFill>
                     <a:srgbClr val="000000"/>
                   </a:solidFill>
@@ -1821,7 +1842,7 @@
             </a:ln>
             <a:extLst>
               <a:ext uri="{91240B29-F687-4f45-9708-019B960494DF}">
-                <a14:hiddenLine xmlns:a14="http://schemas.microsoft.com/office/drawing/2010/main" xmlns="" w="9525">
+                <a14:hiddenLine xmlns="" xmlns:a14="http://schemas.microsoft.com/office/drawing/2010/main" w="9525">
                   <a:solidFill>
                     <a:srgbClr val="000000"/>
                   </a:solidFill>
@@ -1911,7 +1932,7 @@
             </a:ln>
             <a:extLst>
               <a:ext uri="{91240B29-F687-4f45-9708-019B960494DF}">
-                <a14:hiddenLine xmlns:a14="http://schemas.microsoft.com/office/drawing/2010/main" xmlns="" w="9525">
+                <a14:hiddenLine xmlns="" xmlns:a14="http://schemas.microsoft.com/office/drawing/2010/main" w="9525">
                   <a:solidFill>
                     <a:srgbClr val="000000"/>
                   </a:solidFill>
@@ -1967,7 +1988,7 @@
             </a:ln>
             <a:extLst>
               <a:ext uri="{91240B29-F687-4f45-9708-019B960494DF}">
-                <a14:hiddenLine xmlns:a14="http://schemas.microsoft.com/office/drawing/2010/main" xmlns="" w="9525">
+                <a14:hiddenLine xmlns="" xmlns:a14="http://schemas.microsoft.com/office/drawing/2010/main" w="9525">
                   <a:solidFill>
                     <a:srgbClr val="000000"/>
                   </a:solidFill>
@@ -2057,7 +2078,7 @@
             </a:ln>
             <a:extLst>
               <a:ext uri="{91240B29-F687-4f45-9708-019B960494DF}">
-                <a14:hiddenLine xmlns:a14="http://schemas.microsoft.com/office/drawing/2010/main" xmlns="" w="9525">
+                <a14:hiddenLine xmlns="" xmlns:a14="http://schemas.microsoft.com/office/drawing/2010/main" w="9525">
                   <a:solidFill>
                     <a:srgbClr val="000000"/>
                   </a:solidFill>
@@ -2125,7 +2146,7 @@
             </a:ln>
             <a:extLst>
               <a:ext uri="{91240B29-F687-4f45-9708-019B960494DF}">
-                <a14:hiddenLine xmlns:a14="http://schemas.microsoft.com/office/drawing/2010/main" xmlns="" w="9525">
+                <a14:hiddenLine xmlns="" xmlns:a14="http://schemas.microsoft.com/office/drawing/2010/main" w="9525">
                   <a:solidFill>
                     <a:srgbClr val="000000"/>
                   </a:solidFill>
@@ -2215,7 +2236,7 @@
             </a:ln>
             <a:extLst>
               <a:ext uri="{91240B29-F687-4f45-9708-019B960494DF}">
-                <a14:hiddenLine xmlns:a14="http://schemas.microsoft.com/office/drawing/2010/main" xmlns="" w="9525">
+                <a14:hiddenLine xmlns="" xmlns:a14="http://schemas.microsoft.com/office/drawing/2010/main" w="9525">
                   <a:solidFill>
                     <a:srgbClr val="000000"/>
                   </a:solidFill>
@@ -2283,7 +2304,7 @@
             </a:ln>
             <a:extLst>
               <a:ext uri="{91240B29-F687-4f45-9708-019B960494DF}">
-                <a14:hiddenLine xmlns:a14="http://schemas.microsoft.com/office/drawing/2010/main" xmlns="" w="9525">
+                <a14:hiddenLine xmlns="" xmlns:a14="http://schemas.microsoft.com/office/drawing/2010/main" w="9525">
                   <a:solidFill>
                     <a:srgbClr val="000000"/>
                   </a:solidFill>
@@ -2373,7 +2394,7 @@
             </a:ln>
             <a:extLst>
               <a:ext uri="{91240B29-F687-4f45-9708-019B960494DF}">
-                <a14:hiddenLine xmlns:a14="http://schemas.microsoft.com/office/drawing/2010/main" xmlns="" w="9525">
+                <a14:hiddenLine xmlns="" xmlns:a14="http://schemas.microsoft.com/office/drawing/2010/main" w="9525">
                   <a:solidFill>
                     <a:srgbClr val="000000"/>
                   </a:solidFill>
@@ -2407,7 +2428,7 @@
             </a:ln>
             <a:extLst>
               <a:ext uri="{91240B29-F687-4f45-9708-019B960494DF}">
-                <a14:hiddenLine xmlns:a14="http://schemas.microsoft.com/office/drawing/2010/main" xmlns="" w="9525">
+                <a14:hiddenLine xmlns="" xmlns:a14="http://schemas.microsoft.com/office/drawing/2010/main" w="9525">
                   <a:solidFill>
                     <a:srgbClr val="000000"/>
                   </a:solidFill>
@@ -2497,7 +2518,7 @@
             </a:ln>
             <a:extLst>
               <a:ext uri="{91240B29-F687-4f45-9708-019B960494DF}">
-                <a14:hiddenLine xmlns:a14="http://schemas.microsoft.com/office/drawing/2010/main" xmlns="" w="9525">
+                <a14:hiddenLine xmlns="" xmlns:a14="http://schemas.microsoft.com/office/drawing/2010/main" w="9525">
                   <a:solidFill>
                     <a:srgbClr val="000000"/>
                   </a:solidFill>
@@ -2559,7 +2580,7 @@
             </a:ln>
             <a:extLst>
               <a:ext uri="{91240B29-F687-4f45-9708-019B960494DF}">
-                <a14:hiddenLine xmlns:a14="http://schemas.microsoft.com/office/drawing/2010/main" xmlns="" w="9525">
+                <a14:hiddenLine xmlns="" xmlns:a14="http://schemas.microsoft.com/office/drawing/2010/main" w="9525">
                   <a:solidFill>
                     <a:srgbClr val="000000"/>
                   </a:solidFill>
@@ -2621,7 +2642,7 @@
             </a:ln>
             <a:extLst>
               <a:ext uri="{91240B29-F687-4f45-9708-019B960494DF}">
-                <a14:hiddenLine xmlns:a14="http://schemas.microsoft.com/office/drawing/2010/main" xmlns="" w="9525">
+                <a14:hiddenLine xmlns="" xmlns:a14="http://schemas.microsoft.com/office/drawing/2010/main" w="9525">
                   <a:solidFill>
                     <a:srgbClr val="000000"/>
                   </a:solidFill>
@@ -2711,7 +2732,7 @@
             </a:ln>
             <a:extLst>
               <a:ext uri="{91240B29-F687-4f45-9708-019B960494DF}">
-                <a14:hiddenLine xmlns:a14="http://schemas.microsoft.com/office/drawing/2010/main" xmlns="" w="9525">
+                <a14:hiddenLine xmlns="" xmlns:a14="http://schemas.microsoft.com/office/drawing/2010/main" w="9525">
                   <a:solidFill>
                     <a:srgbClr val="000000"/>
                   </a:solidFill>
@@ -2779,7 +2800,7 @@
             </a:ln>
             <a:extLst>
               <a:ext uri="{91240B29-F687-4f45-9708-019B960494DF}">
-                <a14:hiddenLine xmlns:a14="http://schemas.microsoft.com/office/drawing/2010/main" xmlns="" w="9525">
+                <a14:hiddenLine xmlns="" xmlns:a14="http://schemas.microsoft.com/office/drawing/2010/main" w="9525">
                   <a:solidFill>
                     <a:srgbClr val="000000"/>
                   </a:solidFill>
@@ -2841,7 +2862,7 @@
             </a:ln>
             <a:extLst>
               <a:ext uri="{91240B29-F687-4f45-9708-019B960494DF}">
-                <a14:hiddenLine xmlns:a14="http://schemas.microsoft.com/office/drawing/2010/main" xmlns="" w="9525">
+                <a14:hiddenLine xmlns="" xmlns:a14="http://schemas.microsoft.com/office/drawing/2010/main" w="9525">
                   <a:solidFill>
                     <a:srgbClr val="000000"/>
                   </a:solidFill>
@@ -2931,7 +2952,7 @@
             </a:ln>
             <a:extLst>
               <a:ext uri="{91240B29-F687-4f45-9708-019B960494DF}">
-                <a14:hiddenLine xmlns:a14="http://schemas.microsoft.com/office/drawing/2010/main" xmlns="" w="9525">
+                <a14:hiddenLine xmlns="" xmlns:a14="http://schemas.microsoft.com/office/drawing/2010/main" w="9525">
                   <a:solidFill>
                     <a:srgbClr val="000000"/>
                   </a:solidFill>
@@ -2993,7 +3014,7 @@
             </a:ln>
             <a:extLst>
               <a:ext uri="{91240B29-F687-4f45-9708-019B960494DF}">
-                <a14:hiddenLine xmlns:a14="http://schemas.microsoft.com/office/drawing/2010/main" xmlns="" w="9525">
+                <a14:hiddenLine xmlns="" xmlns:a14="http://schemas.microsoft.com/office/drawing/2010/main" w="9525">
                   <a:solidFill>
                     <a:srgbClr val="000000"/>
                   </a:solidFill>
@@ -3083,7 +3104,7 @@
             </a:ln>
             <a:extLst>
               <a:ext uri="{91240B29-F687-4f45-9708-019B960494DF}">
-                <a14:hiddenLine xmlns:a14="http://schemas.microsoft.com/office/drawing/2010/main" xmlns="" w="9525">
+                <a14:hiddenLine xmlns="" xmlns:a14="http://schemas.microsoft.com/office/drawing/2010/main" w="9525">
                   <a:solidFill>
                     <a:srgbClr val="000000"/>
                   </a:solidFill>
@@ -3145,7 +3166,7 @@
             </a:ln>
             <a:extLst>
               <a:ext uri="{91240B29-F687-4f45-9708-019B960494DF}">
-                <a14:hiddenLine xmlns:a14="http://schemas.microsoft.com/office/drawing/2010/main" xmlns="" w="9525">
+                <a14:hiddenLine xmlns="" xmlns:a14="http://schemas.microsoft.com/office/drawing/2010/main" w="9525">
                   <a:solidFill>
                     <a:srgbClr val="000000"/>
                   </a:solidFill>
@@ -3235,7 +3256,7 @@
             </a:ln>
             <a:extLst>
               <a:ext uri="{91240B29-F687-4f45-9708-019B960494DF}">
-                <a14:hiddenLine xmlns:a14="http://schemas.microsoft.com/office/drawing/2010/main" xmlns="" w="9525">
+                <a14:hiddenLine xmlns="" xmlns:a14="http://schemas.microsoft.com/office/drawing/2010/main" w="9525">
                   <a:solidFill>
                     <a:srgbClr val="000000"/>
                   </a:solidFill>
@@ -3269,7 +3290,7 @@
             </a:ln>
             <a:extLst>
               <a:ext uri="{91240B29-F687-4f45-9708-019B960494DF}">
-                <a14:hiddenLine xmlns:a14="http://schemas.microsoft.com/office/drawing/2010/main" xmlns="" w="9525">
+                <a14:hiddenLine xmlns="" xmlns:a14="http://schemas.microsoft.com/office/drawing/2010/main" w="9525">
                   <a:solidFill>
                     <a:srgbClr val="000000"/>
                   </a:solidFill>
@@ -3334,7 +3355,7 @@
             </a:ln>
             <a:extLst>
               <a:ext uri="{91240B29-F687-4f45-9708-019B960494DF}">
-                <a14:hiddenLine xmlns:a14="http://schemas.microsoft.com/office/drawing/2010/main" xmlns="" w="9525">
+                <a14:hiddenLine xmlns="" xmlns:a14="http://schemas.microsoft.com/office/drawing/2010/main" w="9525">
                   <a:solidFill>
                     <a:srgbClr val="000000"/>
                   </a:solidFill>
@@ -3424,7 +3445,7 @@
             </a:ln>
             <a:extLst>
               <a:ext uri="{91240B29-F687-4f45-9708-019B960494DF}">
-                <a14:hiddenLine xmlns:a14="http://schemas.microsoft.com/office/drawing/2010/main" xmlns="" w="9525">
+                <a14:hiddenLine xmlns="" xmlns:a14="http://schemas.microsoft.com/office/drawing/2010/main" w="9525">
                   <a:solidFill>
                     <a:srgbClr val="000000"/>
                   </a:solidFill>
@@ -3486,7 +3507,7 @@
             </a:ln>
             <a:extLst>
               <a:ext uri="{91240B29-F687-4f45-9708-019B960494DF}">
-                <a14:hiddenLine xmlns:a14="http://schemas.microsoft.com/office/drawing/2010/main" xmlns="" w="9525">
+                <a14:hiddenLine xmlns="" xmlns:a14="http://schemas.microsoft.com/office/drawing/2010/main" w="9525">
                   <a:solidFill>
                     <a:srgbClr val="000000"/>
                   </a:solidFill>
@@ -3576,7 +3597,7 @@
             </a:ln>
             <a:extLst>
               <a:ext uri="{91240B29-F687-4f45-9708-019B960494DF}">
-                <a14:hiddenLine xmlns:a14="http://schemas.microsoft.com/office/drawing/2010/main" xmlns="" w="9525">
+                <a14:hiddenLine xmlns="" xmlns:a14="http://schemas.microsoft.com/office/drawing/2010/main" w="9525">
                   <a:solidFill>
                     <a:srgbClr val="000000"/>
                   </a:solidFill>
@@ -3666,7 +3687,7 @@
             </a:ln>
             <a:extLst>
               <a:ext uri="{91240B29-F687-4f45-9708-019B960494DF}">
-                <a14:hiddenLine xmlns:a14="http://schemas.microsoft.com/office/drawing/2010/main" xmlns="" w="9525">
+                <a14:hiddenLine xmlns="" xmlns:a14="http://schemas.microsoft.com/office/drawing/2010/main" w="9525">
                   <a:solidFill>
                     <a:srgbClr val="000000"/>
                   </a:solidFill>
@@ -3731,7 +3752,7 @@
             </a:ln>
             <a:extLst>
               <a:ext uri="{91240B29-F687-4f45-9708-019B960494DF}">
-                <a14:hiddenLine xmlns:a14="http://schemas.microsoft.com/office/drawing/2010/main" xmlns="" w="9525">
+                <a14:hiddenLine xmlns="" xmlns:a14="http://schemas.microsoft.com/office/drawing/2010/main" w="9525">
                   <a:solidFill>
                     <a:srgbClr val="000000"/>
                   </a:solidFill>
@@ -3793,7 +3814,7 @@
             </a:ln>
             <a:extLst>
               <a:ext uri="{91240B29-F687-4f45-9708-019B960494DF}">
-                <a14:hiddenLine xmlns:a14="http://schemas.microsoft.com/office/drawing/2010/main" xmlns="" w="9525">
+                <a14:hiddenLine xmlns="" xmlns:a14="http://schemas.microsoft.com/office/drawing/2010/main" w="9525">
                   <a:solidFill>
                     <a:srgbClr val="000000"/>
                   </a:solidFill>
@@ -3883,7 +3904,7 @@
             </a:ln>
             <a:extLst>
               <a:ext uri="{91240B29-F687-4f45-9708-019B960494DF}">
-                <a14:hiddenLine xmlns:a14="http://schemas.microsoft.com/office/drawing/2010/main" xmlns="" w="9525">
+                <a14:hiddenLine xmlns="" xmlns:a14="http://schemas.microsoft.com/office/drawing/2010/main" w="9525">
                   <a:solidFill>
                     <a:srgbClr val="000000"/>
                   </a:solidFill>
@@ -3973,7 +3994,7 @@
             </a:ln>
             <a:extLst>
               <a:ext uri="{91240B29-F687-4f45-9708-019B960494DF}">
-                <a14:hiddenLine xmlns:a14="http://schemas.microsoft.com/office/drawing/2010/main" xmlns="" w="9525">
+                <a14:hiddenLine xmlns="" xmlns:a14="http://schemas.microsoft.com/office/drawing/2010/main" w="9525">
                   <a:solidFill>
                     <a:srgbClr val="000000"/>
                   </a:solidFill>
@@ -4035,7 +4056,7 @@
             </a:ln>
             <a:extLst>
               <a:ext uri="{91240B29-F687-4f45-9708-019B960494DF}">
-                <a14:hiddenLine xmlns:a14="http://schemas.microsoft.com/office/drawing/2010/main" xmlns="" w="9525">
+                <a14:hiddenLine xmlns="" xmlns:a14="http://schemas.microsoft.com/office/drawing/2010/main" w="9525">
                   <a:solidFill>
                     <a:srgbClr val="000000"/>
                   </a:solidFill>
@@ -4155,7 +4176,7 @@
             </a:ln>
             <a:extLst>
               <a:ext uri="{91240B29-F687-4f45-9708-019B960494DF}">
-                <a14:hiddenLine xmlns:a14="http://schemas.microsoft.com/office/drawing/2010/main" xmlns="" w="9525">
+                <a14:hiddenLine xmlns="" xmlns:a14="http://schemas.microsoft.com/office/drawing/2010/main" w="9525">
                   <a:solidFill>
                     <a:srgbClr val="000000"/>
                   </a:solidFill>
@@ -4223,7 +4244,7 @@
             </a:ln>
             <a:extLst>
               <a:ext uri="{91240B29-F687-4f45-9708-019B960494DF}">
-                <a14:hiddenLine xmlns:a14="http://schemas.microsoft.com/office/drawing/2010/main" xmlns="" w="9525">
+                <a14:hiddenLine xmlns="" xmlns:a14="http://schemas.microsoft.com/office/drawing/2010/main" w="9525">
                   <a:solidFill>
                     <a:srgbClr val="000000"/>
                   </a:solidFill>
@@ -4313,7 +4334,7 @@
             </a:ln>
             <a:extLst>
               <a:ext uri="{91240B29-F687-4f45-9708-019B960494DF}">
-                <a14:hiddenLine xmlns:a14="http://schemas.microsoft.com/office/drawing/2010/main" xmlns="" w="9525">
+                <a14:hiddenLine xmlns="" xmlns:a14="http://schemas.microsoft.com/office/drawing/2010/main" w="9525">
                   <a:solidFill>
                     <a:srgbClr val="000000"/>
                   </a:solidFill>
@@ -4453,7 +4474,7 @@
           <a:p>
             <a:fld id="{4559D4BB-A0F9-4B27-80E6-E5E59F9288D1}" type="datetimeFigureOut">
               <a:rPr lang="en-US" smtClean="0"/>
-              <a:t>2/13/2026</a:t>
+              <a:t>2/14/2026</a:t>
             </a:fld>
             <a:endParaRPr lang="en-US"/>
           </a:p>
@@ -4720,7 +4741,7 @@
           <a:p>
             <a:fld id="{4559D4BB-A0F9-4B27-80E6-E5E59F9288D1}" type="datetimeFigureOut">
               <a:rPr lang="en-US" smtClean="0"/>
-              <a:t>2/13/2026</a:t>
+              <a:t>2/14/2026</a:t>
             </a:fld>
             <a:endParaRPr lang="en-US"/>
           </a:p>
@@ -4916,7 +4937,7 @@
           <a:p>
             <a:fld id="{4559D4BB-A0F9-4B27-80E6-E5E59F9288D1}" type="datetimeFigureOut">
               <a:rPr lang="en-US" smtClean="0"/>
-              <a:t>2/13/2026</a:t>
+              <a:t>2/14/2026</a:t>
             </a:fld>
             <a:endParaRPr lang="en-US"/>
           </a:p>
@@ -5179,7 +5200,7 @@
           <a:p>
             <a:fld id="{4559D4BB-A0F9-4B27-80E6-E5E59F9288D1}" type="datetimeFigureOut">
               <a:rPr lang="en-US" smtClean="0"/>
-              <a:t>2/13/2026</a:t>
+              <a:t>2/14/2026</a:t>
             </a:fld>
             <a:endParaRPr lang="en-US"/>
           </a:p>
@@ -5613,7 +5634,7 @@
           <a:p>
             <a:fld id="{4559D4BB-A0F9-4B27-80E6-E5E59F9288D1}" type="datetimeFigureOut">
               <a:rPr lang="en-US" smtClean="0"/>
-              <a:t>2/13/2026</a:t>
+              <a:t>2/14/2026</a:t>
             </a:fld>
             <a:endParaRPr lang="en-US"/>
           </a:p>
@@ -6159,7 +6180,7 @@
           <a:p>
             <a:fld id="{4559D4BB-A0F9-4B27-80E6-E5E59F9288D1}" type="datetimeFigureOut">
               <a:rPr lang="en-US" smtClean="0"/>
-              <a:t>2/13/2026</a:t>
+              <a:t>2/14/2026</a:t>
             </a:fld>
             <a:endParaRPr lang="en-US"/>
           </a:p>
@@ -6879,7 +6900,7 @@
           <a:p>
             <a:fld id="{4559D4BB-A0F9-4B27-80E6-E5E59F9288D1}" type="datetimeFigureOut">
               <a:rPr lang="en-US" smtClean="0"/>
-              <a:t>2/13/2026</a:t>
+              <a:t>2/14/2026</a:t>
             </a:fld>
             <a:endParaRPr lang="en-US"/>
           </a:p>
@@ -7049,7 +7070,7 @@
           <a:p>
             <a:fld id="{4559D4BB-A0F9-4B27-80E6-E5E59F9288D1}" type="datetimeFigureOut">
               <a:rPr lang="en-US" smtClean="0"/>
-              <a:t>2/13/2026</a:t>
+              <a:t>2/14/2026</a:t>
             </a:fld>
             <a:endParaRPr lang="en-US"/>
           </a:p>
@@ -7229,7 +7250,7 @@
           <a:p>
             <a:fld id="{4559D4BB-A0F9-4B27-80E6-E5E59F9288D1}" type="datetimeFigureOut">
               <a:rPr lang="en-US" smtClean="0"/>
-              <a:t>2/13/2026</a:t>
+              <a:t>2/14/2026</a:t>
             </a:fld>
             <a:endParaRPr lang="en-US"/>
           </a:p>
@@ -7340,7 +7361,7 @@
           <a:noFill/>
           <a:extLst>
             <a:ext uri="{909E8E84-426E-40dd-AFC4-6F175D3DCCD1}">
-              <a14:hiddenFill xmlns:a14="http://schemas.microsoft.com/office/drawing/2010/main" xmlns="">
+              <a14:hiddenFill xmlns="" xmlns:a14="http://schemas.microsoft.com/office/drawing/2010/main">
                 <a:solidFill>
                   <a:srgbClr val="FFFFFF"/>
                 </a:solidFill>
@@ -7400,7 +7421,7 @@
             </a:ln>
             <a:extLst>
               <a:ext uri="{91240B29-F687-4f45-9708-019B960494DF}">
-                <a14:hiddenLine xmlns:a14="http://schemas.microsoft.com/office/drawing/2010/main" xmlns="" w="9525">
+                <a14:hiddenLine xmlns="" xmlns:a14="http://schemas.microsoft.com/office/drawing/2010/main" w="9525">
                   <a:solidFill>
                     <a:srgbClr val="000000"/>
                   </a:solidFill>
@@ -7490,7 +7511,7 @@
             </a:ln>
             <a:extLst>
               <a:ext uri="{91240B29-F687-4f45-9708-019B960494DF}">
-                <a14:hiddenLine xmlns:a14="http://schemas.microsoft.com/office/drawing/2010/main" xmlns="" w="9525">
+                <a14:hiddenLine xmlns="" xmlns:a14="http://schemas.microsoft.com/office/drawing/2010/main" w="9525">
                   <a:solidFill>
                     <a:srgbClr val="000000"/>
                   </a:solidFill>
@@ -7580,7 +7601,7 @@
             </a:ln>
             <a:extLst>
               <a:ext uri="{91240B29-F687-4f45-9708-019B960494DF}">
-                <a14:hiddenLine xmlns:a14="http://schemas.microsoft.com/office/drawing/2010/main" xmlns="" w="9525">
+                <a14:hiddenLine xmlns="" xmlns:a14="http://schemas.microsoft.com/office/drawing/2010/main" w="9525">
                   <a:solidFill>
                     <a:srgbClr val="000000"/>
                   </a:solidFill>
@@ -7614,7 +7635,7 @@
             </a:ln>
             <a:extLst>
               <a:ext uri="{91240B29-F687-4f45-9708-019B960494DF}">
-                <a14:hiddenLine xmlns:a14="http://schemas.microsoft.com/office/drawing/2010/main" xmlns="" w="9525">
+                <a14:hiddenLine xmlns="" xmlns:a14="http://schemas.microsoft.com/office/drawing/2010/main" w="9525">
                   <a:solidFill>
                     <a:srgbClr val="000000"/>
                   </a:solidFill>
@@ -7704,7 +7725,7 @@
             </a:ln>
             <a:extLst>
               <a:ext uri="{91240B29-F687-4f45-9708-019B960494DF}">
-                <a14:hiddenLine xmlns:a14="http://schemas.microsoft.com/office/drawing/2010/main" xmlns="" w="9525">
+                <a14:hiddenLine xmlns="" xmlns:a14="http://schemas.microsoft.com/office/drawing/2010/main" w="9525">
                   <a:solidFill>
                     <a:srgbClr val="000000"/>
                   </a:solidFill>
@@ -7766,7 +7787,7 @@
             </a:ln>
             <a:extLst>
               <a:ext uri="{91240B29-F687-4f45-9708-019B960494DF}">
-                <a14:hiddenLine xmlns:a14="http://schemas.microsoft.com/office/drawing/2010/main" xmlns="" w="9525">
+                <a14:hiddenLine xmlns="" xmlns:a14="http://schemas.microsoft.com/office/drawing/2010/main" w="9525">
                   <a:solidFill>
                     <a:srgbClr val="000000"/>
                   </a:solidFill>
@@ -7828,7 +7849,7 @@
             </a:ln>
             <a:extLst>
               <a:ext uri="{91240B29-F687-4f45-9708-019B960494DF}">
-                <a14:hiddenLine xmlns:a14="http://schemas.microsoft.com/office/drawing/2010/main" xmlns="" w="9525">
+                <a14:hiddenLine xmlns="" xmlns:a14="http://schemas.microsoft.com/office/drawing/2010/main" w="9525">
                   <a:solidFill>
                     <a:srgbClr val="000000"/>
                   </a:solidFill>
@@ -7918,7 +7939,7 @@
             </a:ln>
             <a:extLst>
               <a:ext uri="{91240B29-F687-4f45-9708-019B960494DF}">
-                <a14:hiddenLine xmlns:a14="http://schemas.microsoft.com/office/drawing/2010/main" xmlns="" w="9525">
+                <a14:hiddenLine xmlns="" xmlns:a14="http://schemas.microsoft.com/office/drawing/2010/main" w="9525">
                   <a:solidFill>
                     <a:srgbClr val="000000"/>
                   </a:solidFill>
@@ -7980,7 +8001,7 @@
             </a:ln>
             <a:extLst>
               <a:ext uri="{91240B29-F687-4f45-9708-019B960494DF}">
-                <a14:hiddenLine xmlns:a14="http://schemas.microsoft.com/office/drawing/2010/main" xmlns="" w="9525">
+                <a14:hiddenLine xmlns="" xmlns:a14="http://schemas.microsoft.com/office/drawing/2010/main" w="9525">
                   <a:solidFill>
                     <a:srgbClr val="000000"/>
                   </a:solidFill>
@@ -8042,7 +8063,7 @@
             </a:ln>
             <a:extLst>
               <a:ext uri="{91240B29-F687-4f45-9708-019B960494DF}">
-                <a14:hiddenLine xmlns:a14="http://schemas.microsoft.com/office/drawing/2010/main" xmlns="" w="9525">
+                <a14:hiddenLine xmlns="" xmlns:a14="http://schemas.microsoft.com/office/drawing/2010/main" w="9525">
                   <a:solidFill>
                     <a:srgbClr val="000000"/>
                   </a:solidFill>
@@ -8132,7 +8153,7 @@
             </a:ln>
             <a:extLst>
               <a:ext uri="{91240B29-F687-4f45-9708-019B960494DF}">
-                <a14:hiddenLine xmlns:a14="http://schemas.microsoft.com/office/drawing/2010/main" xmlns="" w="9525">
+                <a14:hiddenLine xmlns="" xmlns:a14="http://schemas.microsoft.com/office/drawing/2010/main" w="9525">
                   <a:solidFill>
                     <a:srgbClr val="000000"/>
                   </a:solidFill>
@@ -8222,7 +8243,7 @@
             </a:ln>
             <a:extLst>
               <a:ext uri="{91240B29-F687-4f45-9708-019B960494DF}">
-                <a14:hiddenLine xmlns:a14="http://schemas.microsoft.com/office/drawing/2010/main" xmlns="" w="9525">
+                <a14:hiddenLine xmlns="" xmlns:a14="http://schemas.microsoft.com/office/drawing/2010/main" w="9525">
                   <a:solidFill>
                     <a:srgbClr val="000000"/>
                   </a:solidFill>
@@ -8284,7 +8305,7 @@
             </a:ln>
             <a:extLst>
               <a:ext uri="{91240B29-F687-4f45-9708-019B960494DF}">
-                <a14:hiddenLine xmlns:a14="http://schemas.microsoft.com/office/drawing/2010/main" xmlns="" w="9525">
+                <a14:hiddenLine xmlns="" xmlns:a14="http://schemas.microsoft.com/office/drawing/2010/main" w="9525">
                   <a:solidFill>
                     <a:srgbClr val="000000"/>
                   </a:solidFill>
@@ -8394,7 +8415,7 @@
             </a:ln>
             <a:extLst>
               <a:ext uri="{91240B29-F687-4f45-9708-019B960494DF}">
-                <a14:hiddenLine xmlns:a14="http://schemas.microsoft.com/office/drawing/2010/main" xmlns="" w="9525">
+                <a14:hiddenLine xmlns="" xmlns:a14="http://schemas.microsoft.com/office/drawing/2010/main" w="9525">
                   <a:solidFill>
                     <a:srgbClr val="000000"/>
                   </a:solidFill>
@@ -8456,7 +8477,7 @@
             </a:ln>
             <a:extLst>
               <a:ext uri="{91240B29-F687-4f45-9708-019B960494DF}">
-                <a14:hiddenLine xmlns:a14="http://schemas.microsoft.com/office/drawing/2010/main" xmlns="" w="9525">
+                <a14:hiddenLine xmlns="" xmlns:a14="http://schemas.microsoft.com/office/drawing/2010/main" w="9525">
                   <a:solidFill>
                     <a:srgbClr val="000000"/>
                   </a:solidFill>
@@ -8546,7 +8567,7 @@
             </a:ln>
             <a:extLst>
               <a:ext uri="{91240B29-F687-4f45-9708-019B960494DF}">
-                <a14:hiddenLine xmlns:a14="http://schemas.microsoft.com/office/drawing/2010/main" xmlns="" w="9525">
+                <a14:hiddenLine xmlns="" xmlns:a14="http://schemas.microsoft.com/office/drawing/2010/main" w="9525">
                   <a:solidFill>
                     <a:srgbClr val="000000"/>
                   </a:solidFill>
@@ -8636,7 +8657,7 @@
             </a:ln>
             <a:extLst>
               <a:ext uri="{91240B29-F687-4f45-9708-019B960494DF}">
-                <a14:hiddenLine xmlns:a14="http://schemas.microsoft.com/office/drawing/2010/main" xmlns="" w="9525">
+                <a14:hiddenLine xmlns="" xmlns:a14="http://schemas.microsoft.com/office/drawing/2010/main" w="9525">
                   <a:solidFill>
                     <a:srgbClr val="000000"/>
                   </a:solidFill>
@@ -8698,7 +8719,7 @@
             </a:ln>
             <a:extLst>
               <a:ext uri="{91240B29-F687-4f45-9708-019B960494DF}">
-                <a14:hiddenLine xmlns:a14="http://schemas.microsoft.com/office/drawing/2010/main" xmlns="" w="9525">
+                <a14:hiddenLine xmlns="" xmlns:a14="http://schemas.microsoft.com/office/drawing/2010/main" w="9525">
                   <a:solidFill>
                     <a:srgbClr val="000000"/>
                   </a:solidFill>
@@ -8788,7 +8809,7 @@
             </a:ln>
             <a:extLst>
               <a:ext uri="{91240B29-F687-4f45-9708-019B960494DF}">
-                <a14:hiddenLine xmlns:a14="http://schemas.microsoft.com/office/drawing/2010/main" xmlns="" w="9525">
+                <a14:hiddenLine xmlns="" xmlns:a14="http://schemas.microsoft.com/office/drawing/2010/main" w="9525">
                   <a:solidFill>
                     <a:srgbClr val="000000"/>
                   </a:solidFill>
@@ -8878,7 +8899,7 @@
             </a:ln>
             <a:extLst>
               <a:ext uri="{91240B29-F687-4f45-9708-019B960494DF}">
-                <a14:hiddenLine xmlns:a14="http://schemas.microsoft.com/office/drawing/2010/main" xmlns="" w="9525">
+                <a14:hiddenLine xmlns="" xmlns:a14="http://schemas.microsoft.com/office/drawing/2010/main" w="9525">
                   <a:solidFill>
                     <a:srgbClr val="000000"/>
                   </a:solidFill>
@@ -8934,7 +8955,7 @@
             </a:ln>
             <a:extLst>
               <a:ext uri="{91240B29-F687-4f45-9708-019B960494DF}">
-                <a14:hiddenLine xmlns:a14="http://schemas.microsoft.com/office/drawing/2010/main" xmlns="" w="9525">
+                <a14:hiddenLine xmlns="" xmlns:a14="http://schemas.microsoft.com/office/drawing/2010/main" w="9525">
                   <a:solidFill>
                     <a:srgbClr val="000000"/>
                   </a:solidFill>
@@ -9024,7 +9045,7 @@
             </a:ln>
             <a:extLst>
               <a:ext uri="{91240B29-F687-4f45-9708-019B960494DF}">
-                <a14:hiddenLine xmlns:a14="http://schemas.microsoft.com/office/drawing/2010/main" xmlns="" w="9525">
+                <a14:hiddenLine xmlns="" xmlns:a14="http://schemas.microsoft.com/office/drawing/2010/main" w="9525">
                   <a:solidFill>
                     <a:srgbClr val="000000"/>
                   </a:solidFill>
@@ -9080,7 +9101,7 @@
             </a:ln>
             <a:extLst>
               <a:ext uri="{91240B29-F687-4f45-9708-019B960494DF}">
-                <a14:hiddenLine xmlns:a14="http://schemas.microsoft.com/office/drawing/2010/main" xmlns="" w="9525">
+                <a14:hiddenLine xmlns="" xmlns:a14="http://schemas.microsoft.com/office/drawing/2010/main" w="9525">
                   <a:solidFill>
                     <a:srgbClr val="000000"/>
                   </a:solidFill>
@@ -9170,7 +9191,7 @@
             </a:ln>
             <a:extLst>
               <a:ext uri="{91240B29-F687-4f45-9708-019B960494DF}">
-                <a14:hiddenLine xmlns:a14="http://schemas.microsoft.com/office/drawing/2010/main" xmlns="" w="9525">
+                <a14:hiddenLine xmlns="" xmlns:a14="http://schemas.microsoft.com/office/drawing/2010/main" w="9525">
                   <a:solidFill>
                     <a:srgbClr val="000000"/>
                   </a:solidFill>
@@ -9238,7 +9259,7 @@
             </a:ln>
             <a:extLst>
               <a:ext uri="{91240B29-F687-4f45-9708-019B960494DF}">
-                <a14:hiddenLine xmlns:a14="http://schemas.microsoft.com/office/drawing/2010/main" xmlns="" w="9525">
+                <a14:hiddenLine xmlns="" xmlns:a14="http://schemas.microsoft.com/office/drawing/2010/main" w="9525">
                   <a:solidFill>
                     <a:srgbClr val="000000"/>
                   </a:solidFill>
@@ -9328,7 +9349,7 @@
             </a:ln>
             <a:extLst>
               <a:ext uri="{91240B29-F687-4f45-9708-019B960494DF}">
-                <a14:hiddenLine xmlns:a14="http://schemas.microsoft.com/office/drawing/2010/main" xmlns="" w="9525">
+                <a14:hiddenLine xmlns="" xmlns:a14="http://schemas.microsoft.com/office/drawing/2010/main" w="9525">
                   <a:solidFill>
                     <a:srgbClr val="000000"/>
                   </a:solidFill>
@@ -9396,7 +9417,7 @@
             </a:ln>
             <a:extLst>
               <a:ext uri="{91240B29-F687-4f45-9708-019B960494DF}">
-                <a14:hiddenLine xmlns:a14="http://schemas.microsoft.com/office/drawing/2010/main" xmlns="" w="9525">
+                <a14:hiddenLine xmlns="" xmlns:a14="http://schemas.microsoft.com/office/drawing/2010/main" w="9525">
                   <a:solidFill>
                     <a:srgbClr val="000000"/>
                   </a:solidFill>
@@ -9486,7 +9507,7 @@
             </a:ln>
             <a:extLst>
               <a:ext uri="{91240B29-F687-4f45-9708-019B960494DF}">
-                <a14:hiddenLine xmlns:a14="http://schemas.microsoft.com/office/drawing/2010/main" xmlns="" w="9525">
+                <a14:hiddenLine xmlns="" xmlns:a14="http://schemas.microsoft.com/office/drawing/2010/main" w="9525">
                   <a:solidFill>
                     <a:srgbClr val="000000"/>
                   </a:solidFill>
@@ -9520,7 +9541,7 @@
             </a:ln>
             <a:extLst>
               <a:ext uri="{91240B29-F687-4f45-9708-019B960494DF}">
-                <a14:hiddenLine xmlns:a14="http://schemas.microsoft.com/office/drawing/2010/main" xmlns="" w="9525">
+                <a14:hiddenLine xmlns="" xmlns:a14="http://schemas.microsoft.com/office/drawing/2010/main" w="9525">
                   <a:solidFill>
                     <a:srgbClr val="000000"/>
                   </a:solidFill>
@@ -9610,7 +9631,7 @@
             </a:ln>
             <a:extLst>
               <a:ext uri="{91240B29-F687-4f45-9708-019B960494DF}">
-                <a14:hiddenLine xmlns:a14="http://schemas.microsoft.com/office/drawing/2010/main" xmlns="" w="9525">
+                <a14:hiddenLine xmlns="" xmlns:a14="http://schemas.microsoft.com/office/drawing/2010/main" w="9525">
                   <a:solidFill>
                     <a:srgbClr val="000000"/>
                   </a:solidFill>
@@ -9672,7 +9693,7 @@
             </a:ln>
             <a:extLst>
               <a:ext uri="{91240B29-F687-4f45-9708-019B960494DF}">
-                <a14:hiddenLine xmlns:a14="http://schemas.microsoft.com/office/drawing/2010/main" xmlns="" w="9525">
+                <a14:hiddenLine xmlns="" xmlns:a14="http://schemas.microsoft.com/office/drawing/2010/main" w="9525">
                   <a:solidFill>
                     <a:srgbClr val="000000"/>
                   </a:solidFill>
@@ -9734,7 +9755,7 @@
             </a:ln>
             <a:extLst>
               <a:ext uri="{91240B29-F687-4f45-9708-019B960494DF}">
-                <a14:hiddenLine xmlns:a14="http://schemas.microsoft.com/office/drawing/2010/main" xmlns="" w="9525">
+                <a14:hiddenLine xmlns="" xmlns:a14="http://schemas.microsoft.com/office/drawing/2010/main" w="9525">
                   <a:solidFill>
                     <a:srgbClr val="000000"/>
                   </a:solidFill>
@@ -9824,7 +9845,7 @@
             </a:ln>
             <a:extLst>
               <a:ext uri="{91240B29-F687-4f45-9708-019B960494DF}">
-                <a14:hiddenLine xmlns:a14="http://schemas.microsoft.com/office/drawing/2010/main" xmlns="" w="9525">
+                <a14:hiddenLine xmlns="" xmlns:a14="http://schemas.microsoft.com/office/drawing/2010/main" w="9525">
                   <a:solidFill>
                     <a:srgbClr val="000000"/>
                   </a:solidFill>
@@ -9892,7 +9913,7 @@
             </a:ln>
             <a:extLst>
               <a:ext uri="{91240B29-F687-4f45-9708-019B960494DF}">
-                <a14:hiddenLine xmlns:a14="http://schemas.microsoft.com/office/drawing/2010/main" xmlns="" w="9525">
+                <a14:hiddenLine xmlns="" xmlns:a14="http://schemas.microsoft.com/office/drawing/2010/main" w="9525">
                   <a:solidFill>
                     <a:srgbClr val="000000"/>
                   </a:solidFill>
@@ -9954,7 +9975,7 @@
             </a:ln>
             <a:extLst>
               <a:ext uri="{91240B29-F687-4f45-9708-019B960494DF}">
-                <a14:hiddenLine xmlns:a14="http://schemas.microsoft.com/office/drawing/2010/main" xmlns="" w="9525">
+                <a14:hiddenLine xmlns="" xmlns:a14="http://schemas.microsoft.com/office/drawing/2010/main" w="9525">
                   <a:solidFill>
                     <a:srgbClr val="000000"/>
                   </a:solidFill>
@@ -10044,7 +10065,7 @@
             </a:ln>
             <a:extLst>
               <a:ext uri="{91240B29-F687-4f45-9708-019B960494DF}">
-                <a14:hiddenLine xmlns:a14="http://schemas.microsoft.com/office/drawing/2010/main" xmlns="" w="9525">
+                <a14:hiddenLine xmlns="" xmlns:a14="http://schemas.microsoft.com/office/drawing/2010/main" w="9525">
                   <a:solidFill>
                     <a:srgbClr val="000000"/>
                   </a:solidFill>
@@ -10106,7 +10127,7 @@
             </a:ln>
             <a:extLst>
               <a:ext uri="{91240B29-F687-4f45-9708-019B960494DF}">
-                <a14:hiddenLine xmlns:a14="http://schemas.microsoft.com/office/drawing/2010/main" xmlns="" w="9525">
+                <a14:hiddenLine xmlns="" xmlns:a14="http://schemas.microsoft.com/office/drawing/2010/main" w="9525">
                   <a:solidFill>
                     <a:srgbClr val="000000"/>
                   </a:solidFill>
@@ -10196,7 +10217,7 @@
             </a:ln>
             <a:extLst>
               <a:ext uri="{91240B29-F687-4f45-9708-019B960494DF}">
-                <a14:hiddenLine xmlns:a14="http://schemas.microsoft.com/office/drawing/2010/main" xmlns="" w="9525">
+                <a14:hiddenLine xmlns="" xmlns:a14="http://schemas.microsoft.com/office/drawing/2010/main" w="9525">
                   <a:solidFill>
                     <a:srgbClr val="000000"/>
                   </a:solidFill>
@@ -10258,7 +10279,7 @@
             </a:ln>
             <a:extLst>
               <a:ext uri="{91240B29-F687-4f45-9708-019B960494DF}">
-                <a14:hiddenLine xmlns:a14="http://schemas.microsoft.com/office/drawing/2010/main" xmlns="" w="9525">
+                <a14:hiddenLine xmlns="" xmlns:a14="http://schemas.microsoft.com/office/drawing/2010/main" w="9525">
                   <a:solidFill>
                     <a:srgbClr val="000000"/>
                   </a:solidFill>
@@ -10348,7 +10369,7 @@
             </a:ln>
             <a:extLst>
               <a:ext uri="{91240B29-F687-4f45-9708-019B960494DF}">
-                <a14:hiddenLine xmlns:a14="http://schemas.microsoft.com/office/drawing/2010/main" xmlns="" w="9525">
+                <a14:hiddenLine xmlns="" xmlns:a14="http://schemas.microsoft.com/office/drawing/2010/main" w="9525">
                   <a:solidFill>
                     <a:srgbClr val="000000"/>
                   </a:solidFill>
@@ -10382,7 +10403,7 @@
             </a:ln>
             <a:extLst>
               <a:ext uri="{91240B29-F687-4f45-9708-019B960494DF}">
-                <a14:hiddenLine xmlns:a14="http://schemas.microsoft.com/office/drawing/2010/main" xmlns="" w="9525">
+                <a14:hiddenLine xmlns="" xmlns:a14="http://schemas.microsoft.com/office/drawing/2010/main" w="9525">
                   <a:solidFill>
                     <a:srgbClr val="000000"/>
                   </a:solidFill>
@@ -10447,7 +10468,7 @@
             </a:ln>
             <a:extLst>
               <a:ext uri="{91240B29-F687-4f45-9708-019B960494DF}">
-                <a14:hiddenLine xmlns:a14="http://schemas.microsoft.com/office/drawing/2010/main" xmlns="" w="9525">
+                <a14:hiddenLine xmlns="" xmlns:a14="http://schemas.microsoft.com/office/drawing/2010/main" w="9525">
                   <a:solidFill>
                     <a:srgbClr val="000000"/>
                   </a:solidFill>
@@ -10537,7 +10558,7 @@
             </a:ln>
             <a:extLst>
               <a:ext uri="{91240B29-F687-4f45-9708-019B960494DF}">
-                <a14:hiddenLine xmlns:a14="http://schemas.microsoft.com/office/drawing/2010/main" xmlns="" w="9525">
+                <a14:hiddenLine xmlns="" xmlns:a14="http://schemas.microsoft.com/office/drawing/2010/main" w="9525">
                   <a:solidFill>
                     <a:srgbClr val="000000"/>
                   </a:solidFill>
@@ -10599,7 +10620,7 @@
             </a:ln>
             <a:extLst>
               <a:ext uri="{91240B29-F687-4f45-9708-019B960494DF}">
-                <a14:hiddenLine xmlns:a14="http://schemas.microsoft.com/office/drawing/2010/main" xmlns="" w="9525">
+                <a14:hiddenLine xmlns="" xmlns:a14="http://schemas.microsoft.com/office/drawing/2010/main" w="9525">
                   <a:solidFill>
                     <a:srgbClr val="000000"/>
                   </a:solidFill>
@@ -10689,7 +10710,7 @@
             </a:ln>
             <a:extLst>
               <a:ext uri="{91240B29-F687-4f45-9708-019B960494DF}">
-                <a14:hiddenLine xmlns:a14="http://schemas.microsoft.com/office/drawing/2010/main" xmlns="" w="9525">
+                <a14:hiddenLine xmlns="" xmlns:a14="http://schemas.microsoft.com/office/drawing/2010/main" w="9525">
                   <a:solidFill>
                     <a:srgbClr val="000000"/>
                   </a:solidFill>
@@ -10779,7 +10800,7 @@
             </a:ln>
             <a:extLst>
               <a:ext uri="{91240B29-F687-4f45-9708-019B960494DF}">
-                <a14:hiddenLine xmlns:a14="http://schemas.microsoft.com/office/drawing/2010/main" xmlns="" w="9525">
+                <a14:hiddenLine xmlns="" xmlns:a14="http://schemas.microsoft.com/office/drawing/2010/main" w="9525">
                   <a:solidFill>
                     <a:srgbClr val="000000"/>
                   </a:solidFill>
@@ -10844,7 +10865,7 @@
             </a:ln>
             <a:extLst>
               <a:ext uri="{91240B29-F687-4f45-9708-019B960494DF}">
-                <a14:hiddenLine xmlns:a14="http://schemas.microsoft.com/office/drawing/2010/main" xmlns="" w="9525">
+                <a14:hiddenLine xmlns="" xmlns:a14="http://schemas.microsoft.com/office/drawing/2010/main" w="9525">
                   <a:solidFill>
                     <a:srgbClr val="000000"/>
                   </a:solidFill>
@@ -10906,7 +10927,7 @@
             </a:ln>
             <a:extLst>
               <a:ext uri="{91240B29-F687-4f45-9708-019B960494DF}">
-                <a14:hiddenLine xmlns:a14="http://schemas.microsoft.com/office/drawing/2010/main" xmlns="" w="9525">
+                <a14:hiddenLine xmlns="" xmlns:a14="http://schemas.microsoft.com/office/drawing/2010/main" w="9525">
                   <a:solidFill>
                     <a:srgbClr val="000000"/>
                   </a:solidFill>
@@ -10996,7 +11017,7 @@
             </a:ln>
             <a:extLst>
               <a:ext uri="{91240B29-F687-4f45-9708-019B960494DF}">
-                <a14:hiddenLine xmlns:a14="http://schemas.microsoft.com/office/drawing/2010/main" xmlns="" w="9525">
+                <a14:hiddenLine xmlns="" xmlns:a14="http://schemas.microsoft.com/office/drawing/2010/main" w="9525">
                   <a:solidFill>
                     <a:srgbClr val="000000"/>
                   </a:solidFill>
@@ -11086,7 +11107,7 @@
             </a:ln>
             <a:extLst>
               <a:ext uri="{91240B29-F687-4f45-9708-019B960494DF}">
-                <a14:hiddenLine xmlns:a14="http://schemas.microsoft.com/office/drawing/2010/main" xmlns="" w="9525">
+                <a14:hiddenLine xmlns="" xmlns:a14="http://schemas.microsoft.com/office/drawing/2010/main" w="9525">
                   <a:solidFill>
                     <a:srgbClr val="000000"/>
                   </a:solidFill>
@@ -11148,7 +11169,7 @@
             </a:ln>
             <a:extLst>
               <a:ext uri="{91240B29-F687-4f45-9708-019B960494DF}">
-                <a14:hiddenLine xmlns:a14="http://schemas.microsoft.com/office/drawing/2010/main" xmlns="" w="9525">
+                <a14:hiddenLine xmlns="" xmlns:a14="http://schemas.microsoft.com/office/drawing/2010/main" w="9525">
                   <a:solidFill>
                     <a:srgbClr val="000000"/>
                   </a:solidFill>
@@ -11268,7 +11289,7 @@
             </a:ln>
             <a:extLst>
               <a:ext uri="{91240B29-F687-4f45-9708-019B960494DF}">
-                <a14:hiddenLine xmlns:a14="http://schemas.microsoft.com/office/drawing/2010/main" xmlns="" w="9525">
+                <a14:hiddenLine xmlns="" xmlns:a14="http://schemas.microsoft.com/office/drawing/2010/main" w="9525">
                   <a:solidFill>
                     <a:srgbClr val="000000"/>
                   </a:solidFill>
@@ -11336,7 +11357,7 @@
             </a:ln>
             <a:extLst>
               <a:ext uri="{91240B29-F687-4f45-9708-019B960494DF}">
-                <a14:hiddenLine xmlns:a14="http://schemas.microsoft.com/office/drawing/2010/main" xmlns="" w="9525">
+                <a14:hiddenLine xmlns="" xmlns:a14="http://schemas.microsoft.com/office/drawing/2010/main" w="9525">
                   <a:solidFill>
                     <a:srgbClr val="000000"/>
                   </a:solidFill>
@@ -11426,7 +11447,7 @@
             </a:ln>
             <a:extLst>
               <a:ext uri="{91240B29-F687-4f45-9708-019B960494DF}">
-                <a14:hiddenLine xmlns:a14="http://schemas.microsoft.com/office/drawing/2010/main" xmlns="" w="9525">
+                <a14:hiddenLine xmlns="" xmlns:a14="http://schemas.microsoft.com/office/drawing/2010/main" w="9525">
                   <a:solidFill>
                     <a:srgbClr val="000000"/>
                   </a:solidFill>
@@ -11566,7 +11587,7 @@
           <a:p>
             <a:fld id="{4559D4BB-A0F9-4B27-80E6-E5E59F9288D1}" type="datetimeFigureOut">
               <a:rPr lang="en-US" smtClean="0"/>
-              <a:t>2/13/2026</a:t>
+              <a:t>2/14/2026</a:t>
             </a:fld>
             <a:endParaRPr lang="en-US"/>
           </a:p>
@@ -11746,7 +11767,7 @@
           <a:p>
             <a:fld id="{4559D4BB-A0F9-4B27-80E6-E5E59F9288D1}" type="datetimeFigureOut">
               <a:rPr lang="en-US" smtClean="0"/>
-              <a:t>2/13/2026</a:t>
+              <a:t>2/14/2026</a:t>
             </a:fld>
             <a:endParaRPr lang="en-US"/>
           </a:p>
@@ -11916,7 +11937,7 @@
           <a:p>
             <a:fld id="{4559D4BB-A0F9-4B27-80E6-E5E59F9288D1}" type="datetimeFigureOut">
               <a:rPr lang="en-US" smtClean="0"/>
-              <a:t>2/13/2026</a:t>
+              <a:t>2/14/2026</a:t>
             </a:fld>
             <a:endParaRPr lang="en-US"/>
           </a:p>
@@ -12166,7 +12187,7 @@
           <a:p>
             <a:fld id="{4559D4BB-A0F9-4B27-80E6-E5E59F9288D1}" type="datetimeFigureOut">
               <a:rPr lang="en-US" smtClean="0"/>
-              <a:t>2/13/2026</a:t>
+              <a:t>2/14/2026</a:t>
             </a:fld>
             <a:endParaRPr lang="en-US"/>
           </a:p>
@@ -12398,7 +12419,7 @@
           <a:p>
             <a:fld id="{4559D4BB-A0F9-4B27-80E6-E5E59F9288D1}" type="datetimeFigureOut">
               <a:rPr lang="en-US" smtClean="0"/>
-              <a:t>2/13/2026</a:t>
+              <a:t>2/14/2026</a:t>
             </a:fld>
             <a:endParaRPr lang="en-US"/>
           </a:p>
@@ -12779,7 +12800,7 @@
           <a:p>
             <a:fld id="{4559D4BB-A0F9-4B27-80E6-E5E59F9288D1}" type="datetimeFigureOut">
               <a:rPr lang="en-US" smtClean="0"/>
-              <a:t>2/13/2026</a:t>
+              <a:t>2/14/2026</a:t>
             </a:fld>
             <a:endParaRPr lang="en-US"/>
           </a:p>
@@ -12897,7 +12918,7 @@
           <a:p>
             <a:fld id="{4559D4BB-A0F9-4B27-80E6-E5E59F9288D1}" type="datetimeFigureOut">
               <a:rPr lang="en-US" smtClean="0"/>
-              <a:t>2/13/2026</a:t>
+              <a:t>2/14/2026</a:t>
             </a:fld>
             <a:endParaRPr lang="en-US"/>
           </a:p>
@@ -12992,7 +13013,7 @@
           <a:p>
             <a:fld id="{4559D4BB-A0F9-4B27-80E6-E5E59F9288D1}" type="datetimeFigureOut">
               <a:rPr lang="en-US" smtClean="0"/>
-              <a:t>2/13/2026</a:t>
+              <a:t>2/14/2026</a:t>
             </a:fld>
             <a:endParaRPr lang="en-US"/>
           </a:p>
@@ -13241,7 +13262,7 @@
           <a:p>
             <a:fld id="{4559D4BB-A0F9-4B27-80E6-E5E59F9288D1}" type="datetimeFigureOut">
               <a:rPr lang="en-US" smtClean="0"/>
-              <a:t>2/13/2026</a:t>
+              <a:t>2/14/2026</a:t>
             </a:fld>
             <a:endParaRPr lang="en-US"/>
           </a:p>
@@ -13521,7 +13542,7 @@
           <a:p>
             <a:fld id="{4559D4BB-A0F9-4B27-80E6-E5E59F9288D1}" type="datetimeFigureOut">
               <a:rPr lang="en-US" smtClean="0"/>
-              <a:t>2/13/2026</a:t>
+              <a:t>2/14/2026</a:t>
             </a:fld>
             <a:endParaRPr lang="en-US"/>
           </a:p>
@@ -13778,7 +13799,7 @@
           <a:p>
             <a:fld id="{4559D4BB-A0F9-4B27-80E6-E5E59F9288D1}" type="datetimeFigureOut">
               <a:rPr lang="en-US" smtClean="0"/>
-              <a:t>2/13/2026</a:t>
+              <a:t>2/14/2026</a:t>
             </a:fld>
             <a:endParaRPr lang="en-US"/>
           </a:p>
@@ -13974,7 +13995,7 @@
           <a:p>
             <a:fld id="{4559D4BB-A0F9-4B27-80E6-E5E59F9288D1}" type="datetimeFigureOut">
               <a:rPr lang="en-US" smtClean="0"/>
-              <a:t>2/13/2026</a:t>
+              <a:t>2/14/2026</a:t>
             </a:fld>
             <a:endParaRPr lang="en-US"/>
           </a:p>
@@ -14237,7 +14258,7 @@
           <a:p>
             <a:fld id="{4559D4BB-A0F9-4B27-80E6-E5E59F9288D1}" type="datetimeFigureOut">
               <a:rPr lang="en-US" smtClean="0"/>
-              <a:t>2/13/2026</a:t>
+              <a:t>2/14/2026</a:t>
             </a:fld>
             <a:endParaRPr lang="en-US"/>
           </a:p>
@@ -14725,7 +14746,7 @@
           <a:p>
             <a:fld id="{4559D4BB-A0F9-4B27-80E6-E5E59F9288D1}" type="datetimeFigureOut">
               <a:rPr lang="en-US" smtClean="0"/>
-              <a:t>2/13/2026</a:t>
+              <a:t>2/14/2026</a:t>
             </a:fld>
             <a:endParaRPr lang="en-US"/>
           </a:p>
@@ -14921,7 +14942,7 @@
           <a:p>
             <a:fld id="{4559D4BB-A0F9-4B27-80E6-E5E59F9288D1}" type="datetimeFigureOut">
               <a:rPr lang="en-US" smtClean="0"/>
-              <a:t>2/13/2026</a:t>
+              <a:t>2/14/2026</a:t>
             </a:fld>
             <a:endParaRPr lang="en-US"/>
           </a:p>
@@ -15467,7 +15488,7 @@
           <a:p>
             <a:fld id="{4559D4BB-A0F9-4B27-80E6-E5E59F9288D1}" type="datetimeFigureOut">
               <a:rPr lang="en-US" smtClean="0"/>
-              <a:t>2/13/2026</a:t>
+              <a:t>2/14/2026</a:t>
             </a:fld>
             <a:endParaRPr lang="en-US"/>
           </a:p>
@@ -16187,7 +16208,7 @@
           <a:p>
             <a:fld id="{4559D4BB-A0F9-4B27-80E6-E5E59F9288D1}" type="datetimeFigureOut">
               <a:rPr lang="en-US" smtClean="0"/>
-              <a:t>2/13/2026</a:t>
+              <a:t>2/14/2026</a:t>
             </a:fld>
             <a:endParaRPr lang="en-US"/>
           </a:p>
@@ -16357,7 +16378,7 @@
           <a:p>
             <a:fld id="{4559D4BB-A0F9-4B27-80E6-E5E59F9288D1}" type="datetimeFigureOut">
               <a:rPr lang="en-US" smtClean="0"/>
-              <a:t>2/13/2026</a:t>
+              <a:t>2/14/2026</a:t>
             </a:fld>
             <a:endParaRPr lang="en-US"/>
           </a:p>
@@ -16537,7 +16558,7 @@
           <a:p>
             <a:fld id="{4559D4BB-A0F9-4B27-80E6-E5E59F9288D1}" type="datetimeFigureOut">
               <a:rPr lang="en-US" smtClean="0"/>
-              <a:t>2/13/2026</a:t>
+              <a:t>2/14/2026</a:t>
             </a:fld>
             <a:endParaRPr lang="en-US"/>
           </a:p>
@@ -16769,7 +16790,7 @@
           <a:p>
             <a:fld id="{4559D4BB-A0F9-4B27-80E6-E5E59F9288D1}" type="datetimeFigureOut">
               <a:rPr lang="en-US" smtClean="0"/>
-              <a:t>2/13/2026</a:t>
+              <a:t>2/14/2026</a:t>
             </a:fld>
             <a:endParaRPr lang="en-US"/>
           </a:p>
@@ -17150,7 +17171,7 @@
           <a:p>
             <a:fld id="{4559D4BB-A0F9-4B27-80E6-E5E59F9288D1}" type="datetimeFigureOut">
               <a:rPr lang="en-US" smtClean="0"/>
-              <a:t>2/13/2026</a:t>
+              <a:t>2/14/2026</a:t>
             </a:fld>
             <a:endParaRPr lang="en-US"/>
           </a:p>
@@ -17268,7 +17289,7 @@
           <a:p>
             <a:fld id="{4559D4BB-A0F9-4B27-80E6-E5E59F9288D1}" type="datetimeFigureOut">
               <a:rPr lang="en-US" smtClean="0"/>
-              <a:t>2/13/2026</a:t>
+              <a:t>2/14/2026</a:t>
             </a:fld>
             <a:endParaRPr lang="en-US"/>
           </a:p>
@@ -17363,7 +17384,7 @@
           <a:p>
             <a:fld id="{4559D4BB-A0F9-4B27-80E6-E5E59F9288D1}" type="datetimeFigureOut">
               <a:rPr lang="en-US" smtClean="0"/>
-              <a:t>2/13/2026</a:t>
+              <a:t>2/14/2026</a:t>
             </a:fld>
             <a:endParaRPr lang="en-US"/>
           </a:p>
@@ -17612,7 +17633,7 @@
           <a:p>
             <a:fld id="{4559D4BB-A0F9-4B27-80E6-E5E59F9288D1}" type="datetimeFigureOut">
               <a:rPr lang="en-US" smtClean="0"/>
-              <a:t>2/13/2026</a:t>
+              <a:t>2/14/2026</a:t>
             </a:fld>
             <a:endParaRPr lang="en-US"/>
           </a:p>
@@ -17892,7 +17913,7 @@
           <a:p>
             <a:fld id="{4559D4BB-A0F9-4B27-80E6-E5E59F9288D1}" type="datetimeFigureOut">
               <a:rPr lang="en-US" smtClean="0"/>
-              <a:t>2/13/2026</a:t>
+              <a:t>2/14/2026</a:t>
             </a:fld>
             <a:endParaRPr lang="en-US"/>
           </a:p>
@@ -18015,7 +18036,7 @@
           <a:noFill/>
           <a:extLst>
             <a:ext uri="{909E8E84-426E-40dd-AFC4-6F175D3DCCD1}">
-              <a14:hiddenFill xmlns:a14="http://schemas.microsoft.com/office/drawing/2010/main" xmlns="">
+              <a14:hiddenFill xmlns="" xmlns:a14="http://schemas.microsoft.com/office/drawing/2010/main">
                 <a:solidFill>
                   <a:srgbClr val="FFFFFF"/>
                 </a:solidFill>
@@ -18089,7 +18110,7 @@
               </a:ln>
               <a:extLst>
                 <a:ext uri="{91240B29-F687-4f45-9708-019B960494DF}">
-                  <a14:hiddenLine xmlns:a14="http://schemas.microsoft.com/office/drawing/2010/main" xmlns="" w="9525">
+                  <a14:hiddenLine xmlns="" xmlns:a14="http://schemas.microsoft.com/office/drawing/2010/main" w="9525">
                     <a:solidFill>
                       <a:srgbClr val="000000"/>
                     </a:solidFill>
@@ -18179,7 +18200,7 @@
               </a:ln>
               <a:extLst>
                 <a:ext uri="{91240B29-F687-4f45-9708-019B960494DF}">
-                  <a14:hiddenLine xmlns:a14="http://schemas.microsoft.com/office/drawing/2010/main" xmlns="" w="9525">
+                  <a14:hiddenLine xmlns="" xmlns:a14="http://schemas.microsoft.com/office/drawing/2010/main" w="9525">
                     <a:solidFill>
                       <a:srgbClr val="000000"/>
                     </a:solidFill>
@@ -18269,7 +18290,7 @@
               </a:ln>
               <a:extLst>
                 <a:ext uri="{91240B29-F687-4f45-9708-019B960494DF}">
-                  <a14:hiddenLine xmlns:a14="http://schemas.microsoft.com/office/drawing/2010/main" xmlns="" w="9525">
+                  <a14:hiddenLine xmlns="" xmlns:a14="http://schemas.microsoft.com/office/drawing/2010/main" w="9525">
                     <a:solidFill>
                       <a:srgbClr val="000000"/>
                     </a:solidFill>
@@ -18331,7 +18352,7 @@
               </a:ln>
               <a:extLst>
                 <a:ext uri="{91240B29-F687-4f45-9708-019B960494DF}">
-                  <a14:hiddenLine xmlns:a14="http://schemas.microsoft.com/office/drawing/2010/main" xmlns="" w="9525">
+                  <a14:hiddenLine xmlns="" xmlns:a14="http://schemas.microsoft.com/office/drawing/2010/main" w="9525">
                     <a:solidFill>
                       <a:srgbClr val="000000"/>
                     </a:solidFill>
@@ -18421,7 +18442,7 @@
               </a:ln>
               <a:extLst>
                 <a:ext uri="{91240B29-F687-4f45-9708-019B960494DF}">
-                  <a14:hiddenLine xmlns:a14="http://schemas.microsoft.com/office/drawing/2010/main" xmlns="" w="9525">
+                  <a14:hiddenLine xmlns="" xmlns:a14="http://schemas.microsoft.com/office/drawing/2010/main" w="9525">
                     <a:solidFill>
                       <a:srgbClr val="000000"/>
                     </a:solidFill>
@@ -18483,7 +18504,7 @@
               </a:ln>
               <a:extLst>
                 <a:ext uri="{91240B29-F687-4f45-9708-019B960494DF}">
-                  <a14:hiddenLine xmlns:a14="http://schemas.microsoft.com/office/drawing/2010/main" xmlns="" w="9525">
+                  <a14:hiddenLine xmlns="" xmlns:a14="http://schemas.microsoft.com/office/drawing/2010/main" w="9525">
                     <a:solidFill>
                       <a:srgbClr val="000000"/>
                     </a:solidFill>
@@ -18545,7 +18566,7 @@
               </a:ln>
               <a:extLst>
                 <a:ext uri="{91240B29-F687-4f45-9708-019B960494DF}">
-                  <a14:hiddenLine xmlns:a14="http://schemas.microsoft.com/office/drawing/2010/main" xmlns="" w="9525">
+                  <a14:hiddenLine xmlns="" xmlns:a14="http://schemas.microsoft.com/office/drawing/2010/main" w="9525">
                     <a:solidFill>
                       <a:srgbClr val="000000"/>
                     </a:solidFill>
@@ -18635,7 +18656,7 @@
               </a:ln>
               <a:extLst>
                 <a:ext uri="{91240B29-F687-4f45-9708-019B960494DF}">
-                  <a14:hiddenLine xmlns:a14="http://schemas.microsoft.com/office/drawing/2010/main" xmlns="" w="9525">
+                  <a14:hiddenLine xmlns="" xmlns:a14="http://schemas.microsoft.com/office/drawing/2010/main" w="9525">
                     <a:solidFill>
                       <a:srgbClr val="000000"/>
                     </a:solidFill>
@@ -18725,7 +18746,7 @@
               </a:ln>
               <a:extLst>
                 <a:ext uri="{91240B29-F687-4f45-9708-019B960494DF}">
-                  <a14:hiddenLine xmlns:a14="http://schemas.microsoft.com/office/drawing/2010/main" xmlns="" w="9525">
+                  <a14:hiddenLine xmlns="" xmlns:a14="http://schemas.microsoft.com/office/drawing/2010/main" w="9525">
                     <a:solidFill>
                       <a:srgbClr val="000000"/>
                     </a:solidFill>
@@ -18787,7 +18808,7 @@
               </a:ln>
               <a:extLst>
                 <a:ext uri="{91240B29-F687-4f45-9708-019B960494DF}">
-                  <a14:hiddenLine xmlns:a14="http://schemas.microsoft.com/office/drawing/2010/main" xmlns="" w="9525">
+                  <a14:hiddenLine xmlns="" xmlns:a14="http://schemas.microsoft.com/office/drawing/2010/main" w="9525">
                     <a:solidFill>
                       <a:srgbClr val="000000"/>
                     </a:solidFill>
@@ -18897,7 +18918,7 @@
               </a:ln>
               <a:extLst>
                 <a:ext uri="{91240B29-F687-4f45-9708-019B960494DF}">
-                  <a14:hiddenLine xmlns:a14="http://schemas.microsoft.com/office/drawing/2010/main" xmlns="" w="9525">
+                  <a14:hiddenLine xmlns="" xmlns:a14="http://schemas.microsoft.com/office/drawing/2010/main" w="9525">
                     <a:solidFill>
                       <a:srgbClr val="000000"/>
                     </a:solidFill>
@@ -18981,7 +19002,7 @@
               </a:ln>
               <a:extLst>
                 <a:ext uri="{91240B29-F687-4f45-9708-019B960494DF}">
-                  <a14:hiddenLine xmlns:a14="http://schemas.microsoft.com/office/drawing/2010/main" xmlns="" w="9525">
+                  <a14:hiddenLine xmlns="" xmlns:a14="http://schemas.microsoft.com/office/drawing/2010/main" w="9525">
                     <a:solidFill>
                       <a:srgbClr val="000000"/>
                     </a:solidFill>
@@ -19043,7 +19064,7 @@
               </a:ln>
               <a:extLst>
                 <a:ext uri="{91240B29-F687-4f45-9708-019B960494DF}">
-                  <a14:hiddenLine xmlns:a14="http://schemas.microsoft.com/office/drawing/2010/main" xmlns="" w="9525">
+                  <a14:hiddenLine xmlns="" xmlns:a14="http://schemas.microsoft.com/office/drawing/2010/main" w="9525">
                     <a:solidFill>
                       <a:srgbClr val="000000"/>
                     </a:solidFill>
@@ -19105,7 +19126,7 @@
               </a:ln>
               <a:extLst>
                 <a:ext uri="{91240B29-F687-4f45-9708-019B960494DF}">
-                  <a14:hiddenLine xmlns:a14="http://schemas.microsoft.com/office/drawing/2010/main" xmlns="" w="9525">
+                  <a14:hiddenLine xmlns="" xmlns:a14="http://schemas.microsoft.com/office/drawing/2010/main" w="9525">
                     <a:solidFill>
                       <a:srgbClr val="000000"/>
                     </a:solidFill>
@@ -19195,7 +19216,7 @@
               </a:ln>
               <a:extLst>
                 <a:ext uri="{91240B29-F687-4f45-9708-019B960494DF}">
-                  <a14:hiddenLine xmlns:a14="http://schemas.microsoft.com/office/drawing/2010/main" xmlns="" w="9525">
+                  <a14:hiddenLine xmlns="" xmlns:a14="http://schemas.microsoft.com/office/drawing/2010/main" w="9525">
                     <a:solidFill>
                       <a:srgbClr val="000000"/>
                     </a:solidFill>
@@ -19229,7 +19250,7 @@
               </a:ln>
               <a:extLst>
                 <a:ext uri="{91240B29-F687-4f45-9708-019B960494DF}">
-                  <a14:hiddenLine xmlns:a14="http://schemas.microsoft.com/office/drawing/2010/main" xmlns="" w="9525">
+                  <a14:hiddenLine xmlns="" xmlns:a14="http://schemas.microsoft.com/office/drawing/2010/main" w="9525">
                     <a:solidFill>
                       <a:srgbClr val="000000"/>
                     </a:solidFill>
@@ -19294,7 +19315,7 @@
               </a:ln>
               <a:extLst>
                 <a:ext uri="{91240B29-F687-4f45-9708-019B960494DF}">
-                  <a14:hiddenLine xmlns:a14="http://schemas.microsoft.com/office/drawing/2010/main" xmlns="" w="9525">
+                  <a14:hiddenLine xmlns="" xmlns:a14="http://schemas.microsoft.com/office/drawing/2010/main" w="9525">
                     <a:solidFill>
                       <a:srgbClr val="000000"/>
                     </a:solidFill>
@@ -19384,7 +19405,7 @@
               </a:ln>
               <a:extLst>
                 <a:ext uri="{91240B29-F687-4f45-9708-019B960494DF}">
-                  <a14:hiddenLine xmlns:a14="http://schemas.microsoft.com/office/drawing/2010/main" xmlns="" w="9525">
+                  <a14:hiddenLine xmlns="" xmlns:a14="http://schemas.microsoft.com/office/drawing/2010/main" w="9525">
                     <a:solidFill>
                       <a:srgbClr val="000000"/>
                     </a:solidFill>
@@ -19446,7 +19467,7 @@
               </a:ln>
               <a:extLst>
                 <a:ext uri="{91240B29-F687-4f45-9708-019B960494DF}">
-                  <a14:hiddenLine xmlns:a14="http://schemas.microsoft.com/office/drawing/2010/main" xmlns="" w="9525">
+                  <a14:hiddenLine xmlns="" xmlns:a14="http://schemas.microsoft.com/office/drawing/2010/main" w="9525">
                     <a:solidFill>
                       <a:srgbClr val="000000"/>
                     </a:solidFill>
@@ -19536,7 +19557,7 @@
               </a:ln>
               <a:extLst>
                 <a:ext uri="{91240B29-F687-4f45-9708-019B960494DF}">
-                  <a14:hiddenLine xmlns:a14="http://schemas.microsoft.com/office/drawing/2010/main" xmlns="" w="9525">
+                  <a14:hiddenLine xmlns="" xmlns:a14="http://schemas.microsoft.com/office/drawing/2010/main" w="9525">
                     <a:solidFill>
                       <a:srgbClr val="000000"/>
                     </a:solidFill>
@@ -19601,7 +19622,7 @@
               </a:ln>
               <a:extLst>
                 <a:ext uri="{91240B29-F687-4f45-9708-019B960494DF}">
-                  <a14:hiddenLine xmlns:a14="http://schemas.microsoft.com/office/drawing/2010/main" xmlns="" w="9525">
+                  <a14:hiddenLine xmlns="" xmlns:a14="http://schemas.microsoft.com/office/drawing/2010/main" w="9525">
                     <a:solidFill>
                       <a:srgbClr val="000000"/>
                     </a:solidFill>
@@ -19663,7 +19684,7 @@
               </a:ln>
               <a:extLst>
                 <a:ext uri="{91240B29-F687-4f45-9708-019B960494DF}">
-                  <a14:hiddenLine xmlns:a14="http://schemas.microsoft.com/office/drawing/2010/main" xmlns="" w="9525">
+                  <a14:hiddenLine xmlns="" xmlns:a14="http://schemas.microsoft.com/office/drawing/2010/main" w="9525">
                     <a:solidFill>
                       <a:srgbClr val="000000"/>
                     </a:solidFill>
@@ -19753,7 +19774,7 @@
               </a:ln>
               <a:extLst>
                 <a:ext uri="{91240B29-F687-4f45-9708-019B960494DF}">
-                  <a14:hiddenLine xmlns:a14="http://schemas.microsoft.com/office/drawing/2010/main" xmlns="" w="9525">
+                  <a14:hiddenLine xmlns="" xmlns:a14="http://schemas.microsoft.com/office/drawing/2010/main" w="9525">
                     <a:solidFill>
                       <a:srgbClr val="000000"/>
                     </a:solidFill>
@@ -19843,7 +19864,7 @@
               </a:ln>
               <a:extLst>
                 <a:ext uri="{91240B29-F687-4f45-9708-019B960494DF}">
-                  <a14:hiddenLine xmlns:a14="http://schemas.microsoft.com/office/drawing/2010/main" xmlns="" w="9525">
+                  <a14:hiddenLine xmlns="" xmlns:a14="http://schemas.microsoft.com/office/drawing/2010/main" w="9525">
                     <a:solidFill>
                       <a:srgbClr val="000000"/>
                     </a:solidFill>
@@ -19908,7 +19929,7 @@
               </a:ln>
               <a:extLst>
                 <a:ext uri="{91240B29-F687-4f45-9708-019B960494DF}">
-                  <a14:hiddenLine xmlns:a14="http://schemas.microsoft.com/office/drawing/2010/main" xmlns="" w="9525">
+                  <a14:hiddenLine xmlns="" xmlns:a14="http://schemas.microsoft.com/office/drawing/2010/main" w="9525">
                     <a:solidFill>
                       <a:srgbClr val="000000"/>
                     </a:solidFill>
@@ -20028,7 +20049,7 @@
               </a:ln>
               <a:extLst>
                 <a:ext uri="{91240B29-F687-4f45-9708-019B960494DF}">
-                  <a14:hiddenLine xmlns:a14="http://schemas.microsoft.com/office/drawing/2010/main" xmlns="" w="9525">
+                  <a14:hiddenLine xmlns="" xmlns:a14="http://schemas.microsoft.com/office/drawing/2010/main" w="9525">
                     <a:solidFill>
                       <a:srgbClr val="000000"/>
                     </a:solidFill>
@@ -20109,7 +20130,7 @@
               </a:ln>
               <a:extLst>
                 <a:ext uri="{91240B29-F687-4f45-9708-019B960494DF}">
-                  <a14:hiddenLine xmlns:a14="http://schemas.microsoft.com/office/drawing/2010/main" xmlns="" w="9525">
+                  <a14:hiddenLine xmlns="" xmlns:a14="http://schemas.microsoft.com/office/drawing/2010/main" w="9525">
                     <a:solidFill>
                       <a:srgbClr val="000000"/>
                     </a:solidFill>
@@ -20224,7 +20245,7 @@
               </a:ln>
               <a:extLst>
                 <a:ext uri="{91240B29-F687-4f45-9708-019B960494DF}">
-                  <a14:hiddenLine xmlns:a14="http://schemas.microsoft.com/office/drawing/2010/main" xmlns="" w="9525">
+                  <a14:hiddenLine xmlns="" xmlns:a14="http://schemas.microsoft.com/office/drawing/2010/main" w="9525">
                     <a:solidFill>
                       <a:srgbClr val="000000"/>
                     </a:solidFill>
@@ -20314,7 +20335,7 @@
               </a:ln>
               <a:extLst>
                 <a:ext uri="{91240B29-F687-4f45-9708-019B960494DF}">
-                  <a14:hiddenLine xmlns:a14="http://schemas.microsoft.com/office/drawing/2010/main" xmlns="" w="9525">
+                  <a14:hiddenLine xmlns="" xmlns:a14="http://schemas.microsoft.com/office/drawing/2010/main" w="9525">
                     <a:solidFill>
                       <a:srgbClr val="000000"/>
                     </a:solidFill>
@@ -20379,7 +20400,7 @@
               </a:ln>
               <a:extLst>
                 <a:ext uri="{91240B29-F687-4f45-9708-019B960494DF}">
-                  <a14:hiddenLine xmlns:a14="http://schemas.microsoft.com/office/drawing/2010/main" xmlns="" w="9525">
+                  <a14:hiddenLine xmlns="" xmlns:a14="http://schemas.microsoft.com/office/drawing/2010/main" w="9525">
                     <a:solidFill>
                       <a:srgbClr val="000000"/>
                     </a:solidFill>
@@ -20469,7 +20490,7 @@
               </a:ln>
               <a:extLst>
                 <a:ext uri="{91240B29-F687-4f45-9708-019B960494DF}">
-                  <a14:hiddenLine xmlns:a14="http://schemas.microsoft.com/office/drawing/2010/main" xmlns="" w="9525">
+                  <a14:hiddenLine xmlns="" xmlns:a14="http://schemas.microsoft.com/office/drawing/2010/main" w="9525">
                     <a:solidFill>
                       <a:srgbClr val="000000"/>
                     </a:solidFill>
@@ -20537,7 +20558,7 @@
               </a:ln>
               <a:extLst>
                 <a:ext uri="{91240B29-F687-4f45-9708-019B960494DF}">
-                  <a14:hiddenLine xmlns:a14="http://schemas.microsoft.com/office/drawing/2010/main" xmlns="" w="9525">
+                  <a14:hiddenLine xmlns="" xmlns:a14="http://schemas.microsoft.com/office/drawing/2010/main" w="9525">
                     <a:solidFill>
                       <a:srgbClr val="000000"/>
                     </a:solidFill>
@@ -20627,7 +20648,7 @@
               </a:ln>
               <a:extLst>
                 <a:ext uri="{91240B29-F687-4f45-9708-019B960494DF}">
-                  <a14:hiddenLine xmlns:a14="http://schemas.microsoft.com/office/drawing/2010/main" xmlns="" w="9525">
+                  <a14:hiddenLine xmlns="" xmlns:a14="http://schemas.microsoft.com/office/drawing/2010/main" w="9525">
                     <a:solidFill>
                       <a:srgbClr val="000000"/>
                     </a:solidFill>
@@ -20695,7 +20716,7 @@
               </a:ln>
               <a:extLst>
                 <a:ext uri="{91240B29-F687-4f45-9708-019B960494DF}">
-                  <a14:hiddenLine xmlns:a14="http://schemas.microsoft.com/office/drawing/2010/main" xmlns="" w="9525">
+                  <a14:hiddenLine xmlns="" xmlns:a14="http://schemas.microsoft.com/office/drawing/2010/main" w="9525">
                     <a:solidFill>
                       <a:srgbClr val="000000"/>
                     </a:solidFill>
@@ -20785,7 +20806,7 @@
               </a:ln>
               <a:extLst>
                 <a:ext uri="{91240B29-F687-4f45-9708-019B960494DF}">
-                  <a14:hiddenLine xmlns:a14="http://schemas.microsoft.com/office/drawing/2010/main" xmlns="" w="9525">
+                  <a14:hiddenLine xmlns="" xmlns:a14="http://schemas.microsoft.com/office/drawing/2010/main" w="9525">
                     <a:solidFill>
                       <a:srgbClr val="000000"/>
                     </a:solidFill>
@@ -20819,7 +20840,7 @@
               </a:ln>
               <a:extLst>
                 <a:ext uri="{91240B29-F687-4f45-9708-019B960494DF}">
-                  <a14:hiddenLine xmlns:a14="http://schemas.microsoft.com/office/drawing/2010/main" xmlns="" w="9525">
+                  <a14:hiddenLine xmlns="" xmlns:a14="http://schemas.microsoft.com/office/drawing/2010/main" w="9525">
                     <a:solidFill>
                       <a:srgbClr val="000000"/>
                     </a:solidFill>
@@ -20959,7 +20980,7 @@
           <a:p>
             <a:fld id="{4559D4BB-A0F9-4B27-80E6-E5E59F9288D1}" type="datetimeFigureOut">
               <a:rPr lang="en-US" smtClean="0"/>
-              <a:t>2/13/2026</a:t>
+              <a:t>2/14/2026</a:t>
             </a:fld>
             <a:endParaRPr lang="en-US"/>
           </a:p>
@@ -21417,7 +21438,7 @@
           <a:noFill/>
           <a:extLst>
             <a:ext uri="{909E8E84-426E-40dd-AFC4-6F175D3DCCD1}">
-              <a14:hiddenFill xmlns:a14="http://schemas.microsoft.com/office/drawing/2010/main" xmlns="">
+              <a14:hiddenFill xmlns="" xmlns:a14="http://schemas.microsoft.com/office/drawing/2010/main">
                 <a:solidFill>
                   <a:srgbClr val="FFFFFF"/>
                 </a:solidFill>
@@ -21491,7 +21512,7 @@
               </a:ln>
               <a:extLst>
                 <a:ext uri="{91240B29-F687-4f45-9708-019B960494DF}">
-                  <a14:hiddenLine xmlns:a14="http://schemas.microsoft.com/office/drawing/2010/main" xmlns="" w="9525">
+                  <a14:hiddenLine xmlns="" xmlns:a14="http://schemas.microsoft.com/office/drawing/2010/main" w="9525">
                     <a:solidFill>
                       <a:srgbClr val="000000"/>
                     </a:solidFill>
@@ -21581,7 +21602,7 @@
               </a:ln>
               <a:extLst>
                 <a:ext uri="{91240B29-F687-4f45-9708-019B960494DF}">
-                  <a14:hiddenLine xmlns:a14="http://schemas.microsoft.com/office/drawing/2010/main" xmlns="" w="9525">
+                  <a14:hiddenLine xmlns="" xmlns:a14="http://schemas.microsoft.com/office/drawing/2010/main" w="9525">
                     <a:solidFill>
                       <a:srgbClr val="000000"/>
                     </a:solidFill>
@@ -21671,7 +21692,7 @@
               </a:ln>
               <a:extLst>
                 <a:ext uri="{91240B29-F687-4f45-9708-019B960494DF}">
-                  <a14:hiddenLine xmlns:a14="http://schemas.microsoft.com/office/drawing/2010/main" xmlns="" w="9525">
+                  <a14:hiddenLine xmlns="" xmlns:a14="http://schemas.microsoft.com/office/drawing/2010/main" w="9525">
                     <a:solidFill>
                       <a:srgbClr val="000000"/>
                     </a:solidFill>
@@ -21733,7 +21754,7 @@
               </a:ln>
               <a:extLst>
                 <a:ext uri="{91240B29-F687-4f45-9708-019B960494DF}">
-                  <a14:hiddenLine xmlns:a14="http://schemas.microsoft.com/office/drawing/2010/main" xmlns="" w="9525">
+                  <a14:hiddenLine xmlns="" xmlns:a14="http://schemas.microsoft.com/office/drawing/2010/main" w="9525">
                     <a:solidFill>
                       <a:srgbClr val="000000"/>
                     </a:solidFill>
@@ -21823,7 +21844,7 @@
               </a:ln>
               <a:extLst>
                 <a:ext uri="{91240B29-F687-4f45-9708-019B960494DF}">
-                  <a14:hiddenLine xmlns:a14="http://schemas.microsoft.com/office/drawing/2010/main" xmlns="" w="9525">
+                  <a14:hiddenLine xmlns="" xmlns:a14="http://schemas.microsoft.com/office/drawing/2010/main" w="9525">
                     <a:solidFill>
                       <a:srgbClr val="000000"/>
                     </a:solidFill>
@@ -21885,7 +21906,7 @@
               </a:ln>
               <a:extLst>
                 <a:ext uri="{91240B29-F687-4f45-9708-019B960494DF}">
-                  <a14:hiddenLine xmlns:a14="http://schemas.microsoft.com/office/drawing/2010/main" xmlns="" w="9525">
+                  <a14:hiddenLine xmlns="" xmlns:a14="http://schemas.microsoft.com/office/drawing/2010/main" w="9525">
                     <a:solidFill>
                       <a:srgbClr val="000000"/>
                     </a:solidFill>
@@ -21947,7 +21968,7 @@
               </a:ln>
               <a:extLst>
                 <a:ext uri="{91240B29-F687-4f45-9708-019B960494DF}">
-                  <a14:hiddenLine xmlns:a14="http://schemas.microsoft.com/office/drawing/2010/main" xmlns="" w="9525">
+                  <a14:hiddenLine xmlns="" xmlns:a14="http://schemas.microsoft.com/office/drawing/2010/main" w="9525">
                     <a:solidFill>
                       <a:srgbClr val="000000"/>
                     </a:solidFill>
@@ -22037,7 +22058,7 @@
               </a:ln>
               <a:extLst>
                 <a:ext uri="{91240B29-F687-4f45-9708-019B960494DF}">
-                  <a14:hiddenLine xmlns:a14="http://schemas.microsoft.com/office/drawing/2010/main" xmlns="" w="9525">
+                  <a14:hiddenLine xmlns="" xmlns:a14="http://schemas.microsoft.com/office/drawing/2010/main" w="9525">
                     <a:solidFill>
                       <a:srgbClr val="000000"/>
                     </a:solidFill>
@@ -22127,7 +22148,7 @@
               </a:ln>
               <a:extLst>
                 <a:ext uri="{91240B29-F687-4f45-9708-019B960494DF}">
-                  <a14:hiddenLine xmlns:a14="http://schemas.microsoft.com/office/drawing/2010/main" xmlns="" w="9525">
+                  <a14:hiddenLine xmlns="" xmlns:a14="http://schemas.microsoft.com/office/drawing/2010/main" w="9525">
                     <a:solidFill>
                       <a:srgbClr val="000000"/>
                     </a:solidFill>
@@ -22189,7 +22210,7 @@
               </a:ln>
               <a:extLst>
                 <a:ext uri="{91240B29-F687-4f45-9708-019B960494DF}">
-                  <a14:hiddenLine xmlns:a14="http://schemas.microsoft.com/office/drawing/2010/main" xmlns="" w="9525">
+                  <a14:hiddenLine xmlns="" xmlns:a14="http://schemas.microsoft.com/office/drawing/2010/main" w="9525">
                     <a:solidFill>
                       <a:srgbClr val="000000"/>
                     </a:solidFill>
@@ -22299,7 +22320,7 @@
               </a:ln>
               <a:extLst>
                 <a:ext uri="{91240B29-F687-4f45-9708-019B960494DF}">
-                  <a14:hiddenLine xmlns:a14="http://schemas.microsoft.com/office/drawing/2010/main" xmlns="" w="9525">
+                  <a14:hiddenLine xmlns="" xmlns:a14="http://schemas.microsoft.com/office/drawing/2010/main" w="9525">
                     <a:solidFill>
                       <a:srgbClr val="000000"/>
                     </a:solidFill>
@@ -22383,7 +22404,7 @@
               </a:ln>
               <a:extLst>
                 <a:ext uri="{91240B29-F687-4f45-9708-019B960494DF}">
-                  <a14:hiddenLine xmlns:a14="http://schemas.microsoft.com/office/drawing/2010/main" xmlns="" w="9525">
+                  <a14:hiddenLine xmlns="" xmlns:a14="http://schemas.microsoft.com/office/drawing/2010/main" w="9525">
                     <a:solidFill>
                       <a:srgbClr val="000000"/>
                     </a:solidFill>
@@ -22445,7 +22466,7 @@
               </a:ln>
               <a:extLst>
                 <a:ext uri="{91240B29-F687-4f45-9708-019B960494DF}">
-                  <a14:hiddenLine xmlns:a14="http://schemas.microsoft.com/office/drawing/2010/main" xmlns="" w="9525">
+                  <a14:hiddenLine xmlns="" xmlns:a14="http://schemas.microsoft.com/office/drawing/2010/main" w="9525">
                     <a:solidFill>
                       <a:srgbClr val="000000"/>
                     </a:solidFill>
@@ -22507,7 +22528,7 @@
               </a:ln>
               <a:extLst>
                 <a:ext uri="{91240B29-F687-4f45-9708-019B960494DF}">
-                  <a14:hiddenLine xmlns:a14="http://schemas.microsoft.com/office/drawing/2010/main" xmlns="" w="9525">
+                  <a14:hiddenLine xmlns="" xmlns:a14="http://schemas.microsoft.com/office/drawing/2010/main" w="9525">
                     <a:solidFill>
                       <a:srgbClr val="000000"/>
                     </a:solidFill>
@@ -22597,7 +22618,7 @@
               </a:ln>
               <a:extLst>
                 <a:ext uri="{91240B29-F687-4f45-9708-019B960494DF}">
-                  <a14:hiddenLine xmlns:a14="http://schemas.microsoft.com/office/drawing/2010/main" xmlns="" w="9525">
+                  <a14:hiddenLine xmlns="" xmlns:a14="http://schemas.microsoft.com/office/drawing/2010/main" w="9525">
                     <a:solidFill>
                       <a:srgbClr val="000000"/>
                     </a:solidFill>
@@ -22631,7 +22652,7 @@
               </a:ln>
               <a:extLst>
                 <a:ext uri="{91240B29-F687-4f45-9708-019B960494DF}">
-                  <a14:hiddenLine xmlns:a14="http://schemas.microsoft.com/office/drawing/2010/main" xmlns="" w="9525">
+                  <a14:hiddenLine xmlns="" xmlns:a14="http://schemas.microsoft.com/office/drawing/2010/main" w="9525">
                     <a:solidFill>
                       <a:srgbClr val="000000"/>
                     </a:solidFill>
@@ -22696,7 +22717,7 @@
               </a:ln>
               <a:extLst>
                 <a:ext uri="{91240B29-F687-4f45-9708-019B960494DF}">
-                  <a14:hiddenLine xmlns:a14="http://schemas.microsoft.com/office/drawing/2010/main" xmlns="" w="9525">
+                  <a14:hiddenLine xmlns="" xmlns:a14="http://schemas.microsoft.com/office/drawing/2010/main" w="9525">
                     <a:solidFill>
                       <a:srgbClr val="000000"/>
                     </a:solidFill>
@@ -22786,7 +22807,7 @@
               </a:ln>
               <a:extLst>
                 <a:ext uri="{91240B29-F687-4f45-9708-019B960494DF}">
-                  <a14:hiddenLine xmlns:a14="http://schemas.microsoft.com/office/drawing/2010/main" xmlns="" w="9525">
+                  <a14:hiddenLine xmlns="" xmlns:a14="http://schemas.microsoft.com/office/drawing/2010/main" w="9525">
                     <a:solidFill>
                       <a:srgbClr val="000000"/>
                     </a:solidFill>
@@ -22848,7 +22869,7 @@
               </a:ln>
               <a:extLst>
                 <a:ext uri="{91240B29-F687-4f45-9708-019B960494DF}">
-                  <a14:hiddenLine xmlns:a14="http://schemas.microsoft.com/office/drawing/2010/main" xmlns="" w="9525">
+                  <a14:hiddenLine xmlns="" xmlns:a14="http://schemas.microsoft.com/office/drawing/2010/main" w="9525">
                     <a:solidFill>
                       <a:srgbClr val="000000"/>
                     </a:solidFill>
@@ -22938,7 +22959,7 @@
               </a:ln>
               <a:extLst>
                 <a:ext uri="{91240B29-F687-4f45-9708-019B960494DF}">
-                  <a14:hiddenLine xmlns:a14="http://schemas.microsoft.com/office/drawing/2010/main" xmlns="" w="9525">
+                  <a14:hiddenLine xmlns="" xmlns:a14="http://schemas.microsoft.com/office/drawing/2010/main" w="9525">
                     <a:solidFill>
                       <a:srgbClr val="000000"/>
                     </a:solidFill>
@@ -23003,7 +23024,7 @@
               </a:ln>
               <a:extLst>
                 <a:ext uri="{91240B29-F687-4f45-9708-019B960494DF}">
-                  <a14:hiddenLine xmlns:a14="http://schemas.microsoft.com/office/drawing/2010/main" xmlns="" w="9525">
+                  <a14:hiddenLine xmlns="" xmlns:a14="http://schemas.microsoft.com/office/drawing/2010/main" w="9525">
                     <a:solidFill>
                       <a:srgbClr val="000000"/>
                     </a:solidFill>
@@ -23065,7 +23086,7 @@
               </a:ln>
               <a:extLst>
                 <a:ext uri="{91240B29-F687-4f45-9708-019B960494DF}">
-                  <a14:hiddenLine xmlns:a14="http://schemas.microsoft.com/office/drawing/2010/main" xmlns="" w="9525">
+                  <a14:hiddenLine xmlns="" xmlns:a14="http://schemas.microsoft.com/office/drawing/2010/main" w="9525">
                     <a:solidFill>
                       <a:srgbClr val="000000"/>
                     </a:solidFill>
@@ -23155,7 +23176,7 @@
               </a:ln>
               <a:extLst>
                 <a:ext uri="{91240B29-F687-4f45-9708-019B960494DF}">
-                  <a14:hiddenLine xmlns:a14="http://schemas.microsoft.com/office/drawing/2010/main" xmlns="" w="9525">
+                  <a14:hiddenLine xmlns="" xmlns:a14="http://schemas.microsoft.com/office/drawing/2010/main" w="9525">
                     <a:solidFill>
                       <a:srgbClr val="000000"/>
                     </a:solidFill>
@@ -23245,7 +23266,7 @@
               </a:ln>
               <a:extLst>
                 <a:ext uri="{91240B29-F687-4f45-9708-019B960494DF}">
-                  <a14:hiddenLine xmlns:a14="http://schemas.microsoft.com/office/drawing/2010/main" xmlns="" w="9525">
+                  <a14:hiddenLine xmlns="" xmlns:a14="http://schemas.microsoft.com/office/drawing/2010/main" w="9525">
                     <a:solidFill>
                       <a:srgbClr val="000000"/>
                     </a:solidFill>
@@ -23310,7 +23331,7 @@
               </a:ln>
               <a:extLst>
                 <a:ext uri="{91240B29-F687-4f45-9708-019B960494DF}">
-                  <a14:hiddenLine xmlns:a14="http://schemas.microsoft.com/office/drawing/2010/main" xmlns="" w="9525">
+                  <a14:hiddenLine xmlns="" xmlns:a14="http://schemas.microsoft.com/office/drawing/2010/main" w="9525">
                     <a:solidFill>
                       <a:srgbClr val="000000"/>
                     </a:solidFill>
@@ -23430,7 +23451,7 @@
               </a:ln>
               <a:extLst>
                 <a:ext uri="{91240B29-F687-4f45-9708-019B960494DF}">
-                  <a14:hiddenLine xmlns:a14="http://schemas.microsoft.com/office/drawing/2010/main" xmlns="" w="9525">
+                  <a14:hiddenLine xmlns="" xmlns:a14="http://schemas.microsoft.com/office/drawing/2010/main" w="9525">
                     <a:solidFill>
                       <a:srgbClr val="000000"/>
                     </a:solidFill>
@@ -23528,7 +23549,7 @@
               </a:ln>
               <a:extLst>
                 <a:ext uri="{91240B29-F687-4f45-9708-019B960494DF}">
-                  <a14:hiddenLine xmlns:a14="http://schemas.microsoft.com/office/drawing/2010/main" xmlns="" w="9525">
+                  <a14:hiddenLine xmlns="" xmlns:a14="http://schemas.microsoft.com/office/drawing/2010/main" w="9525">
                     <a:solidFill>
                       <a:srgbClr val="000000"/>
                     </a:solidFill>
@@ -23643,7 +23664,7 @@
               </a:ln>
               <a:extLst>
                 <a:ext uri="{91240B29-F687-4f45-9708-019B960494DF}">
-                  <a14:hiddenLine xmlns:a14="http://schemas.microsoft.com/office/drawing/2010/main" xmlns="" w="9525">
+                  <a14:hiddenLine xmlns="" xmlns:a14="http://schemas.microsoft.com/office/drawing/2010/main" w="9525">
                     <a:solidFill>
                       <a:srgbClr val="000000"/>
                     </a:solidFill>
@@ -23733,7 +23754,7 @@
               </a:ln>
               <a:extLst>
                 <a:ext uri="{91240B29-F687-4f45-9708-019B960494DF}">
-                  <a14:hiddenLine xmlns:a14="http://schemas.microsoft.com/office/drawing/2010/main" xmlns="" w="9525">
+                  <a14:hiddenLine xmlns="" xmlns:a14="http://schemas.microsoft.com/office/drawing/2010/main" w="9525">
                     <a:solidFill>
                       <a:srgbClr val="000000"/>
                     </a:solidFill>
@@ -23798,7 +23819,7 @@
               </a:ln>
               <a:extLst>
                 <a:ext uri="{91240B29-F687-4f45-9708-019B960494DF}">
-                  <a14:hiddenLine xmlns:a14="http://schemas.microsoft.com/office/drawing/2010/main" xmlns="" w="9525">
+                  <a14:hiddenLine xmlns="" xmlns:a14="http://schemas.microsoft.com/office/drawing/2010/main" w="9525">
                     <a:solidFill>
                       <a:srgbClr val="000000"/>
                     </a:solidFill>
@@ -23888,7 +23909,7 @@
               </a:ln>
               <a:extLst>
                 <a:ext uri="{91240B29-F687-4f45-9708-019B960494DF}">
-                  <a14:hiddenLine xmlns:a14="http://schemas.microsoft.com/office/drawing/2010/main" xmlns="" w="9525">
+                  <a14:hiddenLine xmlns="" xmlns:a14="http://schemas.microsoft.com/office/drawing/2010/main" w="9525">
                     <a:solidFill>
                       <a:srgbClr val="000000"/>
                     </a:solidFill>
@@ -23956,7 +23977,7 @@
               </a:ln>
               <a:extLst>
                 <a:ext uri="{91240B29-F687-4f45-9708-019B960494DF}">
-                  <a14:hiddenLine xmlns:a14="http://schemas.microsoft.com/office/drawing/2010/main" xmlns="" w="9525">
+                  <a14:hiddenLine xmlns="" xmlns:a14="http://schemas.microsoft.com/office/drawing/2010/main" w="9525">
                     <a:solidFill>
                       <a:srgbClr val="000000"/>
                     </a:solidFill>
@@ -24046,7 +24067,7 @@
               </a:ln>
               <a:extLst>
                 <a:ext uri="{91240B29-F687-4f45-9708-019B960494DF}">
-                  <a14:hiddenLine xmlns:a14="http://schemas.microsoft.com/office/drawing/2010/main" xmlns="" w="9525">
+                  <a14:hiddenLine xmlns="" xmlns:a14="http://schemas.microsoft.com/office/drawing/2010/main" w="9525">
                     <a:solidFill>
                       <a:srgbClr val="000000"/>
                     </a:solidFill>
@@ -24114,7 +24135,7 @@
               </a:ln>
               <a:extLst>
                 <a:ext uri="{91240B29-F687-4f45-9708-019B960494DF}">
-                  <a14:hiddenLine xmlns:a14="http://schemas.microsoft.com/office/drawing/2010/main" xmlns="" w="9525">
+                  <a14:hiddenLine xmlns="" xmlns:a14="http://schemas.microsoft.com/office/drawing/2010/main" w="9525">
                     <a:solidFill>
                       <a:srgbClr val="000000"/>
                     </a:solidFill>
@@ -24204,7 +24225,7 @@
               </a:ln>
               <a:extLst>
                 <a:ext uri="{91240B29-F687-4f45-9708-019B960494DF}">
-                  <a14:hiddenLine xmlns:a14="http://schemas.microsoft.com/office/drawing/2010/main" xmlns="" w="9525">
+                  <a14:hiddenLine xmlns="" xmlns:a14="http://schemas.microsoft.com/office/drawing/2010/main" w="9525">
                     <a:solidFill>
                       <a:srgbClr val="000000"/>
                     </a:solidFill>
@@ -24238,7 +24259,7 @@
               </a:ln>
               <a:extLst>
                 <a:ext uri="{91240B29-F687-4f45-9708-019B960494DF}">
-                  <a14:hiddenLine xmlns:a14="http://schemas.microsoft.com/office/drawing/2010/main" xmlns="" w="9525">
+                  <a14:hiddenLine xmlns="" xmlns:a14="http://schemas.microsoft.com/office/drawing/2010/main" w="9525">
                     <a:solidFill>
                       <a:srgbClr val="000000"/>
                     </a:solidFill>
@@ -24378,7 +24399,7 @@
           <a:p>
             <a:fld id="{4559D4BB-A0F9-4B27-80E6-E5E59F9288D1}" type="datetimeFigureOut">
               <a:rPr lang="en-US" smtClean="0"/>
-              <a:t>2/13/2026</a:t>
+              <a:t>2/14/2026</a:t>
             </a:fld>
             <a:endParaRPr lang="en-US"/>
           </a:p>
@@ -25130,8 +25151,8 @@
           </a:p>
         </p:txBody>
       </p:sp>
-      <mc:AlternateContent xmlns:mc="http://schemas.openxmlformats.org/markup-compatibility/2006">
-        <mc:Choice xmlns:a14="http://schemas.microsoft.com/office/drawing/2010/main" Requires="a14">
+      <mc:AlternateContent xmlns:mc="http://schemas.openxmlformats.org/markup-compatibility/2006" xmlns:a14="http://schemas.microsoft.com/office/drawing/2010/main">
+        <mc:Choice Requires="a14">
           <p:sp>
             <p:nvSpPr>
               <p:cNvPr id="7" name="TextBox 6">
@@ -25550,7 +25571,7 @@
             </p:txBody>
           </p:sp>
         </mc:Choice>
-        <mc:Fallback>
+        <mc:Fallback xmlns="">
           <p:sp>
             <p:nvSpPr>
               <p:cNvPr id="7" name="TextBox 6">
@@ -26664,8 +26685,8 @@
           </a:p>
         </p:txBody>
       </p:sp>
-      <mc:AlternateContent xmlns:mc="http://schemas.openxmlformats.org/markup-compatibility/2006">
-        <mc:Choice xmlns:a14="http://schemas.microsoft.com/office/drawing/2010/main" Requires="a14">
+      <mc:AlternateContent xmlns:mc="http://schemas.openxmlformats.org/markup-compatibility/2006" xmlns:a14="http://schemas.microsoft.com/office/drawing/2010/main">
+        <mc:Choice Requires="a14">
           <p:sp>
             <p:nvSpPr>
               <p:cNvPr id="3" name="Content Placeholder 2">
@@ -26734,7 +26755,7 @@
             </p:txBody>
           </p:sp>
         </mc:Choice>
-        <mc:Fallback>
+        <mc:Fallback xmlns="">
           <p:sp>
             <p:nvSpPr>
               <p:cNvPr id="3" name="Content Placeholder 2">
@@ -27180,8 +27201,8 @@
           </a:p>
         </p:txBody>
       </p:sp>
-      <mc:AlternateContent xmlns:mc="http://schemas.openxmlformats.org/markup-compatibility/2006">
-        <mc:Choice xmlns:a14="http://schemas.microsoft.com/office/drawing/2010/main" Requires="a14">
+      <mc:AlternateContent xmlns:mc="http://schemas.openxmlformats.org/markup-compatibility/2006" xmlns:a14="http://schemas.microsoft.com/office/drawing/2010/main">
+        <mc:Choice Requires="a14">
           <p:sp>
             <p:nvSpPr>
               <p:cNvPr id="3" name="Content Placeholder 2">
@@ -27517,18 +27538,24 @@
                     <m:sSub>
                       <m:sSubPr>
                         <m:ctrlPr>
-                          <a:rPr lang="en-US" i="1"/>
+                          <a:rPr lang="en-US" i="1">
+                            <a:latin typeface="Cambria Math" panose="02040503050406030204" pitchFamily="18" charset="0"/>
+                          </a:rPr>
                         </m:ctrlPr>
                       </m:sSubPr>
                       <m:e>
                         <m:r>
-                          <a:rPr lang="en-US" i="1"/>
+                          <a:rPr lang="en-US" i="1">
+                            <a:latin typeface="Cambria Math" panose="02040503050406030204" pitchFamily="18" charset="0"/>
+                          </a:rPr>
                           <m:t>𝐾</m:t>
                         </m:r>
                       </m:e>
                       <m:sub>
                         <m:r>
-                          <a:rPr lang="en-US" i="1"/>
+                          <a:rPr lang="en-US" i="1">
+                            <a:latin typeface="Cambria Math" panose="02040503050406030204" pitchFamily="18" charset="0"/>
+                          </a:rPr>
                           <m:t>𝑠</m:t>
                         </m:r>
                       </m:sub>
@@ -27611,7 +27638,7 @@
             </p:txBody>
           </p:sp>
         </mc:Choice>
-        <mc:Fallback>
+        <mc:Fallback xmlns="">
           <p:sp>
             <p:nvSpPr>
               <p:cNvPr id="3" name="Content Placeholder 2">
@@ -27752,7 +27779,7 @@
                 </a:r>
                 <a:r>
                   <a:rPr lang="en-US" dirty="0"/>
-                  <a:t>Denote this initialization vector by c(0). The sender sends the IV to the receiver in cleartext.</a:t>
+                  <a:t>Denote this initialization vector by C(0). The sender sends the IV to the receiver in cleartext.</a:t>
                 </a:r>
               </a:p>
               <a:p>
@@ -27762,7 +27789,7 @@
                 </a:pPr>
                 <a:r>
                   <a:rPr lang="en-US" dirty="0"/>
-                  <a:t>For the first block, the sender calculates m(1) c(0), that is, calculates the exclusive-or of the first block of cleartext with the IV. It then runs the result through the block-cipher algorithm to get the corresponding ciphertext block; that is, C(1) = </a:t>
+                  <a:t>For the first block, the sender calculates M(1) C(0), that is, calculates the exclusive-or of the first block of cleartext with the IV. It then runs the result through the block-cipher algorithm to get the corresponding ciphertext block; that is, C(1) = </a:t>
                 </a:r>
                 <a14:m>
                   <m:oMath xmlns:m="http://schemas.openxmlformats.org/officeDocument/2006/math">
@@ -27955,30 +27982,17 @@
                       <a:rPr lang="en-US">
                         <a:latin typeface="Cambria Math" panose="02040503050406030204" pitchFamily="18" charset="0"/>
                       </a:rPr>
-                      <m:t>)</m:t>
-                    </m:r>
-                    <m:r>
-                      <m:rPr>
-                        <m:nor/>
-                      </m:rPr>
-                      <a:rPr lang="en-US">
-                        <a:latin typeface="Cambria Math" panose="02040503050406030204" pitchFamily="18" charset="0"/>
-                      </a:rPr>
-                      <m:t> </m:t>
+                      <m:t>) </m:t>
                     </m:r>
                   </m:oMath>
                 </a14:m>
                 <a:r>
-                  <a:rPr lang="en-US" dirty="0"/>
-                  <a:t>xor c(</a:t>
-                </a:r>
-                <a:r>
                   <a:rPr lang="en-US" dirty="0" err="1"/>
-                  <a:t>i</a:t>
+                  <a:t>xor</a:t>
                 </a:r>
                 <a:r>
                   <a:rPr lang="en-US" dirty="0"/>
-                  <a:t>- 1)).</a:t>
+                  <a:t> C(i-1)).</a:t>
                 </a:r>
               </a:p>
             </p:txBody>
@@ -28005,7 +28019,7 @@
               <a:blipFill>
                 <a:blip r:embed="rId2"/>
                 <a:stretch>
-                  <a:fillRect l="-985" t="-2410" r="-1538"/>
+                  <a:fillRect l="-985" t="-2410" r="-431"/>
                 </a:stretch>
               </a:blipFill>
             </p:spPr>
@@ -28028,6 +28042,1911 @@
     <p:extLst>
       <p:ext uri="{BB962C8B-B14F-4D97-AF65-F5344CB8AC3E}">
         <p14:creationId xmlns:p14="http://schemas.microsoft.com/office/powerpoint/2010/main" val="861955478"/>
+      </p:ext>
+    </p:extLst>
+  </p:cSld>
+  <p:clrMapOvr>
+    <a:masterClrMapping/>
+  </p:clrMapOvr>
+</p:sld>
+</file>
+
+<file path=ppt/slides/slide24.xml><?xml version="1.0" encoding="utf-8"?>
+<p:sld xmlns:a="http://schemas.openxmlformats.org/drawingml/2006/main" xmlns:r="http://schemas.openxmlformats.org/officeDocument/2006/relationships" xmlns:p="http://schemas.openxmlformats.org/presentationml/2006/main">
+  <p:cSld>
+    <p:spTree>
+      <p:nvGrpSpPr>
+        <p:cNvPr id="1" name=""/>
+        <p:cNvGrpSpPr/>
+        <p:nvPr/>
+      </p:nvGrpSpPr>
+      <p:grpSpPr>
+        <a:xfrm>
+          <a:off x="0" y="0"/>
+          <a:ext cx="0" cy="0"/>
+          <a:chOff x="0" y="0"/>
+          <a:chExt cx="0" cy="0"/>
+        </a:xfrm>
+      </p:grpSpPr>
+      <p:sp>
+        <p:nvSpPr>
+          <p:cNvPr id="2" name="Title 1">
+            <a:extLst>
+              <a:ext uri="{FF2B5EF4-FFF2-40B4-BE49-F238E27FC236}">
+                <a16:creationId xmlns:a16="http://schemas.microsoft.com/office/drawing/2014/main" id="{0B46635C-CF22-F18C-7EF4-EEB5BEFCEE11}"/>
+              </a:ext>
+            </a:extLst>
+          </p:cNvPr>
+          <p:cNvSpPr>
+            <a:spLocks noGrp="1"/>
+          </p:cNvSpPr>
+          <p:nvPr>
+            <p:ph type="title"/>
+          </p:nvPr>
+        </p:nvSpPr>
+        <p:spPr>
+          <a:xfrm>
+            <a:off x="1143001" y="279154"/>
+            <a:ext cx="9905998" cy="1478570"/>
+          </a:xfrm>
+        </p:spPr>
+        <p:txBody>
+          <a:bodyPr/>
+          <a:lstStyle/>
+          <a:p>
+            <a:r>
+              <a:rPr lang="en-US" dirty="0"/>
+              <a:t>Public key encryption</a:t>
+            </a:r>
+          </a:p>
+        </p:txBody>
+      </p:sp>
+      <p:pic>
+        <p:nvPicPr>
+          <p:cNvPr id="5" name="Picture 4">
+            <a:extLst>
+              <a:ext uri="{FF2B5EF4-FFF2-40B4-BE49-F238E27FC236}">
+                <a16:creationId xmlns:a16="http://schemas.microsoft.com/office/drawing/2014/main" id="{DD2C2E59-BDB6-9C26-50EA-E74DA02D3650}"/>
+              </a:ext>
+            </a:extLst>
+          </p:cNvPr>
+          <p:cNvPicPr>
+            <a:picLocks noChangeAspect="1"/>
+          </p:cNvPicPr>
+          <p:nvPr/>
+        </p:nvPicPr>
+        <p:blipFill>
+          <a:blip r:embed="rId2">
+            <a:extLst>
+              <a:ext uri="{28A0092B-C50C-407E-A947-70E740481C1C}">
+                <a14:useLocalDpi xmlns:a14="http://schemas.microsoft.com/office/drawing/2010/main" val="0"/>
+              </a:ext>
+            </a:extLst>
+          </a:blip>
+          <a:stretch>
+            <a:fillRect/>
+          </a:stretch>
+        </p:blipFill>
+        <p:spPr>
+          <a:xfrm>
+            <a:off x="6926053" y="1632859"/>
+            <a:ext cx="4800891" cy="3313963"/>
+          </a:xfrm>
+          <a:prstGeom prst="rect">
+            <a:avLst/>
+          </a:prstGeom>
+        </p:spPr>
+      </p:pic>
+      <mc:AlternateContent xmlns:mc="http://schemas.openxmlformats.org/markup-compatibility/2006">
+        <mc:Choice xmlns:a14="http://schemas.microsoft.com/office/drawing/2010/main" Requires="a14">
+          <p:sp>
+            <p:nvSpPr>
+              <p:cNvPr id="6" name="TextBox 5">
+                <a:extLst>
+                  <a:ext uri="{FF2B5EF4-FFF2-40B4-BE49-F238E27FC236}">
+                    <a16:creationId xmlns:a16="http://schemas.microsoft.com/office/drawing/2014/main" id="{B5390112-B1AF-ADF6-B18E-CD587DB9FBCE}"/>
+                  </a:ext>
+                </a:extLst>
+              </p:cNvPr>
+              <p:cNvSpPr txBox="1"/>
+              <p:nvPr/>
+            </p:nvSpPr>
+            <p:spPr>
+              <a:xfrm>
+                <a:off x="896316" y="1757724"/>
+                <a:ext cx="5872130" cy="3693319"/>
+              </a:xfrm>
+              <a:prstGeom prst="rect">
+                <a:avLst/>
+              </a:prstGeom>
+              <a:noFill/>
+            </p:spPr>
+            <p:txBody>
+              <a:bodyPr wrap="square" rtlCol="0">
+                <a:spAutoFit/>
+              </a:bodyPr>
+              <a:lstStyle/>
+              <a:p>
+                <a:pPr marL="285750" indent="-285750">
+                  <a:buFont typeface="Wingdings" panose="05000000000000000000" pitchFamily="2" charset="2"/>
+                  <a:buChar char="ü"/>
+                </a:pPr>
+                <a:r>
+                  <a:rPr lang="en-US" dirty="0"/>
+                  <a:t>Bob has two keys : </a:t>
+                </a:r>
+                <a14:m>
+                  <m:oMath xmlns:m="http://schemas.openxmlformats.org/officeDocument/2006/math">
+                    <m:sSubSup>
+                      <m:sSubSupPr>
+                        <m:ctrlPr>
+                          <a:rPr lang="en-US" i="1" smtClean="0">
+                            <a:latin typeface="Cambria Math" panose="02040503050406030204" pitchFamily="18" charset="0"/>
+                          </a:rPr>
+                        </m:ctrlPr>
+                      </m:sSubSupPr>
+                      <m:e>
+                        <m:r>
+                          <a:rPr lang="en-US" b="0" i="1" smtClean="0">
+                            <a:latin typeface="Cambria Math" panose="02040503050406030204" pitchFamily="18" charset="0"/>
+                          </a:rPr>
+                          <m:t>𝐾</m:t>
+                        </m:r>
+                      </m:e>
+                      <m:sub>
+                        <m:r>
+                          <a:rPr lang="en-US" b="0" i="1" smtClean="0">
+                            <a:latin typeface="Cambria Math" panose="02040503050406030204" pitchFamily="18" charset="0"/>
+                          </a:rPr>
+                          <m:t>𝐵</m:t>
+                        </m:r>
+                      </m:sub>
+                      <m:sup>
+                        <m:r>
+                          <a:rPr lang="en-US" b="0" i="1" smtClean="0">
+                            <a:latin typeface="Cambria Math" panose="02040503050406030204" pitchFamily="18" charset="0"/>
+                          </a:rPr>
+                          <m:t>+</m:t>
+                        </m:r>
+                      </m:sup>
+                    </m:sSubSup>
+                  </m:oMath>
+                </a14:m>
+                <a:r>
+                  <a:rPr lang="en-US" dirty="0"/>
+                  <a:t> (public key) and </a:t>
+                </a:r>
+                <a14:m>
+                  <m:oMath xmlns:m="http://schemas.openxmlformats.org/officeDocument/2006/math">
+                    <m:sSubSup>
+                      <m:sSubSupPr>
+                        <m:ctrlPr>
+                          <a:rPr lang="en-US" i="1">
+                            <a:latin typeface="Cambria Math" panose="02040503050406030204" pitchFamily="18" charset="0"/>
+                          </a:rPr>
+                        </m:ctrlPr>
+                      </m:sSubSupPr>
+                      <m:e>
+                        <m:r>
+                          <a:rPr lang="en-US" i="1">
+                            <a:latin typeface="Cambria Math" panose="02040503050406030204" pitchFamily="18" charset="0"/>
+                          </a:rPr>
+                          <m:t>𝐾</m:t>
+                        </m:r>
+                      </m:e>
+                      <m:sub>
+                        <m:r>
+                          <a:rPr lang="en-US" i="1">
+                            <a:latin typeface="Cambria Math" panose="02040503050406030204" pitchFamily="18" charset="0"/>
+                          </a:rPr>
+                          <m:t>𝐵</m:t>
+                        </m:r>
+                      </m:sub>
+                      <m:sup>
+                        <m:r>
+                          <a:rPr lang="en-US" b="0" i="1" smtClean="0">
+                            <a:latin typeface="Cambria Math" panose="02040503050406030204" pitchFamily="18" charset="0"/>
+                          </a:rPr>
+                          <m:t>−</m:t>
+                        </m:r>
+                      </m:sup>
+                    </m:sSubSup>
+                  </m:oMath>
+                </a14:m>
+                <a:r>
+                  <a:rPr lang="en-US" dirty="0"/>
+                  <a:t> (public key)</a:t>
+                </a:r>
+              </a:p>
+              <a:p>
+                <a:pPr marL="285750" indent="-285750">
+                  <a:buFont typeface="Wingdings" panose="05000000000000000000" pitchFamily="2" charset="2"/>
+                  <a:buChar char="ü"/>
+                </a:pPr>
+                <a:r>
+                  <a:rPr lang="en-US" dirty="0"/>
+                  <a:t>Alice encrypts the message using Bob’s public key </a:t>
+                </a:r>
+                <a14:m>
+                  <m:oMath xmlns:m="http://schemas.openxmlformats.org/officeDocument/2006/math">
+                    <m:sSubSup>
+                      <m:sSubSupPr>
+                        <m:ctrlPr>
+                          <a:rPr lang="en-US" i="1">
+                            <a:latin typeface="Cambria Math" panose="02040503050406030204" pitchFamily="18" charset="0"/>
+                          </a:rPr>
+                        </m:ctrlPr>
+                      </m:sSubSupPr>
+                      <m:e>
+                        <m:r>
+                          <a:rPr lang="en-US" i="1">
+                            <a:latin typeface="Cambria Math" panose="02040503050406030204" pitchFamily="18" charset="0"/>
+                          </a:rPr>
+                          <m:t>𝐾</m:t>
+                        </m:r>
+                      </m:e>
+                      <m:sub>
+                        <m:r>
+                          <a:rPr lang="en-US" i="1">
+                            <a:latin typeface="Cambria Math" panose="02040503050406030204" pitchFamily="18" charset="0"/>
+                          </a:rPr>
+                          <m:t>𝐵</m:t>
+                        </m:r>
+                      </m:sub>
+                      <m:sup>
+                        <m:r>
+                          <a:rPr lang="en-US" i="1">
+                            <a:latin typeface="Cambria Math" panose="02040503050406030204" pitchFamily="18" charset="0"/>
+                          </a:rPr>
+                          <m:t>+</m:t>
+                        </m:r>
+                      </m:sup>
+                    </m:sSubSup>
+                  </m:oMath>
+                </a14:m>
+                <a:r>
+                  <a:rPr lang="en-US" dirty="0"/>
+                  <a:t>(M)</a:t>
+                </a:r>
+              </a:p>
+              <a:p>
+                <a:pPr marL="285750" indent="-285750">
+                  <a:buFont typeface="Wingdings" panose="05000000000000000000" pitchFamily="2" charset="2"/>
+                  <a:buChar char="ü"/>
+                </a:pPr>
+                <a:r>
+                  <a:rPr lang="en-US" dirty="0"/>
+                  <a:t>Bob decrypts the message using his private key </a:t>
+                </a:r>
+                <a14:m>
+                  <m:oMath xmlns:m="http://schemas.openxmlformats.org/officeDocument/2006/math">
+                    <m:sSubSup>
+                      <m:sSubSupPr>
+                        <m:ctrlPr>
+                          <a:rPr lang="en-US" i="1">
+                            <a:latin typeface="Cambria Math" panose="02040503050406030204" pitchFamily="18" charset="0"/>
+                          </a:rPr>
+                        </m:ctrlPr>
+                      </m:sSubSupPr>
+                      <m:e>
+                        <m:r>
+                          <a:rPr lang="en-US" i="1">
+                            <a:latin typeface="Cambria Math" panose="02040503050406030204" pitchFamily="18" charset="0"/>
+                          </a:rPr>
+                          <m:t>𝐾</m:t>
+                        </m:r>
+                      </m:e>
+                      <m:sub>
+                        <m:r>
+                          <a:rPr lang="en-US" i="1">
+                            <a:latin typeface="Cambria Math" panose="02040503050406030204" pitchFamily="18" charset="0"/>
+                          </a:rPr>
+                          <m:t>𝐵</m:t>
+                        </m:r>
+                      </m:sub>
+                      <m:sup>
+                        <m:r>
+                          <a:rPr lang="en-US" b="0" i="1" smtClean="0">
+                            <a:latin typeface="Cambria Math" panose="02040503050406030204" pitchFamily="18" charset="0"/>
+                          </a:rPr>
+                          <m:t>−</m:t>
+                        </m:r>
+                      </m:sup>
+                    </m:sSubSup>
+                  </m:oMath>
+                </a14:m>
+                <a:r>
+                  <a:rPr lang="en-US" dirty="0"/>
+                  <a:t> </a:t>
+                </a:r>
+                <a14:m>
+                  <m:oMath xmlns:m="http://schemas.openxmlformats.org/officeDocument/2006/math">
+                    <m:sSubSup>
+                      <m:sSubSupPr>
+                        <m:ctrlPr>
+                          <a:rPr lang="en-US" i="1">
+                            <a:latin typeface="Cambria Math" panose="02040503050406030204" pitchFamily="18" charset="0"/>
+                          </a:rPr>
+                        </m:ctrlPr>
+                      </m:sSubSupPr>
+                      <m:e>
+                        <m:r>
+                          <a:rPr lang="en-US" i="1">
+                            <a:latin typeface="Cambria Math" panose="02040503050406030204" pitchFamily="18" charset="0"/>
+                          </a:rPr>
+                          <m:t>𝐾</m:t>
+                        </m:r>
+                      </m:e>
+                      <m:sub>
+                        <m:r>
+                          <a:rPr lang="en-US" i="1">
+                            <a:latin typeface="Cambria Math" panose="02040503050406030204" pitchFamily="18" charset="0"/>
+                          </a:rPr>
+                          <m:t>𝐵</m:t>
+                        </m:r>
+                      </m:sub>
+                      <m:sup>
+                        <m:r>
+                          <a:rPr lang="en-US" b="0" i="1" smtClean="0">
+                            <a:latin typeface="Cambria Math" panose="02040503050406030204" pitchFamily="18" charset="0"/>
+                          </a:rPr>
+                          <m:t>−</m:t>
+                        </m:r>
+                      </m:sup>
+                    </m:sSubSup>
+                  </m:oMath>
+                </a14:m>
+                <a:r>
+                  <a:rPr lang="en-US" dirty="0"/>
+                  <a:t>(</a:t>
+                </a:r>
+                <a14:m>
+                  <m:oMath xmlns:m="http://schemas.openxmlformats.org/officeDocument/2006/math">
+                    <m:sSubSup>
+                      <m:sSubSupPr>
+                        <m:ctrlPr>
+                          <a:rPr lang="en-US" i="1">
+                            <a:latin typeface="Cambria Math" panose="02040503050406030204" pitchFamily="18" charset="0"/>
+                          </a:rPr>
+                        </m:ctrlPr>
+                      </m:sSubSupPr>
+                      <m:e>
+                        <m:r>
+                          <a:rPr lang="en-US" i="1">
+                            <a:latin typeface="Cambria Math" panose="02040503050406030204" pitchFamily="18" charset="0"/>
+                          </a:rPr>
+                          <m:t>𝐾</m:t>
+                        </m:r>
+                      </m:e>
+                      <m:sub>
+                        <m:r>
+                          <a:rPr lang="en-US" i="1">
+                            <a:latin typeface="Cambria Math" panose="02040503050406030204" pitchFamily="18" charset="0"/>
+                          </a:rPr>
+                          <m:t>𝐵</m:t>
+                        </m:r>
+                      </m:sub>
+                      <m:sup>
+                        <m:r>
+                          <a:rPr lang="en-US" i="1">
+                            <a:latin typeface="Cambria Math" panose="02040503050406030204" pitchFamily="18" charset="0"/>
+                          </a:rPr>
+                          <m:t>+</m:t>
+                        </m:r>
+                      </m:sup>
+                    </m:sSubSup>
+                  </m:oMath>
+                </a14:m>
+                <a:r>
+                  <a:rPr lang="en-US" dirty="0"/>
+                  <a:t>(M)) =  M</a:t>
+                </a:r>
+              </a:p>
+              <a:p>
+                <a:pPr marL="285750" indent="-285750">
+                  <a:buFont typeface="Wingdings" panose="05000000000000000000" pitchFamily="2" charset="2"/>
+                  <a:buChar char="ü"/>
+                </a:pPr>
+                <a:endParaRPr lang="en-US" dirty="0"/>
+              </a:p>
+              <a:p>
+                <a:pPr marL="285750" indent="-285750">
+                  <a:buFont typeface="Arial" panose="020B0604020202020204" pitchFamily="34" charset="0"/>
+                  <a:buChar char="•"/>
+                </a:pPr>
+                <a:r>
+                  <a:rPr lang="en-US" dirty="0"/>
+                  <a:t>There are encryption/decryption algorithms and techniques for choosing public and private keys such that:</a:t>
+                </a:r>
+              </a:p>
+              <a:p>
+                <a:pPr marL="285750" indent="-285750">
+                  <a:buFont typeface="Arial" panose="020B0604020202020204" pitchFamily="34" charset="0"/>
+                  <a:buChar char="•"/>
+                </a:pPr>
+                <a:r>
+                  <a:rPr lang="en-US" dirty="0"/>
+                  <a:t> </a:t>
+                </a:r>
+              </a:p>
+              <a:p>
+                <a:r>
+                  <a:rPr lang="en-US" dirty="0"/>
+                  <a:t>					</a:t>
+                </a:r>
+                <a14:m>
+                  <m:oMath xmlns:m="http://schemas.openxmlformats.org/officeDocument/2006/math">
+                    <m:sSubSup>
+                      <m:sSubSupPr>
+                        <m:ctrlPr>
+                          <a:rPr lang="en-US" i="1">
+                            <a:latin typeface="Cambria Math" panose="02040503050406030204" pitchFamily="18" charset="0"/>
+                          </a:rPr>
+                        </m:ctrlPr>
+                      </m:sSubSupPr>
+                      <m:e>
+                        <m:r>
+                          <a:rPr lang="en-US" i="1">
+                            <a:latin typeface="Cambria Math" panose="02040503050406030204" pitchFamily="18" charset="0"/>
+                          </a:rPr>
+                          <m:t>𝐾</m:t>
+                        </m:r>
+                      </m:e>
+                      <m:sub>
+                        <m:r>
+                          <a:rPr lang="en-US" i="1">
+                            <a:latin typeface="Cambria Math" panose="02040503050406030204" pitchFamily="18" charset="0"/>
+                          </a:rPr>
+                          <m:t>𝐵</m:t>
+                        </m:r>
+                      </m:sub>
+                      <m:sup>
+                        <m:r>
+                          <a:rPr lang="en-US" i="1">
+                            <a:latin typeface="Cambria Math" panose="02040503050406030204" pitchFamily="18" charset="0"/>
+                          </a:rPr>
+                          <m:t>−</m:t>
+                        </m:r>
+                      </m:sup>
+                    </m:sSubSup>
+                  </m:oMath>
+                </a14:m>
+                <a:r>
+                  <a:rPr lang="en-US" dirty="0"/>
+                  <a:t>(</a:t>
+                </a:r>
+                <a14:m>
+                  <m:oMath xmlns:m="http://schemas.openxmlformats.org/officeDocument/2006/math">
+                    <m:sSubSup>
+                      <m:sSubSupPr>
+                        <m:ctrlPr>
+                          <a:rPr lang="en-US" i="1">
+                            <a:latin typeface="Cambria Math" panose="02040503050406030204" pitchFamily="18" charset="0"/>
+                          </a:rPr>
+                        </m:ctrlPr>
+                      </m:sSubSupPr>
+                      <m:e>
+                        <m:r>
+                          <a:rPr lang="en-US" i="1">
+                            <a:latin typeface="Cambria Math" panose="02040503050406030204" pitchFamily="18" charset="0"/>
+                          </a:rPr>
+                          <m:t>𝐾</m:t>
+                        </m:r>
+                      </m:e>
+                      <m:sub>
+                        <m:r>
+                          <a:rPr lang="en-US" i="1">
+                            <a:latin typeface="Cambria Math" panose="02040503050406030204" pitchFamily="18" charset="0"/>
+                          </a:rPr>
+                          <m:t>𝐵</m:t>
+                        </m:r>
+                      </m:sub>
+                      <m:sup>
+                        <m:r>
+                          <a:rPr lang="en-US" i="1">
+                            <a:latin typeface="Cambria Math" panose="02040503050406030204" pitchFamily="18" charset="0"/>
+                          </a:rPr>
+                          <m:t>+</m:t>
+                        </m:r>
+                      </m:sup>
+                    </m:sSubSup>
+                  </m:oMath>
+                </a14:m>
+                <a:r>
+                  <a:rPr lang="en-US" dirty="0"/>
+                  <a:t>(M)) = M</a:t>
+                </a:r>
+              </a:p>
+              <a:p>
+                <a:endParaRPr lang="en-US" dirty="0"/>
+              </a:p>
+              <a:p>
+                <a:endParaRPr lang="en-US" dirty="0"/>
+              </a:p>
+              <a:p>
+                <a:pPr marL="285750" indent="-285750">
+                  <a:buFont typeface="Arial" panose="020B0604020202020204" pitchFamily="34" charset="0"/>
+                  <a:buChar char="•"/>
+                </a:pPr>
+                <a:r>
+                  <a:rPr lang="en-US" b="1" u="sng" dirty="0"/>
+                  <a:t>But a problem would arise !! THE NEED FOR DIGITAL SIGNATURE BECOMES CRUCIAL</a:t>
+                </a:r>
+              </a:p>
+            </p:txBody>
+          </p:sp>
+        </mc:Choice>
+        <mc:Fallback>
+          <p:sp>
+            <p:nvSpPr>
+              <p:cNvPr id="6" name="TextBox 5">
+                <a:extLst>
+                  <a:ext uri="{FF2B5EF4-FFF2-40B4-BE49-F238E27FC236}">
+                    <a16:creationId xmlns:a16="http://schemas.microsoft.com/office/drawing/2014/main" id="{B5390112-B1AF-ADF6-B18E-CD587DB9FBCE}"/>
+                  </a:ext>
+                </a:extLst>
+              </p:cNvPr>
+              <p:cNvSpPr txBox="1">
+                <a:spLocks noRot="1" noChangeAspect="1" noMove="1" noResize="1" noEditPoints="1" noAdjustHandles="1" noChangeArrowheads="1" noChangeShapeType="1" noTextEdit="1"/>
+              </p:cNvSpPr>
+              <p:nvPr/>
+            </p:nvSpPr>
+            <p:spPr>
+              <a:xfrm>
+                <a:off x="896316" y="1757724"/>
+                <a:ext cx="5872130" cy="3693319"/>
+              </a:xfrm>
+              <a:prstGeom prst="rect">
+                <a:avLst/>
+              </a:prstGeom>
+              <a:blipFill>
+                <a:blip r:embed="rId3"/>
+                <a:stretch>
+                  <a:fillRect l="-623" t="-825" r="-1765" b="-1650"/>
+                </a:stretch>
+              </a:blipFill>
+            </p:spPr>
+            <p:txBody>
+              <a:bodyPr/>
+              <a:lstStyle/>
+              <a:p>
+                <a:r>
+                  <a:rPr lang="en-US">
+                    <a:noFill/>
+                  </a:rPr>
+                  <a:t> </a:t>
+                </a:r>
+              </a:p>
+            </p:txBody>
+          </p:sp>
+        </mc:Fallback>
+      </mc:AlternateContent>
+    </p:spTree>
+    <p:extLst>
+      <p:ext uri="{BB962C8B-B14F-4D97-AF65-F5344CB8AC3E}">
+        <p14:creationId xmlns:p14="http://schemas.microsoft.com/office/powerpoint/2010/main" val="3018579289"/>
+      </p:ext>
+    </p:extLst>
+  </p:cSld>
+  <p:clrMapOvr>
+    <a:masterClrMapping/>
+  </p:clrMapOvr>
+</p:sld>
+</file>
+
+<file path=ppt/slides/slide25.xml><?xml version="1.0" encoding="utf-8"?>
+<p:sld xmlns:a="http://schemas.openxmlformats.org/drawingml/2006/main" xmlns:r="http://schemas.openxmlformats.org/officeDocument/2006/relationships" xmlns:p="http://schemas.openxmlformats.org/presentationml/2006/main">
+  <p:cSld>
+    <p:spTree>
+      <p:nvGrpSpPr>
+        <p:cNvPr id="1" name=""/>
+        <p:cNvGrpSpPr/>
+        <p:nvPr/>
+      </p:nvGrpSpPr>
+      <p:grpSpPr>
+        <a:xfrm>
+          <a:off x="0" y="0"/>
+          <a:ext cx="0" cy="0"/>
+          <a:chOff x="0" y="0"/>
+          <a:chExt cx="0" cy="0"/>
+        </a:xfrm>
+      </p:grpSpPr>
+      <p:sp>
+        <p:nvSpPr>
+          <p:cNvPr id="2" name="Title 1">
+            <a:extLst>
+              <a:ext uri="{FF2B5EF4-FFF2-40B4-BE49-F238E27FC236}">
+                <a16:creationId xmlns:a16="http://schemas.microsoft.com/office/drawing/2014/main" id="{DCD32629-1EFF-31D2-ABB6-8D5A507504F9}"/>
+              </a:ext>
+            </a:extLst>
+          </p:cNvPr>
+          <p:cNvSpPr>
+            <a:spLocks noGrp="1"/>
+          </p:cNvSpPr>
+          <p:nvPr>
+            <p:ph type="title"/>
+          </p:nvPr>
+        </p:nvSpPr>
+        <p:spPr>
+          <a:xfrm>
+            <a:off x="1141413" y="326288"/>
+            <a:ext cx="9905998" cy="1478570"/>
+          </a:xfrm>
+        </p:spPr>
+        <p:txBody>
+          <a:bodyPr/>
+          <a:lstStyle/>
+          <a:p>
+            <a:r>
+              <a:rPr lang="en-US" dirty="0"/>
+              <a:t>RSA Obeying PUBLIC ENCRYPTION KEY</a:t>
+            </a:r>
+          </a:p>
+        </p:txBody>
+      </p:sp>
+      <mc:AlternateContent xmlns:mc="http://schemas.openxmlformats.org/markup-compatibility/2006">
+        <mc:Choice xmlns:a14="http://schemas.microsoft.com/office/drawing/2010/main" Requires="a14">
+          <p:sp>
+            <p:nvSpPr>
+              <p:cNvPr id="3" name="Content Placeholder 2">
+                <a:extLst>
+                  <a:ext uri="{FF2B5EF4-FFF2-40B4-BE49-F238E27FC236}">
+                    <a16:creationId xmlns:a16="http://schemas.microsoft.com/office/drawing/2014/main" id="{46D9CE07-6ABB-1767-4232-1882717142E5}"/>
+                  </a:ext>
+                </a:extLst>
+              </p:cNvPr>
+              <p:cNvSpPr>
+                <a:spLocks noGrp="1"/>
+              </p:cNvSpPr>
+              <p:nvPr>
+                <p:ph idx="1"/>
+              </p:nvPr>
+            </p:nvSpPr>
+            <p:spPr>
+              <a:xfrm>
+                <a:off x="1442267" y="1702731"/>
+                <a:ext cx="9605144" cy="4263374"/>
+              </a:xfrm>
+            </p:spPr>
+            <p:txBody>
+              <a:bodyPr>
+                <a:normAutofit fontScale="77500" lnSpcReduction="20000"/>
+              </a:bodyPr>
+              <a:lstStyle/>
+              <a:p>
+                <a:pPr marL="457200" indent="-457200">
+                  <a:buFont typeface="+mj-lt"/>
+                  <a:buAutoNum type="arabicPeriod"/>
+                </a:pPr>
+                <a:r>
+                  <a:rPr lang="en-US" dirty="0"/>
+                  <a:t>Choose two large prime numbers, p and q.</a:t>
+                </a:r>
+              </a:p>
+              <a:p>
+                <a:pPr marL="457200" indent="-457200">
+                  <a:buFont typeface="+mj-lt"/>
+                  <a:buAutoNum type="arabicPeriod"/>
+                </a:pPr>
+                <a:r>
+                  <a:rPr lang="en-US" dirty="0"/>
+                  <a:t>Compute n = </a:t>
+                </a:r>
+                <a:r>
+                  <a:rPr lang="en-US" dirty="0" err="1"/>
+                  <a:t>pq</a:t>
+                </a:r>
+                <a:r>
+                  <a:rPr lang="en-US" dirty="0"/>
+                  <a:t> and z = (p - 1)(q - 1).</a:t>
+                </a:r>
+              </a:p>
+              <a:p>
+                <a:pPr marL="457200" indent="-457200">
+                  <a:buFont typeface="+mj-lt"/>
+                  <a:buAutoNum type="arabicPeriod"/>
+                </a:pPr>
+                <a:r>
+                  <a:rPr lang="en-US" dirty="0"/>
+                  <a:t>Choose a number, e (used for encryption), less than n that is relatively prime to z.</a:t>
+                </a:r>
+              </a:p>
+              <a:p>
+                <a:pPr marL="457200" indent="-457200">
+                  <a:buFont typeface="+mj-lt"/>
+                  <a:buAutoNum type="arabicPeriod"/>
+                </a:pPr>
+                <a:r>
+                  <a:rPr lang="en-US" dirty="0"/>
+                  <a:t>Find a number, d (used for decryption), such that ed mod z = 1</a:t>
+                </a:r>
+              </a:p>
+              <a:p>
+                <a:pPr marL="457200" indent="-457200">
+                  <a:buFont typeface="+mj-lt"/>
+                  <a:buAutoNum type="arabicPeriod"/>
+                </a:pPr>
+                <a14:m>
+                  <m:oMath xmlns:m="http://schemas.openxmlformats.org/officeDocument/2006/math">
+                    <m:sSubSup>
+                      <m:sSubSupPr>
+                        <m:ctrlPr>
+                          <a:rPr lang="en-US" i="1">
+                            <a:latin typeface="Cambria Math" panose="02040503050406030204" pitchFamily="18" charset="0"/>
+                          </a:rPr>
+                        </m:ctrlPr>
+                      </m:sSubSupPr>
+                      <m:e>
+                        <m:r>
+                          <a:rPr lang="en-US" i="1">
+                            <a:latin typeface="Cambria Math" panose="02040503050406030204" pitchFamily="18" charset="0"/>
+                          </a:rPr>
+                          <m:t>𝐾</m:t>
+                        </m:r>
+                      </m:e>
+                      <m:sub>
+                        <m:r>
+                          <a:rPr lang="en-US" i="1">
+                            <a:latin typeface="Cambria Math" panose="02040503050406030204" pitchFamily="18" charset="0"/>
+                          </a:rPr>
+                          <m:t>𝐵</m:t>
+                        </m:r>
+                      </m:sub>
+                      <m:sup>
+                        <m:r>
+                          <a:rPr lang="en-US" i="1">
+                            <a:latin typeface="Cambria Math" panose="02040503050406030204" pitchFamily="18" charset="0"/>
+                          </a:rPr>
+                          <m:t>+</m:t>
+                        </m:r>
+                      </m:sup>
+                    </m:sSubSup>
+                  </m:oMath>
+                </a14:m>
+                <a:r>
+                  <a:rPr lang="en-US" dirty="0"/>
+                  <a:t> = ( n , e ) is the public key and </a:t>
+                </a:r>
+                <a14:m>
+                  <m:oMath xmlns:m="http://schemas.openxmlformats.org/officeDocument/2006/math">
+                    <m:sSubSup>
+                      <m:sSubSupPr>
+                        <m:ctrlPr>
+                          <a:rPr lang="en-US" i="1">
+                            <a:latin typeface="Cambria Math" panose="02040503050406030204" pitchFamily="18" charset="0"/>
+                          </a:rPr>
+                        </m:ctrlPr>
+                      </m:sSubSupPr>
+                      <m:e>
+                        <m:r>
+                          <a:rPr lang="en-US" i="1">
+                            <a:latin typeface="Cambria Math" panose="02040503050406030204" pitchFamily="18" charset="0"/>
+                          </a:rPr>
+                          <m:t>𝐾</m:t>
+                        </m:r>
+                      </m:e>
+                      <m:sub>
+                        <m:r>
+                          <a:rPr lang="en-US" i="1">
+                            <a:latin typeface="Cambria Math" panose="02040503050406030204" pitchFamily="18" charset="0"/>
+                          </a:rPr>
+                          <m:t>𝐵</m:t>
+                        </m:r>
+                      </m:sub>
+                      <m:sup>
+                        <m:r>
+                          <a:rPr lang="en-US" b="0" i="1" smtClean="0">
+                            <a:latin typeface="Cambria Math" panose="02040503050406030204" pitchFamily="18" charset="0"/>
+                          </a:rPr>
+                          <m:t>−</m:t>
+                        </m:r>
+                      </m:sup>
+                    </m:sSubSup>
+                  </m:oMath>
+                </a14:m>
+                <a:r>
+                  <a:rPr lang="en-US" dirty="0"/>
+                  <a:t> = ( n , d )</a:t>
+                </a:r>
+              </a:p>
+              <a:p>
+                <a:pPr marL="0" indent="0">
+                  <a:buNone/>
+                </a:pPr>
+                <a:r>
+                  <a:rPr lang="en-US" b="1" u="sng" dirty="0"/>
+                  <a:t>How does it work?</a:t>
+                </a:r>
+              </a:p>
+              <a:p>
+                <a:pPr marL="0" indent="0">
+                  <a:buNone/>
+                </a:pPr>
+                <a:r>
+                  <a:rPr lang="en-US" dirty="0"/>
+                  <a:t>Suppose m is the number of the bit string to be transmitted (with m &lt; n).</a:t>
+                </a:r>
+              </a:p>
+              <a:p>
+                <a:pPr marL="0" indent="0">
+                  <a:buNone/>
+                </a:pPr>
+                <a:r>
+                  <a:rPr lang="en-US" dirty="0"/>
+                  <a:t>Alice Computes c = </a:t>
+                </a:r>
+                <a14:m>
+                  <m:oMath xmlns:m="http://schemas.openxmlformats.org/officeDocument/2006/math">
+                    <m:sSup>
+                      <m:sSupPr>
+                        <m:ctrlPr>
+                          <a:rPr lang="en-US" i="1" smtClean="0">
+                            <a:latin typeface="Cambria Math" panose="02040503050406030204" pitchFamily="18" charset="0"/>
+                          </a:rPr>
+                        </m:ctrlPr>
+                      </m:sSupPr>
+                      <m:e>
+                        <m:r>
+                          <a:rPr lang="en-US" b="0" i="1" smtClean="0">
+                            <a:latin typeface="Cambria Math" panose="02040503050406030204" pitchFamily="18" charset="0"/>
+                          </a:rPr>
+                          <m:t>𝑚</m:t>
+                        </m:r>
+                      </m:e>
+                      <m:sup>
+                        <m:r>
+                          <a:rPr lang="en-US" b="0" i="1" smtClean="0">
+                            <a:latin typeface="Cambria Math" panose="02040503050406030204" pitchFamily="18" charset="0"/>
+                          </a:rPr>
+                          <m:t>𝑒</m:t>
+                        </m:r>
+                      </m:sup>
+                    </m:sSup>
+                  </m:oMath>
+                </a14:m>
+                <a:r>
+                  <a:rPr lang="en-US" dirty="0"/>
+                  <a:t> mod n and sends it to Bob.</a:t>
+                </a:r>
+              </a:p>
+              <a:p>
+                <a:pPr marL="0" indent="0">
+                  <a:buNone/>
+                </a:pPr>
+                <a:r>
+                  <a:rPr lang="en-US" dirty="0"/>
+                  <a:t>Then bob decrypts the message using the property </a:t>
+                </a:r>
+                <a14:m>
+                  <m:oMath xmlns:m="http://schemas.openxmlformats.org/officeDocument/2006/math">
+                    <m:sSup>
+                      <m:sSupPr>
+                        <m:ctrlPr>
+                          <a:rPr lang="en-US" i="1" smtClean="0">
+                            <a:latin typeface="Cambria Math" panose="02040503050406030204" pitchFamily="18" charset="0"/>
+                          </a:rPr>
+                        </m:ctrlPr>
+                      </m:sSupPr>
+                      <m:e>
+                        <m:r>
+                          <a:rPr lang="en-US" b="0" i="1" smtClean="0">
+                            <a:latin typeface="Cambria Math" panose="02040503050406030204" pitchFamily="18" charset="0"/>
+                          </a:rPr>
+                          <m:t>𝑚</m:t>
+                        </m:r>
+                      </m:e>
+                      <m:sup>
+                        <m:r>
+                          <a:rPr lang="en-US" b="0" i="1" smtClean="0">
+                            <a:latin typeface="Cambria Math" panose="02040503050406030204" pitchFamily="18" charset="0"/>
+                          </a:rPr>
+                          <m:t>𝑒𝑑</m:t>
+                        </m:r>
+                      </m:sup>
+                    </m:sSup>
+                  </m:oMath>
+                </a14:m>
+                <a:r>
+                  <a:rPr lang="da-DK" dirty="0"/>
+                  <a:t> mod n = </a:t>
+                </a:r>
+                <a14:m>
+                  <m:oMath xmlns:m="http://schemas.openxmlformats.org/officeDocument/2006/math">
+                    <m:sSup>
+                      <m:sSupPr>
+                        <m:ctrlPr>
+                          <a:rPr lang="en-US" i="1">
+                            <a:latin typeface="Cambria Math" panose="02040503050406030204" pitchFamily="18" charset="0"/>
+                          </a:rPr>
+                        </m:ctrlPr>
+                      </m:sSupPr>
+                      <m:e>
+                        <m:r>
+                          <a:rPr lang="en-US" i="1">
+                            <a:latin typeface="Cambria Math" panose="02040503050406030204" pitchFamily="18" charset="0"/>
+                          </a:rPr>
+                          <m:t>𝑚</m:t>
+                        </m:r>
+                      </m:e>
+                      <m:sup>
+                        <m:r>
+                          <m:rPr>
+                            <m:nor/>
+                          </m:rPr>
+                          <a:rPr lang="da-DK"/>
+                          <m:t>(</m:t>
+                        </m:r>
+                        <m:r>
+                          <m:rPr>
+                            <m:nor/>
+                          </m:rPr>
+                          <a:rPr lang="da-DK"/>
+                          <m:t>ed</m:t>
+                        </m:r>
+                        <m:r>
+                          <m:rPr>
+                            <m:nor/>
+                          </m:rPr>
+                          <a:rPr lang="da-DK"/>
+                          <m:t> </m:t>
+                        </m:r>
+                        <m:r>
+                          <m:rPr>
+                            <m:nor/>
+                          </m:rPr>
+                          <a:rPr lang="da-DK"/>
+                          <m:t>mod</m:t>
+                        </m:r>
+                        <m:r>
+                          <m:rPr>
+                            <m:nor/>
+                          </m:rPr>
+                          <a:rPr lang="da-DK"/>
+                          <m:t> </m:t>
+                        </m:r>
+                        <m:r>
+                          <m:rPr>
+                            <m:nor/>
+                          </m:rPr>
+                          <a:rPr lang="da-DK"/>
+                          <m:t>z</m:t>
+                        </m:r>
+                        <m:r>
+                          <m:rPr>
+                            <m:nor/>
+                          </m:rPr>
+                          <a:rPr lang="da-DK"/>
+                          <m:t>)</m:t>
+                        </m:r>
+                      </m:sup>
+                    </m:sSup>
+                  </m:oMath>
+                </a14:m>
+                <a:r>
+                  <a:rPr lang="da-DK" dirty="0"/>
+                  <a:t> mod n</a:t>
+                </a:r>
+              </a:p>
+              <a:p>
+                <a:pPr marL="0" indent="0">
+                  <a:buNone/>
+                </a:pPr>
+                <a:r>
+                  <a:rPr lang="en-US" dirty="0"/>
+                  <a:t>m = </a:t>
+                </a:r>
+                <a14:m>
+                  <m:oMath xmlns:m="http://schemas.openxmlformats.org/officeDocument/2006/math">
+                    <m:sSup>
+                      <m:sSupPr>
+                        <m:ctrlPr>
+                          <a:rPr lang="en-US" i="1"/>
+                        </m:ctrlPr>
+                      </m:sSupPr>
+                      <m:e>
+                        <m:r>
+                          <a:rPr lang="en-US" b="0" i="1" smtClean="0">
+                            <a:latin typeface="Cambria Math" panose="02040503050406030204" pitchFamily="18" charset="0"/>
+                          </a:rPr>
+                          <m:t>𝑐</m:t>
+                        </m:r>
+                      </m:e>
+                      <m:sup>
+                        <m:r>
+                          <a:rPr lang="en-US" b="0" i="1" smtClean="0">
+                            <a:latin typeface="Cambria Math" panose="02040503050406030204" pitchFamily="18" charset="0"/>
+                          </a:rPr>
+                          <m:t>𝑑</m:t>
+                        </m:r>
+                      </m:sup>
+                    </m:sSup>
+                  </m:oMath>
+                </a14:m>
+                <a:r>
+                  <a:rPr lang="da-DK" dirty="0"/>
+                  <a:t> mod n = </a:t>
+                </a:r>
+                <a14:m>
+                  <m:oMath xmlns:m="http://schemas.openxmlformats.org/officeDocument/2006/math">
+                    <m:sSup>
+                      <m:sSupPr>
+                        <m:ctrlPr>
+                          <a:rPr lang="en-US" i="1">
+                            <a:latin typeface="Cambria Math" panose="02040503050406030204" pitchFamily="18" charset="0"/>
+                          </a:rPr>
+                        </m:ctrlPr>
+                      </m:sSupPr>
+                      <m:e>
+                        <m:r>
+                          <a:rPr lang="en-US" i="1">
+                            <a:latin typeface="Cambria Math" panose="02040503050406030204" pitchFamily="18" charset="0"/>
+                          </a:rPr>
+                          <m:t>𝑚</m:t>
+                        </m:r>
+                      </m:e>
+                      <m:sup>
+                        <m:r>
+                          <a:rPr lang="en-US" i="1">
+                            <a:latin typeface="Cambria Math" panose="02040503050406030204" pitchFamily="18" charset="0"/>
+                          </a:rPr>
+                          <m:t>𝑒𝑑</m:t>
+                        </m:r>
+                      </m:sup>
+                    </m:sSup>
+                  </m:oMath>
+                </a14:m>
+                <a:r>
+                  <a:rPr lang="da-DK" dirty="0"/>
+                  <a:t> mod n = </a:t>
+                </a:r>
+                <a14:m>
+                  <m:oMath xmlns:m="http://schemas.openxmlformats.org/officeDocument/2006/math">
+                    <m:sSup>
+                      <m:sSupPr>
+                        <m:ctrlPr>
+                          <a:rPr lang="en-US" i="1">
+                            <a:latin typeface="Cambria Math" panose="02040503050406030204" pitchFamily="18" charset="0"/>
+                          </a:rPr>
+                        </m:ctrlPr>
+                      </m:sSupPr>
+                      <m:e>
+                        <m:r>
+                          <a:rPr lang="en-US" i="1">
+                            <a:latin typeface="Cambria Math" panose="02040503050406030204" pitchFamily="18" charset="0"/>
+                          </a:rPr>
+                          <m:t>𝑚</m:t>
+                        </m:r>
+                      </m:e>
+                      <m:sup>
+                        <m:r>
+                          <m:rPr>
+                            <m:nor/>
+                          </m:rPr>
+                          <a:rPr lang="da-DK"/>
+                          <m:t>(</m:t>
+                        </m:r>
+                        <m:r>
+                          <m:rPr>
+                            <m:nor/>
+                          </m:rPr>
+                          <a:rPr lang="en-US" b="0" i="0" smtClean="0"/>
+                          <m:t>ed</m:t>
+                        </m:r>
+                        <m:r>
+                          <m:rPr>
+                            <m:nor/>
+                          </m:rPr>
+                          <a:rPr lang="da-DK" smtClean="0"/>
+                          <m:t> </m:t>
+                        </m:r>
+                        <m:r>
+                          <m:rPr>
+                            <m:nor/>
+                          </m:rPr>
+                          <a:rPr lang="da-DK"/>
+                          <m:t>mod</m:t>
+                        </m:r>
+                        <m:r>
+                          <m:rPr>
+                            <m:nor/>
+                          </m:rPr>
+                          <a:rPr lang="da-DK"/>
+                          <m:t> </m:t>
+                        </m:r>
+                        <m:r>
+                          <m:rPr>
+                            <m:nor/>
+                          </m:rPr>
+                          <a:rPr lang="da-DK"/>
+                          <m:t>z</m:t>
+                        </m:r>
+                        <m:r>
+                          <m:rPr>
+                            <m:nor/>
+                          </m:rPr>
+                          <a:rPr lang="da-DK"/>
+                          <m:t>)</m:t>
+                        </m:r>
+                      </m:sup>
+                    </m:sSup>
+                  </m:oMath>
+                </a14:m>
+                <a:r>
+                  <a:rPr lang="da-DK" dirty="0"/>
+                  <a:t> mod n = m mod n = m</a:t>
+                </a:r>
+              </a:p>
+              <a:p>
+                <a:pPr marL="0" indent="0">
+                  <a:buNone/>
+                </a:pPr>
+                <a:endParaRPr lang="en-US" dirty="0"/>
+              </a:p>
+              <a:p>
+                <a:pPr marL="457200" indent="-457200">
+                  <a:buFont typeface="+mj-lt"/>
+                  <a:buAutoNum type="arabicPeriod"/>
+                </a:pPr>
+                <a:endParaRPr lang="en-US" dirty="0"/>
+              </a:p>
+            </p:txBody>
+          </p:sp>
+        </mc:Choice>
+        <mc:Fallback>
+          <p:sp>
+            <p:nvSpPr>
+              <p:cNvPr id="3" name="Content Placeholder 2">
+                <a:extLst>
+                  <a:ext uri="{FF2B5EF4-FFF2-40B4-BE49-F238E27FC236}">
+                    <a16:creationId xmlns:a16="http://schemas.microsoft.com/office/drawing/2014/main" id="{46D9CE07-6ABB-1767-4232-1882717142E5}"/>
+                  </a:ext>
+                </a:extLst>
+              </p:cNvPr>
+              <p:cNvSpPr>
+                <a:spLocks noGrp="1" noRot="1" noChangeAspect="1" noMove="1" noResize="1" noEditPoints="1" noAdjustHandles="1" noChangeArrowheads="1" noChangeShapeType="1" noTextEdit="1"/>
+              </p:cNvSpPr>
+              <p:nvPr>
+                <p:ph idx="1"/>
+              </p:nvPr>
+            </p:nvSpPr>
+            <p:spPr>
+              <a:xfrm>
+                <a:off x="1442267" y="1702731"/>
+                <a:ext cx="9605144" cy="4263374"/>
+              </a:xfrm>
+              <a:blipFill>
+                <a:blip r:embed="rId2"/>
+                <a:stretch>
+                  <a:fillRect l="-952" t="-1571" b="-1286"/>
+                </a:stretch>
+              </a:blipFill>
+            </p:spPr>
+            <p:txBody>
+              <a:bodyPr/>
+              <a:lstStyle/>
+              <a:p>
+                <a:r>
+                  <a:rPr lang="en-US">
+                    <a:noFill/>
+                  </a:rPr>
+                  <a:t> </a:t>
+                </a:r>
+              </a:p>
+            </p:txBody>
+          </p:sp>
+        </mc:Fallback>
+      </mc:AlternateContent>
+    </p:spTree>
+    <p:extLst>
+      <p:ext uri="{BB962C8B-B14F-4D97-AF65-F5344CB8AC3E}">
+        <p14:creationId xmlns:p14="http://schemas.microsoft.com/office/powerpoint/2010/main" val="2988473362"/>
+      </p:ext>
+    </p:extLst>
+  </p:cSld>
+  <p:clrMapOvr>
+    <a:masterClrMapping/>
+  </p:clrMapOvr>
+</p:sld>
+</file>
+
+<file path=ppt/slides/slide26.xml><?xml version="1.0" encoding="utf-8"?>
+<p:sld xmlns:a="http://schemas.openxmlformats.org/drawingml/2006/main" xmlns:r="http://schemas.openxmlformats.org/officeDocument/2006/relationships" xmlns:p="http://schemas.openxmlformats.org/presentationml/2006/main">
+  <p:cSld>
+    <p:spTree>
+      <p:nvGrpSpPr>
+        <p:cNvPr id="1" name=""/>
+        <p:cNvGrpSpPr/>
+        <p:nvPr/>
+      </p:nvGrpSpPr>
+      <p:grpSpPr>
+        <a:xfrm>
+          <a:off x="0" y="0"/>
+          <a:ext cx="0" cy="0"/>
+          <a:chOff x="0" y="0"/>
+          <a:chExt cx="0" cy="0"/>
+        </a:xfrm>
+      </p:grpSpPr>
+      <p:sp>
+        <p:nvSpPr>
+          <p:cNvPr id="2" name="Title 1">
+            <a:extLst>
+              <a:ext uri="{FF2B5EF4-FFF2-40B4-BE49-F238E27FC236}">
+                <a16:creationId xmlns:a16="http://schemas.microsoft.com/office/drawing/2014/main" id="{6C4CE2B3-7F20-EC07-1B39-6E516F3C31CF}"/>
+              </a:ext>
+            </a:extLst>
+          </p:cNvPr>
+          <p:cNvSpPr>
+            <a:spLocks noGrp="1"/>
+          </p:cNvSpPr>
+          <p:nvPr>
+            <p:ph type="title"/>
+          </p:nvPr>
+        </p:nvSpPr>
+        <p:spPr>
+          <a:xfrm>
+            <a:off x="1141412" y="128324"/>
+            <a:ext cx="9905998" cy="1478570"/>
+          </a:xfrm>
+        </p:spPr>
+        <p:txBody>
+          <a:bodyPr/>
+          <a:lstStyle/>
+          <a:p>
+            <a:r>
+              <a:rPr lang="en-US" dirty="0"/>
+              <a:t>Session keys</a:t>
+            </a:r>
+          </a:p>
+        </p:txBody>
+      </p:sp>
+      <mc:AlternateContent xmlns:mc="http://schemas.openxmlformats.org/markup-compatibility/2006">
+        <mc:Choice xmlns:a14="http://schemas.microsoft.com/office/drawing/2010/main" Requires="a14">
+          <p:sp>
+            <p:nvSpPr>
+              <p:cNvPr id="3" name="Content Placeholder 2">
+                <a:extLst>
+                  <a:ext uri="{FF2B5EF4-FFF2-40B4-BE49-F238E27FC236}">
+                    <a16:creationId xmlns:a16="http://schemas.microsoft.com/office/drawing/2014/main" id="{F6133BBF-FBE3-426B-ABD1-4EFDA75D42BF}"/>
+                  </a:ext>
+                </a:extLst>
+              </p:cNvPr>
+              <p:cNvSpPr>
+                <a:spLocks noGrp="1"/>
+              </p:cNvSpPr>
+              <p:nvPr>
+                <p:ph idx="1"/>
+              </p:nvPr>
+            </p:nvSpPr>
+            <p:spPr>
+              <a:xfrm>
+                <a:off x="1141411" y="1353940"/>
+                <a:ext cx="9473170" cy="3095512"/>
+              </a:xfrm>
+            </p:spPr>
+            <p:txBody>
+              <a:bodyPr>
+                <a:normAutofit fontScale="77500" lnSpcReduction="20000"/>
+              </a:bodyPr>
+              <a:lstStyle/>
+              <a:p>
+                <a:pPr marL="0" indent="0">
+                  <a:buNone/>
+                </a:pPr>
+                <a:r>
+                  <a:rPr lang="en-US" dirty="0"/>
+                  <a:t>We note here that the exponentiation required by RSA is a rather time-consuming process. As a result, RSA is often used in practice in combination with symmetric key cryptography. For example, if Alice wants to send Bob a large amount of encrypted data, she could do the following. First Alice chooses a key that will be used to encode the data itself; this key is referred to as a session key, and is denoted by </a:t>
+                </a:r>
+                <a14:m>
+                  <m:oMath xmlns:m="http://schemas.openxmlformats.org/officeDocument/2006/math">
+                    <m:sSub>
+                      <m:sSubPr>
+                        <m:ctrlPr>
+                          <a:rPr lang="en-US" i="1">
+                            <a:latin typeface="Cambria Math" panose="02040503050406030204" pitchFamily="18" charset="0"/>
+                          </a:rPr>
+                        </m:ctrlPr>
+                      </m:sSubPr>
+                      <m:e>
+                        <m:r>
+                          <a:rPr lang="en-US" i="1">
+                            <a:latin typeface="Cambria Math" panose="02040503050406030204" pitchFamily="18" charset="0"/>
+                          </a:rPr>
+                          <m:t>𝐾</m:t>
+                        </m:r>
+                      </m:e>
+                      <m:sub>
+                        <m:r>
+                          <a:rPr lang="en-US" i="1">
+                            <a:latin typeface="Cambria Math" panose="02040503050406030204" pitchFamily="18" charset="0"/>
+                          </a:rPr>
+                          <m:t>𝑆</m:t>
+                        </m:r>
+                      </m:sub>
+                    </m:sSub>
+                  </m:oMath>
+                </a14:m>
+                <a:r>
+                  <a:rPr lang="en-US" dirty="0"/>
+                  <a:t>. Alice must inform Bob of the session key, since this is the shared symmetric key they will use with a symmetric key cipher (e.g., with DES or AES). Alice encrypts the session key using Bob’s public key, that is, computes C = </a:t>
+                </a:r>
+                <a14:m>
+                  <m:oMath xmlns:m="http://schemas.openxmlformats.org/officeDocument/2006/math">
+                    <m:sSup>
+                      <m:sSupPr>
+                        <m:ctrlPr>
+                          <a:rPr lang="en-US" i="1" smtClean="0">
+                            <a:latin typeface="Cambria Math" panose="02040503050406030204" pitchFamily="18" charset="0"/>
+                          </a:rPr>
+                        </m:ctrlPr>
+                      </m:sSupPr>
+                      <m:e>
+                        <m:r>
+                          <m:rPr>
+                            <m:nor/>
+                          </m:rPr>
+                          <a:rPr lang="en-US" dirty="0"/>
+                          <m:t>(</m:t>
+                        </m:r>
+                        <m:sSub>
+                          <m:sSubPr>
+                            <m:ctrlPr>
+                              <a:rPr lang="en-US" i="1">
+                                <a:latin typeface="Cambria Math" panose="02040503050406030204" pitchFamily="18" charset="0"/>
+                              </a:rPr>
+                            </m:ctrlPr>
+                          </m:sSubPr>
+                          <m:e>
+                            <m:r>
+                              <a:rPr lang="en-US" i="1">
+                                <a:latin typeface="Cambria Math" panose="02040503050406030204" pitchFamily="18" charset="0"/>
+                              </a:rPr>
+                              <m:t>𝐾</m:t>
+                            </m:r>
+                          </m:e>
+                          <m:sub>
+                            <m:r>
+                              <a:rPr lang="en-US" i="1">
+                                <a:latin typeface="Cambria Math" panose="02040503050406030204" pitchFamily="18" charset="0"/>
+                              </a:rPr>
+                              <m:t>𝑆</m:t>
+                            </m:r>
+                          </m:sub>
+                        </m:sSub>
+                        <m:r>
+                          <m:rPr>
+                            <m:nor/>
+                          </m:rPr>
+                          <a:rPr lang="en-US" dirty="0"/>
+                          <m:t>)</m:t>
+                        </m:r>
+                      </m:e>
+                      <m:sup>
+                        <m:r>
+                          <a:rPr lang="en-US" b="0" i="1" smtClean="0">
+                            <a:latin typeface="Cambria Math" panose="02040503050406030204" pitchFamily="18" charset="0"/>
+                          </a:rPr>
+                          <m:t>𝑒</m:t>
+                        </m:r>
+                      </m:sup>
+                    </m:sSup>
+                  </m:oMath>
+                </a14:m>
+                <a:r>
+                  <a:rPr lang="en-US" dirty="0"/>
+                  <a:t> mod n. Bob receives the RSA-encrypted session key, c, and decrypts it to obtain the session key, KS. Bob now knows the session key that Alice will use for her encrypted data transfer.</a:t>
+                </a:r>
+              </a:p>
+            </p:txBody>
+          </p:sp>
+        </mc:Choice>
+        <mc:Fallback>
+          <p:sp>
+            <p:nvSpPr>
+              <p:cNvPr id="3" name="Content Placeholder 2">
+                <a:extLst>
+                  <a:ext uri="{FF2B5EF4-FFF2-40B4-BE49-F238E27FC236}">
+                    <a16:creationId xmlns:a16="http://schemas.microsoft.com/office/drawing/2014/main" id="{F6133BBF-FBE3-426B-ABD1-4EFDA75D42BF}"/>
+                  </a:ext>
+                </a:extLst>
+              </p:cNvPr>
+              <p:cNvSpPr>
+                <a:spLocks noGrp="1" noRot="1" noChangeAspect="1" noMove="1" noResize="1" noEditPoints="1" noAdjustHandles="1" noChangeArrowheads="1" noChangeShapeType="1" noTextEdit="1"/>
+              </p:cNvSpPr>
+              <p:nvPr>
+                <p:ph idx="1"/>
+              </p:nvPr>
+            </p:nvSpPr>
+            <p:spPr>
+              <a:xfrm>
+                <a:off x="1141411" y="1353940"/>
+                <a:ext cx="9473170" cy="3095512"/>
+              </a:xfrm>
+              <a:blipFill>
+                <a:blip r:embed="rId2"/>
+                <a:stretch>
+                  <a:fillRect l="-579" t="-1181" r="-322"/>
+                </a:stretch>
+              </a:blipFill>
+            </p:spPr>
+            <p:txBody>
+              <a:bodyPr/>
+              <a:lstStyle/>
+              <a:p>
+                <a:r>
+                  <a:rPr lang="en-US">
+                    <a:noFill/>
+                  </a:rPr>
+                  <a:t> </a:t>
+                </a:r>
+              </a:p>
+            </p:txBody>
+          </p:sp>
+        </mc:Fallback>
+      </mc:AlternateContent>
+      <p:pic>
+        <p:nvPicPr>
+          <p:cNvPr id="5" name="Picture 4">
+            <a:extLst>
+              <a:ext uri="{FF2B5EF4-FFF2-40B4-BE49-F238E27FC236}">
+                <a16:creationId xmlns:a16="http://schemas.microsoft.com/office/drawing/2014/main" id="{29716237-A939-BE14-5DAA-EEC7CA5A160A}"/>
+              </a:ext>
+            </a:extLst>
+          </p:cNvPr>
+          <p:cNvPicPr>
+            <a:picLocks noChangeAspect="1"/>
+          </p:cNvPicPr>
+          <p:nvPr/>
+        </p:nvPicPr>
+        <p:blipFill>
+          <a:blip r:embed="rId3">
+            <a:extLst>
+              <a:ext uri="{28A0092B-C50C-407E-A947-70E740481C1C}">
+                <a14:useLocalDpi xmlns:a14="http://schemas.microsoft.com/office/drawing/2010/main" val="0"/>
+              </a:ext>
+            </a:extLst>
+          </a:blip>
+          <a:stretch>
+            <a:fillRect/>
+          </a:stretch>
+        </p:blipFill>
+        <p:spPr>
+          <a:xfrm>
+            <a:off x="3058129" y="4194928"/>
+            <a:ext cx="5547841" cy="1546994"/>
+          </a:xfrm>
+          <a:prstGeom prst="rect">
+            <a:avLst/>
+          </a:prstGeom>
+        </p:spPr>
+      </p:pic>
+      <p:sp>
+        <p:nvSpPr>
+          <p:cNvPr id="6" name="TextBox 5">
+            <a:extLst>
+              <a:ext uri="{FF2B5EF4-FFF2-40B4-BE49-F238E27FC236}">
+                <a16:creationId xmlns:a16="http://schemas.microsoft.com/office/drawing/2014/main" id="{1A7E76CE-2A58-9026-01D4-EC49C6523510}"/>
+              </a:ext>
+            </a:extLst>
+          </p:cNvPr>
+          <p:cNvSpPr txBox="1"/>
+          <p:nvPr/>
+        </p:nvSpPr>
+        <p:spPr>
+          <a:xfrm>
+            <a:off x="4213763" y="5891753"/>
+            <a:ext cx="3761295" cy="369332"/>
+          </a:xfrm>
+          <a:prstGeom prst="rect">
+            <a:avLst/>
+          </a:prstGeom>
+          <a:noFill/>
+        </p:spPr>
+        <p:txBody>
+          <a:bodyPr wrap="square" rtlCol="0">
+            <a:spAutoFit/>
+          </a:bodyPr>
+          <a:lstStyle/>
+          <a:p>
+            <a:r>
+              <a:rPr lang="pt-BR" dirty="0"/>
+              <a:t>Bob’s RSA decryption, d = 29, n = 35</a:t>
+            </a:r>
+            <a:endParaRPr lang="en-US" dirty="0"/>
+          </a:p>
+        </p:txBody>
+      </p:sp>
+    </p:spTree>
+    <p:extLst>
+      <p:ext uri="{BB962C8B-B14F-4D97-AF65-F5344CB8AC3E}">
+        <p14:creationId xmlns:p14="http://schemas.microsoft.com/office/powerpoint/2010/main" val="3236570637"/>
+      </p:ext>
+    </p:extLst>
+  </p:cSld>
+  <p:clrMapOvr>
+    <a:masterClrMapping/>
+  </p:clrMapOvr>
+</p:sld>
+</file>
+
+<file path=ppt/slides/slide27.xml><?xml version="1.0" encoding="utf-8"?>
+<p:sld xmlns:a="http://schemas.openxmlformats.org/drawingml/2006/main" xmlns:r="http://schemas.openxmlformats.org/officeDocument/2006/relationships" xmlns:p="http://schemas.openxmlformats.org/presentationml/2006/main">
+  <p:cSld>
+    <p:spTree>
+      <p:nvGrpSpPr>
+        <p:cNvPr id="1" name=""/>
+        <p:cNvGrpSpPr/>
+        <p:nvPr/>
+      </p:nvGrpSpPr>
+      <p:grpSpPr>
+        <a:xfrm>
+          <a:off x="0" y="0"/>
+          <a:ext cx="0" cy="0"/>
+          <a:chOff x="0" y="0"/>
+          <a:chExt cx="0" cy="0"/>
+        </a:xfrm>
+      </p:grpSpPr>
+      <p:sp>
+        <p:nvSpPr>
+          <p:cNvPr id="2" name="Title 1">
+            <a:extLst>
+              <a:ext uri="{FF2B5EF4-FFF2-40B4-BE49-F238E27FC236}">
+                <a16:creationId xmlns:a16="http://schemas.microsoft.com/office/drawing/2014/main" id="{AB13F343-26CD-0B7F-2D23-3F8FEC5C720C}"/>
+              </a:ext>
+            </a:extLst>
+          </p:cNvPr>
+          <p:cNvSpPr>
+            <a:spLocks noGrp="1"/>
+          </p:cNvSpPr>
+          <p:nvPr>
+            <p:ph type="title"/>
+          </p:nvPr>
+        </p:nvSpPr>
+        <p:spPr/>
+        <p:txBody>
+          <a:bodyPr/>
+          <a:lstStyle/>
+          <a:p>
+            <a:r>
+              <a:rPr lang="en-US" dirty="0"/>
+              <a:t>3. Message Integrity and Digital Signatures</a:t>
+            </a:r>
+          </a:p>
+        </p:txBody>
+      </p:sp>
+      <p:sp>
+        <p:nvSpPr>
+          <p:cNvPr id="3" name="Content Placeholder 2">
+            <a:extLst>
+              <a:ext uri="{FF2B5EF4-FFF2-40B4-BE49-F238E27FC236}">
+                <a16:creationId xmlns:a16="http://schemas.microsoft.com/office/drawing/2014/main" id="{A1758CED-377C-AA6C-2ED4-99C86E9A8821}"/>
+              </a:ext>
+            </a:extLst>
+          </p:cNvPr>
+          <p:cNvSpPr>
+            <a:spLocks noGrp="1"/>
+          </p:cNvSpPr>
+          <p:nvPr>
+            <p:ph idx="1"/>
+          </p:nvPr>
+        </p:nvSpPr>
+        <p:spPr/>
+        <p:txBody>
+          <a:bodyPr/>
+          <a:lstStyle/>
+          <a:p>
+            <a:pPr marL="0" indent="0">
+              <a:buNone/>
+            </a:pPr>
+            <a:r>
+              <a:rPr lang="en-US" dirty="0"/>
+              <a:t>We define the message integrity problem using, once again, Alice and Bob. Suppose Bob receives a message (which may be encrypted or may be in plaintext) and he believes this message was sent by Alice. To authenticate this message, Bob needs to verify:</a:t>
+            </a:r>
+          </a:p>
+          <a:p>
+            <a:pPr marL="457200" indent="-457200">
+              <a:buFont typeface="+mj-lt"/>
+              <a:buAutoNum type="arabicPeriod"/>
+            </a:pPr>
+            <a:r>
+              <a:rPr lang="en-US" dirty="0"/>
+              <a:t>The message indeed originated from Alice.</a:t>
+            </a:r>
+          </a:p>
+          <a:p>
+            <a:pPr marL="457200" indent="-457200">
+              <a:buFont typeface="+mj-lt"/>
+              <a:buAutoNum type="arabicPeriod"/>
+            </a:pPr>
+            <a:r>
+              <a:rPr lang="en-US" dirty="0"/>
+              <a:t>The message was not tampered with on its way to Bob.</a:t>
+            </a:r>
+          </a:p>
+        </p:txBody>
+      </p:sp>
+    </p:spTree>
+    <p:extLst>
+      <p:ext uri="{BB962C8B-B14F-4D97-AF65-F5344CB8AC3E}">
+        <p14:creationId xmlns:p14="http://schemas.microsoft.com/office/powerpoint/2010/main" val="270888706"/>
+      </p:ext>
+    </p:extLst>
+  </p:cSld>
+  <p:clrMapOvr>
+    <a:masterClrMapping/>
+  </p:clrMapOvr>
+</p:sld>
+</file>
+
+<file path=ppt/slides/slide28.xml><?xml version="1.0" encoding="utf-8"?>
+<p:sld xmlns:a="http://schemas.openxmlformats.org/drawingml/2006/main" xmlns:r="http://schemas.openxmlformats.org/officeDocument/2006/relationships" xmlns:p="http://schemas.openxmlformats.org/presentationml/2006/main">
+  <p:cSld>
+    <p:spTree>
+      <p:nvGrpSpPr>
+        <p:cNvPr id="1" name=""/>
+        <p:cNvGrpSpPr/>
+        <p:nvPr/>
+      </p:nvGrpSpPr>
+      <p:grpSpPr>
+        <a:xfrm>
+          <a:off x="0" y="0"/>
+          <a:ext cx="0" cy="0"/>
+          <a:chOff x="0" y="0"/>
+          <a:chExt cx="0" cy="0"/>
+        </a:xfrm>
+      </p:grpSpPr>
+      <p:sp>
+        <p:nvSpPr>
+          <p:cNvPr id="2" name="Title 1">
+            <a:extLst>
+              <a:ext uri="{FF2B5EF4-FFF2-40B4-BE49-F238E27FC236}">
+                <a16:creationId xmlns:a16="http://schemas.microsoft.com/office/drawing/2014/main" id="{A026AC1F-C47E-3AEE-F753-D85F41E053B5}"/>
+              </a:ext>
+            </a:extLst>
+          </p:cNvPr>
+          <p:cNvSpPr>
+            <a:spLocks noGrp="1"/>
+          </p:cNvSpPr>
+          <p:nvPr>
+            <p:ph type="title"/>
+          </p:nvPr>
+        </p:nvSpPr>
+        <p:spPr/>
+        <p:txBody>
+          <a:bodyPr/>
+          <a:lstStyle/>
+          <a:p>
+            <a:r>
+              <a:rPr lang="en-US" dirty="0"/>
+              <a:t>Message Authentication Code</a:t>
+            </a:r>
+          </a:p>
+        </p:txBody>
+      </p:sp>
+      <p:sp>
+        <p:nvSpPr>
+          <p:cNvPr id="3" name="Content Placeholder 2">
+            <a:extLst>
+              <a:ext uri="{FF2B5EF4-FFF2-40B4-BE49-F238E27FC236}">
+                <a16:creationId xmlns:a16="http://schemas.microsoft.com/office/drawing/2014/main" id="{64B020BC-A948-E947-A5AD-E782FB9A96F8}"/>
+              </a:ext>
+            </a:extLst>
+          </p:cNvPr>
+          <p:cNvSpPr>
+            <a:spLocks noGrp="1"/>
+          </p:cNvSpPr>
+          <p:nvPr>
+            <p:ph idx="1"/>
+          </p:nvPr>
+        </p:nvSpPr>
+        <p:spPr/>
+        <p:txBody>
+          <a:bodyPr>
+            <a:normAutofit fontScale="92500" lnSpcReduction="20000"/>
+          </a:bodyPr>
+          <a:lstStyle/>
+          <a:p>
+            <a:pPr marL="0" indent="0">
+              <a:buNone/>
+            </a:pPr>
+            <a:r>
+              <a:rPr lang="en-US" dirty="0"/>
+              <a:t>The first approach:</a:t>
+            </a:r>
+          </a:p>
+          <a:p>
+            <a:pPr marL="457200" indent="-457200">
+              <a:buFont typeface="+mj-lt"/>
+              <a:buAutoNum type="arabicPeriod"/>
+            </a:pPr>
+            <a:r>
+              <a:rPr lang="en-US" dirty="0"/>
+              <a:t>Alice creates message m and calculates the hash H(m) (for example, with SHA-1).</a:t>
+            </a:r>
+          </a:p>
+          <a:p>
+            <a:pPr marL="457200" indent="-457200">
+              <a:buFont typeface="+mj-lt"/>
+              <a:buAutoNum type="arabicPeriod"/>
+            </a:pPr>
+            <a:r>
+              <a:rPr lang="en-US" dirty="0"/>
+              <a:t>Alice then appends H(m) to the message m, creating an extended message (m, H(m)), and sends the extended message to Bob.</a:t>
+            </a:r>
+          </a:p>
+          <a:p>
+            <a:pPr marL="457200" indent="-457200">
+              <a:buFont typeface="+mj-lt"/>
+              <a:buAutoNum type="arabicPeriod"/>
+            </a:pPr>
+            <a:r>
+              <a:rPr lang="en-US" dirty="0"/>
+              <a:t>Bob receives an extended message (m, h) and calculates H(m). If H(m) = h, Bob concludes that everything is fine.</a:t>
+            </a:r>
+          </a:p>
+          <a:p>
+            <a:pPr marL="0" indent="0">
+              <a:buNone/>
+            </a:pPr>
+            <a:endParaRPr lang="en-US" b="1" u="sng" dirty="0"/>
+          </a:p>
+          <a:p>
+            <a:pPr marL="0" indent="0">
+              <a:buNone/>
+            </a:pPr>
+            <a:r>
+              <a:rPr lang="en-US" b="1" u="sng" dirty="0"/>
+              <a:t>What’s wrong with this approach?</a:t>
+            </a:r>
+          </a:p>
+          <a:p>
+            <a:pPr marL="0" indent="0">
+              <a:buNone/>
+            </a:pPr>
+            <a:endParaRPr lang="en-US" b="1" u="sng" dirty="0"/>
+          </a:p>
+        </p:txBody>
+      </p:sp>
+    </p:spTree>
+    <p:extLst>
+      <p:ext uri="{BB962C8B-B14F-4D97-AF65-F5344CB8AC3E}">
+        <p14:creationId xmlns:p14="http://schemas.microsoft.com/office/powerpoint/2010/main" val="3149912413"/>
+      </p:ext>
+    </p:extLst>
+  </p:cSld>
+  <p:clrMapOvr>
+    <a:masterClrMapping/>
+  </p:clrMapOvr>
+</p:sld>
+</file>
+
+<file path=ppt/slides/slide29.xml><?xml version="1.0" encoding="utf-8"?>
+<p:sld xmlns:a="http://schemas.openxmlformats.org/drawingml/2006/main" xmlns:r="http://schemas.openxmlformats.org/officeDocument/2006/relationships" xmlns:p="http://schemas.openxmlformats.org/presentationml/2006/main">
+  <p:cSld>
+    <p:spTree>
+      <p:nvGrpSpPr>
+        <p:cNvPr id="1" name=""/>
+        <p:cNvGrpSpPr/>
+        <p:nvPr/>
+      </p:nvGrpSpPr>
+      <p:grpSpPr>
+        <a:xfrm>
+          <a:off x="0" y="0"/>
+          <a:ext cx="0" cy="0"/>
+          <a:chOff x="0" y="0"/>
+          <a:chExt cx="0" cy="0"/>
+        </a:xfrm>
+      </p:grpSpPr>
+      <p:sp>
+        <p:nvSpPr>
+          <p:cNvPr id="2" name="Title 1">
+            <a:extLst>
+              <a:ext uri="{FF2B5EF4-FFF2-40B4-BE49-F238E27FC236}">
+                <a16:creationId xmlns:a16="http://schemas.microsoft.com/office/drawing/2014/main" id="{7ECF392B-0C99-B114-98C6-D7B07FF9E634}"/>
+              </a:ext>
+            </a:extLst>
+          </p:cNvPr>
+          <p:cNvSpPr>
+            <a:spLocks noGrp="1"/>
+          </p:cNvSpPr>
+          <p:nvPr>
+            <p:ph type="title"/>
+          </p:nvPr>
+        </p:nvSpPr>
+        <p:spPr/>
+        <p:txBody>
+          <a:bodyPr/>
+          <a:lstStyle/>
+          <a:p>
+            <a:r>
+              <a:rPr lang="en-US" dirty="0"/>
+              <a:t>Alternative approach</a:t>
+            </a:r>
+          </a:p>
+        </p:txBody>
+      </p:sp>
+      <p:sp>
+        <p:nvSpPr>
+          <p:cNvPr id="3" name="Content Placeholder 2">
+            <a:extLst>
+              <a:ext uri="{FF2B5EF4-FFF2-40B4-BE49-F238E27FC236}">
+                <a16:creationId xmlns:a16="http://schemas.microsoft.com/office/drawing/2014/main" id="{F41D7E82-C5E7-77F4-7145-1AD4D08EA29B}"/>
+              </a:ext>
+            </a:extLst>
+          </p:cNvPr>
+          <p:cNvSpPr>
+            <a:spLocks noGrp="1"/>
+          </p:cNvSpPr>
+          <p:nvPr>
+            <p:ph idx="1"/>
+          </p:nvPr>
+        </p:nvSpPr>
+        <p:spPr/>
+        <p:txBody>
+          <a:bodyPr>
+            <a:normAutofit fontScale="77500" lnSpcReduction="20000"/>
+          </a:bodyPr>
+          <a:lstStyle/>
+          <a:p>
+            <a:pPr marL="0" indent="0">
+              <a:buNone/>
+            </a:pPr>
+            <a:r>
+              <a:rPr lang="en-US" dirty="0"/>
+              <a:t>To perform message integrity, in addition to using cryptographic hash functions, Alice and Bob will need a shared secret s. This shared secret, which is nothing more than a string of bits, is called the </a:t>
+            </a:r>
+            <a:r>
+              <a:rPr lang="en-US" b="1" dirty="0"/>
+              <a:t>authentication key</a:t>
+            </a:r>
+            <a:r>
+              <a:rPr lang="en-US" dirty="0"/>
+              <a:t>. Using this shared secret, message integrity can be performed as follows:</a:t>
+            </a:r>
+          </a:p>
+          <a:p>
+            <a:pPr marL="457200" indent="-457200">
+              <a:buFont typeface="+mj-lt"/>
+              <a:buAutoNum type="arabicPeriod"/>
+            </a:pPr>
+            <a:r>
+              <a:rPr lang="en-US" dirty="0"/>
+              <a:t>Alice creates message m, concatenates s with m to create m + s, and calculates the hash        H(m + s) (for example, with SHA-1). H(m + s) is called the message </a:t>
+            </a:r>
+            <a:r>
+              <a:rPr lang="en-US" b="1" dirty="0"/>
+              <a:t>authentication code (MAC)</a:t>
+            </a:r>
+            <a:r>
+              <a:rPr lang="en-US" dirty="0"/>
+              <a:t>.</a:t>
+            </a:r>
+          </a:p>
+          <a:p>
+            <a:pPr marL="457200" indent="-457200">
+              <a:buFont typeface="+mj-lt"/>
+              <a:buAutoNum type="arabicPeriod"/>
+            </a:pPr>
+            <a:r>
+              <a:rPr lang="en-US" dirty="0"/>
+              <a:t>Alice then appends the MAC to the message m, creating an extended message (m, H(m + s)), and sends the extended message to Bob.</a:t>
+            </a:r>
+          </a:p>
+          <a:p>
+            <a:pPr marL="457200" indent="-457200">
+              <a:buFont typeface="+mj-lt"/>
+              <a:buAutoNum type="arabicPeriod"/>
+            </a:pPr>
+            <a:r>
+              <a:rPr lang="en-US" dirty="0"/>
+              <a:t>Bob receives an extended message (m, h) and knowing s, calculates the MAC H(m + s). If H(m + s) = h, Bob concludes that everything is fine.</a:t>
+            </a:r>
+          </a:p>
+        </p:txBody>
+      </p:sp>
+    </p:spTree>
+    <p:extLst>
+      <p:ext uri="{BB962C8B-B14F-4D97-AF65-F5344CB8AC3E}">
+        <p14:creationId xmlns:p14="http://schemas.microsoft.com/office/powerpoint/2010/main" val="2670658928"/>
       </p:ext>
     </p:extLst>
   </p:cSld>
@@ -28238,6 +30157,157 @@
     <p:extLst>
       <p:ext uri="{BB962C8B-B14F-4D97-AF65-F5344CB8AC3E}">
         <p14:creationId xmlns:p14="http://schemas.microsoft.com/office/powerpoint/2010/main" val="3838982165"/>
+      </p:ext>
+    </p:extLst>
+  </p:cSld>
+  <p:clrMapOvr>
+    <a:masterClrMapping/>
+  </p:clrMapOvr>
+</p:sld>
+</file>
+
+<file path=ppt/slides/slide30.xml><?xml version="1.0" encoding="utf-8"?>
+<p:sld xmlns:a="http://schemas.openxmlformats.org/drawingml/2006/main" xmlns:r="http://schemas.openxmlformats.org/officeDocument/2006/relationships" xmlns:p="http://schemas.openxmlformats.org/presentationml/2006/main">
+  <p:cSld>
+    <p:spTree>
+      <p:nvGrpSpPr>
+        <p:cNvPr id="1" name=""/>
+        <p:cNvGrpSpPr/>
+        <p:nvPr/>
+      </p:nvGrpSpPr>
+      <p:grpSpPr>
+        <a:xfrm>
+          <a:off x="0" y="0"/>
+          <a:ext cx="0" cy="0"/>
+          <a:chOff x="0" y="0"/>
+          <a:chExt cx="0" cy="0"/>
+        </a:xfrm>
+      </p:grpSpPr>
+      <p:sp>
+        <p:nvSpPr>
+          <p:cNvPr id="2" name="Title 1">
+            <a:extLst>
+              <a:ext uri="{FF2B5EF4-FFF2-40B4-BE49-F238E27FC236}">
+                <a16:creationId xmlns:a16="http://schemas.microsoft.com/office/drawing/2014/main" id="{8FB68370-E5C6-193B-869F-CF0295040272}"/>
+              </a:ext>
+            </a:extLst>
+          </p:cNvPr>
+          <p:cNvSpPr>
+            <a:spLocks noGrp="1"/>
+          </p:cNvSpPr>
+          <p:nvPr>
+            <p:ph type="title"/>
+          </p:nvPr>
+        </p:nvSpPr>
+        <p:spPr/>
+        <p:txBody>
+          <a:bodyPr/>
+          <a:lstStyle/>
+          <a:p>
+            <a:r>
+              <a:rPr lang="en-US" dirty="0"/>
+              <a:t> </a:t>
+            </a:r>
+          </a:p>
+        </p:txBody>
+      </p:sp>
+      <p:sp>
+        <p:nvSpPr>
+          <p:cNvPr id="3" name="Content Placeholder 2">
+            <a:extLst>
+              <a:ext uri="{FF2B5EF4-FFF2-40B4-BE49-F238E27FC236}">
+                <a16:creationId xmlns:a16="http://schemas.microsoft.com/office/drawing/2014/main" id="{BEA27154-A677-0F67-4CBF-5AA79CB1AF3A}"/>
+              </a:ext>
+            </a:extLst>
+          </p:cNvPr>
+          <p:cNvSpPr>
+            <a:spLocks noGrp="1"/>
+          </p:cNvSpPr>
+          <p:nvPr>
+            <p:ph idx="1"/>
+          </p:nvPr>
+        </p:nvSpPr>
+        <p:spPr/>
+        <p:txBody>
+          <a:bodyPr>
+            <a:normAutofit fontScale="92500" lnSpcReduction="10000"/>
+          </a:bodyPr>
+          <a:lstStyle/>
+          <a:p>
+            <a:pPr marL="0" indent="0">
+              <a:buNone/>
+            </a:pPr>
+            <a:endParaRPr lang="en-US" dirty="0"/>
+          </a:p>
+          <a:p>
+            <a:pPr marL="0" indent="0">
+              <a:buNone/>
+            </a:pPr>
+            <a:endParaRPr lang="en-US" dirty="0"/>
+          </a:p>
+          <a:p>
+            <a:pPr marL="0" indent="0">
+              <a:buNone/>
+            </a:pPr>
+            <a:endParaRPr lang="en-US" dirty="0"/>
+          </a:p>
+          <a:p>
+            <a:pPr marL="0" indent="0">
+              <a:buNone/>
+            </a:pPr>
+            <a:endParaRPr lang="en-US" dirty="0"/>
+          </a:p>
+          <a:p>
+            <a:pPr marL="0" indent="0">
+              <a:buNone/>
+            </a:pPr>
+            <a:r>
+              <a:rPr lang="en-US" dirty="0"/>
+              <a:t>As you might expect, a number of different standards for MACs have been pro posed over the years. The most popular standard today is HMAC, which can be used either with MD5 or SHA-1. HMAC actually runs data and the authentication key through the hash function twice</a:t>
+            </a:r>
+          </a:p>
+        </p:txBody>
+      </p:sp>
+      <p:pic>
+        <p:nvPicPr>
+          <p:cNvPr id="7" name="Picture 6">
+            <a:extLst>
+              <a:ext uri="{FF2B5EF4-FFF2-40B4-BE49-F238E27FC236}">
+                <a16:creationId xmlns:a16="http://schemas.microsoft.com/office/drawing/2014/main" id="{D243CE0F-0248-7408-D218-47CA43FCB78A}"/>
+              </a:ext>
+            </a:extLst>
+          </p:cNvPr>
+          <p:cNvPicPr>
+            <a:picLocks noChangeAspect="1"/>
+          </p:cNvPicPr>
+          <p:nvPr/>
+        </p:nvPicPr>
+        <p:blipFill>
+          <a:blip r:embed="rId3">
+            <a:extLst>
+              <a:ext uri="{28A0092B-C50C-407E-A947-70E740481C1C}">
+                <a14:useLocalDpi xmlns:a14="http://schemas.microsoft.com/office/drawing/2010/main" val="0"/>
+              </a:ext>
+            </a:extLst>
+          </a:blip>
+          <a:stretch>
+            <a:fillRect/>
+          </a:stretch>
+        </p:blipFill>
+        <p:spPr>
+          <a:xfrm>
+            <a:off x="2488403" y="578261"/>
+            <a:ext cx="6561329" cy="3037653"/>
+          </a:xfrm>
+          <a:prstGeom prst="rect">
+            <a:avLst/>
+          </a:prstGeom>
+        </p:spPr>
+      </p:pic>
+    </p:spTree>
+    <p:extLst>
+      <p:ext uri="{BB962C8B-B14F-4D97-AF65-F5344CB8AC3E}">
+        <p14:creationId xmlns:p14="http://schemas.microsoft.com/office/powerpoint/2010/main" val="3226355646"/>
       </p:ext>
     </p:extLst>
   </p:cSld>
@@ -29421,6 +31491,92 @@
 </a:themeOverride>
 </file>
 
+<file path=ppt/theme/themeOverride10.xml><?xml version="1.0" encoding="utf-8"?>
+<a:themeOverride xmlns:a="http://schemas.openxmlformats.org/drawingml/2006/main">
+  <a:clrScheme name="Violet II">
+    <a:dk1>
+      <a:sysClr val="windowText" lastClr="000000"/>
+    </a:dk1>
+    <a:lt1>
+      <a:sysClr val="window" lastClr="FFFFFF"/>
+    </a:lt1>
+    <a:dk2>
+      <a:srgbClr val="632E62"/>
+    </a:dk2>
+    <a:lt2>
+      <a:srgbClr val="EAE5EB"/>
+    </a:lt2>
+    <a:accent1>
+      <a:srgbClr val="92278F"/>
+    </a:accent1>
+    <a:accent2>
+      <a:srgbClr val="9B57D3"/>
+    </a:accent2>
+    <a:accent3>
+      <a:srgbClr val="755DD9"/>
+    </a:accent3>
+    <a:accent4>
+      <a:srgbClr val="665EB8"/>
+    </a:accent4>
+    <a:accent5>
+      <a:srgbClr val="45A5ED"/>
+    </a:accent5>
+    <a:accent6>
+      <a:srgbClr val="5982DB"/>
+    </a:accent6>
+    <a:hlink>
+      <a:srgbClr val="0066FF"/>
+    </a:hlink>
+    <a:folHlink>
+      <a:srgbClr val="666699"/>
+    </a:folHlink>
+  </a:clrScheme>
+</a:themeOverride>
+</file>
+
+<file path=ppt/theme/themeOverride11.xml><?xml version="1.0" encoding="utf-8"?>
+<a:themeOverride xmlns:a="http://schemas.openxmlformats.org/drawingml/2006/main">
+  <a:clrScheme name="Violet II">
+    <a:dk1>
+      <a:sysClr val="windowText" lastClr="000000"/>
+    </a:dk1>
+    <a:lt1>
+      <a:sysClr val="window" lastClr="FFFFFF"/>
+    </a:lt1>
+    <a:dk2>
+      <a:srgbClr val="632E62"/>
+    </a:dk2>
+    <a:lt2>
+      <a:srgbClr val="EAE5EB"/>
+    </a:lt2>
+    <a:accent1>
+      <a:srgbClr val="92278F"/>
+    </a:accent1>
+    <a:accent2>
+      <a:srgbClr val="9B57D3"/>
+    </a:accent2>
+    <a:accent3>
+      <a:srgbClr val="755DD9"/>
+    </a:accent3>
+    <a:accent4>
+      <a:srgbClr val="665EB8"/>
+    </a:accent4>
+    <a:accent5>
+      <a:srgbClr val="45A5ED"/>
+    </a:accent5>
+    <a:accent6>
+      <a:srgbClr val="5982DB"/>
+    </a:accent6>
+    <a:hlink>
+      <a:srgbClr val="0066FF"/>
+    </a:hlink>
+    <a:folHlink>
+      <a:srgbClr val="666699"/>
+    </a:folHlink>
+  </a:clrScheme>
+</a:themeOverride>
+</file>
+
 <file path=ppt/theme/themeOverride2.xml><?xml version="1.0" encoding="utf-8"?>
 <a:themeOverride xmlns:a="http://schemas.openxmlformats.org/drawingml/2006/main">
   <a:clrScheme name="Green Yellow">
@@ -29677,4 +31833,90 @@
     </a:folHlink>
   </a:clrScheme>
 </a:themeOverride>
+</file>
+
+<file path=ppt/theme/themeOverride8.xml><?xml version="1.0" encoding="utf-8"?>
+<a:themeOverride xmlns:a="http://schemas.openxmlformats.org/drawingml/2006/main">
+  <a:clrScheme name="Violet II">
+    <a:dk1>
+      <a:sysClr val="windowText" lastClr="000000"/>
+    </a:dk1>
+    <a:lt1>
+      <a:sysClr val="window" lastClr="FFFFFF"/>
+    </a:lt1>
+    <a:dk2>
+      <a:srgbClr val="632E62"/>
+    </a:dk2>
+    <a:lt2>
+      <a:srgbClr val="EAE5EB"/>
+    </a:lt2>
+    <a:accent1>
+      <a:srgbClr val="92278F"/>
+    </a:accent1>
+    <a:accent2>
+      <a:srgbClr val="9B57D3"/>
+    </a:accent2>
+    <a:accent3>
+      <a:srgbClr val="755DD9"/>
+    </a:accent3>
+    <a:accent4>
+      <a:srgbClr val="665EB8"/>
+    </a:accent4>
+    <a:accent5>
+      <a:srgbClr val="45A5ED"/>
+    </a:accent5>
+    <a:accent6>
+      <a:srgbClr val="5982DB"/>
+    </a:accent6>
+    <a:hlink>
+      <a:srgbClr val="0066FF"/>
+    </a:hlink>
+    <a:folHlink>
+      <a:srgbClr val="666699"/>
+    </a:folHlink>
+  </a:clrScheme>
+</a:themeOverride>
+</file>
+
+<file path=ppt/theme/themeOverride9.xml><?xml version="1.0" encoding="utf-8"?>
+<a:themeOverride xmlns:a="http://schemas.openxmlformats.org/drawingml/2006/main">
+  <a:clrScheme name="Violet II">
+    <a:dk1>
+      <a:sysClr val="windowText" lastClr="000000"/>
+    </a:dk1>
+    <a:lt1>
+      <a:sysClr val="window" lastClr="FFFFFF"/>
+    </a:lt1>
+    <a:dk2>
+      <a:srgbClr val="632E62"/>
+    </a:dk2>
+    <a:lt2>
+      <a:srgbClr val="EAE5EB"/>
+    </a:lt2>
+    <a:accent1>
+      <a:srgbClr val="92278F"/>
+    </a:accent1>
+    <a:accent2>
+      <a:srgbClr val="9B57D3"/>
+    </a:accent2>
+    <a:accent3>
+      <a:srgbClr val="755DD9"/>
+    </a:accent3>
+    <a:accent4>
+      <a:srgbClr val="665EB8"/>
+    </a:accent4>
+    <a:accent5>
+      <a:srgbClr val="45A5ED"/>
+    </a:accent5>
+    <a:accent6>
+      <a:srgbClr val="5982DB"/>
+    </a:accent6>
+    <a:hlink>
+      <a:srgbClr val="0066FF"/>
+    </a:hlink>
+    <a:folHlink>
+      <a:srgbClr val="666699"/>
+    </a:folHlink>
+  </a:clrScheme>
+</a:themeOverride>
 </file>
</xml_diff>

<commit_message>
finished the section related to message integrity
</commit_message>
<xml_diff>
--- a/TLS.pptx
+++ b/TLS.pptx
@@ -5,6 +5,9 @@
     <p:sldMasterId id="2147483732" r:id="rId1"/>
     <p:sldMasterId id="2147483750" r:id="rId2"/>
   </p:sldMasterIdLst>
+  <p:notesMasterIdLst>
+    <p:notesMasterId r:id="rId40"/>
+  </p:notesMasterIdLst>
   <p:sldIdLst>
     <p:sldId id="256" r:id="rId3"/>
     <p:sldId id="257" r:id="rId4"/>
@@ -36,6 +39,13 @@
     <p:sldId id="283" r:id="rId30"/>
     <p:sldId id="284" r:id="rId31"/>
     <p:sldId id="285" r:id="rId32"/>
+    <p:sldId id="286" r:id="rId33"/>
+    <p:sldId id="287" r:id="rId34"/>
+    <p:sldId id="288" r:id="rId35"/>
+    <p:sldId id="289" r:id="rId36"/>
+    <p:sldId id="290" r:id="rId37"/>
+    <p:sldId id="291" r:id="rId38"/>
+    <p:sldId id="292" r:id="rId39"/>
   </p:sldIdLst>
   <p:sldSz cx="12192000" cy="6858000"/>
   <p:notesSz cx="6858000" cy="9144000"/>
@@ -181,6 +191,13 @@
             <p14:sldId id="283"/>
             <p14:sldId id="284"/>
             <p14:sldId id="285"/>
+            <p14:sldId id="286"/>
+            <p14:sldId id="287"/>
+            <p14:sldId id="288"/>
+            <p14:sldId id="289"/>
+            <p14:sldId id="290"/>
+            <p14:sldId id="291"/>
+            <p14:sldId id="292"/>
           </p14:sldIdLst>
         </p14:section>
       </p14:sectionLst>
@@ -190,6 +207,523 @@
     </p:ext>
   </p:extLst>
 </p:presentation>
+</file>
+
+<file path=ppt/notesMasters/notesMaster1.xml><?xml version="1.0" encoding="utf-8"?>
+<p:notesMaster xmlns:a="http://schemas.openxmlformats.org/drawingml/2006/main" xmlns:r="http://schemas.openxmlformats.org/officeDocument/2006/relationships" xmlns:p="http://schemas.openxmlformats.org/presentationml/2006/main">
+  <p:cSld>
+    <p:bg>
+      <p:bgRef idx="1001">
+        <a:schemeClr val="bg1"/>
+      </p:bgRef>
+    </p:bg>
+    <p:spTree>
+      <p:nvGrpSpPr>
+        <p:cNvPr id="1" name=""/>
+        <p:cNvGrpSpPr/>
+        <p:nvPr/>
+      </p:nvGrpSpPr>
+      <p:grpSpPr>
+        <a:xfrm>
+          <a:off x="0" y="0"/>
+          <a:ext cx="0" cy="0"/>
+          <a:chOff x="0" y="0"/>
+          <a:chExt cx="0" cy="0"/>
+        </a:xfrm>
+      </p:grpSpPr>
+      <p:sp>
+        <p:nvSpPr>
+          <p:cNvPr id="2" name="Header Placeholder 1"/>
+          <p:cNvSpPr>
+            <a:spLocks noGrp="1"/>
+          </p:cNvSpPr>
+          <p:nvPr>
+            <p:ph type="hdr" sz="quarter"/>
+          </p:nvPr>
+        </p:nvSpPr>
+        <p:spPr>
+          <a:xfrm>
+            <a:off x="0" y="0"/>
+            <a:ext cx="2971800" cy="458788"/>
+          </a:xfrm>
+          <a:prstGeom prst="rect">
+            <a:avLst/>
+          </a:prstGeom>
+        </p:spPr>
+        <p:txBody>
+          <a:bodyPr vert="horz" lIns="91440" tIns="45720" rIns="91440" bIns="45720" rtlCol="0"/>
+          <a:lstStyle>
+            <a:lvl1pPr algn="l">
+              <a:defRPr sz="1200"/>
+            </a:lvl1pPr>
+          </a:lstStyle>
+          <a:p>
+            <a:endParaRPr lang="en-US"/>
+          </a:p>
+        </p:txBody>
+      </p:sp>
+      <p:sp>
+        <p:nvSpPr>
+          <p:cNvPr id="3" name="Date Placeholder 2"/>
+          <p:cNvSpPr>
+            <a:spLocks noGrp="1"/>
+          </p:cNvSpPr>
+          <p:nvPr>
+            <p:ph type="dt" idx="1"/>
+          </p:nvPr>
+        </p:nvSpPr>
+        <p:spPr>
+          <a:xfrm>
+            <a:off x="3884613" y="0"/>
+            <a:ext cx="2971800" cy="458788"/>
+          </a:xfrm>
+          <a:prstGeom prst="rect">
+            <a:avLst/>
+          </a:prstGeom>
+        </p:spPr>
+        <p:txBody>
+          <a:bodyPr vert="horz" lIns="91440" tIns="45720" rIns="91440" bIns="45720" rtlCol="0"/>
+          <a:lstStyle>
+            <a:lvl1pPr algn="r">
+              <a:defRPr sz="1200"/>
+            </a:lvl1pPr>
+          </a:lstStyle>
+          <a:p>
+            <a:fld id="{DB2C1E28-4850-40A3-8B1C-AB5C3E19CFA4}" type="datetimeFigureOut">
+              <a:rPr lang="en-US" smtClean="0"/>
+              <a:t>2/16/2026</a:t>
+            </a:fld>
+            <a:endParaRPr lang="en-US"/>
+          </a:p>
+        </p:txBody>
+      </p:sp>
+      <p:sp>
+        <p:nvSpPr>
+          <p:cNvPr id="4" name="Slide Image Placeholder 3"/>
+          <p:cNvSpPr>
+            <a:spLocks noGrp="1" noRot="1" noChangeAspect="1"/>
+          </p:cNvSpPr>
+          <p:nvPr>
+            <p:ph type="sldImg" idx="2"/>
+          </p:nvPr>
+        </p:nvSpPr>
+        <p:spPr>
+          <a:xfrm>
+            <a:off x="685800" y="1143000"/>
+            <a:ext cx="5486400" cy="3086100"/>
+          </a:xfrm>
+          <a:prstGeom prst="rect">
+            <a:avLst/>
+          </a:prstGeom>
+          <a:noFill/>
+          <a:ln w="12700">
+            <a:solidFill>
+              <a:prstClr val="black"/>
+            </a:solidFill>
+          </a:ln>
+        </p:spPr>
+        <p:txBody>
+          <a:bodyPr vert="horz" lIns="91440" tIns="45720" rIns="91440" bIns="45720" rtlCol="0" anchor="ctr"/>
+          <a:lstStyle/>
+          <a:p>
+            <a:endParaRPr lang="en-US"/>
+          </a:p>
+        </p:txBody>
+      </p:sp>
+      <p:sp>
+        <p:nvSpPr>
+          <p:cNvPr id="5" name="Notes Placeholder 4"/>
+          <p:cNvSpPr>
+            <a:spLocks noGrp="1"/>
+          </p:cNvSpPr>
+          <p:nvPr>
+            <p:ph type="body" sz="quarter" idx="3"/>
+          </p:nvPr>
+        </p:nvSpPr>
+        <p:spPr>
+          <a:xfrm>
+            <a:off x="685800" y="4400550"/>
+            <a:ext cx="5486400" cy="3600450"/>
+          </a:xfrm>
+          <a:prstGeom prst="rect">
+            <a:avLst/>
+          </a:prstGeom>
+        </p:spPr>
+        <p:txBody>
+          <a:bodyPr vert="horz" lIns="91440" tIns="45720" rIns="91440" bIns="45720" rtlCol="0"/>
+          <a:lstStyle/>
+          <a:p>
+            <a:pPr lvl="0"/>
+            <a:r>
+              <a:rPr lang="en-US"/>
+              <a:t>Click to edit Master text styles</a:t>
+            </a:r>
+          </a:p>
+          <a:p>
+            <a:pPr lvl="1"/>
+            <a:r>
+              <a:rPr lang="en-US"/>
+              <a:t>Second level</a:t>
+            </a:r>
+          </a:p>
+          <a:p>
+            <a:pPr lvl="2"/>
+            <a:r>
+              <a:rPr lang="en-US"/>
+              <a:t>Third level</a:t>
+            </a:r>
+          </a:p>
+          <a:p>
+            <a:pPr lvl="3"/>
+            <a:r>
+              <a:rPr lang="en-US"/>
+              <a:t>Fourth level</a:t>
+            </a:r>
+          </a:p>
+          <a:p>
+            <a:pPr lvl="4"/>
+            <a:r>
+              <a:rPr lang="en-US"/>
+              <a:t>Fifth level</a:t>
+            </a:r>
+          </a:p>
+        </p:txBody>
+      </p:sp>
+      <p:sp>
+        <p:nvSpPr>
+          <p:cNvPr id="6" name="Footer Placeholder 5"/>
+          <p:cNvSpPr>
+            <a:spLocks noGrp="1"/>
+          </p:cNvSpPr>
+          <p:nvPr>
+            <p:ph type="ftr" sz="quarter" idx="4"/>
+          </p:nvPr>
+        </p:nvSpPr>
+        <p:spPr>
+          <a:xfrm>
+            <a:off x="0" y="8685213"/>
+            <a:ext cx="2971800" cy="458787"/>
+          </a:xfrm>
+          <a:prstGeom prst="rect">
+            <a:avLst/>
+          </a:prstGeom>
+        </p:spPr>
+        <p:txBody>
+          <a:bodyPr vert="horz" lIns="91440" tIns="45720" rIns="91440" bIns="45720" rtlCol="0" anchor="b"/>
+          <a:lstStyle>
+            <a:lvl1pPr algn="l">
+              <a:defRPr sz="1200"/>
+            </a:lvl1pPr>
+          </a:lstStyle>
+          <a:p>
+            <a:endParaRPr lang="en-US"/>
+          </a:p>
+        </p:txBody>
+      </p:sp>
+      <p:sp>
+        <p:nvSpPr>
+          <p:cNvPr id="7" name="Slide Number Placeholder 6"/>
+          <p:cNvSpPr>
+            <a:spLocks noGrp="1"/>
+          </p:cNvSpPr>
+          <p:nvPr>
+            <p:ph type="sldNum" sz="quarter" idx="5"/>
+          </p:nvPr>
+        </p:nvSpPr>
+        <p:spPr>
+          <a:xfrm>
+            <a:off x="3884613" y="8685213"/>
+            <a:ext cx="2971800" cy="458787"/>
+          </a:xfrm>
+          <a:prstGeom prst="rect">
+            <a:avLst/>
+          </a:prstGeom>
+        </p:spPr>
+        <p:txBody>
+          <a:bodyPr vert="horz" lIns="91440" tIns="45720" rIns="91440" bIns="45720" rtlCol="0" anchor="b"/>
+          <a:lstStyle>
+            <a:lvl1pPr algn="r">
+              <a:defRPr sz="1200"/>
+            </a:lvl1pPr>
+          </a:lstStyle>
+          <a:p>
+            <a:fld id="{6C9BCCC5-7F16-4E90-AEDC-210626B03759}" type="slidenum">
+              <a:rPr lang="en-US" smtClean="0"/>
+              <a:t>‹#›</a:t>
+            </a:fld>
+            <a:endParaRPr lang="en-US"/>
+          </a:p>
+        </p:txBody>
+      </p:sp>
+    </p:spTree>
+    <p:extLst>
+      <p:ext uri="{BB962C8B-B14F-4D97-AF65-F5344CB8AC3E}">
+        <p14:creationId xmlns:p14="http://schemas.microsoft.com/office/powerpoint/2010/main" val="4217863977"/>
+      </p:ext>
+    </p:extLst>
+  </p:cSld>
+  <p:clrMap bg1="lt1" tx1="dk1" bg2="lt2" tx2="dk2" accent1="accent1" accent2="accent2" accent3="accent3" accent4="accent4" accent5="accent5" accent6="accent6" hlink="hlink" folHlink="folHlink"/>
+  <p:notesStyle>
+    <a:lvl1pPr marL="0" algn="l" defTabSz="914400" rtl="0" eaLnBrk="1" latinLnBrk="0" hangingPunct="1">
+      <a:defRPr sz="1200" kern="1200">
+        <a:solidFill>
+          <a:schemeClr val="tx1"/>
+        </a:solidFill>
+        <a:latin typeface="+mn-lt"/>
+        <a:ea typeface="+mn-ea"/>
+        <a:cs typeface="+mn-cs"/>
+      </a:defRPr>
+    </a:lvl1pPr>
+    <a:lvl2pPr marL="457200" algn="l" defTabSz="914400" rtl="0" eaLnBrk="1" latinLnBrk="0" hangingPunct="1">
+      <a:defRPr sz="1200" kern="1200">
+        <a:solidFill>
+          <a:schemeClr val="tx1"/>
+        </a:solidFill>
+        <a:latin typeface="+mn-lt"/>
+        <a:ea typeface="+mn-ea"/>
+        <a:cs typeface="+mn-cs"/>
+      </a:defRPr>
+    </a:lvl2pPr>
+    <a:lvl3pPr marL="914400" algn="l" defTabSz="914400" rtl="0" eaLnBrk="1" latinLnBrk="0" hangingPunct="1">
+      <a:defRPr sz="1200" kern="1200">
+        <a:solidFill>
+          <a:schemeClr val="tx1"/>
+        </a:solidFill>
+        <a:latin typeface="+mn-lt"/>
+        <a:ea typeface="+mn-ea"/>
+        <a:cs typeface="+mn-cs"/>
+      </a:defRPr>
+    </a:lvl3pPr>
+    <a:lvl4pPr marL="1371600" algn="l" defTabSz="914400" rtl="0" eaLnBrk="1" latinLnBrk="0" hangingPunct="1">
+      <a:defRPr sz="1200" kern="1200">
+        <a:solidFill>
+          <a:schemeClr val="tx1"/>
+        </a:solidFill>
+        <a:latin typeface="+mn-lt"/>
+        <a:ea typeface="+mn-ea"/>
+        <a:cs typeface="+mn-cs"/>
+      </a:defRPr>
+    </a:lvl4pPr>
+    <a:lvl5pPr marL="1828800" algn="l" defTabSz="914400" rtl="0" eaLnBrk="1" latinLnBrk="0" hangingPunct="1">
+      <a:defRPr sz="1200" kern="1200">
+        <a:solidFill>
+          <a:schemeClr val="tx1"/>
+        </a:solidFill>
+        <a:latin typeface="+mn-lt"/>
+        <a:ea typeface="+mn-ea"/>
+        <a:cs typeface="+mn-cs"/>
+      </a:defRPr>
+    </a:lvl5pPr>
+    <a:lvl6pPr marL="2286000" algn="l" defTabSz="914400" rtl="0" eaLnBrk="1" latinLnBrk="0" hangingPunct="1">
+      <a:defRPr sz="1200" kern="1200">
+        <a:solidFill>
+          <a:schemeClr val="tx1"/>
+        </a:solidFill>
+        <a:latin typeface="+mn-lt"/>
+        <a:ea typeface="+mn-ea"/>
+        <a:cs typeface="+mn-cs"/>
+      </a:defRPr>
+    </a:lvl6pPr>
+    <a:lvl7pPr marL="2743200" algn="l" defTabSz="914400" rtl="0" eaLnBrk="1" latinLnBrk="0" hangingPunct="1">
+      <a:defRPr sz="1200" kern="1200">
+        <a:solidFill>
+          <a:schemeClr val="tx1"/>
+        </a:solidFill>
+        <a:latin typeface="+mn-lt"/>
+        <a:ea typeface="+mn-ea"/>
+        <a:cs typeface="+mn-cs"/>
+      </a:defRPr>
+    </a:lvl7pPr>
+    <a:lvl8pPr marL="3200400" algn="l" defTabSz="914400" rtl="0" eaLnBrk="1" latinLnBrk="0" hangingPunct="1">
+      <a:defRPr sz="1200" kern="1200">
+        <a:solidFill>
+          <a:schemeClr val="tx1"/>
+        </a:solidFill>
+        <a:latin typeface="+mn-lt"/>
+        <a:ea typeface="+mn-ea"/>
+        <a:cs typeface="+mn-cs"/>
+      </a:defRPr>
+    </a:lvl8pPr>
+    <a:lvl9pPr marL="3657600" algn="l" defTabSz="914400" rtl="0" eaLnBrk="1" latinLnBrk="0" hangingPunct="1">
+      <a:defRPr sz="1200" kern="1200">
+        <a:solidFill>
+          <a:schemeClr val="tx1"/>
+        </a:solidFill>
+        <a:latin typeface="+mn-lt"/>
+        <a:ea typeface="+mn-ea"/>
+        <a:cs typeface="+mn-cs"/>
+      </a:defRPr>
+    </a:lvl9pPr>
+  </p:notesStyle>
+</p:notesMaster>
+</file>
+
+<file path=ppt/notesSlides/notesSlide1.xml><?xml version="1.0" encoding="utf-8"?>
+<p:notes xmlns:a="http://schemas.openxmlformats.org/drawingml/2006/main" xmlns:r="http://schemas.openxmlformats.org/officeDocument/2006/relationships" xmlns:p="http://schemas.openxmlformats.org/presentationml/2006/main">
+  <p:cSld>
+    <p:spTree>
+      <p:nvGrpSpPr>
+        <p:cNvPr id="1" name=""/>
+        <p:cNvGrpSpPr/>
+        <p:nvPr/>
+      </p:nvGrpSpPr>
+      <p:grpSpPr>
+        <a:xfrm>
+          <a:off x="0" y="0"/>
+          <a:ext cx="0" cy="0"/>
+          <a:chOff x="0" y="0"/>
+          <a:chExt cx="0" cy="0"/>
+        </a:xfrm>
+      </p:grpSpPr>
+      <p:sp>
+        <p:nvSpPr>
+          <p:cNvPr id="2" name="Slide Image Placeholder 1"/>
+          <p:cNvSpPr>
+            <a:spLocks noGrp="1" noRot="1" noChangeAspect="1"/>
+          </p:cNvSpPr>
+          <p:nvPr>
+            <p:ph type="sldImg"/>
+          </p:nvPr>
+        </p:nvSpPr>
+        <p:spPr/>
+      </p:sp>
+      <p:sp>
+        <p:nvSpPr>
+          <p:cNvPr id="3" name="Notes Placeholder 2"/>
+          <p:cNvSpPr>
+            <a:spLocks noGrp="1"/>
+          </p:cNvSpPr>
+          <p:nvPr>
+            <p:ph type="body" idx="1"/>
+          </p:nvPr>
+        </p:nvSpPr>
+        <p:spPr/>
+        <p:txBody>
+          <a:bodyPr/>
+          <a:lstStyle/>
+          <a:p>
+            <a:endParaRPr lang="en-US" dirty="0"/>
+          </a:p>
+        </p:txBody>
+      </p:sp>
+      <p:sp>
+        <p:nvSpPr>
+          <p:cNvPr id="4" name="Slide Number Placeholder 3"/>
+          <p:cNvSpPr>
+            <a:spLocks noGrp="1"/>
+          </p:cNvSpPr>
+          <p:nvPr>
+            <p:ph type="sldNum" sz="quarter" idx="5"/>
+          </p:nvPr>
+        </p:nvSpPr>
+        <p:spPr/>
+        <p:txBody>
+          <a:bodyPr/>
+          <a:lstStyle/>
+          <a:p>
+            <a:fld id="{6C9BCCC5-7F16-4E90-AEDC-210626B03759}" type="slidenum">
+              <a:rPr lang="en-US" smtClean="0"/>
+              <a:t>35</a:t>
+            </a:fld>
+            <a:endParaRPr lang="en-US"/>
+          </a:p>
+        </p:txBody>
+      </p:sp>
+    </p:spTree>
+    <p:extLst>
+      <p:ext uri="{BB962C8B-B14F-4D97-AF65-F5344CB8AC3E}">
+        <p14:creationId xmlns:p14="http://schemas.microsoft.com/office/powerpoint/2010/main" val="161430754"/>
+      </p:ext>
+    </p:extLst>
+  </p:cSld>
+  <p:clrMapOvr>
+    <a:masterClrMapping/>
+  </p:clrMapOvr>
+</p:notes>
+</file>
+
+<file path=ppt/notesSlides/notesSlide2.xml><?xml version="1.0" encoding="utf-8"?>
+<p:notes xmlns:a="http://schemas.openxmlformats.org/drawingml/2006/main" xmlns:r="http://schemas.openxmlformats.org/officeDocument/2006/relationships" xmlns:p="http://schemas.openxmlformats.org/presentationml/2006/main">
+  <p:cSld>
+    <p:spTree>
+      <p:nvGrpSpPr>
+        <p:cNvPr id="1" name=""/>
+        <p:cNvGrpSpPr/>
+        <p:nvPr/>
+      </p:nvGrpSpPr>
+      <p:grpSpPr>
+        <a:xfrm>
+          <a:off x="0" y="0"/>
+          <a:ext cx="0" cy="0"/>
+          <a:chOff x="0" y="0"/>
+          <a:chExt cx="0" cy="0"/>
+        </a:xfrm>
+      </p:grpSpPr>
+      <p:sp>
+        <p:nvSpPr>
+          <p:cNvPr id="2" name="Slide Image Placeholder 1"/>
+          <p:cNvSpPr>
+            <a:spLocks noGrp="1" noRot="1" noChangeAspect="1"/>
+          </p:cNvSpPr>
+          <p:nvPr>
+            <p:ph type="sldImg"/>
+          </p:nvPr>
+        </p:nvSpPr>
+        <p:spPr/>
+      </p:sp>
+      <p:sp>
+        <p:nvSpPr>
+          <p:cNvPr id="3" name="Notes Placeholder 2"/>
+          <p:cNvSpPr>
+            <a:spLocks noGrp="1"/>
+          </p:cNvSpPr>
+          <p:nvPr>
+            <p:ph type="body" idx="1"/>
+          </p:nvPr>
+        </p:nvSpPr>
+        <p:spPr/>
+        <p:txBody>
+          <a:bodyPr/>
+          <a:lstStyle/>
+          <a:p>
+            <a:endParaRPr lang="en-US" dirty="0"/>
+          </a:p>
+        </p:txBody>
+      </p:sp>
+      <p:sp>
+        <p:nvSpPr>
+          <p:cNvPr id="4" name="Slide Number Placeholder 3"/>
+          <p:cNvSpPr>
+            <a:spLocks noGrp="1"/>
+          </p:cNvSpPr>
+          <p:nvPr>
+            <p:ph type="sldNum" sz="quarter" idx="5"/>
+          </p:nvPr>
+        </p:nvSpPr>
+        <p:spPr/>
+        <p:txBody>
+          <a:bodyPr/>
+          <a:lstStyle/>
+          <a:p>
+            <a:fld id="{6C9BCCC5-7F16-4E90-AEDC-210626B03759}" type="slidenum">
+              <a:rPr lang="en-US" smtClean="0"/>
+              <a:t>37</a:t>
+            </a:fld>
+            <a:endParaRPr lang="en-US"/>
+          </a:p>
+        </p:txBody>
+      </p:sp>
+    </p:spTree>
+    <p:extLst>
+      <p:ext uri="{BB962C8B-B14F-4D97-AF65-F5344CB8AC3E}">
+        <p14:creationId xmlns:p14="http://schemas.microsoft.com/office/powerpoint/2010/main" val="1374432453"/>
+      </p:ext>
+    </p:extLst>
+  </p:cSld>
+  <p:clrMapOvr>
+    <a:masterClrMapping/>
+  </p:clrMapOvr>
+</p:notes>
 </file>
 
 <file path=ppt/slideLayouts/slideLayout1.xml><?xml version="1.0" encoding="utf-8"?>
@@ -4474,7 +5008,7 @@
           <a:p>
             <a:fld id="{4559D4BB-A0F9-4B27-80E6-E5E59F9288D1}" type="datetimeFigureOut">
               <a:rPr lang="en-US" smtClean="0"/>
-              <a:t>2/14/2026</a:t>
+              <a:t>2/15/2026</a:t>
             </a:fld>
             <a:endParaRPr lang="en-US"/>
           </a:p>
@@ -4741,7 +5275,7 @@
           <a:p>
             <a:fld id="{4559D4BB-A0F9-4B27-80E6-E5E59F9288D1}" type="datetimeFigureOut">
               <a:rPr lang="en-US" smtClean="0"/>
-              <a:t>2/14/2026</a:t>
+              <a:t>2/15/2026</a:t>
             </a:fld>
             <a:endParaRPr lang="en-US"/>
           </a:p>
@@ -4937,7 +5471,7 @@
           <a:p>
             <a:fld id="{4559D4BB-A0F9-4B27-80E6-E5E59F9288D1}" type="datetimeFigureOut">
               <a:rPr lang="en-US" smtClean="0"/>
-              <a:t>2/14/2026</a:t>
+              <a:t>2/15/2026</a:t>
             </a:fld>
             <a:endParaRPr lang="en-US"/>
           </a:p>
@@ -5200,7 +5734,7 @@
           <a:p>
             <a:fld id="{4559D4BB-A0F9-4B27-80E6-E5E59F9288D1}" type="datetimeFigureOut">
               <a:rPr lang="en-US" smtClean="0"/>
-              <a:t>2/14/2026</a:t>
+              <a:t>2/15/2026</a:t>
             </a:fld>
             <a:endParaRPr lang="en-US"/>
           </a:p>
@@ -5634,7 +6168,7 @@
           <a:p>
             <a:fld id="{4559D4BB-A0F9-4B27-80E6-E5E59F9288D1}" type="datetimeFigureOut">
               <a:rPr lang="en-US" smtClean="0"/>
-              <a:t>2/14/2026</a:t>
+              <a:t>2/15/2026</a:t>
             </a:fld>
             <a:endParaRPr lang="en-US"/>
           </a:p>
@@ -6180,7 +6714,7 @@
           <a:p>
             <a:fld id="{4559D4BB-A0F9-4B27-80E6-E5E59F9288D1}" type="datetimeFigureOut">
               <a:rPr lang="en-US" smtClean="0"/>
-              <a:t>2/14/2026</a:t>
+              <a:t>2/15/2026</a:t>
             </a:fld>
             <a:endParaRPr lang="en-US"/>
           </a:p>
@@ -6900,7 +7434,7 @@
           <a:p>
             <a:fld id="{4559D4BB-A0F9-4B27-80E6-E5E59F9288D1}" type="datetimeFigureOut">
               <a:rPr lang="en-US" smtClean="0"/>
-              <a:t>2/14/2026</a:t>
+              <a:t>2/15/2026</a:t>
             </a:fld>
             <a:endParaRPr lang="en-US"/>
           </a:p>
@@ -7070,7 +7604,7 @@
           <a:p>
             <a:fld id="{4559D4BB-A0F9-4B27-80E6-E5E59F9288D1}" type="datetimeFigureOut">
               <a:rPr lang="en-US" smtClean="0"/>
-              <a:t>2/14/2026</a:t>
+              <a:t>2/15/2026</a:t>
             </a:fld>
             <a:endParaRPr lang="en-US"/>
           </a:p>
@@ -7250,7 +7784,7 @@
           <a:p>
             <a:fld id="{4559D4BB-A0F9-4B27-80E6-E5E59F9288D1}" type="datetimeFigureOut">
               <a:rPr lang="en-US" smtClean="0"/>
-              <a:t>2/14/2026</a:t>
+              <a:t>2/15/2026</a:t>
             </a:fld>
             <a:endParaRPr lang="en-US"/>
           </a:p>
@@ -11587,7 +12121,7 @@
           <a:p>
             <a:fld id="{4559D4BB-A0F9-4B27-80E6-E5E59F9288D1}" type="datetimeFigureOut">
               <a:rPr lang="en-US" smtClean="0"/>
-              <a:t>2/14/2026</a:t>
+              <a:t>2/15/2026</a:t>
             </a:fld>
             <a:endParaRPr lang="en-US"/>
           </a:p>
@@ -11767,7 +12301,7 @@
           <a:p>
             <a:fld id="{4559D4BB-A0F9-4B27-80E6-E5E59F9288D1}" type="datetimeFigureOut">
               <a:rPr lang="en-US" smtClean="0"/>
-              <a:t>2/14/2026</a:t>
+              <a:t>2/15/2026</a:t>
             </a:fld>
             <a:endParaRPr lang="en-US"/>
           </a:p>
@@ -11937,7 +12471,7 @@
           <a:p>
             <a:fld id="{4559D4BB-A0F9-4B27-80E6-E5E59F9288D1}" type="datetimeFigureOut">
               <a:rPr lang="en-US" smtClean="0"/>
-              <a:t>2/14/2026</a:t>
+              <a:t>2/15/2026</a:t>
             </a:fld>
             <a:endParaRPr lang="en-US"/>
           </a:p>
@@ -12187,7 +12721,7 @@
           <a:p>
             <a:fld id="{4559D4BB-A0F9-4B27-80E6-E5E59F9288D1}" type="datetimeFigureOut">
               <a:rPr lang="en-US" smtClean="0"/>
-              <a:t>2/14/2026</a:t>
+              <a:t>2/15/2026</a:t>
             </a:fld>
             <a:endParaRPr lang="en-US"/>
           </a:p>
@@ -12419,7 +12953,7 @@
           <a:p>
             <a:fld id="{4559D4BB-A0F9-4B27-80E6-E5E59F9288D1}" type="datetimeFigureOut">
               <a:rPr lang="en-US" smtClean="0"/>
-              <a:t>2/14/2026</a:t>
+              <a:t>2/15/2026</a:t>
             </a:fld>
             <a:endParaRPr lang="en-US"/>
           </a:p>
@@ -12800,7 +13334,7 @@
           <a:p>
             <a:fld id="{4559D4BB-A0F9-4B27-80E6-E5E59F9288D1}" type="datetimeFigureOut">
               <a:rPr lang="en-US" smtClean="0"/>
-              <a:t>2/14/2026</a:t>
+              <a:t>2/15/2026</a:t>
             </a:fld>
             <a:endParaRPr lang="en-US"/>
           </a:p>
@@ -12918,7 +13452,7 @@
           <a:p>
             <a:fld id="{4559D4BB-A0F9-4B27-80E6-E5E59F9288D1}" type="datetimeFigureOut">
               <a:rPr lang="en-US" smtClean="0"/>
-              <a:t>2/14/2026</a:t>
+              <a:t>2/15/2026</a:t>
             </a:fld>
             <a:endParaRPr lang="en-US"/>
           </a:p>
@@ -13013,7 +13547,7 @@
           <a:p>
             <a:fld id="{4559D4BB-A0F9-4B27-80E6-E5E59F9288D1}" type="datetimeFigureOut">
               <a:rPr lang="en-US" smtClean="0"/>
-              <a:t>2/14/2026</a:t>
+              <a:t>2/15/2026</a:t>
             </a:fld>
             <a:endParaRPr lang="en-US"/>
           </a:p>
@@ -13262,7 +13796,7 @@
           <a:p>
             <a:fld id="{4559D4BB-A0F9-4B27-80E6-E5E59F9288D1}" type="datetimeFigureOut">
               <a:rPr lang="en-US" smtClean="0"/>
-              <a:t>2/14/2026</a:t>
+              <a:t>2/15/2026</a:t>
             </a:fld>
             <a:endParaRPr lang="en-US"/>
           </a:p>
@@ -13542,7 +14076,7 @@
           <a:p>
             <a:fld id="{4559D4BB-A0F9-4B27-80E6-E5E59F9288D1}" type="datetimeFigureOut">
               <a:rPr lang="en-US" smtClean="0"/>
-              <a:t>2/14/2026</a:t>
+              <a:t>2/15/2026</a:t>
             </a:fld>
             <a:endParaRPr lang="en-US"/>
           </a:p>
@@ -13799,7 +14333,7 @@
           <a:p>
             <a:fld id="{4559D4BB-A0F9-4B27-80E6-E5E59F9288D1}" type="datetimeFigureOut">
               <a:rPr lang="en-US" smtClean="0"/>
-              <a:t>2/14/2026</a:t>
+              <a:t>2/15/2026</a:t>
             </a:fld>
             <a:endParaRPr lang="en-US"/>
           </a:p>
@@ -13995,7 +14529,7 @@
           <a:p>
             <a:fld id="{4559D4BB-A0F9-4B27-80E6-E5E59F9288D1}" type="datetimeFigureOut">
               <a:rPr lang="en-US" smtClean="0"/>
-              <a:t>2/14/2026</a:t>
+              <a:t>2/15/2026</a:t>
             </a:fld>
             <a:endParaRPr lang="en-US"/>
           </a:p>
@@ -14258,7 +14792,7 @@
           <a:p>
             <a:fld id="{4559D4BB-A0F9-4B27-80E6-E5E59F9288D1}" type="datetimeFigureOut">
               <a:rPr lang="en-US" smtClean="0"/>
-              <a:t>2/14/2026</a:t>
+              <a:t>2/15/2026</a:t>
             </a:fld>
             <a:endParaRPr lang="en-US"/>
           </a:p>
@@ -14746,7 +15280,7 @@
           <a:p>
             <a:fld id="{4559D4BB-A0F9-4B27-80E6-E5E59F9288D1}" type="datetimeFigureOut">
               <a:rPr lang="en-US" smtClean="0"/>
-              <a:t>2/14/2026</a:t>
+              <a:t>2/15/2026</a:t>
             </a:fld>
             <a:endParaRPr lang="en-US"/>
           </a:p>
@@ -14942,7 +15476,7 @@
           <a:p>
             <a:fld id="{4559D4BB-A0F9-4B27-80E6-E5E59F9288D1}" type="datetimeFigureOut">
               <a:rPr lang="en-US" smtClean="0"/>
-              <a:t>2/14/2026</a:t>
+              <a:t>2/15/2026</a:t>
             </a:fld>
             <a:endParaRPr lang="en-US"/>
           </a:p>
@@ -15488,7 +16022,7 @@
           <a:p>
             <a:fld id="{4559D4BB-A0F9-4B27-80E6-E5E59F9288D1}" type="datetimeFigureOut">
               <a:rPr lang="en-US" smtClean="0"/>
-              <a:t>2/14/2026</a:t>
+              <a:t>2/15/2026</a:t>
             </a:fld>
             <a:endParaRPr lang="en-US"/>
           </a:p>
@@ -16208,7 +16742,7 @@
           <a:p>
             <a:fld id="{4559D4BB-A0F9-4B27-80E6-E5E59F9288D1}" type="datetimeFigureOut">
               <a:rPr lang="en-US" smtClean="0"/>
-              <a:t>2/14/2026</a:t>
+              <a:t>2/15/2026</a:t>
             </a:fld>
             <a:endParaRPr lang="en-US"/>
           </a:p>
@@ -16378,7 +16912,7 @@
           <a:p>
             <a:fld id="{4559D4BB-A0F9-4B27-80E6-E5E59F9288D1}" type="datetimeFigureOut">
               <a:rPr lang="en-US" smtClean="0"/>
-              <a:t>2/14/2026</a:t>
+              <a:t>2/15/2026</a:t>
             </a:fld>
             <a:endParaRPr lang="en-US"/>
           </a:p>
@@ -16558,7 +17092,7 @@
           <a:p>
             <a:fld id="{4559D4BB-A0F9-4B27-80E6-E5E59F9288D1}" type="datetimeFigureOut">
               <a:rPr lang="en-US" smtClean="0"/>
-              <a:t>2/14/2026</a:t>
+              <a:t>2/15/2026</a:t>
             </a:fld>
             <a:endParaRPr lang="en-US"/>
           </a:p>
@@ -16790,7 +17324,7 @@
           <a:p>
             <a:fld id="{4559D4BB-A0F9-4B27-80E6-E5E59F9288D1}" type="datetimeFigureOut">
               <a:rPr lang="en-US" smtClean="0"/>
-              <a:t>2/14/2026</a:t>
+              <a:t>2/15/2026</a:t>
             </a:fld>
             <a:endParaRPr lang="en-US"/>
           </a:p>
@@ -17171,7 +17705,7 @@
           <a:p>
             <a:fld id="{4559D4BB-A0F9-4B27-80E6-E5E59F9288D1}" type="datetimeFigureOut">
               <a:rPr lang="en-US" smtClean="0"/>
-              <a:t>2/14/2026</a:t>
+              <a:t>2/15/2026</a:t>
             </a:fld>
             <a:endParaRPr lang="en-US"/>
           </a:p>
@@ -17289,7 +17823,7 @@
           <a:p>
             <a:fld id="{4559D4BB-A0F9-4B27-80E6-E5E59F9288D1}" type="datetimeFigureOut">
               <a:rPr lang="en-US" smtClean="0"/>
-              <a:t>2/14/2026</a:t>
+              <a:t>2/15/2026</a:t>
             </a:fld>
             <a:endParaRPr lang="en-US"/>
           </a:p>
@@ -17384,7 +17918,7 @@
           <a:p>
             <a:fld id="{4559D4BB-A0F9-4B27-80E6-E5E59F9288D1}" type="datetimeFigureOut">
               <a:rPr lang="en-US" smtClean="0"/>
-              <a:t>2/14/2026</a:t>
+              <a:t>2/15/2026</a:t>
             </a:fld>
             <a:endParaRPr lang="en-US"/>
           </a:p>
@@ -17633,7 +18167,7 @@
           <a:p>
             <a:fld id="{4559D4BB-A0F9-4B27-80E6-E5E59F9288D1}" type="datetimeFigureOut">
               <a:rPr lang="en-US" smtClean="0"/>
-              <a:t>2/14/2026</a:t>
+              <a:t>2/15/2026</a:t>
             </a:fld>
             <a:endParaRPr lang="en-US"/>
           </a:p>
@@ -17913,7 +18447,7 @@
           <a:p>
             <a:fld id="{4559D4BB-A0F9-4B27-80E6-E5E59F9288D1}" type="datetimeFigureOut">
               <a:rPr lang="en-US" smtClean="0"/>
-              <a:t>2/14/2026</a:t>
+              <a:t>2/15/2026</a:t>
             </a:fld>
             <a:endParaRPr lang="en-US"/>
           </a:p>
@@ -20980,7 +21514,7 @@
           <a:p>
             <a:fld id="{4559D4BB-A0F9-4B27-80E6-E5E59F9288D1}" type="datetimeFigureOut">
               <a:rPr lang="en-US" smtClean="0"/>
-              <a:t>2/14/2026</a:t>
+              <a:t>2/15/2026</a:t>
             </a:fld>
             <a:endParaRPr lang="en-US"/>
           </a:p>
@@ -24399,7 +24933,7 @@
           <a:p>
             <a:fld id="{4559D4BB-A0F9-4B27-80E6-E5E59F9288D1}" type="datetimeFigureOut">
               <a:rPr lang="en-US" smtClean="0"/>
-              <a:t>2/14/2026</a:t>
+              <a:t>2/15/2026</a:t>
             </a:fld>
             <a:endParaRPr lang="en-US"/>
           </a:p>
@@ -27740,8 +28274,8 @@
           </a:p>
         </p:txBody>
       </p:sp>
-      <mc:AlternateContent xmlns:mc="http://schemas.openxmlformats.org/markup-compatibility/2006">
-        <mc:Choice xmlns:a14="http://schemas.microsoft.com/office/drawing/2010/main" Requires="a14">
+      <mc:AlternateContent xmlns:mc="http://schemas.openxmlformats.org/markup-compatibility/2006" xmlns:a14="http://schemas.microsoft.com/office/drawing/2010/main">
+        <mc:Choice Requires="a14">
           <p:sp>
             <p:nvSpPr>
               <p:cNvPr id="3" name="Content Placeholder 2">
@@ -27998,7 +28532,7 @@
             </p:txBody>
           </p:sp>
         </mc:Choice>
-        <mc:Fallback>
+        <mc:Fallback xmlns="">
           <p:sp>
             <p:nvSpPr>
               <p:cNvPr id="3" name="Content Placeholder 2">
@@ -28137,8 +28671,8 @@
           </a:prstGeom>
         </p:spPr>
       </p:pic>
-      <mc:AlternateContent xmlns:mc="http://schemas.openxmlformats.org/markup-compatibility/2006">
-        <mc:Choice xmlns:a14="http://schemas.microsoft.com/office/drawing/2010/main" Requires="a14">
+      <mc:AlternateContent xmlns:mc="http://schemas.openxmlformats.org/markup-compatibility/2006" xmlns:a14="http://schemas.microsoft.com/office/drawing/2010/main">
+        <mc:Choice Requires="a14">
           <p:sp>
             <p:nvSpPr>
               <p:cNvPr id="6" name="TextBox 5">
@@ -28576,7 +29110,7 @@
             </p:txBody>
           </p:sp>
         </mc:Choice>
-        <mc:Fallback>
+        <mc:Fallback xmlns="">
           <p:sp>
             <p:nvSpPr>
               <p:cNvPr id="6" name="TextBox 5">
@@ -28684,8 +29218,8 @@
           </a:p>
         </p:txBody>
       </p:sp>
-      <mc:AlternateContent xmlns:mc="http://schemas.openxmlformats.org/markup-compatibility/2006">
-        <mc:Choice xmlns:a14="http://schemas.microsoft.com/office/drawing/2010/main" Requires="a14">
+      <mc:AlternateContent xmlns:mc="http://schemas.openxmlformats.org/markup-compatibility/2006" xmlns:a14="http://schemas.microsoft.com/office/drawing/2010/main">
+        <mc:Choice Requires="a14">
           <p:sp>
             <p:nvSpPr>
               <p:cNvPr id="3" name="Content Placeholder 2">
@@ -29040,7 +29574,9 @@
                     <m:sSup>
                       <m:sSupPr>
                         <m:ctrlPr>
-                          <a:rPr lang="en-US" i="1"/>
+                          <a:rPr lang="en-US" i="1">
+                            <a:latin typeface="Cambria Math" panose="02040503050406030204" pitchFamily="18" charset="0"/>
+                          </a:rPr>
                         </m:ctrlPr>
                       </m:sSupPr>
                       <m:e>
@@ -29192,7 +29728,7 @@
             </p:txBody>
           </p:sp>
         </mc:Choice>
-        <mc:Fallback>
+        <mc:Fallback xmlns="">
           <p:sp>
             <p:nvSpPr>
               <p:cNvPr id="3" name="Content Placeholder 2">
@@ -29299,8 +29835,8 @@
           </a:p>
         </p:txBody>
       </p:sp>
-      <mc:AlternateContent xmlns:mc="http://schemas.openxmlformats.org/markup-compatibility/2006">
-        <mc:Choice xmlns:a14="http://schemas.microsoft.com/office/drawing/2010/main" Requires="a14">
+      <mc:AlternateContent xmlns:mc="http://schemas.openxmlformats.org/markup-compatibility/2006" xmlns:a14="http://schemas.microsoft.com/office/drawing/2010/main">
+        <mc:Choice Requires="a14">
           <p:sp>
             <p:nvSpPr>
               <p:cNvPr id="3" name="Content Placeholder 2">
@@ -29439,7 +29975,7 @@
             </p:txBody>
           </p:sp>
         </mc:Choice>
-        <mc:Fallback>
+        <mc:Fallback xmlns="">
           <p:sp>
             <p:nvSpPr>
               <p:cNvPr id="3" name="Content Placeholder 2">
@@ -30308,6 +30844,1705 @@
     <p:extLst>
       <p:ext uri="{BB962C8B-B14F-4D97-AF65-F5344CB8AC3E}">
         <p14:creationId xmlns:p14="http://schemas.microsoft.com/office/powerpoint/2010/main" val="3226355646"/>
+      </p:ext>
+    </p:extLst>
+  </p:cSld>
+  <p:clrMapOvr>
+    <a:masterClrMapping/>
+  </p:clrMapOvr>
+</p:sld>
+</file>
+
+<file path=ppt/slides/slide31.xml><?xml version="1.0" encoding="utf-8"?>
+<p:sld xmlns:a="http://schemas.openxmlformats.org/drawingml/2006/main" xmlns:r="http://schemas.openxmlformats.org/officeDocument/2006/relationships" xmlns:p="http://schemas.openxmlformats.org/presentationml/2006/main">
+  <p:cSld>
+    <p:spTree>
+      <p:nvGrpSpPr>
+        <p:cNvPr id="1" name=""/>
+        <p:cNvGrpSpPr/>
+        <p:nvPr/>
+      </p:nvGrpSpPr>
+      <p:grpSpPr>
+        <a:xfrm>
+          <a:off x="0" y="0"/>
+          <a:ext cx="0" cy="0"/>
+          <a:chOff x="0" y="0"/>
+          <a:chExt cx="0" cy="0"/>
+        </a:xfrm>
+      </p:grpSpPr>
+      <p:sp>
+        <p:nvSpPr>
+          <p:cNvPr id="2" name="Title 1">
+            <a:extLst>
+              <a:ext uri="{FF2B5EF4-FFF2-40B4-BE49-F238E27FC236}">
+                <a16:creationId xmlns:a16="http://schemas.microsoft.com/office/drawing/2014/main" id="{C9F5ABBD-14BE-0665-5E25-7D833944D0C2}"/>
+              </a:ext>
+            </a:extLst>
+          </p:cNvPr>
+          <p:cNvSpPr>
+            <a:spLocks noGrp="1"/>
+          </p:cNvSpPr>
+          <p:nvPr>
+            <p:ph type="title"/>
+          </p:nvPr>
+        </p:nvSpPr>
+        <p:spPr/>
+        <p:txBody>
+          <a:bodyPr/>
+          <a:lstStyle/>
+          <a:p>
+            <a:r>
+              <a:rPr lang="en-US" dirty="0"/>
+              <a:t>Digital signatures</a:t>
+            </a:r>
+          </a:p>
+        </p:txBody>
+      </p:sp>
+      <p:sp>
+        <p:nvSpPr>
+          <p:cNvPr id="3" name="Content Placeholder 2">
+            <a:extLst>
+              <a:ext uri="{FF2B5EF4-FFF2-40B4-BE49-F238E27FC236}">
+                <a16:creationId xmlns:a16="http://schemas.microsoft.com/office/drawing/2014/main" id="{6D99BAE3-2255-097C-732A-14108B6892EB}"/>
+              </a:ext>
+            </a:extLst>
+          </p:cNvPr>
+          <p:cNvSpPr>
+            <a:spLocks noGrp="1"/>
+          </p:cNvSpPr>
+          <p:nvPr>
+            <p:ph idx="1"/>
+          </p:nvPr>
+        </p:nvSpPr>
+        <p:spPr/>
+        <p:txBody>
+          <a:bodyPr/>
+          <a:lstStyle/>
+          <a:p>
+            <a:r>
+              <a:rPr lang="en-US" dirty="0"/>
+              <a:t>In a digital world, one often wants to indicate the owner or creator of a document, or to signify one’s agreement with a document’s content. A digital signature is a cryptographic technique for achieving these goals in a digital world.</a:t>
+            </a:r>
+          </a:p>
+          <a:p>
+            <a:pPr marL="0" indent="0">
+              <a:buNone/>
+            </a:pPr>
+            <a:endParaRPr lang="en-US" b="1" u="sng" dirty="0"/>
+          </a:p>
+          <a:p>
+            <a:pPr marL="0" indent="0">
+              <a:buNone/>
+            </a:pPr>
+            <a:r>
+              <a:rPr lang="en-US" b="1" u="sng" dirty="0"/>
+              <a:t>How do we design a digital signature scheme? Is MAC a good choice?</a:t>
+            </a:r>
+          </a:p>
+          <a:p>
+            <a:pPr marL="0" indent="0">
+              <a:buNone/>
+            </a:pPr>
+            <a:r>
+              <a:rPr lang="en-US" b="1" u="sng" dirty="0"/>
+              <a:t>What about public key encryption?</a:t>
+            </a:r>
+          </a:p>
+        </p:txBody>
+      </p:sp>
+    </p:spTree>
+    <p:extLst>
+      <p:ext uri="{BB962C8B-B14F-4D97-AF65-F5344CB8AC3E}">
+        <p14:creationId xmlns:p14="http://schemas.microsoft.com/office/powerpoint/2010/main" val="61768855"/>
+      </p:ext>
+    </p:extLst>
+  </p:cSld>
+  <p:clrMapOvr>
+    <a:masterClrMapping/>
+  </p:clrMapOvr>
+</p:sld>
+</file>
+
+<file path=ppt/slides/slide32.xml><?xml version="1.0" encoding="utf-8"?>
+<p:sld xmlns:a="http://schemas.openxmlformats.org/drawingml/2006/main" xmlns:r="http://schemas.openxmlformats.org/officeDocument/2006/relationships" xmlns:p="http://schemas.openxmlformats.org/presentationml/2006/main">
+  <p:cSld>
+    <p:spTree>
+      <p:nvGrpSpPr>
+        <p:cNvPr id="1" name=""/>
+        <p:cNvGrpSpPr/>
+        <p:nvPr/>
+      </p:nvGrpSpPr>
+      <p:grpSpPr>
+        <a:xfrm>
+          <a:off x="0" y="0"/>
+          <a:ext cx="0" cy="0"/>
+          <a:chOff x="0" y="0"/>
+          <a:chExt cx="0" cy="0"/>
+        </a:xfrm>
+      </p:grpSpPr>
+      <p:sp>
+        <p:nvSpPr>
+          <p:cNvPr id="2" name="Title 1">
+            <a:extLst>
+              <a:ext uri="{FF2B5EF4-FFF2-40B4-BE49-F238E27FC236}">
+                <a16:creationId xmlns:a16="http://schemas.microsoft.com/office/drawing/2014/main" id="{6DAAD2EF-1D48-59F8-18FD-C7FF3C873F6E}"/>
+              </a:ext>
+            </a:extLst>
+          </p:cNvPr>
+          <p:cNvSpPr>
+            <a:spLocks noGrp="1"/>
+          </p:cNvSpPr>
+          <p:nvPr>
+            <p:ph type="title"/>
+          </p:nvPr>
+        </p:nvSpPr>
+        <p:spPr/>
+        <p:txBody>
+          <a:bodyPr/>
+          <a:lstStyle/>
+          <a:p>
+            <a:r>
+              <a:rPr lang="en-US" dirty="0"/>
+              <a:t> </a:t>
+            </a:r>
+          </a:p>
+        </p:txBody>
+      </p:sp>
+      <mc:AlternateContent xmlns:mc="http://schemas.openxmlformats.org/markup-compatibility/2006">
+        <mc:Choice xmlns:a14="http://schemas.microsoft.com/office/drawing/2010/main" Requires="a14">
+          <p:sp>
+            <p:nvSpPr>
+              <p:cNvPr id="3" name="Content Placeholder 2">
+                <a:extLst>
+                  <a:ext uri="{FF2B5EF4-FFF2-40B4-BE49-F238E27FC236}">
+                    <a16:creationId xmlns:a16="http://schemas.microsoft.com/office/drawing/2014/main" id="{3C582CEC-5A6D-BEE7-BC40-283E641F6CAF}"/>
+                  </a:ext>
+                </a:extLst>
+              </p:cNvPr>
+              <p:cNvSpPr>
+                <a:spLocks noGrp="1"/>
+              </p:cNvSpPr>
+              <p:nvPr>
+                <p:ph idx="1"/>
+              </p:nvPr>
+            </p:nvSpPr>
+            <p:spPr>
+              <a:xfrm>
+                <a:off x="1170879" y="3429000"/>
+                <a:ext cx="8568196" cy="2661878"/>
+              </a:xfrm>
+            </p:spPr>
+            <p:txBody>
+              <a:bodyPr>
+                <a:normAutofit fontScale="85000" lnSpcReduction="20000"/>
+              </a:bodyPr>
+              <a:lstStyle/>
+              <a:p>
+                <a:pPr marL="0" indent="0">
+                  <a:buNone/>
+                </a:pPr>
+                <a:r>
+                  <a:rPr lang="en-US" dirty="0"/>
+                  <a:t> Does the digital signature </a:t>
+                </a:r>
+                <a14:m>
+                  <m:oMath xmlns:m="http://schemas.openxmlformats.org/officeDocument/2006/math">
+                    <m:sSubSup>
+                      <m:sSubSupPr>
+                        <m:ctrlPr>
+                          <a:rPr lang="en-US" i="1">
+                            <a:latin typeface="Cambria Math" panose="02040503050406030204" pitchFamily="18" charset="0"/>
+                          </a:rPr>
+                        </m:ctrlPr>
+                      </m:sSubSupPr>
+                      <m:e>
+                        <m:r>
+                          <a:rPr lang="en-US" i="1">
+                            <a:latin typeface="Cambria Math" panose="02040503050406030204" pitchFamily="18" charset="0"/>
+                          </a:rPr>
+                          <m:t>𝐾</m:t>
+                        </m:r>
+                      </m:e>
+                      <m:sub>
+                        <m:r>
+                          <a:rPr lang="en-US" i="1">
+                            <a:latin typeface="Cambria Math" panose="02040503050406030204" pitchFamily="18" charset="0"/>
+                          </a:rPr>
+                          <m:t>𝐵</m:t>
+                        </m:r>
+                      </m:sub>
+                      <m:sup>
+                        <m:r>
+                          <a:rPr lang="en-US" i="1">
+                            <a:latin typeface="Cambria Math" panose="02040503050406030204" pitchFamily="18" charset="0"/>
+                          </a:rPr>
+                          <m:t>−</m:t>
+                        </m:r>
+                      </m:sup>
+                    </m:sSubSup>
+                  </m:oMath>
+                </a14:m>
+                <a:r>
+                  <a:rPr lang="en-US" dirty="0"/>
+                  <a:t>(m) meet our requirements of being verifiable and </a:t>
+                </a:r>
+                <a:r>
+                  <a:rPr lang="en-US" dirty="0" err="1"/>
+                  <a:t>nonforgeable</a:t>
+                </a:r>
+                <a:r>
+                  <a:rPr lang="en-US" dirty="0"/>
+                  <a:t>? Suppose Alice has m and </a:t>
+                </a:r>
+                <a14:m>
+                  <m:oMath xmlns:m="http://schemas.openxmlformats.org/officeDocument/2006/math">
+                    <m:sSubSup>
+                      <m:sSubSupPr>
+                        <m:ctrlPr>
+                          <a:rPr lang="en-US" i="1">
+                            <a:latin typeface="Cambria Math" panose="02040503050406030204" pitchFamily="18" charset="0"/>
+                          </a:rPr>
+                        </m:ctrlPr>
+                      </m:sSubSupPr>
+                      <m:e>
+                        <m:r>
+                          <a:rPr lang="en-US" i="1">
+                            <a:latin typeface="Cambria Math" panose="02040503050406030204" pitchFamily="18" charset="0"/>
+                          </a:rPr>
+                          <m:t>𝐾</m:t>
+                        </m:r>
+                      </m:e>
+                      <m:sub>
+                        <m:r>
+                          <a:rPr lang="en-US" i="1">
+                            <a:latin typeface="Cambria Math" panose="02040503050406030204" pitchFamily="18" charset="0"/>
+                          </a:rPr>
+                          <m:t>𝐵</m:t>
+                        </m:r>
+                      </m:sub>
+                      <m:sup>
+                        <m:r>
+                          <a:rPr lang="en-US" i="1">
+                            <a:latin typeface="Cambria Math" panose="02040503050406030204" pitchFamily="18" charset="0"/>
+                          </a:rPr>
+                          <m:t>−</m:t>
+                        </m:r>
+                      </m:sup>
+                    </m:sSubSup>
+                  </m:oMath>
+                </a14:m>
+                <a:r>
+                  <a:rPr lang="en-US" dirty="0"/>
+                  <a:t>(m). She wants to prove in court (being litigious) that Bob had indeed signed the document and was the only person who could have possibly signed the document. Alice takes Bob’s public key, </a:t>
+                </a:r>
+                <a14:m>
+                  <m:oMath xmlns:m="http://schemas.openxmlformats.org/officeDocument/2006/math">
+                    <m:sSubSup>
+                      <m:sSubSupPr>
+                        <m:ctrlPr>
+                          <a:rPr lang="en-US" i="1">
+                            <a:latin typeface="Cambria Math" panose="02040503050406030204" pitchFamily="18" charset="0"/>
+                          </a:rPr>
+                        </m:ctrlPr>
+                      </m:sSubSupPr>
+                      <m:e>
+                        <m:r>
+                          <a:rPr lang="en-US" i="1">
+                            <a:latin typeface="Cambria Math" panose="02040503050406030204" pitchFamily="18" charset="0"/>
+                          </a:rPr>
+                          <m:t>𝐾</m:t>
+                        </m:r>
+                      </m:e>
+                      <m:sub>
+                        <m:r>
+                          <a:rPr lang="en-US" i="1">
+                            <a:latin typeface="Cambria Math" panose="02040503050406030204" pitchFamily="18" charset="0"/>
+                          </a:rPr>
+                          <m:t>𝐵</m:t>
+                        </m:r>
+                      </m:sub>
+                      <m:sup>
+                        <m:r>
+                          <a:rPr lang="en-US" b="0" i="1" smtClean="0">
+                            <a:latin typeface="Cambria Math" panose="02040503050406030204" pitchFamily="18" charset="0"/>
+                          </a:rPr>
+                          <m:t>+</m:t>
+                        </m:r>
+                      </m:sup>
+                    </m:sSubSup>
+                  </m:oMath>
+                </a14:m>
+                <a:r>
+                  <a:rPr lang="en-US" dirty="0"/>
+                  <a:t>, and applies it to the digital signature, </a:t>
+                </a:r>
+                <a14:m>
+                  <m:oMath xmlns:m="http://schemas.openxmlformats.org/officeDocument/2006/math">
+                    <m:sSubSup>
+                      <m:sSubSupPr>
+                        <m:ctrlPr>
+                          <a:rPr lang="en-US" i="1">
+                            <a:latin typeface="Cambria Math" panose="02040503050406030204" pitchFamily="18" charset="0"/>
+                          </a:rPr>
+                        </m:ctrlPr>
+                      </m:sSubSupPr>
+                      <m:e>
+                        <m:r>
+                          <a:rPr lang="en-US" i="1">
+                            <a:latin typeface="Cambria Math" panose="02040503050406030204" pitchFamily="18" charset="0"/>
+                          </a:rPr>
+                          <m:t>𝐾</m:t>
+                        </m:r>
+                      </m:e>
+                      <m:sub>
+                        <m:r>
+                          <a:rPr lang="en-US" i="1">
+                            <a:latin typeface="Cambria Math" panose="02040503050406030204" pitchFamily="18" charset="0"/>
+                          </a:rPr>
+                          <m:t>𝐵</m:t>
+                        </m:r>
+                      </m:sub>
+                      <m:sup>
+                        <m:r>
+                          <a:rPr lang="en-US" i="1">
+                            <a:latin typeface="Cambria Math" panose="02040503050406030204" pitchFamily="18" charset="0"/>
+                          </a:rPr>
+                          <m:t>−</m:t>
+                        </m:r>
+                      </m:sup>
+                    </m:sSubSup>
+                  </m:oMath>
+                </a14:m>
+                <a:r>
+                  <a:rPr lang="en-US" dirty="0"/>
+                  <a:t>(m) , associated with the document, m. That is, she computes </a:t>
+                </a:r>
+                <a14:m>
+                  <m:oMath xmlns:m="http://schemas.openxmlformats.org/officeDocument/2006/math">
+                    <m:sSubSup>
+                      <m:sSubSupPr>
+                        <m:ctrlPr>
+                          <a:rPr lang="en-US" i="1">
+                            <a:latin typeface="Cambria Math" panose="02040503050406030204" pitchFamily="18" charset="0"/>
+                          </a:rPr>
+                        </m:ctrlPr>
+                      </m:sSubSupPr>
+                      <m:e>
+                        <m:r>
+                          <a:rPr lang="en-US" i="1">
+                            <a:latin typeface="Cambria Math" panose="02040503050406030204" pitchFamily="18" charset="0"/>
+                          </a:rPr>
+                          <m:t>𝐾</m:t>
+                        </m:r>
+                      </m:e>
+                      <m:sub>
+                        <m:r>
+                          <a:rPr lang="en-US" i="1">
+                            <a:latin typeface="Cambria Math" panose="02040503050406030204" pitchFamily="18" charset="0"/>
+                          </a:rPr>
+                          <m:t>𝐵</m:t>
+                        </m:r>
+                      </m:sub>
+                      <m:sup>
+                        <m:r>
+                          <a:rPr lang="en-US" b="0" i="1" smtClean="0">
+                            <a:latin typeface="Cambria Math" panose="02040503050406030204" pitchFamily="18" charset="0"/>
+                          </a:rPr>
+                          <m:t>+</m:t>
+                        </m:r>
+                      </m:sup>
+                    </m:sSubSup>
+                  </m:oMath>
+                </a14:m>
+                <a:r>
+                  <a:rPr lang="en-US" dirty="0"/>
+                  <a:t>(</a:t>
+                </a:r>
+                <a14:m>
+                  <m:oMath xmlns:m="http://schemas.openxmlformats.org/officeDocument/2006/math">
+                    <m:sSubSup>
+                      <m:sSubSupPr>
+                        <m:ctrlPr>
+                          <a:rPr lang="en-US" i="1">
+                            <a:latin typeface="Cambria Math" panose="02040503050406030204" pitchFamily="18" charset="0"/>
+                          </a:rPr>
+                        </m:ctrlPr>
+                      </m:sSubSupPr>
+                      <m:e>
+                        <m:r>
+                          <a:rPr lang="en-US" i="1">
+                            <a:latin typeface="Cambria Math" panose="02040503050406030204" pitchFamily="18" charset="0"/>
+                          </a:rPr>
+                          <m:t>𝐾</m:t>
+                        </m:r>
+                      </m:e>
+                      <m:sub>
+                        <m:r>
+                          <a:rPr lang="en-US" i="1">
+                            <a:latin typeface="Cambria Math" panose="02040503050406030204" pitchFamily="18" charset="0"/>
+                          </a:rPr>
+                          <m:t>𝐵</m:t>
+                        </m:r>
+                      </m:sub>
+                      <m:sup>
+                        <m:r>
+                          <a:rPr lang="en-US" i="1">
+                            <a:latin typeface="Cambria Math" panose="02040503050406030204" pitchFamily="18" charset="0"/>
+                          </a:rPr>
+                          <m:t>−</m:t>
+                        </m:r>
+                      </m:sup>
+                    </m:sSubSup>
+                  </m:oMath>
+                </a14:m>
+                <a:r>
+                  <a:rPr lang="en-US" dirty="0"/>
+                  <a:t>(m)), and voilà, with a dramatic flurry, she produces m, which exactly matches the original document! Alice then argues that only Bob could have signed the document, for the following reasons:</a:t>
+                </a:r>
+              </a:p>
+            </p:txBody>
+          </p:sp>
+        </mc:Choice>
+        <mc:Fallback>
+          <p:sp>
+            <p:nvSpPr>
+              <p:cNvPr id="3" name="Content Placeholder 2">
+                <a:extLst>
+                  <a:ext uri="{FF2B5EF4-FFF2-40B4-BE49-F238E27FC236}">
+                    <a16:creationId xmlns:a16="http://schemas.microsoft.com/office/drawing/2014/main" id="{3C582CEC-5A6D-BEE7-BC40-283E641F6CAF}"/>
+                  </a:ext>
+                </a:extLst>
+              </p:cNvPr>
+              <p:cNvSpPr>
+                <a:spLocks noGrp="1" noRot="1" noChangeAspect="1" noMove="1" noResize="1" noEditPoints="1" noAdjustHandles="1" noChangeArrowheads="1" noChangeShapeType="1" noTextEdit="1"/>
+              </p:cNvSpPr>
+              <p:nvPr>
+                <p:ph idx="1"/>
+              </p:nvPr>
+            </p:nvSpPr>
+            <p:spPr>
+              <a:xfrm>
+                <a:off x="1170879" y="3429000"/>
+                <a:ext cx="8568196" cy="2661878"/>
+              </a:xfrm>
+              <a:blipFill>
+                <a:blip r:embed="rId3"/>
+                <a:stretch>
+                  <a:fillRect l="-711" t="-1376" r="-711"/>
+                </a:stretch>
+              </a:blipFill>
+            </p:spPr>
+            <p:txBody>
+              <a:bodyPr/>
+              <a:lstStyle/>
+              <a:p>
+                <a:r>
+                  <a:rPr lang="en-US">
+                    <a:noFill/>
+                  </a:rPr>
+                  <a:t> </a:t>
+                </a:r>
+              </a:p>
+            </p:txBody>
+          </p:sp>
+        </mc:Fallback>
+      </mc:AlternateContent>
+      <p:pic>
+        <p:nvPicPr>
+          <p:cNvPr id="5" name="Picture 4">
+            <a:extLst>
+              <a:ext uri="{FF2B5EF4-FFF2-40B4-BE49-F238E27FC236}">
+                <a16:creationId xmlns:a16="http://schemas.microsoft.com/office/drawing/2014/main" id="{4AF985C3-8E97-796B-E9DB-DFFAF22AEEEE}"/>
+              </a:ext>
+            </a:extLst>
+          </p:cNvPr>
+          <p:cNvPicPr>
+            <a:picLocks noChangeAspect="1"/>
+          </p:cNvPicPr>
+          <p:nvPr/>
+        </p:nvPicPr>
+        <p:blipFill>
+          <a:blip r:embed="rId4">
+            <a:extLst>
+              <a:ext uri="{28A0092B-C50C-407E-A947-70E740481C1C}">
+                <a14:useLocalDpi xmlns:a14="http://schemas.microsoft.com/office/drawing/2010/main" val="0"/>
+              </a:ext>
+            </a:extLst>
+          </a:blip>
+          <a:stretch>
+            <a:fillRect/>
+          </a:stretch>
+        </p:blipFill>
+        <p:spPr>
+          <a:xfrm>
+            <a:off x="2684867" y="394021"/>
+            <a:ext cx="5540220" cy="2651990"/>
+          </a:xfrm>
+          <a:prstGeom prst="rect">
+            <a:avLst/>
+          </a:prstGeom>
+        </p:spPr>
+      </p:pic>
+    </p:spTree>
+    <p:extLst>
+      <p:ext uri="{BB962C8B-B14F-4D97-AF65-F5344CB8AC3E}">
+        <p14:creationId xmlns:p14="http://schemas.microsoft.com/office/powerpoint/2010/main" val="794010446"/>
+      </p:ext>
+    </p:extLst>
+  </p:cSld>
+  <p:clrMapOvr>
+    <a:masterClrMapping/>
+  </p:clrMapOvr>
+</p:sld>
+</file>
+
+<file path=ppt/slides/slide33.xml><?xml version="1.0" encoding="utf-8"?>
+<p:sld xmlns:a="http://schemas.openxmlformats.org/drawingml/2006/main" xmlns:r="http://schemas.openxmlformats.org/officeDocument/2006/relationships" xmlns:p="http://schemas.openxmlformats.org/presentationml/2006/main">
+  <p:cSld>
+    <p:spTree>
+      <p:nvGrpSpPr>
+        <p:cNvPr id="1" name=""/>
+        <p:cNvGrpSpPr/>
+        <p:nvPr/>
+      </p:nvGrpSpPr>
+      <p:grpSpPr>
+        <a:xfrm>
+          <a:off x="0" y="0"/>
+          <a:ext cx="0" cy="0"/>
+          <a:chOff x="0" y="0"/>
+          <a:chExt cx="0" cy="0"/>
+        </a:xfrm>
+      </p:grpSpPr>
+      <p:sp>
+        <p:nvSpPr>
+          <p:cNvPr id="2" name="Title 1">
+            <a:extLst>
+              <a:ext uri="{FF2B5EF4-FFF2-40B4-BE49-F238E27FC236}">
+                <a16:creationId xmlns:a16="http://schemas.microsoft.com/office/drawing/2014/main" id="{8A90FCB0-84E0-7383-EB3D-049FA82F49A1}"/>
+              </a:ext>
+            </a:extLst>
+          </p:cNvPr>
+          <p:cNvSpPr>
+            <a:spLocks noGrp="1"/>
+          </p:cNvSpPr>
+          <p:nvPr>
+            <p:ph type="title"/>
+          </p:nvPr>
+        </p:nvSpPr>
+        <p:spPr/>
+        <p:txBody>
+          <a:bodyPr/>
+          <a:lstStyle/>
+          <a:p>
+            <a:r>
+              <a:rPr lang="en-US" dirty="0"/>
+              <a:t> </a:t>
+            </a:r>
+          </a:p>
+        </p:txBody>
+      </p:sp>
+      <mc:AlternateContent xmlns:mc="http://schemas.openxmlformats.org/markup-compatibility/2006">
+        <mc:Choice xmlns:a14="http://schemas.microsoft.com/office/drawing/2010/main" Requires="a14">
+          <p:sp>
+            <p:nvSpPr>
+              <p:cNvPr id="3" name="Content Placeholder 2">
+                <a:extLst>
+                  <a:ext uri="{FF2B5EF4-FFF2-40B4-BE49-F238E27FC236}">
+                    <a16:creationId xmlns:a16="http://schemas.microsoft.com/office/drawing/2014/main" id="{77B33205-8558-7216-1FF6-BA4F6580F1A8}"/>
+                  </a:ext>
+                </a:extLst>
+              </p:cNvPr>
+              <p:cNvSpPr>
+                <a:spLocks noGrp="1"/>
+              </p:cNvSpPr>
+              <p:nvPr>
+                <p:ph idx="1"/>
+              </p:nvPr>
+            </p:nvSpPr>
+            <p:spPr>
+              <a:xfrm>
+                <a:off x="1141412" y="1853561"/>
+                <a:ext cx="9905999" cy="3541714"/>
+              </a:xfrm>
+            </p:spPr>
+            <p:txBody>
+              <a:bodyPr>
+                <a:normAutofit lnSpcReduction="10000"/>
+              </a:bodyPr>
+              <a:lstStyle/>
+              <a:p>
+                <a:r>
+                  <a:rPr lang="en-US" dirty="0"/>
+                  <a:t>Whoever signed the message must have used the private key, </a:t>
+                </a:r>
+                <a14:m>
+                  <m:oMath xmlns:m="http://schemas.openxmlformats.org/officeDocument/2006/math">
+                    <m:sSubSup>
+                      <m:sSubSupPr>
+                        <m:ctrlPr>
+                          <a:rPr lang="en-US" i="1">
+                            <a:latin typeface="Cambria Math" panose="02040503050406030204" pitchFamily="18" charset="0"/>
+                          </a:rPr>
+                        </m:ctrlPr>
+                      </m:sSubSupPr>
+                      <m:e>
+                        <m:r>
+                          <a:rPr lang="en-US" i="1">
+                            <a:latin typeface="Cambria Math" panose="02040503050406030204" pitchFamily="18" charset="0"/>
+                          </a:rPr>
+                          <m:t>𝐾</m:t>
+                        </m:r>
+                      </m:e>
+                      <m:sub>
+                        <m:r>
+                          <a:rPr lang="en-US" i="1">
+                            <a:latin typeface="Cambria Math" panose="02040503050406030204" pitchFamily="18" charset="0"/>
+                          </a:rPr>
+                          <m:t>𝐵</m:t>
+                        </m:r>
+                      </m:sub>
+                      <m:sup>
+                        <m:r>
+                          <a:rPr lang="en-US" i="1">
+                            <a:latin typeface="Cambria Math" panose="02040503050406030204" pitchFamily="18" charset="0"/>
+                          </a:rPr>
+                          <m:t>−</m:t>
+                        </m:r>
+                      </m:sup>
+                    </m:sSubSup>
+                  </m:oMath>
+                </a14:m>
+                <a:r>
+                  <a:rPr lang="en-US" dirty="0"/>
+                  <a:t> , in computing the signature </a:t>
+                </a:r>
+                <a14:m>
+                  <m:oMath xmlns:m="http://schemas.openxmlformats.org/officeDocument/2006/math">
+                    <m:sSubSup>
+                      <m:sSubSupPr>
+                        <m:ctrlPr>
+                          <a:rPr lang="en-US" i="1">
+                            <a:latin typeface="Cambria Math" panose="02040503050406030204" pitchFamily="18" charset="0"/>
+                          </a:rPr>
+                        </m:ctrlPr>
+                      </m:sSubSupPr>
+                      <m:e>
+                        <m:r>
+                          <a:rPr lang="en-US" i="1">
+                            <a:latin typeface="Cambria Math" panose="02040503050406030204" pitchFamily="18" charset="0"/>
+                          </a:rPr>
+                          <m:t>𝐾</m:t>
+                        </m:r>
+                      </m:e>
+                      <m:sub>
+                        <m:r>
+                          <a:rPr lang="en-US" i="1">
+                            <a:latin typeface="Cambria Math" panose="02040503050406030204" pitchFamily="18" charset="0"/>
+                          </a:rPr>
+                          <m:t>𝐵</m:t>
+                        </m:r>
+                      </m:sub>
+                      <m:sup>
+                        <m:r>
+                          <a:rPr lang="en-US" i="1">
+                            <a:latin typeface="Cambria Math" panose="02040503050406030204" pitchFamily="18" charset="0"/>
+                          </a:rPr>
+                          <m:t>−</m:t>
+                        </m:r>
+                      </m:sup>
+                    </m:sSubSup>
+                  </m:oMath>
+                </a14:m>
+                <a:r>
+                  <a:rPr lang="en-US" dirty="0"/>
+                  <a:t> , such that </a:t>
+                </a:r>
+                <a14:m>
+                  <m:oMath xmlns:m="http://schemas.openxmlformats.org/officeDocument/2006/math">
+                    <m:sSubSup>
+                      <m:sSubSupPr>
+                        <m:ctrlPr>
+                          <a:rPr lang="en-US" i="1">
+                            <a:latin typeface="Cambria Math" panose="02040503050406030204" pitchFamily="18" charset="0"/>
+                          </a:rPr>
+                        </m:ctrlPr>
+                      </m:sSubSupPr>
+                      <m:e>
+                        <m:r>
+                          <a:rPr lang="en-US" i="1">
+                            <a:latin typeface="Cambria Math" panose="02040503050406030204" pitchFamily="18" charset="0"/>
+                          </a:rPr>
+                          <m:t>𝐾</m:t>
+                        </m:r>
+                      </m:e>
+                      <m:sub>
+                        <m:r>
+                          <a:rPr lang="en-US" i="1">
+                            <a:latin typeface="Cambria Math" panose="02040503050406030204" pitchFamily="18" charset="0"/>
+                          </a:rPr>
+                          <m:t>𝐵</m:t>
+                        </m:r>
+                      </m:sub>
+                      <m:sup>
+                        <m:r>
+                          <a:rPr lang="en-US" i="1">
+                            <a:latin typeface="Cambria Math" panose="02040503050406030204" pitchFamily="18" charset="0"/>
+                          </a:rPr>
+                          <m:t>+</m:t>
+                        </m:r>
+                      </m:sup>
+                    </m:sSubSup>
+                  </m:oMath>
+                </a14:m>
+                <a:r>
+                  <a:rPr lang="en-US" dirty="0"/>
+                  <a:t>(</a:t>
+                </a:r>
+                <a14:m>
+                  <m:oMath xmlns:m="http://schemas.openxmlformats.org/officeDocument/2006/math">
+                    <m:sSubSup>
+                      <m:sSubSupPr>
+                        <m:ctrlPr>
+                          <a:rPr lang="en-US" i="1">
+                            <a:latin typeface="Cambria Math" panose="02040503050406030204" pitchFamily="18" charset="0"/>
+                          </a:rPr>
+                        </m:ctrlPr>
+                      </m:sSubSupPr>
+                      <m:e>
+                        <m:r>
+                          <a:rPr lang="en-US" i="1">
+                            <a:latin typeface="Cambria Math" panose="02040503050406030204" pitchFamily="18" charset="0"/>
+                          </a:rPr>
+                          <m:t>𝐾</m:t>
+                        </m:r>
+                      </m:e>
+                      <m:sub>
+                        <m:r>
+                          <a:rPr lang="en-US" i="1">
+                            <a:latin typeface="Cambria Math" panose="02040503050406030204" pitchFamily="18" charset="0"/>
+                          </a:rPr>
+                          <m:t>𝐵</m:t>
+                        </m:r>
+                      </m:sub>
+                      <m:sup>
+                        <m:r>
+                          <a:rPr lang="en-US" i="1">
+                            <a:latin typeface="Cambria Math" panose="02040503050406030204" pitchFamily="18" charset="0"/>
+                          </a:rPr>
+                          <m:t>−</m:t>
+                        </m:r>
+                      </m:sup>
+                    </m:sSubSup>
+                  </m:oMath>
+                </a14:m>
+                <a:r>
+                  <a:rPr lang="en-US" dirty="0"/>
+                  <a:t>(m)) = m.</a:t>
+                </a:r>
+              </a:p>
+              <a:p>
+                <a:r>
+                  <a:rPr lang="en-US" dirty="0"/>
+                  <a:t>The only person who could have known the private key, </a:t>
+                </a:r>
+                <a14:m>
+                  <m:oMath xmlns:m="http://schemas.openxmlformats.org/officeDocument/2006/math">
+                    <m:sSubSup>
+                      <m:sSubSupPr>
+                        <m:ctrlPr>
+                          <a:rPr lang="en-US" i="1">
+                            <a:latin typeface="Cambria Math" panose="02040503050406030204" pitchFamily="18" charset="0"/>
+                          </a:rPr>
+                        </m:ctrlPr>
+                      </m:sSubSupPr>
+                      <m:e>
+                        <m:r>
+                          <a:rPr lang="en-US" i="1">
+                            <a:latin typeface="Cambria Math" panose="02040503050406030204" pitchFamily="18" charset="0"/>
+                          </a:rPr>
+                          <m:t>𝐾</m:t>
+                        </m:r>
+                      </m:e>
+                      <m:sub>
+                        <m:r>
+                          <a:rPr lang="en-US" i="1">
+                            <a:latin typeface="Cambria Math" panose="02040503050406030204" pitchFamily="18" charset="0"/>
+                          </a:rPr>
+                          <m:t>𝐵</m:t>
+                        </m:r>
+                      </m:sub>
+                      <m:sup>
+                        <m:r>
+                          <a:rPr lang="en-US" i="1">
+                            <a:latin typeface="Cambria Math" panose="02040503050406030204" pitchFamily="18" charset="0"/>
+                          </a:rPr>
+                          <m:t>−</m:t>
+                        </m:r>
+                      </m:sup>
+                    </m:sSubSup>
+                  </m:oMath>
+                </a14:m>
+                <a:r>
+                  <a:rPr lang="en-US" dirty="0"/>
+                  <a:t>, is Bob. Recall from our discussion of RSA that knowing the public key, </a:t>
+                </a:r>
+                <a14:m>
+                  <m:oMath xmlns:m="http://schemas.openxmlformats.org/officeDocument/2006/math">
+                    <m:sSubSup>
+                      <m:sSubSupPr>
+                        <m:ctrlPr>
+                          <a:rPr lang="en-US" i="1">
+                            <a:latin typeface="Cambria Math" panose="02040503050406030204" pitchFamily="18" charset="0"/>
+                          </a:rPr>
+                        </m:ctrlPr>
+                      </m:sSubSupPr>
+                      <m:e>
+                        <m:r>
+                          <a:rPr lang="en-US" i="1">
+                            <a:latin typeface="Cambria Math" panose="02040503050406030204" pitchFamily="18" charset="0"/>
+                          </a:rPr>
+                          <m:t>𝐾</m:t>
+                        </m:r>
+                      </m:e>
+                      <m:sub>
+                        <m:r>
+                          <a:rPr lang="en-US" i="1">
+                            <a:latin typeface="Cambria Math" panose="02040503050406030204" pitchFamily="18" charset="0"/>
+                          </a:rPr>
+                          <m:t>𝐵</m:t>
+                        </m:r>
+                      </m:sub>
+                      <m:sup>
+                        <m:r>
+                          <a:rPr lang="en-US" b="0" i="1" smtClean="0">
+                            <a:latin typeface="Cambria Math" panose="02040503050406030204" pitchFamily="18" charset="0"/>
+                          </a:rPr>
+                          <m:t>+</m:t>
+                        </m:r>
+                      </m:sup>
+                    </m:sSubSup>
+                  </m:oMath>
+                </a14:m>
+                <a:r>
+                  <a:rPr lang="en-US" dirty="0"/>
+                  <a:t>, is of no help in learning the private key, </a:t>
+                </a:r>
+                <a14:m>
+                  <m:oMath xmlns:m="http://schemas.openxmlformats.org/officeDocument/2006/math">
+                    <m:sSubSup>
+                      <m:sSubSupPr>
+                        <m:ctrlPr>
+                          <a:rPr lang="en-US" i="1">
+                            <a:latin typeface="Cambria Math" panose="02040503050406030204" pitchFamily="18" charset="0"/>
+                          </a:rPr>
+                        </m:ctrlPr>
+                      </m:sSubSupPr>
+                      <m:e>
+                        <m:r>
+                          <a:rPr lang="en-US" i="1">
+                            <a:latin typeface="Cambria Math" panose="02040503050406030204" pitchFamily="18" charset="0"/>
+                          </a:rPr>
+                          <m:t>𝐾</m:t>
+                        </m:r>
+                      </m:e>
+                      <m:sub>
+                        <m:r>
+                          <a:rPr lang="en-US" i="1">
+                            <a:latin typeface="Cambria Math" panose="02040503050406030204" pitchFamily="18" charset="0"/>
+                          </a:rPr>
+                          <m:t>𝐵</m:t>
+                        </m:r>
+                      </m:sub>
+                      <m:sup>
+                        <m:r>
+                          <a:rPr lang="en-US" i="1">
+                            <a:latin typeface="Cambria Math" panose="02040503050406030204" pitchFamily="18" charset="0"/>
+                          </a:rPr>
+                          <m:t>−</m:t>
+                        </m:r>
+                      </m:sup>
+                    </m:sSubSup>
+                  </m:oMath>
+                </a14:m>
+                <a:r>
+                  <a:rPr lang="en-US" dirty="0"/>
+                  <a:t>. Therefore, the only person who could know </a:t>
+                </a:r>
+                <a14:m>
+                  <m:oMath xmlns:m="http://schemas.openxmlformats.org/officeDocument/2006/math">
+                    <m:sSubSup>
+                      <m:sSubSupPr>
+                        <m:ctrlPr>
+                          <a:rPr lang="en-US" i="1">
+                            <a:latin typeface="Cambria Math" panose="02040503050406030204" pitchFamily="18" charset="0"/>
+                          </a:rPr>
+                        </m:ctrlPr>
+                      </m:sSubSupPr>
+                      <m:e>
+                        <m:r>
+                          <a:rPr lang="en-US" i="1">
+                            <a:latin typeface="Cambria Math" panose="02040503050406030204" pitchFamily="18" charset="0"/>
+                          </a:rPr>
+                          <m:t>𝐾</m:t>
+                        </m:r>
+                      </m:e>
+                      <m:sub>
+                        <m:r>
+                          <a:rPr lang="en-US" i="1">
+                            <a:latin typeface="Cambria Math" panose="02040503050406030204" pitchFamily="18" charset="0"/>
+                          </a:rPr>
+                          <m:t>𝐵</m:t>
+                        </m:r>
+                      </m:sub>
+                      <m:sup>
+                        <m:r>
+                          <a:rPr lang="en-US" i="1">
+                            <a:latin typeface="Cambria Math" panose="02040503050406030204" pitchFamily="18" charset="0"/>
+                          </a:rPr>
+                          <m:t>−</m:t>
+                        </m:r>
+                      </m:sup>
+                    </m:sSubSup>
+                  </m:oMath>
+                </a14:m>
+                <a:r>
+                  <a:rPr lang="en-US" dirty="0"/>
+                  <a:t> is the person who generated the pair of keys, (</a:t>
+                </a:r>
+                <a14:m>
+                  <m:oMath xmlns:m="http://schemas.openxmlformats.org/officeDocument/2006/math">
+                    <m:sSubSup>
+                      <m:sSubSupPr>
+                        <m:ctrlPr>
+                          <a:rPr lang="en-US" i="1" smtClean="0">
+                            <a:latin typeface="Cambria Math" panose="02040503050406030204" pitchFamily="18" charset="0"/>
+                          </a:rPr>
+                        </m:ctrlPr>
+                      </m:sSubSupPr>
+                      <m:e>
+                        <m:r>
+                          <a:rPr lang="en-US" i="1">
+                            <a:latin typeface="Cambria Math" panose="02040503050406030204" pitchFamily="18" charset="0"/>
+                          </a:rPr>
+                          <m:t>𝐾</m:t>
+                        </m:r>
+                      </m:e>
+                      <m:sub>
+                        <m:r>
+                          <a:rPr lang="en-US" i="1">
+                            <a:latin typeface="Cambria Math" panose="02040503050406030204" pitchFamily="18" charset="0"/>
+                          </a:rPr>
+                          <m:t>𝐵</m:t>
+                        </m:r>
+                      </m:sub>
+                      <m:sup>
+                        <m:r>
+                          <a:rPr lang="en-US" b="0" i="1" smtClean="0">
+                            <a:latin typeface="Cambria Math" panose="02040503050406030204" pitchFamily="18" charset="0"/>
+                          </a:rPr>
+                          <m:t>+</m:t>
+                        </m:r>
+                      </m:sup>
+                    </m:sSubSup>
+                  </m:oMath>
+                </a14:m>
+                <a:r>
+                  <a:rPr lang="en-US" dirty="0"/>
+                  <a:t> , </a:t>
+                </a:r>
+                <a14:m>
+                  <m:oMath xmlns:m="http://schemas.openxmlformats.org/officeDocument/2006/math">
+                    <m:sSubSup>
+                      <m:sSubSupPr>
+                        <m:ctrlPr>
+                          <a:rPr lang="en-US" i="1">
+                            <a:latin typeface="Cambria Math" panose="02040503050406030204" pitchFamily="18" charset="0"/>
+                          </a:rPr>
+                        </m:ctrlPr>
+                      </m:sSubSupPr>
+                      <m:e>
+                        <m:r>
+                          <a:rPr lang="en-US" i="1">
+                            <a:latin typeface="Cambria Math" panose="02040503050406030204" pitchFamily="18" charset="0"/>
+                          </a:rPr>
+                          <m:t>𝐾</m:t>
+                        </m:r>
+                      </m:e>
+                      <m:sub>
+                        <m:r>
+                          <a:rPr lang="en-US" i="1">
+                            <a:latin typeface="Cambria Math" panose="02040503050406030204" pitchFamily="18" charset="0"/>
+                          </a:rPr>
+                          <m:t>𝐵</m:t>
+                        </m:r>
+                      </m:sub>
+                      <m:sup>
+                        <m:r>
+                          <a:rPr lang="en-US" i="1">
+                            <a:latin typeface="Cambria Math" panose="02040503050406030204" pitchFamily="18" charset="0"/>
+                          </a:rPr>
+                          <m:t>−</m:t>
+                        </m:r>
+                      </m:sup>
+                    </m:sSubSup>
+                  </m:oMath>
+                </a14:m>
+                <a:r>
+                  <a:rPr lang="en-US" dirty="0"/>
+                  <a:t>), in the first place, Bob. (Note that this assumes, though, that Bob has not given </a:t>
+                </a:r>
+                <a14:m>
+                  <m:oMath xmlns:m="http://schemas.openxmlformats.org/officeDocument/2006/math">
+                    <m:sSubSup>
+                      <m:sSubSupPr>
+                        <m:ctrlPr>
+                          <a:rPr lang="en-US" i="1">
+                            <a:latin typeface="Cambria Math" panose="02040503050406030204" pitchFamily="18" charset="0"/>
+                          </a:rPr>
+                        </m:ctrlPr>
+                      </m:sSubSupPr>
+                      <m:e>
+                        <m:r>
+                          <a:rPr lang="en-US" i="1">
+                            <a:latin typeface="Cambria Math" panose="02040503050406030204" pitchFamily="18" charset="0"/>
+                          </a:rPr>
+                          <m:t>𝐾</m:t>
+                        </m:r>
+                      </m:e>
+                      <m:sub>
+                        <m:r>
+                          <a:rPr lang="en-US" i="1">
+                            <a:latin typeface="Cambria Math" panose="02040503050406030204" pitchFamily="18" charset="0"/>
+                          </a:rPr>
+                          <m:t>𝐵</m:t>
+                        </m:r>
+                      </m:sub>
+                      <m:sup>
+                        <m:r>
+                          <a:rPr lang="en-US" i="1">
+                            <a:latin typeface="Cambria Math" panose="02040503050406030204" pitchFamily="18" charset="0"/>
+                          </a:rPr>
+                          <m:t>−</m:t>
+                        </m:r>
+                      </m:sup>
+                    </m:sSubSup>
+                  </m:oMath>
+                </a14:m>
+                <a:r>
+                  <a:rPr lang="en-US" dirty="0"/>
+                  <a:t> to anyone, nor has anyone stolen </a:t>
+                </a:r>
+                <a14:m>
+                  <m:oMath xmlns:m="http://schemas.openxmlformats.org/officeDocument/2006/math">
+                    <m:sSubSup>
+                      <m:sSubSupPr>
+                        <m:ctrlPr>
+                          <a:rPr lang="en-US" i="1">
+                            <a:latin typeface="Cambria Math" panose="02040503050406030204" pitchFamily="18" charset="0"/>
+                          </a:rPr>
+                        </m:ctrlPr>
+                      </m:sSubSupPr>
+                      <m:e>
+                        <m:r>
+                          <a:rPr lang="en-US" i="1">
+                            <a:latin typeface="Cambria Math" panose="02040503050406030204" pitchFamily="18" charset="0"/>
+                          </a:rPr>
+                          <m:t>𝐾</m:t>
+                        </m:r>
+                      </m:e>
+                      <m:sub>
+                        <m:r>
+                          <a:rPr lang="en-US" i="1">
+                            <a:latin typeface="Cambria Math" panose="02040503050406030204" pitchFamily="18" charset="0"/>
+                          </a:rPr>
+                          <m:t>𝐵</m:t>
+                        </m:r>
+                      </m:sub>
+                      <m:sup>
+                        <m:r>
+                          <a:rPr lang="en-US" i="1">
+                            <a:latin typeface="Cambria Math" panose="02040503050406030204" pitchFamily="18" charset="0"/>
+                          </a:rPr>
+                          <m:t>−</m:t>
+                        </m:r>
+                      </m:sup>
+                    </m:sSubSup>
+                  </m:oMath>
+                </a14:m>
+                <a:r>
+                  <a:rPr lang="en-US" dirty="0"/>
+                  <a:t> from Bob.)</a:t>
+                </a:r>
+              </a:p>
+            </p:txBody>
+          </p:sp>
+        </mc:Choice>
+        <mc:Fallback>
+          <p:sp>
+            <p:nvSpPr>
+              <p:cNvPr id="3" name="Content Placeholder 2">
+                <a:extLst>
+                  <a:ext uri="{FF2B5EF4-FFF2-40B4-BE49-F238E27FC236}">
+                    <a16:creationId xmlns:a16="http://schemas.microsoft.com/office/drawing/2014/main" id="{77B33205-8558-7216-1FF6-BA4F6580F1A8}"/>
+                  </a:ext>
+                </a:extLst>
+              </p:cNvPr>
+              <p:cNvSpPr>
+                <a:spLocks noGrp="1" noRot="1" noChangeAspect="1" noMove="1" noResize="1" noEditPoints="1" noAdjustHandles="1" noChangeArrowheads="1" noChangeShapeType="1" noTextEdit="1"/>
+              </p:cNvSpPr>
+              <p:nvPr>
+                <p:ph idx="1"/>
+              </p:nvPr>
+            </p:nvSpPr>
+            <p:spPr>
+              <a:xfrm>
+                <a:off x="1141412" y="1853561"/>
+                <a:ext cx="9905999" cy="3541714"/>
+              </a:xfrm>
+              <a:blipFill>
+                <a:blip r:embed="rId3"/>
+                <a:stretch>
+                  <a:fillRect l="-1231" t="-2926" r="-1723" b="-344"/>
+                </a:stretch>
+              </a:blipFill>
+            </p:spPr>
+            <p:txBody>
+              <a:bodyPr/>
+              <a:lstStyle/>
+              <a:p>
+                <a:r>
+                  <a:rPr lang="en-US">
+                    <a:noFill/>
+                  </a:rPr>
+                  <a:t> </a:t>
+                </a:r>
+              </a:p>
+            </p:txBody>
+          </p:sp>
+        </mc:Fallback>
+      </mc:AlternateContent>
+    </p:spTree>
+    <p:extLst>
+      <p:ext uri="{BB962C8B-B14F-4D97-AF65-F5344CB8AC3E}">
+        <p14:creationId xmlns:p14="http://schemas.microsoft.com/office/powerpoint/2010/main" val="480997045"/>
+      </p:ext>
+    </p:extLst>
+  </p:cSld>
+  <p:clrMapOvr>
+    <a:masterClrMapping/>
+  </p:clrMapOvr>
+</p:sld>
+</file>
+
+<file path=ppt/slides/slide34.xml><?xml version="1.0" encoding="utf-8"?>
+<p:sld xmlns:a="http://schemas.openxmlformats.org/drawingml/2006/main" xmlns:r="http://schemas.openxmlformats.org/officeDocument/2006/relationships" xmlns:p="http://schemas.openxmlformats.org/presentationml/2006/main">
+  <p:cSld>
+    <p:spTree>
+      <p:nvGrpSpPr>
+        <p:cNvPr id="1" name=""/>
+        <p:cNvGrpSpPr/>
+        <p:nvPr/>
+      </p:nvGrpSpPr>
+      <p:grpSpPr>
+        <a:xfrm>
+          <a:off x="0" y="0"/>
+          <a:ext cx="0" cy="0"/>
+          <a:chOff x="0" y="0"/>
+          <a:chExt cx="0" cy="0"/>
+        </a:xfrm>
+      </p:grpSpPr>
+      <p:sp>
+        <p:nvSpPr>
+          <p:cNvPr id="2" name="Title 1">
+            <a:extLst>
+              <a:ext uri="{FF2B5EF4-FFF2-40B4-BE49-F238E27FC236}">
+                <a16:creationId xmlns:a16="http://schemas.microsoft.com/office/drawing/2014/main" id="{4281EF1A-3964-EE76-3E43-06136B225016}"/>
+              </a:ext>
+            </a:extLst>
+          </p:cNvPr>
+          <p:cNvSpPr>
+            <a:spLocks noGrp="1"/>
+          </p:cNvSpPr>
+          <p:nvPr>
+            <p:ph type="title"/>
+          </p:nvPr>
+        </p:nvSpPr>
+        <p:spPr/>
+        <p:txBody>
+          <a:bodyPr/>
+          <a:lstStyle/>
+          <a:p>
+            <a:r>
+              <a:rPr lang="en-US" dirty="0"/>
+              <a:t> </a:t>
+            </a:r>
+          </a:p>
+        </p:txBody>
+      </p:sp>
+      <p:sp>
+        <p:nvSpPr>
+          <p:cNvPr id="3" name="Content Placeholder 2">
+            <a:extLst>
+              <a:ext uri="{FF2B5EF4-FFF2-40B4-BE49-F238E27FC236}">
+                <a16:creationId xmlns:a16="http://schemas.microsoft.com/office/drawing/2014/main" id="{169EA48A-D1A2-4E1F-4E39-F49AD9F39938}"/>
+              </a:ext>
+            </a:extLst>
+          </p:cNvPr>
+          <p:cNvSpPr>
+            <a:spLocks noGrp="1"/>
+          </p:cNvSpPr>
+          <p:nvPr>
+            <p:ph idx="1"/>
+          </p:nvPr>
+        </p:nvSpPr>
+        <p:spPr>
+          <a:xfrm>
+            <a:off x="2027533" y="514955"/>
+            <a:ext cx="7795198" cy="2247099"/>
+          </a:xfrm>
+        </p:spPr>
+        <p:txBody>
+          <a:bodyPr>
+            <a:normAutofit fontScale="92500"/>
+          </a:bodyPr>
+          <a:lstStyle/>
+          <a:p>
+            <a:pPr marL="0" indent="0">
+              <a:buNone/>
+            </a:pPr>
+            <a:r>
+              <a:rPr lang="en-US" dirty="0"/>
+              <a:t>One concern with signing data by encryption is that encryption and decryption are computationally expensive. Given the overheads of encryption and decryption, signing data via complete encryption/decryption can be overkill. A more efficient approach is to introduce hash functions into the digital signature.</a:t>
+            </a:r>
+          </a:p>
+        </p:txBody>
+      </p:sp>
+      <p:pic>
+        <p:nvPicPr>
+          <p:cNvPr id="5" name="Picture 4">
+            <a:extLst>
+              <a:ext uri="{FF2B5EF4-FFF2-40B4-BE49-F238E27FC236}">
+                <a16:creationId xmlns:a16="http://schemas.microsoft.com/office/drawing/2014/main" id="{3661D100-5CB9-1460-66FA-EB37A9076078}"/>
+              </a:ext>
+            </a:extLst>
+          </p:cNvPr>
+          <p:cNvPicPr>
+            <a:picLocks noChangeAspect="1"/>
+          </p:cNvPicPr>
+          <p:nvPr/>
+        </p:nvPicPr>
+        <p:blipFill>
+          <a:blip r:embed="rId3">
+            <a:extLst>
+              <a:ext uri="{28A0092B-C50C-407E-A947-70E740481C1C}">
+                <a14:useLocalDpi xmlns:a14="http://schemas.microsoft.com/office/drawing/2010/main" val="0"/>
+              </a:ext>
+            </a:extLst>
+          </a:blip>
+          <a:stretch>
+            <a:fillRect/>
+          </a:stretch>
+        </p:blipFill>
+        <p:spPr>
+          <a:xfrm>
+            <a:off x="720883" y="2865617"/>
+            <a:ext cx="5715268" cy="3477428"/>
+          </a:xfrm>
+          <a:prstGeom prst="rect">
+            <a:avLst/>
+          </a:prstGeom>
+        </p:spPr>
+      </p:pic>
+      <p:pic>
+        <p:nvPicPr>
+          <p:cNvPr id="7" name="Picture 6">
+            <a:extLst>
+              <a:ext uri="{FF2B5EF4-FFF2-40B4-BE49-F238E27FC236}">
+                <a16:creationId xmlns:a16="http://schemas.microsoft.com/office/drawing/2014/main" id="{822BBB19-0CD1-5D5E-D6E6-557698745C78}"/>
+              </a:ext>
+            </a:extLst>
+          </p:cNvPr>
+          <p:cNvPicPr>
+            <a:picLocks noChangeAspect="1"/>
+          </p:cNvPicPr>
+          <p:nvPr/>
+        </p:nvPicPr>
+        <p:blipFill>
+          <a:blip r:embed="rId4">
+            <a:extLst>
+              <a:ext uri="{28A0092B-C50C-407E-A947-70E740481C1C}">
+                <a14:useLocalDpi xmlns:a14="http://schemas.microsoft.com/office/drawing/2010/main" val="0"/>
+              </a:ext>
+            </a:extLst>
+          </a:blip>
+          <a:stretch>
+            <a:fillRect/>
+          </a:stretch>
+        </p:blipFill>
+        <p:spPr>
+          <a:xfrm>
+            <a:off x="6611583" y="2842293"/>
+            <a:ext cx="4859534" cy="3500752"/>
+          </a:xfrm>
+          <a:prstGeom prst="rect">
+            <a:avLst/>
+          </a:prstGeom>
+        </p:spPr>
+      </p:pic>
+    </p:spTree>
+    <p:extLst>
+      <p:ext uri="{BB962C8B-B14F-4D97-AF65-F5344CB8AC3E}">
+        <p14:creationId xmlns:p14="http://schemas.microsoft.com/office/powerpoint/2010/main" val="3704781208"/>
+      </p:ext>
+    </p:extLst>
+  </p:cSld>
+  <p:clrMapOvr>
+    <a:masterClrMapping/>
+  </p:clrMapOvr>
+</p:sld>
+</file>
+
+<file path=ppt/slides/slide35.xml><?xml version="1.0" encoding="utf-8"?>
+<p:sld xmlns:a="http://schemas.openxmlformats.org/drawingml/2006/main" xmlns:r="http://schemas.openxmlformats.org/officeDocument/2006/relationships" xmlns:p="http://schemas.openxmlformats.org/presentationml/2006/main">
+  <p:cSld>
+    <p:spTree>
+      <p:nvGrpSpPr>
+        <p:cNvPr id="1" name=""/>
+        <p:cNvGrpSpPr/>
+        <p:nvPr/>
+      </p:nvGrpSpPr>
+      <p:grpSpPr>
+        <a:xfrm>
+          <a:off x="0" y="0"/>
+          <a:ext cx="0" cy="0"/>
+          <a:chOff x="0" y="0"/>
+          <a:chExt cx="0" cy="0"/>
+        </a:xfrm>
+      </p:grpSpPr>
+      <p:sp>
+        <p:nvSpPr>
+          <p:cNvPr id="2" name="Title 1">
+            <a:extLst>
+              <a:ext uri="{FF2B5EF4-FFF2-40B4-BE49-F238E27FC236}">
+                <a16:creationId xmlns:a16="http://schemas.microsoft.com/office/drawing/2014/main" id="{A7AAE357-A751-6DEE-2DDD-C5D58C6FB05E}"/>
+              </a:ext>
+            </a:extLst>
+          </p:cNvPr>
+          <p:cNvSpPr>
+            <a:spLocks noGrp="1"/>
+          </p:cNvSpPr>
+          <p:nvPr>
+            <p:ph type="title"/>
+          </p:nvPr>
+        </p:nvSpPr>
+        <p:spPr/>
+        <p:txBody>
+          <a:bodyPr/>
+          <a:lstStyle/>
+          <a:p>
+            <a:r>
+              <a:rPr lang="en-US" dirty="0"/>
+              <a:t>Public key certification</a:t>
+            </a:r>
+          </a:p>
+        </p:txBody>
+      </p:sp>
+      <p:sp>
+        <p:nvSpPr>
+          <p:cNvPr id="3" name="Content Placeholder 2">
+            <a:extLst>
+              <a:ext uri="{FF2B5EF4-FFF2-40B4-BE49-F238E27FC236}">
+                <a16:creationId xmlns:a16="http://schemas.microsoft.com/office/drawing/2014/main" id="{19367B10-1B13-2D74-7B23-9A6A07CB0AA2}"/>
+              </a:ext>
+            </a:extLst>
+          </p:cNvPr>
+          <p:cNvSpPr>
+            <a:spLocks noGrp="1"/>
+          </p:cNvSpPr>
+          <p:nvPr>
+            <p:ph idx="1"/>
+          </p:nvPr>
+        </p:nvSpPr>
+        <p:spPr/>
+        <p:txBody>
+          <a:bodyPr>
+            <a:normAutofit fontScale="92500"/>
+          </a:bodyPr>
+          <a:lstStyle/>
+          <a:p>
+            <a:r>
+              <a:rPr lang="en-US" dirty="0"/>
+              <a:t>An important application of digital signatures is public key certification, that is, certifying that a public key belongs to a specific entity. Public key certification is used in many popular secure networking protocols like TLS.</a:t>
+            </a:r>
+          </a:p>
+          <a:p>
+            <a:pPr marL="0" indent="0">
+              <a:buNone/>
+            </a:pPr>
+            <a:r>
+              <a:rPr lang="en-US" b="1" u="sng" dirty="0"/>
+              <a:t>AN EXAMPLE</a:t>
+            </a:r>
+            <a:endParaRPr lang="en-US" dirty="0"/>
+          </a:p>
+          <a:p>
+            <a:r>
+              <a:rPr lang="en-US" dirty="0"/>
+              <a:t>Alice works in a pizza delivery business and accepts orders and processes them.</a:t>
+            </a:r>
+          </a:p>
+          <a:p>
+            <a:r>
+              <a:rPr lang="en-US" dirty="0"/>
+              <a:t>Bob is a pizza lover and orders his favorite pizza.</a:t>
+            </a:r>
+          </a:p>
+          <a:p>
+            <a:r>
+              <a:rPr lang="en-US" dirty="0"/>
+              <a:t>Trudy is the intruder which might be quite a clever one!!.</a:t>
+            </a:r>
+          </a:p>
+        </p:txBody>
+      </p:sp>
+    </p:spTree>
+    <p:extLst>
+      <p:ext uri="{BB962C8B-B14F-4D97-AF65-F5344CB8AC3E}">
+        <p14:creationId xmlns:p14="http://schemas.microsoft.com/office/powerpoint/2010/main" val="1341771815"/>
+      </p:ext>
+    </p:extLst>
+  </p:cSld>
+  <p:clrMapOvr>
+    <a:masterClrMapping/>
+  </p:clrMapOvr>
+</p:sld>
+</file>
+
+<file path=ppt/slides/slide36.xml><?xml version="1.0" encoding="utf-8"?>
+<p:sld xmlns:a="http://schemas.openxmlformats.org/drawingml/2006/main" xmlns:r="http://schemas.openxmlformats.org/officeDocument/2006/relationships" xmlns:p="http://schemas.openxmlformats.org/presentationml/2006/main">
+  <p:cSld>
+    <p:spTree>
+      <p:nvGrpSpPr>
+        <p:cNvPr id="1" name=""/>
+        <p:cNvGrpSpPr/>
+        <p:nvPr/>
+      </p:nvGrpSpPr>
+      <p:grpSpPr>
+        <a:xfrm>
+          <a:off x="0" y="0"/>
+          <a:ext cx="0" cy="0"/>
+          <a:chOff x="0" y="0"/>
+          <a:chExt cx="0" cy="0"/>
+        </a:xfrm>
+      </p:grpSpPr>
+      <p:sp>
+        <p:nvSpPr>
+          <p:cNvPr id="2" name="Title 1">
+            <a:extLst>
+              <a:ext uri="{FF2B5EF4-FFF2-40B4-BE49-F238E27FC236}">
+                <a16:creationId xmlns:a16="http://schemas.microsoft.com/office/drawing/2014/main" id="{6254C1BA-2A26-FE11-E9D0-9958CC2E350C}"/>
+              </a:ext>
+            </a:extLst>
+          </p:cNvPr>
+          <p:cNvSpPr>
+            <a:spLocks noGrp="1"/>
+          </p:cNvSpPr>
+          <p:nvPr>
+            <p:ph type="title" idx="4294967295"/>
+          </p:nvPr>
+        </p:nvSpPr>
+        <p:spPr>
+          <a:xfrm>
+            <a:off x="0" y="619125"/>
+            <a:ext cx="9906000" cy="1477963"/>
+          </a:xfrm>
+        </p:spPr>
+        <p:txBody>
+          <a:bodyPr/>
+          <a:lstStyle/>
+          <a:p>
+            <a:r>
+              <a:rPr lang="en-US" dirty="0"/>
+              <a:t> </a:t>
+            </a:r>
+          </a:p>
+        </p:txBody>
+      </p:sp>
+      <p:pic>
+        <p:nvPicPr>
+          <p:cNvPr id="5" name="Picture 4">
+            <a:extLst>
+              <a:ext uri="{FF2B5EF4-FFF2-40B4-BE49-F238E27FC236}">
+                <a16:creationId xmlns:a16="http://schemas.microsoft.com/office/drawing/2014/main" id="{8001A87A-5782-DF7E-C3BF-93CBE37DF390}"/>
+              </a:ext>
+            </a:extLst>
+          </p:cNvPr>
+          <p:cNvPicPr>
+            <a:picLocks noChangeAspect="1"/>
+          </p:cNvPicPr>
+          <p:nvPr/>
+        </p:nvPicPr>
+        <p:blipFill>
+          <a:blip r:embed="rId3">
+            <a:extLst>
+              <a:ext uri="{28A0092B-C50C-407E-A947-70E740481C1C}">
+                <a14:useLocalDpi xmlns:a14="http://schemas.microsoft.com/office/drawing/2010/main" val="0"/>
+              </a:ext>
+            </a:extLst>
+          </a:blip>
+          <a:stretch>
+            <a:fillRect/>
+          </a:stretch>
+        </p:blipFill>
+        <p:spPr>
+          <a:xfrm>
+            <a:off x="2685754" y="1196146"/>
+            <a:ext cx="6820491" cy="4465707"/>
+          </a:xfrm>
+          <a:prstGeom prst="rect">
+            <a:avLst/>
+          </a:prstGeom>
+        </p:spPr>
+      </p:pic>
+    </p:spTree>
+    <p:extLst>
+      <p:ext uri="{BB962C8B-B14F-4D97-AF65-F5344CB8AC3E}">
+        <p14:creationId xmlns:p14="http://schemas.microsoft.com/office/powerpoint/2010/main" val="276849371"/>
+      </p:ext>
+    </p:extLst>
+  </p:cSld>
+  <p:clrMapOvr>
+    <a:masterClrMapping/>
+  </p:clrMapOvr>
+</p:sld>
+</file>
+
+<file path=ppt/slides/slide37.xml><?xml version="1.0" encoding="utf-8"?>
+<p:sld xmlns:a="http://schemas.openxmlformats.org/drawingml/2006/main" xmlns:r="http://schemas.openxmlformats.org/officeDocument/2006/relationships" xmlns:p="http://schemas.openxmlformats.org/presentationml/2006/main">
+  <p:cSld>
+    <p:spTree>
+      <p:nvGrpSpPr>
+        <p:cNvPr id="1" name=""/>
+        <p:cNvGrpSpPr/>
+        <p:nvPr/>
+      </p:nvGrpSpPr>
+      <p:grpSpPr>
+        <a:xfrm>
+          <a:off x="0" y="0"/>
+          <a:ext cx="0" cy="0"/>
+          <a:chOff x="0" y="0"/>
+          <a:chExt cx="0" cy="0"/>
+        </a:xfrm>
+      </p:grpSpPr>
+      <p:sp>
+        <p:nvSpPr>
+          <p:cNvPr id="2" name="Title 1">
+            <a:extLst>
+              <a:ext uri="{FF2B5EF4-FFF2-40B4-BE49-F238E27FC236}">
+                <a16:creationId xmlns:a16="http://schemas.microsoft.com/office/drawing/2014/main" id="{63250DB0-B1A9-99BE-5A76-3801F7AC9778}"/>
+              </a:ext>
+            </a:extLst>
+          </p:cNvPr>
+          <p:cNvSpPr>
+            <a:spLocks noGrp="1"/>
+          </p:cNvSpPr>
+          <p:nvPr>
+            <p:ph type="title"/>
+          </p:nvPr>
+        </p:nvSpPr>
+        <p:spPr/>
+        <p:txBody>
+          <a:bodyPr/>
+          <a:lstStyle/>
+          <a:p>
+            <a:r>
+              <a:rPr lang="en-US" dirty="0"/>
+              <a:t>certification authority (CA)</a:t>
+            </a:r>
+          </a:p>
+        </p:txBody>
+      </p:sp>
+      <p:sp>
+        <p:nvSpPr>
+          <p:cNvPr id="3" name="Content Placeholder 2">
+            <a:extLst>
+              <a:ext uri="{FF2B5EF4-FFF2-40B4-BE49-F238E27FC236}">
+                <a16:creationId xmlns:a16="http://schemas.microsoft.com/office/drawing/2014/main" id="{E837D79C-B271-5523-82FB-660FDC0B737E}"/>
+              </a:ext>
+            </a:extLst>
+          </p:cNvPr>
+          <p:cNvSpPr>
+            <a:spLocks noGrp="1"/>
+          </p:cNvSpPr>
+          <p:nvPr>
+            <p:ph idx="1"/>
+          </p:nvPr>
+        </p:nvSpPr>
+        <p:spPr>
+          <a:xfrm>
+            <a:off x="976463" y="2097088"/>
+            <a:ext cx="5102277" cy="3717681"/>
+          </a:xfrm>
+        </p:spPr>
+        <p:txBody>
+          <a:bodyPr>
+            <a:normAutofit fontScale="77500" lnSpcReduction="20000"/>
+          </a:bodyPr>
+          <a:lstStyle/>
+          <a:p>
+            <a:r>
+              <a:rPr lang="en-US" dirty="0"/>
+              <a:t>Binding a public key to a particular entity is typically done by a Certification Authority (CA), whose job is to validate identities and issue certificates.</a:t>
+            </a:r>
+          </a:p>
+          <a:p>
+            <a:r>
+              <a:rPr lang="en-US" dirty="0"/>
+              <a:t>Once the CA verifies the identity of the entity, the CA creates a certificate that binds the public key of the entity to the identity. The certificate contains the public key and globally unique identifying information about the owner of the public key (for example, a human name or an IP address). The certificate is digitally signed by the CA. </a:t>
+            </a:r>
+          </a:p>
+        </p:txBody>
+      </p:sp>
+      <p:pic>
+        <p:nvPicPr>
+          <p:cNvPr id="5" name="Picture 4">
+            <a:extLst>
+              <a:ext uri="{FF2B5EF4-FFF2-40B4-BE49-F238E27FC236}">
+                <a16:creationId xmlns:a16="http://schemas.microsoft.com/office/drawing/2014/main" id="{1598310E-9C61-F881-6B04-183CFE87364B}"/>
+              </a:ext>
+            </a:extLst>
+          </p:cNvPr>
+          <p:cNvPicPr>
+            <a:picLocks noChangeAspect="1"/>
+          </p:cNvPicPr>
+          <p:nvPr/>
+        </p:nvPicPr>
+        <p:blipFill>
+          <a:blip r:embed="rId4">
+            <a:extLst>
+              <a:ext uri="{28A0092B-C50C-407E-A947-70E740481C1C}">
+                <a14:useLocalDpi xmlns:a14="http://schemas.microsoft.com/office/drawing/2010/main" val="0"/>
+              </a:ext>
+            </a:extLst>
+          </a:blip>
+          <a:stretch>
+            <a:fillRect/>
+          </a:stretch>
+        </p:blipFill>
+        <p:spPr>
+          <a:xfrm>
+            <a:off x="6246866" y="2285624"/>
+            <a:ext cx="4968671" cy="3124471"/>
+          </a:xfrm>
+          <a:prstGeom prst="rect">
+            <a:avLst/>
+          </a:prstGeom>
+        </p:spPr>
+      </p:pic>
+    </p:spTree>
+    <p:extLst>
+      <p:ext uri="{BB962C8B-B14F-4D97-AF65-F5344CB8AC3E}">
+        <p14:creationId xmlns:p14="http://schemas.microsoft.com/office/powerpoint/2010/main" val="3174765780"/>
       </p:ext>
     </p:extLst>
   </p:cSld>
@@ -31448,6 +33683,301 @@
 </a:theme>
 </file>
 
+<file path=ppt/theme/theme3.xml><?xml version="1.0" encoding="utf-8"?>
+<a:theme xmlns:a="http://schemas.openxmlformats.org/drawingml/2006/main" name="Office Theme">
+  <a:themeElements>
+    <a:clrScheme name="Office">
+      <a:dk1>
+        <a:sysClr val="windowText" lastClr="000000"/>
+      </a:dk1>
+      <a:lt1>
+        <a:sysClr val="window" lastClr="FFFFFF"/>
+      </a:lt1>
+      <a:dk2>
+        <a:srgbClr val="44546A"/>
+      </a:dk2>
+      <a:lt2>
+        <a:srgbClr val="E7E6E6"/>
+      </a:lt2>
+      <a:accent1>
+        <a:srgbClr val="4472C4"/>
+      </a:accent1>
+      <a:accent2>
+        <a:srgbClr val="ED7D31"/>
+      </a:accent2>
+      <a:accent3>
+        <a:srgbClr val="A5A5A5"/>
+      </a:accent3>
+      <a:accent4>
+        <a:srgbClr val="FFC000"/>
+      </a:accent4>
+      <a:accent5>
+        <a:srgbClr val="5B9BD5"/>
+      </a:accent5>
+      <a:accent6>
+        <a:srgbClr val="70AD47"/>
+      </a:accent6>
+      <a:hlink>
+        <a:srgbClr val="0563C1"/>
+      </a:hlink>
+      <a:folHlink>
+        <a:srgbClr val="954F72"/>
+      </a:folHlink>
+    </a:clrScheme>
+    <a:fontScheme name="Office">
+      <a:majorFont>
+        <a:latin typeface="Calibri Light" panose="020F0302020204030204"/>
+        <a:ea typeface=""/>
+        <a:cs typeface=""/>
+        <a:font script="Jpan" typeface="游ゴシック Light"/>
+        <a:font script="Hang" typeface="맑은 고딕"/>
+        <a:font script="Hans" typeface="等线 Light"/>
+        <a:font script="Hant" typeface="新細明體"/>
+        <a:font script="Arab" typeface="Times New Roman"/>
+        <a:font script="Hebr" typeface="Times New Roman"/>
+        <a:font script="Thai" typeface="Angsana New"/>
+        <a:font script="Ethi" typeface="Nyala"/>
+        <a:font script="Beng" typeface="Vrinda"/>
+        <a:font script="Gujr" typeface="Shruti"/>
+        <a:font script="Khmr" typeface="MoolBoran"/>
+        <a:font script="Knda" typeface="Tunga"/>
+        <a:font script="Guru" typeface="Raavi"/>
+        <a:font script="Cans" typeface="Euphemia"/>
+        <a:font script="Cher" typeface="Plantagenet Cherokee"/>
+        <a:font script="Yiii" typeface="Microsoft Yi Baiti"/>
+        <a:font script="Tibt" typeface="Microsoft Himalaya"/>
+        <a:font script="Thaa" typeface="MV Boli"/>
+        <a:font script="Deva" typeface="Mangal"/>
+        <a:font script="Telu" typeface="Gautami"/>
+        <a:font script="Taml" typeface="Latha"/>
+        <a:font script="Syrc" typeface="Estrangelo Edessa"/>
+        <a:font script="Orya" typeface="Kalinga"/>
+        <a:font script="Mlym" typeface="Kartika"/>
+        <a:font script="Laoo" typeface="DokChampa"/>
+        <a:font script="Sinh" typeface="Iskoola Pota"/>
+        <a:font script="Mong" typeface="Mongolian Baiti"/>
+        <a:font script="Viet" typeface="Times New Roman"/>
+        <a:font script="Uigh" typeface="Microsoft Uighur"/>
+        <a:font script="Geor" typeface="Sylfaen"/>
+        <a:font script="Armn" typeface="Arial"/>
+        <a:font script="Bugi" typeface="Leelawadee UI"/>
+        <a:font script="Bopo" typeface="Microsoft JhengHei"/>
+        <a:font script="Java" typeface="Javanese Text"/>
+        <a:font script="Lisu" typeface="Segoe UI"/>
+        <a:font script="Mymr" typeface="Myanmar Text"/>
+        <a:font script="Nkoo" typeface="Ebrima"/>
+        <a:font script="Olck" typeface="Nirmala UI"/>
+        <a:font script="Osma" typeface="Ebrima"/>
+        <a:font script="Phag" typeface="Phagspa"/>
+        <a:font script="Syrn" typeface="Estrangelo Edessa"/>
+        <a:font script="Syrj" typeface="Estrangelo Edessa"/>
+        <a:font script="Syre" typeface="Estrangelo Edessa"/>
+        <a:font script="Sora" typeface="Nirmala UI"/>
+        <a:font script="Tale" typeface="Microsoft Tai Le"/>
+        <a:font script="Talu" typeface="Microsoft New Tai Lue"/>
+        <a:font script="Tfng" typeface="Ebrima"/>
+      </a:majorFont>
+      <a:minorFont>
+        <a:latin typeface="Calibri" panose="020F0502020204030204"/>
+        <a:ea typeface=""/>
+        <a:cs typeface=""/>
+        <a:font script="Jpan" typeface="游ゴシック"/>
+        <a:font script="Hang" typeface="맑은 고딕"/>
+        <a:font script="Hans" typeface="等线"/>
+        <a:font script="Hant" typeface="新細明體"/>
+        <a:font script="Arab" typeface="Arial"/>
+        <a:font script="Hebr" typeface="Arial"/>
+        <a:font script="Thai" typeface="Cordia New"/>
+        <a:font script="Ethi" typeface="Nyala"/>
+        <a:font script="Beng" typeface="Vrinda"/>
+        <a:font script="Gujr" typeface="Shruti"/>
+        <a:font script="Khmr" typeface="DaunPenh"/>
+        <a:font script="Knda" typeface="Tunga"/>
+        <a:font script="Guru" typeface="Raavi"/>
+        <a:font script="Cans" typeface="Euphemia"/>
+        <a:font script="Cher" typeface="Plantagenet Cherokee"/>
+        <a:font script="Yiii" typeface="Microsoft Yi Baiti"/>
+        <a:font script="Tibt" typeface="Microsoft Himalaya"/>
+        <a:font script="Thaa" typeface="MV Boli"/>
+        <a:font script="Deva" typeface="Mangal"/>
+        <a:font script="Telu" typeface="Gautami"/>
+        <a:font script="Taml" typeface="Latha"/>
+        <a:font script="Syrc" typeface="Estrangelo Edessa"/>
+        <a:font script="Orya" typeface="Kalinga"/>
+        <a:font script="Mlym" typeface="Kartika"/>
+        <a:font script="Laoo" typeface="DokChampa"/>
+        <a:font script="Sinh" typeface="Iskoola Pota"/>
+        <a:font script="Mong" typeface="Mongolian Baiti"/>
+        <a:font script="Viet" typeface="Arial"/>
+        <a:font script="Uigh" typeface="Microsoft Uighur"/>
+        <a:font script="Geor" typeface="Sylfaen"/>
+        <a:font script="Armn" typeface="Arial"/>
+        <a:font script="Bugi" typeface="Leelawadee UI"/>
+        <a:font script="Bopo" typeface="Microsoft JhengHei"/>
+        <a:font script="Java" typeface="Javanese Text"/>
+        <a:font script="Lisu" typeface="Segoe UI"/>
+        <a:font script="Mymr" typeface="Myanmar Text"/>
+        <a:font script="Nkoo" typeface="Ebrima"/>
+        <a:font script="Olck" typeface="Nirmala UI"/>
+        <a:font script="Osma" typeface="Ebrima"/>
+        <a:font script="Phag" typeface="Phagspa"/>
+        <a:font script="Syrn" typeface="Estrangelo Edessa"/>
+        <a:font script="Syrj" typeface="Estrangelo Edessa"/>
+        <a:font script="Syre" typeface="Estrangelo Edessa"/>
+        <a:font script="Sora" typeface="Nirmala UI"/>
+        <a:font script="Tale" typeface="Microsoft Tai Le"/>
+        <a:font script="Talu" typeface="Microsoft New Tai Lue"/>
+        <a:font script="Tfng" typeface="Ebrima"/>
+      </a:minorFont>
+    </a:fontScheme>
+    <a:fmtScheme name="Office">
+      <a:fillStyleLst>
+        <a:solidFill>
+          <a:schemeClr val="phClr"/>
+        </a:solidFill>
+        <a:gradFill rotWithShape="1">
+          <a:gsLst>
+            <a:gs pos="0">
+              <a:schemeClr val="phClr">
+                <a:lumMod val="110000"/>
+                <a:satMod val="105000"/>
+                <a:tint val="67000"/>
+              </a:schemeClr>
+            </a:gs>
+            <a:gs pos="50000">
+              <a:schemeClr val="phClr">
+                <a:lumMod val="105000"/>
+                <a:satMod val="103000"/>
+                <a:tint val="73000"/>
+              </a:schemeClr>
+            </a:gs>
+            <a:gs pos="100000">
+              <a:schemeClr val="phClr">
+                <a:lumMod val="105000"/>
+                <a:satMod val="109000"/>
+                <a:tint val="81000"/>
+              </a:schemeClr>
+            </a:gs>
+          </a:gsLst>
+          <a:lin ang="5400000" scaled="0"/>
+        </a:gradFill>
+        <a:gradFill rotWithShape="1">
+          <a:gsLst>
+            <a:gs pos="0">
+              <a:schemeClr val="phClr">
+                <a:satMod val="103000"/>
+                <a:lumMod val="102000"/>
+                <a:tint val="94000"/>
+              </a:schemeClr>
+            </a:gs>
+            <a:gs pos="50000">
+              <a:schemeClr val="phClr">
+                <a:satMod val="110000"/>
+                <a:lumMod val="100000"/>
+                <a:shade val="100000"/>
+              </a:schemeClr>
+            </a:gs>
+            <a:gs pos="100000">
+              <a:schemeClr val="phClr">
+                <a:lumMod val="99000"/>
+                <a:satMod val="120000"/>
+                <a:shade val="78000"/>
+              </a:schemeClr>
+            </a:gs>
+          </a:gsLst>
+          <a:lin ang="5400000" scaled="0"/>
+        </a:gradFill>
+      </a:fillStyleLst>
+      <a:lnStyleLst>
+        <a:ln w="6350" cap="flat" cmpd="sng" algn="ctr">
+          <a:solidFill>
+            <a:schemeClr val="phClr"/>
+          </a:solidFill>
+          <a:prstDash val="solid"/>
+          <a:miter lim="800000"/>
+        </a:ln>
+        <a:ln w="12700" cap="flat" cmpd="sng" algn="ctr">
+          <a:solidFill>
+            <a:schemeClr val="phClr"/>
+          </a:solidFill>
+          <a:prstDash val="solid"/>
+          <a:miter lim="800000"/>
+        </a:ln>
+        <a:ln w="19050" cap="flat" cmpd="sng" algn="ctr">
+          <a:solidFill>
+            <a:schemeClr val="phClr"/>
+          </a:solidFill>
+          <a:prstDash val="solid"/>
+          <a:miter lim="800000"/>
+        </a:ln>
+      </a:lnStyleLst>
+      <a:effectStyleLst>
+        <a:effectStyle>
+          <a:effectLst/>
+        </a:effectStyle>
+        <a:effectStyle>
+          <a:effectLst/>
+        </a:effectStyle>
+        <a:effectStyle>
+          <a:effectLst>
+            <a:outerShdw blurRad="57150" dist="19050" dir="5400000" algn="ctr" rotWithShape="0">
+              <a:srgbClr val="000000">
+                <a:alpha val="63000"/>
+              </a:srgbClr>
+            </a:outerShdw>
+          </a:effectLst>
+        </a:effectStyle>
+      </a:effectStyleLst>
+      <a:bgFillStyleLst>
+        <a:solidFill>
+          <a:schemeClr val="phClr"/>
+        </a:solidFill>
+        <a:solidFill>
+          <a:schemeClr val="phClr">
+            <a:tint val="95000"/>
+            <a:satMod val="170000"/>
+          </a:schemeClr>
+        </a:solidFill>
+        <a:gradFill rotWithShape="1">
+          <a:gsLst>
+            <a:gs pos="0">
+              <a:schemeClr val="phClr">
+                <a:tint val="93000"/>
+                <a:satMod val="150000"/>
+                <a:shade val="98000"/>
+                <a:lumMod val="102000"/>
+              </a:schemeClr>
+            </a:gs>
+            <a:gs pos="50000">
+              <a:schemeClr val="phClr">
+                <a:tint val="98000"/>
+                <a:satMod val="130000"/>
+                <a:shade val="90000"/>
+                <a:lumMod val="103000"/>
+              </a:schemeClr>
+            </a:gs>
+            <a:gs pos="100000">
+              <a:schemeClr val="phClr">
+                <a:shade val="63000"/>
+                <a:satMod val="120000"/>
+              </a:schemeClr>
+            </a:gs>
+          </a:gsLst>
+          <a:lin ang="5400000" scaled="0"/>
+        </a:gradFill>
+      </a:bgFillStyleLst>
+    </a:fmtScheme>
+  </a:themeElements>
+  <a:objectDefaults/>
+  <a:extraClrSchemeLst/>
+  <a:extLst>
+    <a:ext uri="{05A4C25C-085E-4340-85A3-A5531E510DB2}">
+      <thm15:themeFamily xmlns:thm15="http://schemas.microsoft.com/office/thememl/2012/main" name="Office Theme" id="{62F939B6-93AF-4DB8-9C6B-D6C7DFDC589F}" vid="{4A3C46E8-61CC-4603-A589-7422A47A8E4A}"/>
+    </a:ext>
+  </a:extLst>
+</a:theme>
+</file>
+
 <file path=ppt/theme/themeOverride1.xml><?xml version="1.0" encoding="utf-8"?>
 <a:themeOverride xmlns:a="http://schemas.openxmlformats.org/drawingml/2006/main">
   <a:clrScheme name="Green Yellow">
@@ -31535,6 +34065,307 @@
 </file>
 
 <file path=ppt/theme/themeOverride11.xml><?xml version="1.0" encoding="utf-8"?>
+<a:themeOverride xmlns:a="http://schemas.openxmlformats.org/drawingml/2006/main">
+  <a:clrScheme name="Violet II">
+    <a:dk1>
+      <a:sysClr val="windowText" lastClr="000000"/>
+    </a:dk1>
+    <a:lt1>
+      <a:sysClr val="window" lastClr="FFFFFF"/>
+    </a:lt1>
+    <a:dk2>
+      <a:srgbClr val="632E62"/>
+    </a:dk2>
+    <a:lt2>
+      <a:srgbClr val="EAE5EB"/>
+    </a:lt2>
+    <a:accent1>
+      <a:srgbClr val="92278F"/>
+    </a:accent1>
+    <a:accent2>
+      <a:srgbClr val="9B57D3"/>
+    </a:accent2>
+    <a:accent3>
+      <a:srgbClr val="755DD9"/>
+    </a:accent3>
+    <a:accent4>
+      <a:srgbClr val="665EB8"/>
+    </a:accent4>
+    <a:accent5>
+      <a:srgbClr val="45A5ED"/>
+    </a:accent5>
+    <a:accent6>
+      <a:srgbClr val="5982DB"/>
+    </a:accent6>
+    <a:hlink>
+      <a:srgbClr val="0066FF"/>
+    </a:hlink>
+    <a:folHlink>
+      <a:srgbClr val="666699"/>
+    </a:folHlink>
+  </a:clrScheme>
+</a:themeOverride>
+</file>
+
+<file path=ppt/theme/themeOverride12.xml><?xml version="1.0" encoding="utf-8"?>
+<a:themeOverride xmlns:a="http://schemas.openxmlformats.org/drawingml/2006/main">
+  <a:clrScheme name="Violet II">
+    <a:dk1>
+      <a:sysClr val="windowText" lastClr="000000"/>
+    </a:dk1>
+    <a:lt1>
+      <a:sysClr val="window" lastClr="FFFFFF"/>
+    </a:lt1>
+    <a:dk2>
+      <a:srgbClr val="632E62"/>
+    </a:dk2>
+    <a:lt2>
+      <a:srgbClr val="EAE5EB"/>
+    </a:lt2>
+    <a:accent1>
+      <a:srgbClr val="92278F"/>
+    </a:accent1>
+    <a:accent2>
+      <a:srgbClr val="9B57D3"/>
+    </a:accent2>
+    <a:accent3>
+      <a:srgbClr val="755DD9"/>
+    </a:accent3>
+    <a:accent4>
+      <a:srgbClr val="665EB8"/>
+    </a:accent4>
+    <a:accent5>
+      <a:srgbClr val="45A5ED"/>
+    </a:accent5>
+    <a:accent6>
+      <a:srgbClr val="5982DB"/>
+    </a:accent6>
+    <a:hlink>
+      <a:srgbClr val="0066FF"/>
+    </a:hlink>
+    <a:folHlink>
+      <a:srgbClr val="666699"/>
+    </a:folHlink>
+  </a:clrScheme>
+</a:themeOverride>
+</file>
+
+<file path=ppt/theme/themeOverride13.xml><?xml version="1.0" encoding="utf-8"?>
+<a:themeOverride xmlns:a="http://schemas.openxmlformats.org/drawingml/2006/main">
+  <a:clrScheme name="Violet II">
+    <a:dk1>
+      <a:sysClr val="windowText" lastClr="000000"/>
+    </a:dk1>
+    <a:lt1>
+      <a:sysClr val="window" lastClr="FFFFFF"/>
+    </a:lt1>
+    <a:dk2>
+      <a:srgbClr val="632E62"/>
+    </a:dk2>
+    <a:lt2>
+      <a:srgbClr val="EAE5EB"/>
+    </a:lt2>
+    <a:accent1>
+      <a:srgbClr val="92278F"/>
+    </a:accent1>
+    <a:accent2>
+      <a:srgbClr val="9B57D3"/>
+    </a:accent2>
+    <a:accent3>
+      <a:srgbClr val="755DD9"/>
+    </a:accent3>
+    <a:accent4>
+      <a:srgbClr val="665EB8"/>
+    </a:accent4>
+    <a:accent5>
+      <a:srgbClr val="45A5ED"/>
+    </a:accent5>
+    <a:accent6>
+      <a:srgbClr val="5982DB"/>
+    </a:accent6>
+    <a:hlink>
+      <a:srgbClr val="0066FF"/>
+    </a:hlink>
+    <a:folHlink>
+      <a:srgbClr val="666699"/>
+    </a:folHlink>
+  </a:clrScheme>
+</a:themeOverride>
+</file>
+
+<file path=ppt/theme/themeOverride14.xml><?xml version="1.0" encoding="utf-8"?>
+<a:themeOverride xmlns:a="http://schemas.openxmlformats.org/drawingml/2006/main">
+  <a:clrScheme name="Violet II">
+    <a:dk1>
+      <a:sysClr val="windowText" lastClr="000000"/>
+    </a:dk1>
+    <a:lt1>
+      <a:sysClr val="window" lastClr="FFFFFF"/>
+    </a:lt1>
+    <a:dk2>
+      <a:srgbClr val="632E62"/>
+    </a:dk2>
+    <a:lt2>
+      <a:srgbClr val="EAE5EB"/>
+    </a:lt2>
+    <a:accent1>
+      <a:srgbClr val="92278F"/>
+    </a:accent1>
+    <a:accent2>
+      <a:srgbClr val="9B57D3"/>
+    </a:accent2>
+    <a:accent3>
+      <a:srgbClr val="755DD9"/>
+    </a:accent3>
+    <a:accent4>
+      <a:srgbClr val="665EB8"/>
+    </a:accent4>
+    <a:accent5>
+      <a:srgbClr val="45A5ED"/>
+    </a:accent5>
+    <a:accent6>
+      <a:srgbClr val="5982DB"/>
+    </a:accent6>
+    <a:hlink>
+      <a:srgbClr val="0066FF"/>
+    </a:hlink>
+    <a:folHlink>
+      <a:srgbClr val="666699"/>
+    </a:folHlink>
+  </a:clrScheme>
+</a:themeOverride>
+</file>
+
+<file path=ppt/theme/themeOverride15.xml><?xml version="1.0" encoding="utf-8"?>
+<a:themeOverride xmlns:a="http://schemas.openxmlformats.org/drawingml/2006/main">
+  <a:clrScheme name="Violet II">
+    <a:dk1>
+      <a:sysClr val="windowText" lastClr="000000"/>
+    </a:dk1>
+    <a:lt1>
+      <a:sysClr val="window" lastClr="FFFFFF"/>
+    </a:lt1>
+    <a:dk2>
+      <a:srgbClr val="632E62"/>
+    </a:dk2>
+    <a:lt2>
+      <a:srgbClr val="EAE5EB"/>
+    </a:lt2>
+    <a:accent1>
+      <a:srgbClr val="92278F"/>
+    </a:accent1>
+    <a:accent2>
+      <a:srgbClr val="9B57D3"/>
+    </a:accent2>
+    <a:accent3>
+      <a:srgbClr val="755DD9"/>
+    </a:accent3>
+    <a:accent4>
+      <a:srgbClr val="665EB8"/>
+    </a:accent4>
+    <a:accent5>
+      <a:srgbClr val="45A5ED"/>
+    </a:accent5>
+    <a:accent6>
+      <a:srgbClr val="5982DB"/>
+    </a:accent6>
+    <a:hlink>
+      <a:srgbClr val="0066FF"/>
+    </a:hlink>
+    <a:folHlink>
+      <a:srgbClr val="666699"/>
+    </a:folHlink>
+  </a:clrScheme>
+</a:themeOverride>
+</file>
+
+<file path=ppt/theme/themeOverride16.xml><?xml version="1.0" encoding="utf-8"?>
+<a:themeOverride xmlns:a="http://schemas.openxmlformats.org/drawingml/2006/main">
+  <a:clrScheme name="Violet II">
+    <a:dk1>
+      <a:sysClr val="windowText" lastClr="000000"/>
+    </a:dk1>
+    <a:lt1>
+      <a:sysClr val="window" lastClr="FFFFFF"/>
+    </a:lt1>
+    <a:dk2>
+      <a:srgbClr val="632E62"/>
+    </a:dk2>
+    <a:lt2>
+      <a:srgbClr val="EAE5EB"/>
+    </a:lt2>
+    <a:accent1>
+      <a:srgbClr val="92278F"/>
+    </a:accent1>
+    <a:accent2>
+      <a:srgbClr val="9B57D3"/>
+    </a:accent2>
+    <a:accent3>
+      <a:srgbClr val="755DD9"/>
+    </a:accent3>
+    <a:accent4>
+      <a:srgbClr val="665EB8"/>
+    </a:accent4>
+    <a:accent5>
+      <a:srgbClr val="45A5ED"/>
+    </a:accent5>
+    <a:accent6>
+      <a:srgbClr val="5982DB"/>
+    </a:accent6>
+    <a:hlink>
+      <a:srgbClr val="0066FF"/>
+    </a:hlink>
+    <a:folHlink>
+      <a:srgbClr val="666699"/>
+    </a:folHlink>
+  </a:clrScheme>
+</a:themeOverride>
+</file>
+
+<file path=ppt/theme/themeOverride17.xml><?xml version="1.0" encoding="utf-8"?>
+<a:themeOverride xmlns:a="http://schemas.openxmlformats.org/drawingml/2006/main">
+  <a:clrScheme name="Violet II">
+    <a:dk1>
+      <a:sysClr val="windowText" lastClr="000000"/>
+    </a:dk1>
+    <a:lt1>
+      <a:sysClr val="window" lastClr="FFFFFF"/>
+    </a:lt1>
+    <a:dk2>
+      <a:srgbClr val="632E62"/>
+    </a:dk2>
+    <a:lt2>
+      <a:srgbClr val="EAE5EB"/>
+    </a:lt2>
+    <a:accent1>
+      <a:srgbClr val="92278F"/>
+    </a:accent1>
+    <a:accent2>
+      <a:srgbClr val="9B57D3"/>
+    </a:accent2>
+    <a:accent3>
+      <a:srgbClr val="755DD9"/>
+    </a:accent3>
+    <a:accent4>
+      <a:srgbClr val="665EB8"/>
+    </a:accent4>
+    <a:accent5>
+      <a:srgbClr val="45A5ED"/>
+    </a:accent5>
+    <a:accent6>
+      <a:srgbClr val="5982DB"/>
+    </a:accent6>
+    <a:hlink>
+      <a:srgbClr val="0066FF"/>
+    </a:hlink>
+    <a:folHlink>
+      <a:srgbClr val="666699"/>
+    </a:folHlink>
+  </a:clrScheme>
+</a:themeOverride>
+</file>
+
+<file path=ppt/theme/themeOverride18.xml><?xml version="1.0" encoding="utf-8"?>
 <a:themeOverride xmlns:a="http://schemas.openxmlformats.org/drawingml/2006/main">
   <a:clrScheme name="Violet II">
     <a:dk1>

</xml_diff>

<commit_message>
added a slide to the previous section
</commit_message>
<xml_diff>
--- a/TLS.pptx
+++ b/TLS.pptx
@@ -6,7 +6,7 @@
     <p:sldMasterId id="2147483750" r:id="rId2"/>
   </p:sldMasterIdLst>
   <p:notesMasterIdLst>
-    <p:notesMasterId r:id="rId40"/>
+    <p:notesMasterId r:id="rId41"/>
   </p:notesMasterIdLst>
   <p:sldIdLst>
     <p:sldId id="256" r:id="rId3"/>
@@ -46,6 +46,7 @@
     <p:sldId id="290" r:id="rId37"/>
     <p:sldId id="291" r:id="rId38"/>
     <p:sldId id="292" r:id="rId39"/>
+    <p:sldId id="293" r:id="rId40"/>
   </p:sldIdLst>
   <p:sldSz cx="12192000" cy="6858000"/>
   <p:notesSz cx="6858000" cy="9144000"/>
@@ -198,6 +199,7 @@
             <p14:sldId id="290"/>
             <p14:sldId id="291"/>
             <p14:sldId id="292"/>
+            <p14:sldId id="293"/>
           </p14:sldIdLst>
         </p14:section>
       </p14:sectionLst>
@@ -783,7 +785,7 @@
           <a:noFill/>
           <a:extLst>
             <a:ext uri="{909E8E84-426E-40dd-AFC4-6F175D3DCCD1}">
-              <a14:hiddenFill xmlns="" xmlns:a14="http://schemas.microsoft.com/office/drawing/2010/main">
+              <a14:hiddenFill xmlns:a14="http://schemas.microsoft.com/office/drawing/2010/main" xmlns="">
                 <a:solidFill>
                   <a:srgbClr val="FFFFFF"/>
                 </a:solidFill>
@@ -842,7 +844,7 @@
             </a:ln>
             <a:extLst>
               <a:ext uri="{91240B29-F687-4f45-9708-019B960494DF}">
-                <a14:hiddenLine xmlns="" xmlns:a14="http://schemas.microsoft.com/office/drawing/2010/main" w="9525">
+                <a14:hiddenLine xmlns:a14="http://schemas.microsoft.com/office/drawing/2010/main" xmlns="" w="9525">
                   <a:solidFill>
                     <a:srgbClr val="000000"/>
                   </a:solidFill>
@@ -932,7 +934,7 @@
             </a:ln>
             <a:extLst>
               <a:ext uri="{91240B29-F687-4f45-9708-019B960494DF}">
-                <a14:hiddenLine xmlns="" xmlns:a14="http://schemas.microsoft.com/office/drawing/2010/main" w="9525">
+                <a14:hiddenLine xmlns:a14="http://schemas.microsoft.com/office/drawing/2010/main" xmlns="" w="9525">
                   <a:solidFill>
                     <a:srgbClr val="000000"/>
                   </a:solidFill>
@@ -1022,7 +1024,7 @@
             </a:ln>
             <a:extLst>
               <a:ext uri="{91240B29-F687-4f45-9708-019B960494DF}">
-                <a14:hiddenLine xmlns="" xmlns:a14="http://schemas.microsoft.com/office/drawing/2010/main" w="9525">
+                <a14:hiddenLine xmlns:a14="http://schemas.microsoft.com/office/drawing/2010/main" xmlns="" w="9525">
                   <a:solidFill>
                     <a:srgbClr val="000000"/>
                   </a:solidFill>
@@ -1056,7 +1058,7 @@
             </a:ln>
             <a:extLst>
               <a:ext uri="{91240B29-F687-4f45-9708-019B960494DF}">
-                <a14:hiddenLine xmlns="" xmlns:a14="http://schemas.microsoft.com/office/drawing/2010/main" w="9525">
+                <a14:hiddenLine xmlns:a14="http://schemas.microsoft.com/office/drawing/2010/main" xmlns="" w="9525">
                   <a:solidFill>
                     <a:srgbClr val="000000"/>
                   </a:solidFill>
@@ -1146,7 +1148,7 @@
             </a:ln>
             <a:extLst>
               <a:ext uri="{91240B29-F687-4f45-9708-019B960494DF}">
-                <a14:hiddenLine xmlns="" xmlns:a14="http://schemas.microsoft.com/office/drawing/2010/main" w="9525">
+                <a14:hiddenLine xmlns:a14="http://schemas.microsoft.com/office/drawing/2010/main" xmlns="" w="9525">
                   <a:solidFill>
                     <a:srgbClr val="000000"/>
                   </a:solidFill>
@@ -1208,7 +1210,7 @@
             </a:ln>
             <a:extLst>
               <a:ext uri="{91240B29-F687-4f45-9708-019B960494DF}">
-                <a14:hiddenLine xmlns="" xmlns:a14="http://schemas.microsoft.com/office/drawing/2010/main" w="9525">
+                <a14:hiddenLine xmlns:a14="http://schemas.microsoft.com/office/drawing/2010/main" xmlns="" w="9525">
                   <a:solidFill>
                     <a:srgbClr val="000000"/>
                   </a:solidFill>
@@ -1270,7 +1272,7 @@
             </a:ln>
             <a:extLst>
               <a:ext uri="{91240B29-F687-4f45-9708-019B960494DF}">
-                <a14:hiddenLine xmlns="" xmlns:a14="http://schemas.microsoft.com/office/drawing/2010/main" w="9525">
+                <a14:hiddenLine xmlns:a14="http://schemas.microsoft.com/office/drawing/2010/main" xmlns="" w="9525">
                   <a:solidFill>
                     <a:srgbClr val="000000"/>
                   </a:solidFill>
@@ -1360,7 +1362,7 @@
             </a:ln>
             <a:extLst>
               <a:ext uri="{91240B29-F687-4f45-9708-019B960494DF}">
-                <a14:hiddenLine xmlns="" xmlns:a14="http://schemas.microsoft.com/office/drawing/2010/main" w="9525">
+                <a14:hiddenLine xmlns:a14="http://schemas.microsoft.com/office/drawing/2010/main" xmlns="" w="9525">
                   <a:solidFill>
                     <a:srgbClr val="000000"/>
                   </a:solidFill>
@@ -1422,7 +1424,7 @@
             </a:ln>
             <a:extLst>
               <a:ext uri="{91240B29-F687-4f45-9708-019B960494DF}">
-                <a14:hiddenLine xmlns="" xmlns:a14="http://schemas.microsoft.com/office/drawing/2010/main" w="9525">
+                <a14:hiddenLine xmlns:a14="http://schemas.microsoft.com/office/drawing/2010/main" xmlns="" w="9525">
                   <a:solidFill>
                     <a:srgbClr val="000000"/>
                   </a:solidFill>
@@ -1484,7 +1486,7 @@
             </a:ln>
             <a:extLst>
               <a:ext uri="{91240B29-F687-4f45-9708-019B960494DF}">
-                <a14:hiddenLine xmlns="" xmlns:a14="http://schemas.microsoft.com/office/drawing/2010/main" w="9525">
+                <a14:hiddenLine xmlns:a14="http://schemas.microsoft.com/office/drawing/2010/main" xmlns="" w="9525">
                   <a:solidFill>
                     <a:srgbClr val="000000"/>
                   </a:solidFill>
@@ -1574,7 +1576,7 @@
             </a:ln>
             <a:extLst>
               <a:ext uri="{91240B29-F687-4f45-9708-019B960494DF}">
-                <a14:hiddenLine xmlns="" xmlns:a14="http://schemas.microsoft.com/office/drawing/2010/main" w="9525">
+                <a14:hiddenLine xmlns:a14="http://schemas.microsoft.com/office/drawing/2010/main" xmlns="" w="9525">
                   <a:solidFill>
                     <a:srgbClr val="000000"/>
                   </a:solidFill>
@@ -1664,7 +1666,7 @@
             </a:ln>
             <a:extLst>
               <a:ext uri="{91240B29-F687-4f45-9708-019B960494DF}">
-                <a14:hiddenLine xmlns="" xmlns:a14="http://schemas.microsoft.com/office/drawing/2010/main" w="9525">
+                <a14:hiddenLine xmlns:a14="http://schemas.microsoft.com/office/drawing/2010/main" xmlns="" w="9525">
                   <a:solidFill>
                     <a:srgbClr val="000000"/>
                   </a:solidFill>
@@ -1726,7 +1728,7 @@
             </a:ln>
             <a:extLst>
               <a:ext uri="{91240B29-F687-4f45-9708-019B960494DF}">
-                <a14:hiddenLine xmlns="" xmlns:a14="http://schemas.microsoft.com/office/drawing/2010/main" w="9525">
+                <a14:hiddenLine xmlns:a14="http://schemas.microsoft.com/office/drawing/2010/main" xmlns="" w="9525">
                   <a:solidFill>
                     <a:srgbClr val="000000"/>
                   </a:solidFill>
@@ -1836,7 +1838,7 @@
             </a:ln>
             <a:extLst>
               <a:ext uri="{91240B29-F687-4f45-9708-019B960494DF}">
-                <a14:hiddenLine xmlns="" xmlns:a14="http://schemas.microsoft.com/office/drawing/2010/main" w="9525">
+                <a14:hiddenLine xmlns:a14="http://schemas.microsoft.com/office/drawing/2010/main" xmlns="" w="9525">
                   <a:solidFill>
                     <a:srgbClr val="000000"/>
                   </a:solidFill>
@@ -1898,7 +1900,7 @@
             </a:ln>
             <a:extLst>
               <a:ext uri="{91240B29-F687-4f45-9708-019B960494DF}">
-                <a14:hiddenLine xmlns="" xmlns:a14="http://schemas.microsoft.com/office/drawing/2010/main" w="9525">
+                <a14:hiddenLine xmlns:a14="http://schemas.microsoft.com/office/drawing/2010/main" xmlns="" w="9525">
                   <a:solidFill>
                     <a:srgbClr val="000000"/>
                   </a:solidFill>
@@ -1988,7 +1990,7 @@
             </a:ln>
             <a:extLst>
               <a:ext uri="{91240B29-F687-4f45-9708-019B960494DF}">
-                <a14:hiddenLine xmlns="" xmlns:a14="http://schemas.microsoft.com/office/drawing/2010/main" w="9525">
+                <a14:hiddenLine xmlns:a14="http://schemas.microsoft.com/office/drawing/2010/main" xmlns="" w="9525">
                   <a:solidFill>
                     <a:srgbClr val="000000"/>
                   </a:solidFill>
@@ -2078,7 +2080,7 @@
             </a:ln>
             <a:extLst>
               <a:ext uri="{91240B29-F687-4f45-9708-019B960494DF}">
-                <a14:hiddenLine xmlns="" xmlns:a14="http://schemas.microsoft.com/office/drawing/2010/main" w="9525">
+                <a14:hiddenLine xmlns:a14="http://schemas.microsoft.com/office/drawing/2010/main" xmlns="" w="9525">
                   <a:solidFill>
                     <a:srgbClr val="000000"/>
                   </a:solidFill>
@@ -2140,7 +2142,7 @@
             </a:ln>
             <a:extLst>
               <a:ext uri="{91240B29-F687-4f45-9708-019B960494DF}">
-                <a14:hiddenLine xmlns="" xmlns:a14="http://schemas.microsoft.com/office/drawing/2010/main" w="9525">
+                <a14:hiddenLine xmlns:a14="http://schemas.microsoft.com/office/drawing/2010/main" xmlns="" w="9525">
                   <a:solidFill>
                     <a:srgbClr val="000000"/>
                   </a:solidFill>
@@ -2230,7 +2232,7 @@
             </a:ln>
             <a:extLst>
               <a:ext uri="{91240B29-F687-4f45-9708-019B960494DF}">
-                <a14:hiddenLine xmlns="" xmlns:a14="http://schemas.microsoft.com/office/drawing/2010/main" w="9525">
+                <a14:hiddenLine xmlns:a14="http://schemas.microsoft.com/office/drawing/2010/main" xmlns="" w="9525">
                   <a:solidFill>
                     <a:srgbClr val="000000"/>
                   </a:solidFill>
@@ -2320,7 +2322,7 @@
             </a:ln>
             <a:extLst>
               <a:ext uri="{91240B29-F687-4f45-9708-019B960494DF}">
-                <a14:hiddenLine xmlns="" xmlns:a14="http://schemas.microsoft.com/office/drawing/2010/main" w="9525">
+                <a14:hiddenLine xmlns:a14="http://schemas.microsoft.com/office/drawing/2010/main" xmlns="" w="9525">
                   <a:solidFill>
                     <a:srgbClr val="000000"/>
                   </a:solidFill>
@@ -2376,7 +2378,7 @@
             </a:ln>
             <a:extLst>
               <a:ext uri="{91240B29-F687-4f45-9708-019B960494DF}">
-                <a14:hiddenLine xmlns="" xmlns:a14="http://schemas.microsoft.com/office/drawing/2010/main" w="9525">
+                <a14:hiddenLine xmlns:a14="http://schemas.microsoft.com/office/drawing/2010/main" xmlns="" w="9525">
                   <a:solidFill>
                     <a:srgbClr val="000000"/>
                   </a:solidFill>
@@ -2466,7 +2468,7 @@
             </a:ln>
             <a:extLst>
               <a:ext uri="{91240B29-F687-4f45-9708-019B960494DF}">
-                <a14:hiddenLine xmlns="" xmlns:a14="http://schemas.microsoft.com/office/drawing/2010/main" w="9525">
+                <a14:hiddenLine xmlns:a14="http://schemas.microsoft.com/office/drawing/2010/main" xmlns="" w="9525">
                   <a:solidFill>
                     <a:srgbClr val="000000"/>
                   </a:solidFill>
@@ -2522,7 +2524,7 @@
             </a:ln>
             <a:extLst>
               <a:ext uri="{91240B29-F687-4f45-9708-019B960494DF}">
-                <a14:hiddenLine xmlns="" xmlns:a14="http://schemas.microsoft.com/office/drawing/2010/main" w="9525">
+                <a14:hiddenLine xmlns:a14="http://schemas.microsoft.com/office/drawing/2010/main" xmlns="" w="9525">
                   <a:solidFill>
                     <a:srgbClr val="000000"/>
                   </a:solidFill>
@@ -2612,7 +2614,7 @@
             </a:ln>
             <a:extLst>
               <a:ext uri="{91240B29-F687-4f45-9708-019B960494DF}">
-                <a14:hiddenLine xmlns="" xmlns:a14="http://schemas.microsoft.com/office/drawing/2010/main" w="9525">
+                <a14:hiddenLine xmlns:a14="http://schemas.microsoft.com/office/drawing/2010/main" xmlns="" w="9525">
                   <a:solidFill>
                     <a:srgbClr val="000000"/>
                   </a:solidFill>
@@ -2680,7 +2682,7 @@
             </a:ln>
             <a:extLst>
               <a:ext uri="{91240B29-F687-4f45-9708-019B960494DF}">
-                <a14:hiddenLine xmlns="" xmlns:a14="http://schemas.microsoft.com/office/drawing/2010/main" w="9525">
+                <a14:hiddenLine xmlns:a14="http://schemas.microsoft.com/office/drawing/2010/main" xmlns="" w="9525">
                   <a:solidFill>
                     <a:srgbClr val="000000"/>
                   </a:solidFill>
@@ -2770,7 +2772,7 @@
             </a:ln>
             <a:extLst>
               <a:ext uri="{91240B29-F687-4f45-9708-019B960494DF}">
-                <a14:hiddenLine xmlns="" xmlns:a14="http://schemas.microsoft.com/office/drawing/2010/main" w="9525">
+                <a14:hiddenLine xmlns:a14="http://schemas.microsoft.com/office/drawing/2010/main" xmlns="" w="9525">
                   <a:solidFill>
                     <a:srgbClr val="000000"/>
                   </a:solidFill>
@@ -2838,7 +2840,7 @@
             </a:ln>
             <a:extLst>
               <a:ext uri="{91240B29-F687-4f45-9708-019B960494DF}">
-                <a14:hiddenLine xmlns="" xmlns:a14="http://schemas.microsoft.com/office/drawing/2010/main" w="9525">
+                <a14:hiddenLine xmlns:a14="http://schemas.microsoft.com/office/drawing/2010/main" xmlns="" w="9525">
                   <a:solidFill>
                     <a:srgbClr val="000000"/>
                   </a:solidFill>
@@ -2928,7 +2930,7 @@
             </a:ln>
             <a:extLst>
               <a:ext uri="{91240B29-F687-4f45-9708-019B960494DF}">
-                <a14:hiddenLine xmlns="" xmlns:a14="http://schemas.microsoft.com/office/drawing/2010/main" w="9525">
+                <a14:hiddenLine xmlns:a14="http://schemas.microsoft.com/office/drawing/2010/main" xmlns="" w="9525">
                   <a:solidFill>
                     <a:srgbClr val="000000"/>
                   </a:solidFill>
@@ -2962,7 +2964,7 @@
             </a:ln>
             <a:extLst>
               <a:ext uri="{91240B29-F687-4f45-9708-019B960494DF}">
-                <a14:hiddenLine xmlns="" xmlns:a14="http://schemas.microsoft.com/office/drawing/2010/main" w="9525">
+                <a14:hiddenLine xmlns:a14="http://schemas.microsoft.com/office/drawing/2010/main" xmlns="" w="9525">
                   <a:solidFill>
                     <a:srgbClr val="000000"/>
                   </a:solidFill>
@@ -3052,7 +3054,7 @@
             </a:ln>
             <a:extLst>
               <a:ext uri="{91240B29-F687-4f45-9708-019B960494DF}">
-                <a14:hiddenLine xmlns="" xmlns:a14="http://schemas.microsoft.com/office/drawing/2010/main" w="9525">
+                <a14:hiddenLine xmlns:a14="http://schemas.microsoft.com/office/drawing/2010/main" xmlns="" w="9525">
                   <a:solidFill>
                     <a:srgbClr val="000000"/>
                   </a:solidFill>
@@ -3114,7 +3116,7 @@
             </a:ln>
             <a:extLst>
               <a:ext uri="{91240B29-F687-4f45-9708-019B960494DF}">
-                <a14:hiddenLine xmlns="" xmlns:a14="http://schemas.microsoft.com/office/drawing/2010/main" w="9525">
+                <a14:hiddenLine xmlns:a14="http://schemas.microsoft.com/office/drawing/2010/main" xmlns="" w="9525">
                   <a:solidFill>
                     <a:srgbClr val="000000"/>
                   </a:solidFill>
@@ -3176,7 +3178,7 @@
             </a:ln>
             <a:extLst>
               <a:ext uri="{91240B29-F687-4f45-9708-019B960494DF}">
-                <a14:hiddenLine xmlns="" xmlns:a14="http://schemas.microsoft.com/office/drawing/2010/main" w="9525">
+                <a14:hiddenLine xmlns:a14="http://schemas.microsoft.com/office/drawing/2010/main" xmlns="" w="9525">
                   <a:solidFill>
                     <a:srgbClr val="000000"/>
                   </a:solidFill>
@@ -3266,7 +3268,7 @@
             </a:ln>
             <a:extLst>
               <a:ext uri="{91240B29-F687-4f45-9708-019B960494DF}">
-                <a14:hiddenLine xmlns="" xmlns:a14="http://schemas.microsoft.com/office/drawing/2010/main" w="9525">
+                <a14:hiddenLine xmlns:a14="http://schemas.microsoft.com/office/drawing/2010/main" xmlns="" w="9525">
                   <a:solidFill>
                     <a:srgbClr val="000000"/>
                   </a:solidFill>
@@ -3334,7 +3336,7 @@
             </a:ln>
             <a:extLst>
               <a:ext uri="{91240B29-F687-4f45-9708-019B960494DF}">
-                <a14:hiddenLine xmlns="" xmlns:a14="http://schemas.microsoft.com/office/drawing/2010/main" w="9525">
+                <a14:hiddenLine xmlns:a14="http://schemas.microsoft.com/office/drawing/2010/main" xmlns="" w="9525">
                   <a:solidFill>
                     <a:srgbClr val="000000"/>
                   </a:solidFill>
@@ -3396,7 +3398,7 @@
             </a:ln>
             <a:extLst>
               <a:ext uri="{91240B29-F687-4f45-9708-019B960494DF}">
-                <a14:hiddenLine xmlns="" xmlns:a14="http://schemas.microsoft.com/office/drawing/2010/main" w="9525">
+                <a14:hiddenLine xmlns:a14="http://schemas.microsoft.com/office/drawing/2010/main" xmlns="" w="9525">
                   <a:solidFill>
                     <a:srgbClr val="000000"/>
                   </a:solidFill>
@@ -3486,7 +3488,7 @@
             </a:ln>
             <a:extLst>
               <a:ext uri="{91240B29-F687-4f45-9708-019B960494DF}">
-                <a14:hiddenLine xmlns="" xmlns:a14="http://schemas.microsoft.com/office/drawing/2010/main" w="9525">
+                <a14:hiddenLine xmlns:a14="http://schemas.microsoft.com/office/drawing/2010/main" xmlns="" w="9525">
                   <a:solidFill>
                     <a:srgbClr val="000000"/>
                   </a:solidFill>
@@ -3548,7 +3550,7 @@
             </a:ln>
             <a:extLst>
               <a:ext uri="{91240B29-F687-4f45-9708-019B960494DF}">
-                <a14:hiddenLine xmlns="" xmlns:a14="http://schemas.microsoft.com/office/drawing/2010/main" w="9525">
+                <a14:hiddenLine xmlns:a14="http://schemas.microsoft.com/office/drawing/2010/main" xmlns="" w="9525">
                   <a:solidFill>
                     <a:srgbClr val="000000"/>
                   </a:solidFill>
@@ -3638,7 +3640,7 @@
             </a:ln>
             <a:extLst>
               <a:ext uri="{91240B29-F687-4f45-9708-019B960494DF}">
-                <a14:hiddenLine xmlns="" xmlns:a14="http://schemas.microsoft.com/office/drawing/2010/main" w="9525">
+                <a14:hiddenLine xmlns:a14="http://schemas.microsoft.com/office/drawing/2010/main" xmlns="" w="9525">
                   <a:solidFill>
                     <a:srgbClr val="000000"/>
                   </a:solidFill>
@@ -3700,7 +3702,7 @@
             </a:ln>
             <a:extLst>
               <a:ext uri="{91240B29-F687-4f45-9708-019B960494DF}">
-                <a14:hiddenLine xmlns="" xmlns:a14="http://schemas.microsoft.com/office/drawing/2010/main" w="9525">
+                <a14:hiddenLine xmlns:a14="http://schemas.microsoft.com/office/drawing/2010/main" xmlns="" w="9525">
                   <a:solidFill>
                     <a:srgbClr val="000000"/>
                   </a:solidFill>
@@ -3790,7 +3792,7 @@
             </a:ln>
             <a:extLst>
               <a:ext uri="{91240B29-F687-4f45-9708-019B960494DF}">
-                <a14:hiddenLine xmlns="" xmlns:a14="http://schemas.microsoft.com/office/drawing/2010/main" w="9525">
+                <a14:hiddenLine xmlns:a14="http://schemas.microsoft.com/office/drawing/2010/main" xmlns="" w="9525">
                   <a:solidFill>
                     <a:srgbClr val="000000"/>
                   </a:solidFill>
@@ -3824,7 +3826,7 @@
             </a:ln>
             <a:extLst>
               <a:ext uri="{91240B29-F687-4f45-9708-019B960494DF}">
-                <a14:hiddenLine xmlns="" xmlns:a14="http://schemas.microsoft.com/office/drawing/2010/main" w="9525">
+                <a14:hiddenLine xmlns:a14="http://schemas.microsoft.com/office/drawing/2010/main" xmlns="" w="9525">
                   <a:solidFill>
                     <a:srgbClr val="000000"/>
                   </a:solidFill>
@@ -3889,7 +3891,7 @@
             </a:ln>
             <a:extLst>
               <a:ext uri="{91240B29-F687-4f45-9708-019B960494DF}">
-                <a14:hiddenLine xmlns="" xmlns:a14="http://schemas.microsoft.com/office/drawing/2010/main" w="9525">
+                <a14:hiddenLine xmlns:a14="http://schemas.microsoft.com/office/drawing/2010/main" xmlns="" w="9525">
                   <a:solidFill>
                     <a:srgbClr val="000000"/>
                   </a:solidFill>
@@ -3979,7 +3981,7 @@
             </a:ln>
             <a:extLst>
               <a:ext uri="{91240B29-F687-4f45-9708-019B960494DF}">
-                <a14:hiddenLine xmlns="" xmlns:a14="http://schemas.microsoft.com/office/drawing/2010/main" w="9525">
+                <a14:hiddenLine xmlns:a14="http://schemas.microsoft.com/office/drawing/2010/main" xmlns="" w="9525">
                   <a:solidFill>
                     <a:srgbClr val="000000"/>
                   </a:solidFill>
@@ -4041,7 +4043,7 @@
             </a:ln>
             <a:extLst>
               <a:ext uri="{91240B29-F687-4f45-9708-019B960494DF}">
-                <a14:hiddenLine xmlns="" xmlns:a14="http://schemas.microsoft.com/office/drawing/2010/main" w="9525">
+                <a14:hiddenLine xmlns:a14="http://schemas.microsoft.com/office/drawing/2010/main" xmlns="" w="9525">
                   <a:solidFill>
                     <a:srgbClr val="000000"/>
                   </a:solidFill>
@@ -4131,7 +4133,7 @@
             </a:ln>
             <a:extLst>
               <a:ext uri="{91240B29-F687-4f45-9708-019B960494DF}">
-                <a14:hiddenLine xmlns="" xmlns:a14="http://schemas.microsoft.com/office/drawing/2010/main" w="9525">
+                <a14:hiddenLine xmlns:a14="http://schemas.microsoft.com/office/drawing/2010/main" xmlns="" w="9525">
                   <a:solidFill>
                     <a:srgbClr val="000000"/>
                   </a:solidFill>
@@ -4221,7 +4223,7 @@
             </a:ln>
             <a:extLst>
               <a:ext uri="{91240B29-F687-4f45-9708-019B960494DF}">
-                <a14:hiddenLine xmlns="" xmlns:a14="http://schemas.microsoft.com/office/drawing/2010/main" w="9525">
+                <a14:hiddenLine xmlns:a14="http://schemas.microsoft.com/office/drawing/2010/main" xmlns="" w="9525">
                   <a:solidFill>
                     <a:srgbClr val="000000"/>
                   </a:solidFill>
@@ -4286,7 +4288,7 @@
             </a:ln>
             <a:extLst>
               <a:ext uri="{91240B29-F687-4f45-9708-019B960494DF}">
-                <a14:hiddenLine xmlns="" xmlns:a14="http://schemas.microsoft.com/office/drawing/2010/main" w="9525">
+                <a14:hiddenLine xmlns:a14="http://schemas.microsoft.com/office/drawing/2010/main" xmlns="" w="9525">
                   <a:solidFill>
                     <a:srgbClr val="000000"/>
                   </a:solidFill>
@@ -4348,7 +4350,7 @@
             </a:ln>
             <a:extLst>
               <a:ext uri="{91240B29-F687-4f45-9708-019B960494DF}">
-                <a14:hiddenLine xmlns="" xmlns:a14="http://schemas.microsoft.com/office/drawing/2010/main" w="9525">
+                <a14:hiddenLine xmlns:a14="http://schemas.microsoft.com/office/drawing/2010/main" xmlns="" w="9525">
                   <a:solidFill>
                     <a:srgbClr val="000000"/>
                   </a:solidFill>
@@ -4438,7 +4440,7 @@
             </a:ln>
             <a:extLst>
               <a:ext uri="{91240B29-F687-4f45-9708-019B960494DF}">
-                <a14:hiddenLine xmlns="" xmlns:a14="http://schemas.microsoft.com/office/drawing/2010/main" w="9525">
+                <a14:hiddenLine xmlns:a14="http://schemas.microsoft.com/office/drawing/2010/main" xmlns="" w="9525">
                   <a:solidFill>
                     <a:srgbClr val="000000"/>
                   </a:solidFill>
@@ -4528,7 +4530,7 @@
             </a:ln>
             <a:extLst>
               <a:ext uri="{91240B29-F687-4f45-9708-019B960494DF}">
-                <a14:hiddenLine xmlns="" xmlns:a14="http://schemas.microsoft.com/office/drawing/2010/main" w="9525">
+                <a14:hiddenLine xmlns:a14="http://schemas.microsoft.com/office/drawing/2010/main" xmlns="" w="9525">
                   <a:solidFill>
                     <a:srgbClr val="000000"/>
                   </a:solidFill>
@@ -4590,7 +4592,7 @@
             </a:ln>
             <a:extLst>
               <a:ext uri="{91240B29-F687-4f45-9708-019B960494DF}">
-                <a14:hiddenLine xmlns="" xmlns:a14="http://schemas.microsoft.com/office/drawing/2010/main" w="9525">
+                <a14:hiddenLine xmlns:a14="http://schemas.microsoft.com/office/drawing/2010/main" xmlns="" w="9525">
                   <a:solidFill>
                     <a:srgbClr val="000000"/>
                   </a:solidFill>
@@ -4710,7 +4712,7 @@
             </a:ln>
             <a:extLst>
               <a:ext uri="{91240B29-F687-4f45-9708-019B960494DF}">
-                <a14:hiddenLine xmlns="" xmlns:a14="http://schemas.microsoft.com/office/drawing/2010/main" w="9525">
+                <a14:hiddenLine xmlns:a14="http://schemas.microsoft.com/office/drawing/2010/main" xmlns="" w="9525">
                   <a:solidFill>
                     <a:srgbClr val="000000"/>
                   </a:solidFill>
@@ -4778,7 +4780,7 @@
             </a:ln>
             <a:extLst>
               <a:ext uri="{91240B29-F687-4f45-9708-019B960494DF}">
-                <a14:hiddenLine xmlns="" xmlns:a14="http://schemas.microsoft.com/office/drawing/2010/main" w="9525">
+                <a14:hiddenLine xmlns:a14="http://schemas.microsoft.com/office/drawing/2010/main" xmlns="" w="9525">
                   <a:solidFill>
                     <a:srgbClr val="000000"/>
                   </a:solidFill>
@@ -4868,7 +4870,7 @@
             </a:ln>
             <a:extLst>
               <a:ext uri="{91240B29-F687-4f45-9708-019B960494DF}">
-                <a14:hiddenLine xmlns="" xmlns:a14="http://schemas.microsoft.com/office/drawing/2010/main" w="9525">
+                <a14:hiddenLine xmlns:a14="http://schemas.microsoft.com/office/drawing/2010/main" xmlns="" w="9525">
                   <a:solidFill>
                     <a:srgbClr val="000000"/>
                   </a:solidFill>
@@ -5008,7 +5010,7 @@
           <a:p>
             <a:fld id="{4559D4BB-A0F9-4B27-80E6-E5E59F9288D1}" type="datetimeFigureOut">
               <a:rPr lang="en-US" smtClean="0"/>
-              <a:t>2/15/2026</a:t>
+              <a:t>2/16/2026</a:t>
             </a:fld>
             <a:endParaRPr lang="en-US"/>
           </a:p>
@@ -5275,7 +5277,7 @@
           <a:p>
             <a:fld id="{4559D4BB-A0F9-4B27-80E6-E5E59F9288D1}" type="datetimeFigureOut">
               <a:rPr lang="en-US" smtClean="0"/>
-              <a:t>2/15/2026</a:t>
+              <a:t>2/16/2026</a:t>
             </a:fld>
             <a:endParaRPr lang="en-US"/>
           </a:p>
@@ -5471,7 +5473,7 @@
           <a:p>
             <a:fld id="{4559D4BB-A0F9-4B27-80E6-E5E59F9288D1}" type="datetimeFigureOut">
               <a:rPr lang="en-US" smtClean="0"/>
-              <a:t>2/15/2026</a:t>
+              <a:t>2/16/2026</a:t>
             </a:fld>
             <a:endParaRPr lang="en-US"/>
           </a:p>
@@ -5734,7 +5736,7 @@
           <a:p>
             <a:fld id="{4559D4BB-A0F9-4B27-80E6-E5E59F9288D1}" type="datetimeFigureOut">
               <a:rPr lang="en-US" smtClean="0"/>
-              <a:t>2/15/2026</a:t>
+              <a:t>2/16/2026</a:t>
             </a:fld>
             <a:endParaRPr lang="en-US"/>
           </a:p>
@@ -6168,7 +6170,7 @@
           <a:p>
             <a:fld id="{4559D4BB-A0F9-4B27-80E6-E5E59F9288D1}" type="datetimeFigureOut">
               <a:rPr lang="en-US" smtClean="0"/>
-              <a:t>2/15/2026</a:t>
+              <a:t>2/16/2026</a:t>
             </a:fld>
             <a:endParaRPr lang="en-US"/>
           </a:p>
@@ -6714,7 +6716,7 @@
           <a:p>
             <a:fld id="{4559D4BB-A0F9-4B27-80E6-E5E59F9288D1}" type="datetimeFigureOut">
               <a:rPr lang="en-US" smtClean="0"/>
-              <a:t>2/15/2026</a:t>
+              <a:t>2/16/2026</a:t>
             </a:fld>
             <a:endParaRPr lang="en-US"/>
           </a:p>
@@ -7434,7 +7436,7 @@
           <a:p>
             <a:fld id="{4559D4BB-A0F9-4B27-80E6-E5E59F9288D1}" type="datetimeFigureOut">
               <a:rPr lang="en-US" smtClean="0"/>
-              <a:t>2/15/2026</a:t>
+              <a:t>2/16/2026</a:t>
             </a:fld>
             <a:endParaRPr lang="en-US"/>
           </a:p>
@@ -7604,7 +7606,7 @@
           <a:p>
             <a:fld id="{4559D4BB-A0F9-4B27-80E6-E5E59F9288D1}" type="datetimeFigureOut">
               <a:rPr lang="en-US" smtClean="0"/>
-              <a:t>2/15/2026</a:t>
+              <a:t>2/16/2026</a:t>
             </a:fld>
             <a:endParaRPr lang="en-US"/>
           </a:p>
@@ -7784,7 +7786,7 @@
           <a:p>
             <a:fld id="{4559D4BB-A0F9-4B27-80E6-E5E59F9288D1}" type="datetimeFigureOut">
               <a:rPr lang="en-US" smtClean="0"/>
-              <a:t>2/15/2026</a:t>
+              <a:t>2/16/2026</a:t>
             </a:fld>
             <a:endParaRPr lang="en-US"/>
           </a:p>
@@ -7895,7 +7897,7 @@
           <a:noFill/>
           <a:extLst>
             <a:ext uri="{909E8E84-426E-40dd-AFC4-6F175D3DCCD1}">
-              <a14:hiddenFill xmlns="" xmlns:a14="http://schemas.microsoft.com/office/drawing/2010/main">
+              <a14:hiddenFill xmlns:a14="http://schemas.microsoft.com/office/drawing/2010/main" xmlns="">
                 <a:solidFill>
                   <a:srgbClr val="FFFFFF"/>
                 </a:solidFill>
@@ -7955,7 +7957,7 @@
             </a:ln>
             <a:extLst>
               <a:ext uri="{91240B29-F687-4f45-9708-019B960494DF}">
-                <a14:hiddenLine xmlns="" xmlns:a14="http://schemas.microsoft.com/office/drawing/2010/main" w="9525">
+                <a14:hiddenLine xmlns:a14="http://schemas.microsoft.com/office/drawing/2010/main" xmlns="" w="9525">
                   <a:solidFill>
                     <a:srgbClr val="000000"/>
                   </a:solidFill>
@@ -8045,7 +8047,7 @@
             </a:ln>
             <a:extLst>
               <a:ext uri="{91240B29-F687-4f45-9708-019B960494DF}">
-                <a14:hiddenLine xmlns="" xmlns:a14="http://schemas.microsoft.com/office/drawing/2010/main" w="9525">
+                <a14:hiddenLine xmlns:a14="http://schemas.microsoft.com/office/drawing/2010/main" xmlns="" w="9525">
                   <a:solidFill>
                     <a:srgbClr val="000000"/>
                   </a:solidFill>
@@ -8135,7 +8137,7 @@
             </a:ln>
             <a:extLst>
               <a:ext uri="{91240B29-F687-4f45-9708-019B960494DF}">
-                <a14:hiddenLine xmlns="" xmlns:a14="http://schemas.microsoft.com/office/drawing/2010/main" w="9525">
+                <a14:hiddenLine xmlns:a14="http://schemas.microsoft.com/office/drawing/2010/main" xmlns="" w="9525">
                   <a:solidFill>
                     <a:srgbClr val="000000"/>
                   </a:solidFill>
@@ -8169,7 +8171,7 @@
             </a:ln>
             <a:extLst>
               <a:ext uri="{91240B29-F687-4f45-9708-019B960494DF}">
-                <a14:hiddenLine xmlns="" xmlns:a14="http://schemas.microsoft.com/office/drawing/2010/main" w="9525">
+                <a14:hiddenLine xmlns:a14="http://schemas.microsoft.com/office/drawing/2010/main" xmlns="" w="9525">
                   <a:solidFill>
                     <a:srgbClr val="000000"/>
                   </a:solidFill>
@@ -8259,7 +8261,7 @@
             </a:ln>
             <a:extLst>
               <a:ext uri="{91240B29-F687-4f45-9708-019B960494DF}">
-                <a14:hiddenLine xmlns="" xmlns:a14="http://schemas.microsoft.com/office/drawing/2010/main" w="9525">
+                <a14:hiddenLine xmlns:a14="http://schemas.microsoft.com/office/drawing/2010/main" xmlns="" w="9525">
                   <a:solidFill>
                     <a:srgbClr val="000000"/>
                   </a:solidFill>
@@ -8321,7 +8323,7 @@
             </a:ln>
             <a:extLst>
               <a:ext uri="{91240B29-F687-4f45-9708-019B960494DF}">
-                <a14:hiddenLine xmlns="" xmlns:a14="http://schemas.microsoft.com/office/drawing/2010/main" w="9525">
+                <a14:hiddenLine xmlns:a14="http://schemas.microsoft.com/office/drawing/2010/main" xmlns="" w="9525">
                   <a:solidFill>
                     <a:srgbClr val="000000"/>
                   </a:solidFill>
@@ -8383,7 +8385,7 @@
             </a:ln>
             <a:extLst>
               <a:ext uri="{91240B29-F687-4f45-9708-019B960494DF}">
-                <a14:hiddenLine xmlns="" xmlns:a14="http://schemas.microsoft.com/office/drawing/2010/main" w="9525">
+                <a14:hiddenLine xmlns:a14="http://schemas.microsoft.com/office/drawing/2010/main" xmlns="" w="9525">
                   <a:solidFill>
                     <a:srgbClr val="000000"/>
                   </a:solidFill>
@@ -8473,7 +8475,7 @@
             </a:ln>
             <a:extLst>
               <a:ext uri="{91240B29-F687-4f45-9708-019B960494DF}">
-                <a14:hiddenLine xmlns="" xmlns:a14="http://schemas.microsoft.com/office/drawing/2010/main" w="9525">
+                <a14:hiddenLine xmlns:a14="http://schemas.microsoft.com/office/drawing/2010/main" xmlns="" w="9525">
                   <a:solidFill>
                     <a:srgbClr val="000000"/>
                   </a:solidFill>
@@ -8535,7 +8537,7 @@
             </a:ln>
             <a:extLst>
               <a:ext uri="{91240B29-F687-4f45-9708-019B960494DF}">
-                <a14:hiddenLine xmlns="" xmlns:a14="http://schemas.microsoft.com/office/drawing/2010/main" w="9525">
+                <a14:hiddenLine xmlns:a14="http://schemas.microsoft.com/office/drawing/2010/main" xmlns="" w="9525">
                   <a:solidFill>
                     <a:srgbClr val="000000"/>
                   </a:solidFill>
@@ -8597,7 +8599,7 @@
             </a:ln>
             <a:extLst>
               <a:ext uri="{91240B29-F687-4f45-9708-019B960494DF}">
-                <a14:hiddenLine xmlns="" xmlns:a14="http://schemas.microsoft.com/office/drawing/2010/main" w="9525">
+                <a14:hiddenLine xmlns:a14="http://schemas.microsoft.com/office/drawing/2010/main" xmlns="" w="9525">
                   <a:solidFill>
                     <a:srgbClr val="000000"/>
                   </a:solidFill>
@@ -8687,7 +8689,7 @@
             </a:ln>
             <a:extLst>
               <a:ext uri="{91240B29-F687-4f45-9708-019B960494DF}">
-                <a14:hiddenLine xmlns="" xmlns:a14="http://schemas.microsoft.com/office/drawing/2010/main" w="9525">
+                <a14:hiddenLine xmlns:a14="http://schemas.microsoft.com/office/drawing/2010/main" xmlns="" w="9525">
                   <a:solidFill>
                     <a:srgbClr val="000000"/>
                   </a:solidFill>
@@ -8777,7 +8779,7 @@
             </a:ln>
             <a:extLst>
               <a:ext uri="{91240B29-F687-4f45-9708-019B960494DF}">
-                <a14:hiddenLine xmlns="" xmlns:a14="http://schemas.microsoft.com/office/drawing/2010/main" w="9525">
+                <a14:hiddenLine xmlns:a14="http://schemas.microsoft.com/office/drawing/2010/main" xmlns="" w="9525">
                   <a:solidFill>
                     <a:srgbClr val="000000"/>
                   </a:solidFill>
@@ -8839,7 +8841,7 @@
             </a:ln>
             <a:extLst>
               <a:ext uri="{91240B29-F687-4f45-9708-019B960494DF}">
-                <a14:hiddenLine xmlns="" xmlns:a14="http://schemas.microsoft.com/office/drawing/2010/main" w="9525">
+                <a14:hiddenLine xmlns:a14="http://schemas.microsoft.com/office/drawing/2010/main" xmlns="" w="9525">
                   <a:solidFill>
                     <a:srgbClr val="000000"/>
                   </a:solidFill>
@@ -8949,7 +8951,7 @@
             </a:ln>
             <a:extLst>
               <a:ext uri="{91240B29-F687-4f45-9708-019B960494DF}">
-                <a14:hiddenLine xmlns="" xmlns:a14="http://schemas.microsoft.com/office/drawing/2010/main" w="9525">
+                <a14:hiddenLine xmlns:a14="http://schemas.microsoft.com/office/drawing/2010/main" xmlns="" w="9525">
                   <a:solidFill>
                     <a:srgbClr val="000000"/>
                   </a:solidFill>
@@ -9011,7 +9013,7 @@
             </a:ln>
             <a:extLst>
               <a:ext uri="{91240B29-F687-4f45-9708-019B960494DF}">
-                <a14:hiddenLine xmlns="" xmlns:a14="http://schemas.microsoft.com/office/drawing/2010/main" w="9525">
+                <a14:hiddenLine xmlns:a14="http://schemas.microsoft.com/office/drawing/2010/main" xmlns="" w="9525">
                   <a:solidFill>
                     <a:srgbClr val="000000"/>
                   </a:solidFill>
@@ -9101,7 +9103,7 @@
             </a:ln>
             <a:extLst>
               <a:ext uri="{91240B29-F687-4f45-9708-019B960494DF}">
-                <a14:hiddenLine xmlns="" xmlns:a14="http://schemas.microsoft.com/office/drawing/2010/main" w="9525">
+                <a14:hiddenLine xmlns:a14="http://schemas.microsoft.com/office/drawing/2010/main" xmlns="" w="9525">
                   <a:solidFill>
                     <a:srgbClr val="000000"/>
                   </a:solidFill>
@@ -9191,7 +9193,7 @@
             </a:ln>
             <a:extLst>
               <a:ext uri="{91240B29-F687-4f45-9708-019B960494DF}">
-                <a14:hiddenLine xmlns="" xmlns:a14="http://schemas.microsoft.com/office/drawing/2010/main" w="9525">
+                <a14:hiddenLine xmlns:a14="http://schemas.microsoft.com/office/drawing/2010/main" xmlns="" w="9525">
                   <a:solidFill>
                     <a:srgbClr val="000000"/>
                   </a:solidFill>
@@ -9253,7 +9255,7 @@
             </a:ln>
             <a:extLst>
               <a:ext uri="{91240B29-F687-4f45-9708-019B960494DF}">
-                <a14:hiddenLine xmlns="" xmlns:a14="http://schemas.microsoft.com/office/drawing/2010/main" w="9525">
+                <a14:hiddenLine xmlns:a14="http://schemas.microsoft.com/office/drawing/2010/main" xmlns="" w="9525">
                   <a:solidFill>
                     <a:srgbClr val="000000"/>
                   </a:solidFill>
@@ -9343,7 +9345,7 @@
             </a:ln>
             <a:extLst>
               <a:ext uri="{91240B29-F687-4f45-9708-019B960494DF}">
-                <a14:hiddenLine xmlns="" xmlns:a14="http://schemas.microsoft.com/office/drawing/2010/main" w="9525">
+                <a14:hiddenLine xmlns:a14="http://schemas.microsoft.com/office/drawing/2010/main" xmlns="" w="9525">
                   <a:solidFill>
                     <a:srgbClr val="000000"/>
                   </a:solidFill>
@@ -9433,7 +9435,7 @@
             </a:ln>
             <a:extLst>
               <a:ext uri="{91240B29-F687-4f45-9708-019B960494DF}">
-                <a14:hiddenLine xmlns="" xmlns:a14="http://schemas.microsoft.com/office/drawing/2010/main" w="9525">
+                <a14:hiddenLine xmlns:a14="http://schemas.microsoft.com/office/drawing/2010/main" xmlns="" w="9525">
                   <a:solidFill>
                     <a:srgbClr val="000000"/>
                   </a:solidFill>
@@ -9489,7 +9491,7 @@
             </a:ln>
             <a:extLst>
               <a:ext uri="{91240B29-F687-4f45-9708-019B960494DF}">
-                <a14:hiddenLine xmlns="" xmlns:a14="http://schemas.microsoft.com/office/drawing/2010/main" w="9525">
+                <a14:hiddenLine xmlns:a14="http://schemas.microsoft.com/office/drawing/2010/main" xmlns="" w="9525">
                   <a:solidFill>
                     <a:srgbClr val="000000"/>
                   </a:solidFill>
@@ -9579,7 +9581,7 @@
             </a:ln>
             <a:extLst>
               <a:ext uri="{91240B29-F687-4f45-9708-019B960494DF}">
-                <a14:hiddenLine xmlns="" xmlns:a14="http://schemas.microsoft.com/office/drawing/2010/main" w="9525">
+                <a14:hiddenLine xmlns:a14="http://schemas.microsoft.com/office/drawing/2010/main" xmlns="" w="9525">
                   <a:solidFill>
                     <a:srgbClr val="000000"/>
                   </a:solidFill>
@@ -9635,7 +9637,7 @@
             </a:ln>
             <a:extLst>
               <a:ext uri="{91240B29-F687-4f45-9708-019B960494DF}">
-                <a14:hiddenLine xmlns="" xmlns:a14="http://schemas.microsoft.com/office/drawing/2010/main" w="9525">
+                <a14:hiddenLine xmlns:a14="http://schemas.microsoft.com/office/drawing/2010/main" xmlns="" w="9525">
                   <a:solidFill>
                     <a:srgbClr val="000000"/>
                   </a:solidFill>
@@ -9725,7 +9727,7 @@
             </a:ln>
             <a:extLst>
               <a:ext uri="{91240B29-F687-4f45-9708-019B960494DF}">
-                <a14:hiddenLine xmlns="" xmlns:a14="http://schemas.microsoft.com/office/drawing/2010/main" w="9525">
+                <a14:hiddenLine xmlns:a14="http://schemas.microsoft.com/office/drawing/2010/main" xmlns="" w="9525">
                   <a:solidFill>
                     <a:srgbClr val="000000"/>
                   </a:solidFill>
@@ -9793,7 +9795,7 @@
             </a:ln>
             <a:extLst>
               <a:ext uri="{91240B29-F687-4f45-9708-019B960494DF}">
-                <a14:hiddenLine xmlns="" xmlns:a14="http://schemas.microsoft.com/office/drawing/2010/main" w="9525">
+                <a14:hiddenLine xmlns:a14="http://schemas.microsoft.com/office/drawing/2010/main" xmlns="" w="9525">
                   <a:solidFill>
                     <a:srgbClr val="000000"/>
                   </a:solidFill>
@@ -9883,7 +9885,7 @@
             </a:ln>
             <a:extLst>
               <a:ext uri="{91240B29-F687-4f45-9708-019B960494DF}">
-                <a14:hiddenLine xmlns="" xmlns:a14="http://schemas.microsoft.com/office/drawing/2010/main" w="9525">
+                <a14:hiddenLine xmlns:a14="http://schemas.microsoft.com/office/drawing/2010/main" xmlns="" w="9525">
                   <a:solidFill>
                     <a:srgbClr val="000000"/>
                   </a:solidFill>
@@ -9951,7 +9953,7 @@
             </a:ln>
             <a:extLst>
               <a:ext uri="{91240B29-F687-4f45-9708-019B960494DF}">
-                <a14:hiddenLine xmlns="" xmlns:a14="http://schemas.microsoft.com/office/drawing/2010/main" w="9525">
+                <a14:hiddenLine xmlns:a14="http://schemas.microsoft.com/office/drawing/2010/main" xmlns="" w="9525">
                   <a:solidFill>
                     <a:srgbClr val="000000"/>
                   </a:solidFill>
@@ -10041,7 +10043,7 @@
             </a:ln>
             <a:extLst>
               <a:ext uri="{91240B29-F687-4f45-9708-019B960494DF}">
-                <a14:hiddenLine xmlns="" xmlns:a14="http://schemas.microsoft.com/office/drawing/2010/main" w="9525">
+                <a14:hiddenLine xmlns:a14="http://schemas.microsoft.com/office/drawing/2010/main" xmlns="" w="9525">
                   <a:solidFill>
                     <a:srgbClr val="000000"/>
                   </a:solidFill>
@@ -10075,7 +10077,7 @@
             </a:ln>
             <a:extLst>
               <a:ext uri="{91240B29-F687-4f45-9708-019B960494DF}">
-                <a14:hiddenLine xmlns="" xmlns:a14="http://schemas.microsoft.com/office/drawing/2010/main" w="9525">
+                <a14:hiddenLine xmlns:a14="http://schemas.microsoft.com/office/drawing/2010/main" xmlns="" w="9525">
                   <a:solidFill>
                     <a:srgbClr val="000000"/>
                   </a:solidFill>
@@ -10165,7 +10167,7 @@
             </a:ln>
             <a:extLst>
               <a:ext uri="{91240B29-F687-4f45-9708-019B960494DF}">
-                <a14:hiddenLine xmlns="" xmlns:a14="http://schemas.microsoft.com/office/drawing/2010/main" w="9525">
+                <a14:hiddenLine xmlns:a14="http://schemas.microsoft.com/office/drawing/2010/main" xmlns="" w="9525">
                   <a:solidFill>
                     <a:srgbClr val="000000"/>
                   </a:solidFill>
@@ -10227,7 +10229,7 @@
             </a:ln>
             <a:extLst>
               <a:ext uri="{91240B29-F687-4f45-9708-019B960494DF}">
-                <a14:hiddenLine xmlns="" xmlns:a14="http://schemas.microsoft.com/office/drawing/2010/main" w="9525">
+                <a14:hiddenLine xmlns:a14="http://schemas.microsoft.com/office/drawing/2010/main" xmlns="" w="9525">
                   <a:solidFill>
                     <a:srgbClr val="000000"/>
                   </a:solidFill>
@@ -10289,7 +10291,7 @@
             </a:ln>
             <a:extLst>
               <a:ext uri="{91240B29-F687-4f45-9708-019B960494DF}">
-                <a14:hiddenLine xmlns="" xmlns:a14="http://schemas.microsoft.com/office/drawing/2010/main" w="9525">
+                <a14:hiddenLine xmlns:a14="http://schemas.microsoft.com/office/drawing/2010/main" xmlns="" w="9525">
                   <a:solidFill>
                     <a:srgbClr val="000000"/>
                   </a:solidFill>
@@ -10379,7 +10381,7 @@
             </a:ln>
             <a:extLst>
               <a:ext uri="{91240B29-F687-4f45-9708-019B960494DF}">
-                <a14:hiddenLine xmlns="" xmlns:a14="http://schemas.microsoft.com/office/drawing/2010/main" w="9525">
+                <a14:hiddenLine xmlns:a14="http://schemas.microsoft.com/office/drawing/2010/main" xmlns="" w="9525">
                   <a:solidFill>
                     <a:srgbClr val="000000"/>
                   </a:solidFill>
@@ -10447,7 +10449,7 @@
             </a:ln>
             <a:extLst>
               <a:ext uri="{91240B29-F687-4f45-9708-019B960494DF}">
-                <a14:hiddenLine xmlns="" xmlns:a14="http://schemas.microsoft.com/office/drawing/2010/main" w="9525">
+                <a14:hiddenLine xmlns:a14="http://schemas.microsoft.com/office/drawing/2010/main" xmlns="" w="9525">
                   <a:solidFill>
                     <a:srgbClr val="000000"/>
                   </a:solidFill>
@@ -10509,7 +10511,7 @@
             </a:ln>
             <a:extLst>
               <a:ext uri="{91240B29-F687-4f45-9708-019B960494DF}">
-                <a14:hiddenLine xmlns="" xmlns:a14="http://schemas.microsoft.com/office/drawing/2010/main" w="9525">
+                <a14:hiddenLine xmlns:a14="http://schemas.microsoft.com/office/drawing/2010/main" xmlns="" w="9525">
                   <a:solidFill>
                     <a:srgbClr val="000000"/>
                   </a:solidFill>
@@ -10599,7 +10601,7 @@
             </a:ln>
             <a:extLst>
               <a:ext uri="{91240B29-F687-4f45-9708-019B960494DF}">
-                <a14:hiddenLine xmlns="" xmlns:a14="http://schemas.microsoft.com/office/drawing/2010/main" w="9525">
+                <a14:hiddenLine xmlns:a14="http://schemas.microsoft.com/office/drawing/2010/main" xmlns="" w="9525">
                   <a:solidFill>
                     <a:srgbClr val="000000"/>
                   </a:solidFill>
@@ -10661,7 +10663,7 @@
             </a:ln>
             <a:extLst>
               <a:ext uri="{91240B29-F687-4f45-9708-019B960494DF}">
-                <a14:hiddenLine xmlns="" xmlns:a14="http://schemas.microsoft.com/office/drawing/2010/main" w="9525">
+                <a14:hiddenLine xmlns:a14="http://schemas.microsoft.com/office/drawing/2010/main" xmlns="" w="9525">
                   <a:solidFill>
                     <a:srgbClr val="000000"/>
                   </a:solidFill>
@@ -10751,7 +10753,7 @@
             </a:ln>
             <a:extLst>
               <a:ext uri="{91240B29-F687-4f45-9708-019B960494DF}">
-                <a14:hiddenLine xmlns="" xmlns:a14="http://schemas.microsoft.com/office/drawing/2010/main" w="9525">
+                <a14:hiddenLine xmlns:a14="http://schemas.microsoft.com/office/drawing/2010/main" xmlns="" w="9525">
                   <a:solidFill>
                     <a:srgbClr val="000000"/>
                   </a:solidFill>
@@ -10813,7 +10815,7 @@
             </a:ln>
             <a:extLst>
               <a:ext uri="{91240B29-F687-4f45-9708-019B960494DF}">
-                <a14:hiddenLine xmlns="" xmlns:a14="http://schemas.microsoft.com/office/drawing/2010/main" w="9525">
+                <a14:hiddenLine xmlns:a14="http://schemas.microsoft.com/office/drawing/2010/main" xmlns="" w="9525">
                   <a:solidFill>
                     <a:srgbClr val="000000"/>
                   </a:solidFill>
@@ -10903,7 +10905,7 @@
             </a:ln>
             <a:extLst>
               <a:ext uri="{91240B29-F687-4f45-9708-019B960494DF}">
-                <a14:hiddenLine xmlns="" xmlns:a14="http://schemas.microsoft.com/office/drawing/2010/main" w="9525">
+                <a14:hiddenLine xmlns:a14="http://schemas.microsoft.com/office/drawing/2010/main" xmlns="" w="9525">
                   <a:solidFill>
                     <a:srgbClr val="000000"/>
                   </a:solidFill>
@@ -10937,7 +10939,7 @@
             </a:ln>
             <a:extLst>
               <a:ext uri="{91240B29-F687-4f45-9708-019B960494DF}">
-                <a14:hiddenLine xmlns="" xmlns:a14="http://schemas.microsoft.com/office/drawing/2010/main" w="9525">
+                <a14:hiddenLine xmlns:a14="http://schemas.microsoft.com/office/drawing/2010/main" xmlns="" w="9525">
                   <a:solidFill>
                     <a:srgbClr val="000000"/>
                   </a:solidFill>
@@ -11002,7 +11004,7 @@
             </a:ln>
             <a:extLst>
               <a:ext uri="{91240B29-F687-4f45-9708-019B960494DF}">
-                <a14:hiddenLine xmlns="" xmlns:a14="http://schemas.microsoft.com/office/drawing/2010/main" w="9525">
+                <a14:hiddenLine xmlns:a14="http://schemas.microsoft.com/office/drawing/2010/main" xmlns="" w="9525">
                   <a:solidFill>
                     <a:srgbClr val="000000"/>
                   </a:solidFill>
@@ -11092,7 +11094,7 @@
             </a:ln>
             <a:extLst>
               <a:ext uri="{91240B29-F687-4f45-9708-019B960494DF}">
-                <a14:hiddenLine xmlns="" xmlns:a14="http://schemas.microsoft.com/office/drawing/2010/main" w="9525">
+                <a14:hiddenLine xmlns:a14="http://schemas.microsoft.com/office/drawing/2010/main" xmlns="" w="9525">
                   <a:solidFill>
                     <a:srgbClr val="000000"/>
                   </a:solidFill>
@@ -11154,7 +11156,7 @@
             </a:ln>
             <a:extLst>
               <a:ext uri="{91240B29-F687-4f45-9708-019B960494DF}">
-                <a14:hiddenLine xmlns="" xmlns:a14="http://schemas.microsoft.com/office/drawing/2010/main" w="9525">
+                <a14:hiddenLine xmlns:a14="http://schemas.microsoft.com/office/drawing/2010/main" xmlns="" w="9525">
                   <a:solidFill>
                     <a:srgbClr val="000000"/>
                   </a:solidFill>
@@ -11244,7 +11246,7 @@
             </a:ln>
             <a:extLst>
               <a:ext uri="{91240B29-F687-4f45-9708-019B960494DF}">
-                <a14:hiddenLine xmlns="" xmlns:a14="http://schemas.microsoft.com/office/drawing/2010/main" w="9525">
+                <a14:hiddenLine xmlns:a14="http://schemas.microsoft.com/office/drawing/2010/main" xmlns="" w="9525">
                   <a:solidFill>
                     <a:srgbClr val="000000"/>
                   </a:solidFill>
@@ -11334,7 +11336,7 @@
             </a:ln>
             <a:extLst>
               <a:ext uri="{91240B29-F687-4f45-9708-019B960494DF}">
-                <a14:hiddenLine xmlns="" xmlns:a14="http://schemas.microsoft.com/office/drawing/2010/main" w="9525">
+                <a14:hiddenLine xmlns:a14="http://schemas.microsoft.com/office/drawing/2010/main" xmlns="" w="9525">
                   <a:solidFill>
                     <a:srgbClr val="000000"/>
                   </a:solidFill>
@@ -11399,7 +11401,7 @@
             </a:ln>
             <a:extLst>
               <a:ext uri="{91240B29-F687-4f45-9708-019B960494DF}">
-                <a14:hiddenLine xmlns="" xmlns:a14="http://schemas.microsoft.com/office/drawing/2010/main" w="9525">
+                <a14:hiddenLine xmlns:a14="http://schemas.microsoft.com/office/drawing/2010/main" xmlns="" w="9525">
                   <a:solidFill>
                     <a:srgbClr val="000000"/>
                   </a:solidFill>
@@ -11461,7 +11463,7 @@
             </a:ln>
             <a:extLst>
               <a:ext uri="{91240B29-F687-4f45-9708-019B960494DF}">
-                <a14:hiddenLine xmlns="" xmlns:a14="http://schemas.microsoft.com/office/drawing/2010/main" w="9525">
+                <a14:hiddenLine xmlns:a14="http://schemas.microsoft.com/office/drawing/2010/main" xmlns="" w="9525">
                   <a:solidFill>
                     <a:srgbClr val="000000"/>
                   </a:solidFill>
@@ -11551,7 +11553,7 @@
             </a:ln>
             <a:extLst>
               <a:ext uri="{91240B29-F687-4f45-9708-019B960494DF}">
-                <a14:hiddenLine xmlns="" xmlns:a14="http://schemas.microsoft.com/office/drawing/2010/main" w="9525">
+                <a14:hiddenLine xmlns:a14="http://schemas.microsoft.com/office/drawing/2010/main" xmlns="" w="9525">
                   <a:solidFill>
                     <a:srgbClr val="000000"/>
                   </a:solidFill>
@@ -11641,7 +11643,7 @@
             </a:ln>
             <a:extLst>
               <a:ext uri="{91240B29-F687-4f45-9708-019B960494DF}">
-                <a14:hiddenLine xmlns="" xmlns:a14="http://schemas.microsoft.com/office/drawing/2010/main" w="9525">
+                <a14:hiddenLine xmlns:a14="http://schemas.microsoft.com/office/drawing/2010/main" xmlns="" w="9525">
                   <a:solidFill>
                     <a:srgbClr val="000000"/>
                   </a:solidFill>
@@ -11703,7 +11705,7 @@
             </a:ln>
             <a:extLst>
               <a:ext uri="{91240B29-F687-4f45-9708-019B960494DF}">
-                <a14:hiddenLine xmlns="" xmlns:a14="http://schemas.microsoft.com/office/drawing/2010/main" w="9525">
+                <a14:hiddenLine xmlns:a14="http://schemas.microsoft.com/office/drawing/2010/main" xmlns="" w="9525">
                   <a:solidFill>
                     <a:srgbClr val="000000"/>
                   </a:solidFill>
@@ -11823,7 +11825,7 @@
             </a:ln>
             <a:extLst>
               <a:ext uri="{91240B29-F687-4f45-9708-019B960494DF}">
-                <a14:hiddenLine xmlns="" xmlns:a14="http://schemas.microsoft.com/office/drawing/2010/main" w="9525">
+                <a14:hiddenLine xmlns:a14="http://schemas.microsoft.com/office/drawing/2010/main" xmlns="" w="9525">
                   <a:solidFill>
                     <a:srgbClr val="000000"/>
                   </a:solidFill>
@@ -11891,7 +11893,7 @@
             </a:ln>
             <a:extLst>
               <a:ext uri="{91240B29-F687-4f45-9708-019B960494DF}">
-                <a14:hiddenLine xmlns="" xmlns:a14="http://schemas.microsoft.com/office/drawing/2010/main" w="9525">
+                <a14:hiddenLine xmlns:a14="http://schemas.microsoft.com/office/drawing/2010/main" xmlns="" w="9525">
                   <a:solidFill>
                     <a:srgbClr val="000000"/>
                   </a:solidFill>
@@ -11981,7 +11983,7 @@
             </a:ln>
             <a:extLst>
               <a:ext uri="{91240B29-F687-4f45-9708-019B960494DF}">
-                <a14:hiddenLine xmlns="" xmlns:a14="http://schemas.microsoft.com/office/drawing/2010/main" w="9525">
+                <a14:hiddenLine xmlns:a14="http://schemas.microsoft.com/office/drawing/2010/main" xmlns="" w="9525">
                   <a:solidFill>
                     <a:srgbClr val="000000"/>
                   </a:solidFill>
@@ -12121,7 +12123,7 @@
           <a:p>
             <a:fld id="{4559D4BB-A0F9-4B27-80E6-E5E59F9288D1}" type="datetimeFigureOut">
               <a:rPr lang="en-US" smtClean="0"/>
-              <a:t>2/15/2026</a:t>
+              <a:t>2/16/2026</a:t>
             </a:fld>
             <a:endParaRPr lang="en-US"/>
           </a:p>
@@ -12301,7 +12303,7 @@
           <a:p>
             <a:fld id="{4559D4BB-A0F9-4B27-80E6-E5E59F9288D1}" type="datetimeFigureOut">
               <a:rPr lang="en-US" smtClean="0"/>
-              <a:t>2/15/2026</a:t>
+              <a:t>2/16/2026</a:t>
             </a:fld>
             <a:endParaRPr lang="en-US"/>
           </a:p>
@@ -12471,7 +12473,7 @@
           <a:p>
             <a:fld id="{4559D4BB-A0F9-4B27-80E6-E5E59F9288D1}" type="datetimeFigureOut">
               <a:rPr lang="en-US" smtClean="0"/>
-              <a:t>2/15/2026</a:t>
+              <a:t>2/16/2026</a:t>
             </a:fld>
             <a:endParaRPr lang="en-US"/>
           </a:p>
@@ -12721,7 +12723,7 @@
           <a:p>
             <a:fld id="{4559D4BB-A0F9-4B27-80E6-E5E59F9288D1}" type="datetimeFigureOut">
               <a:rPr lang="en-US" smtClean="0"/>
-              <a:t>2/15/2026</a:t>
+              <a:t>2/16/2026</a:t>
             </a:fld>
             <a:endParaRPr lang="en-US"/>
           </a:p>
@@ -12953,7 +12955,7 @@
           <a:p>
             <a:fld id="{4559D4BB-A0F9-4B27-80E6-E5E59F9288D1}" type="datetimeFigureOut">
               <a:rPr lang="en-US" smtClean="0"/>
-              <a:t>2/15/2026</a:t>
+              <a:t>2/16/2026</a:t>
             </a:fld>
             <a:endParaRPr lang="en-US"/>
           </a:p>
@@ -13334,7 +13336,7 @@
           <a:p>
             <a:fld id="{4559D4BB-A0F9-4B27-80E6-E5E59F9288D1}" type="datetimeFigureOut">
               <a:rPr lang="en-US" smtClean="0"/>
-              <a:t>2/15/2026</a:t>
+              <a:t>2/16/2026</a:t>
             </a:fld>
             <a:endParaRPr lang="en-US"/>
           </a:p>
@@ -13452,7 +13454,7 @@
           <a:p>
             <a:fld id="{4559D4BB-A0F9-4B27-80E6-E5E59F9288D1}" type="datetimeFigureOut">
               <a:rPr lang="en-US" smtClean="0"/>
-              <a:t>2/15/2026</a:t>
+              <a:t>2/16/2026</a:t>
             </a:fld>
             <a:endParaRPr lang="en-US"/>
           </a:p>
@@ -13547,7 +13549,7 @@
           <a:p>
             <a:fld id="{4559D4BB-A0F9-4B27-80E6-E5E59F9288D1}" type="datetimeFigureOut">
               <a:rPr lang="en-US" smtClean="0"/>
-              <a:t>2/15/2026</a:t>
+              <a:t>2/16/2026</a:t>
             </a:fld>
             <a:endParaRPr lang="en-US"/>
           </a:p>
@@ -13796,7 +13798,7 @@
           <a:p>
             <a:fld id="{4559D4BB-A0F9-4B27-80E6-E5E59F9288D1}" type="datetimeFigureOut">
               <a:rPr lang="en-US" smtClean="0"/>
-              <a:t>2/15/2026</a:t>
+              <a:t>2/16/2026</a:t>
             </a:fld>
             <a:endParaRPr lang="en-US"/>
           </a:p>
@@ -14076,7 +14078,7 @@
           <a:p>
             <a:fld id="{4559D4BB-A0F9-4B27-80E6-E5E59F9288D1}" type="datetimeFigureOut">
               <a:rPr lang="en-US" smtClean="0"/>
-              <a:t>2/15/2026</a:t>
+              <a:t>2/16/2026</a:t>
             </a:fld>
             <a:endParaRPr lang="en-US"/>
           </a:p>
@@ -14333,7 +14335,7 @@
           <a:p>
             <a:fld id="{4559D4BB-A0F9-4B27-80E6-E5E59F9288D1}" type="datetimeFigureOut">
               <a:rPr lang="en-US" smtClean="0"/>
-              <a:t>2/15/2026</a:t>
+              <a:t>2/16/2026</a:t>
             </a:fld>
             <a:endParaRPr lang="en-US"/>
           </a:p>
@@ -14529,7 +14531,7 @@
           <a:p>
             <a:fld id="{4559D4BB-A0F9-4B27-80E6-E5E59F9288D1}" type="datetimeFigureOut">
               <a:rPr lang="en-US" smtClean="0"/>
-              <a:t>2/15/2026</a:t>
+              <a:t>2/16/2026</a:t>
             </a:fld>
             <a:endParaRPr lang="en-US"/>
           </a:p>
@@ -14792,7 +14794,7 @@
           <a:p>
             <a:fld id="{4559D4BB-A0F9-4B27-80E6-E5E59F9288D1}" type="datetimeFigureOut">
               <a:rPr lang="en-US" smtClean="0"/>
-              <a:t>2/15/2026</a:t>
+              <a:t>2/16/2026</a:t>
             </a:fld>
             <a:endParaRPr lang="en-US"/>
           </a:p>
@@ -15280,7 +15282,7 @@
           <a:p>
             <a:fld id="{4559D4BB-A0F9-4B27-80E6-E5E59F9288D1}" type="datetimeFigureOut">
               <a:rPr lang="en-US" smtClean="0"/>
-              <a:t>2/15/2026</a:t>
+              <a:t>2/16/2026</a:t>
             </a:fld>
             <a:endParaRPr lang="en-US"/>
           </a:p>
@@ -15476,7 +15478,7 @@
           <a:p>
             <a:fld id="{4559D4BB-A0F9-4B27-80E6-E5E59F9288D1}" type="datetimeFigureOut">
               <a:rPr lang="en-US" smtClean="0"/>
-              <a:t>2/15/2026</a:t>
+              <a:t>2/16/2026</a:t>
             </a:fld>
             <a:endParaRPr lang="en-US"/>
           </a:p>
@@ -16022,7 +16024,7 @@
           <a:p>
             <a:fld id="{4559D4BB-A0F9-4B27-80E6-E5E59F9288D1}" type="datetimeFigureOut">
               <a:rPr lang="en-US" smtClean="0"/>
-              <a:t>2/15/2026</a:t>
+              <a:t>2/16/2026</a:t>
             </a:fld>
             <a:endParaRPr lang="en-US"/>
           </a:p>
@@ -16742,7 +16744,7 @@
           <a:p>
             <a:fld id="{4559D4BB-A0F9-4B27-80E6-E5E59F9288D1}" type="datetimeFigureOut">
               <a:rPr lang="en-US" smtClean="0"/>
-              <a:t>2/15/2026</a:t>
+              <a:t>2/16/2026</a:t>
             </a:fld>
             <a:endParaRPr lang="en-US"/>
           </a:p>
@@ -16912,7 +16914,7 @@
           <a:p>
             <a:fld id="{4559D4BB-A0F9-4B27-80E6-E5E59F9288D1}" type="datetimeFigureOut">
               <a:rPr lang="en-US" smtClean="0"/>
-              <a:t>2/15/2026</a:t>
+              <a:t>2/16/2026</a:t>
             </a:fld>
             <a:endParaRPr lang="en-US"/>
           </a:p>
@@ -17092,7 +17094,7 @@
           <a:p>
             <a:fld id="{4559D4BB-A0F9-4B27-80E6-E5E59F9288D1}" type="datetimeFigureOut">
               <a:rPr lang="en-US" smtClean="0"/>
-              <a:t>2/15/2026</a:t>
+              <a:t>2/16/2026</a:t>
             </a:fld>
             <a:endParaRPr lang="en-US"/>
           </a:p>
@@ -17324,7 +17326,7 @@
           <a:p>
             <a:fld id="{4559D4BB-A0F9-4B27-80E6-E5E59F9288D1}" type="datetimeFigureOut">
               <a:rPr lang="en-US" smtClean="0"/>
-              <a:t>2/15/2026</a:t>
+              <a:t>2/16/2026</a:t>
             </a:fld>
             <a:endParaRPr lang="en-US"/>
           </a:p>
@@ -17705,7 +17707,7 @@
           <a:p>
             <a:fld id="{4559D4BB-A0F9-4B27-80E6-E5E59F9288D1}" type="datetimeFigureOut">
               <a:rPr lang="en-US" smtClean="0"/>
-              <a:t>2/15/2026</a:t>
+              <a:t>2/16/2026</a:t>
             </a:fld>
             <a:endParaRPr lang="en-US"/>
           </a:p>
@@ -17823,7 +17825,7 @@
           <a:p>
             <a:fld id="{4559D4BB-A0F9-4B27-80E6-E5E59F9288D1}" type="datetimeFigureOut">
               <a:rPr lang="en-US" smtClean="0"/>
-              <a:t>2/15/2026</a:t>
+              <a:t>2/16/2026</a:t>
             </a:fld>
             <a:endParaRPr lang="en-US"/>
           </a:p>
@@ -17918,7 +17920,7 @@
           <a:p>
             <a:fld id="{4559D4BB-A0F9-4B27-80E6-E5E59F9288D1}" type="datetimeFigureOut">
               <a:rPr lang="en-US" smtClean="0"/>
-              <a:t>2/15/2026</a:t>
+              <a:t>2/16/2026</a:t>
             </a:fld>
             <a:endParaRPr lang="en-US"/>
           </a:p>
@@ -18167,7 +18169,7 @@
           <a:p>
             <a:fld id="{4559D4BB-A0F9-4B27-80E6-E5E59F9288D1}" type="datetimeFigureOut">
               <a:rPr lang="en-US" smtClean="0"/>
-              <a:t>2/15/2026</a:t>
+              <a:t>2/16/2026</a:t>
             </a:fld>
             <a:endParaRPr lang="en-US"/>
           </a:p>
@@ -18447,7 +18449,7 @@
           <a:p>
             <a:fld id="{4559D4BB-A0F9-4B27-80E6-E5E59F9288D1}" type="datetimeFigureOut">
               <a:rPr lang="en-US" smtClean="0"/>
-              <a:t>2/15/2026</a:t>
+              <a:t>2/16/2026</a:t>
             </a:fld>
             <a:endParaRPr lang="en-US"/>
           </a:p>
@@ -18570,7 +18572,7 @@
           <a:noFill/>
           <a:extLst>
             <a:ext uri="{909E8E84-426E-40dd-AFC4-6F175D3DCCD1}">
-              <a14:hiddenFill xmlns="" xmlns:a14="http://schemas.microsoft.com/office/drawing/2010/main">
+              <a14:hiddenFill xmlns:a14="http://schemas.microsoft.com/office/drawing/2010/main" xmlns="">
                 <a:solidFill>
                   <a:srgbClr val="FFFFFF"/>
                 </a:solidFill>
@@ -18644,7 +18646,7 @@
               </a:ln>
               <a:extLst>
                 <a:ext uri="{91240B29-F687-4f45-9708-019B960494DF}">
-                  <a14:hiddenLine xmlns="" xmlns:a14="http://schemas.microsoft.com/office/drawing/2010/main" w="9525">
+                  <a14:hiddenLine xmlns:a14="http://schemas.microsoft.com/office/drawing/2010/main" xmlns="" w="9525">
                     <a:solidFill>
                       <a:srgbClr val="000000"/>
                     </a:solidFill>
@@ -18734,7 +18736,7 @@
               </a:ln>
               <a:extLst>
                 <a:ext uri="{91240B29-F687-4f45-9708-019B960494DF}">
-                  <a14:hiddenLine xmlns="" xmlns:a14="http://schemas.microsoft.com/office/drawing/2010/main" w="9525">
+                  <a14:hiddenLine xmlns:a14="http://schemas.microsoft.com/office/drawing/2010/main" xmlns="" w="9525">
                     <a:solidFill>
                       <a:srgbClr val="000000"/>
                     </a:solidFill>
@@ -18824,7 +18826,7 @@
               </a:ln>
               <a:extLst>
                 <a:ext uri="{91240B29-F687-4f45-9708-019B960494DF}">
-                  <a14:hiddenLine xmlns="" xmlns:a14="http://schemas.microsoft.com/office/drawing/2010/main" w="9525">
+                  <a14:hiddenLine xmlns:a14="http://schemas.microsoft.com/office/drawing/2010/main" xmlns="" w="9525">
                     <a:solidFill>
                       <a:srgbClr val="000000"/>
                     </a:solidFill>
@@ -18886,7 +18888,7 @@
               </a:ln>
               <a:extLst>
                 <a:ext uri="{91240B29-F687-4f45-9708-019B960494DF}">
-                  <a14:hiddenLine xmlns="" xmlns:a14="http://schemas.microsoft.com/office/drawing/2010/main" w="9525">
+                  <a14:hiddenLine xmlns:a14="http://schemas.microsoft.com/office/drawing/2010/main" xmlns="" w="9525">
                     <a:solidFill>
                       <a:srgbClr val="000000"/>
                     </a:solidFill>
@@ -18976,7 +18978,7 @@
               </a:ln>
               <a:extLst>
                 <a:ext uri="{91240B29-F687-4f45-9708-019B960494DF}">
-                  <a14:hiddenLine xmlns="" xmlns:a14="http://schemas.microsoft.com/office/drawing/2010/main" w="9525">
+                  <a14:hiddenLine xmlns:a14="http://schemas.microsoft.com/office/drawing/2010/main" xmlns="" w="9525">
                     <a:solidFill>
                       <a:srgbClr val="000000"/>
                     </a:solidFill>
@@ -19038,7 +19040,7 @@
               </a:ln>
               <a:extLst>
                 <a:ext uri="{91240B29-F687-4f45-9708-019B960494DF}">
-                  <a14:hiddenLine xmlns="" xmlns:a14="http://schemas.microsoft.com/office/drawing/2010/main" w="9525">
+                  <a14:hiddenLine xmlns:a14="http://schemas.microsoft.com/office/drawing/2010/main" xmlns="" w="9525">
                     <a:solidFill>
                       <a:srgbClr val="000000"/>
                     </a:solidFill>
@@ -19100,7 +19102,7 @@
               </a:ln>
               <a:extLst>
                 <a:ext uri="{91240B29-F687-4f45-9708-019B960494DF}">
-                  <a14:hiddenLine xmlns="" xmlns:a14="http://schemas.microsoft.com/office/drawing/2010/main" w="9525">
+                  <a14:hiddenLine xmlns:a14="http://schemas.microsoft.com/office/drawing/2010/main" xmlns="" w="9525">
                     <a:solidFill>
                       <a:srgbClr val="000000"/>
                     </a:solidFill>
@@ -19190,7 +19192,7 @@
               </a:ln>
               <a:extLst>
                 <a:ext uri="{91240B29-F687-4f45-9708-019B960494DF}">
-                  <a14:hiddenLine xmlns="" xmlns:a14="http://schemas.microsoft.com/office/drawing/2010/main" w="9525">
+                  <a14:hiddenLine xmlns:a14="http://schemas.microsoft.com/office/drawing/2010/main" xmlns="" w="9525">
                     <a:solidFill>
                       <a:srgbClr val="000000"/>
                     </a:solidFill>
@@ -19280,7 +19282,7 @@
               </a:ln>
               <a:extLst>
                 <a:ext uri="{91240B29-F687-4f45-9708-019B960494DF}">
-                  <a14:hiddenLine xmlns="" xmlns:a14="http://schemas.microsoft.com/office/drawing/2010/main" w="9525">
+                  <a14:hiddenLine xmlns:a14="http://schemas.microsoft.com/office/drawing/2010/main" xmlns="" w="9525">
                     <a:solidFill>
                       <a:srgbClr val="000000"/>
                     </a:solidFill>
@@ -19342,7 +19344,7 @@
               </a:ln>
               <a:extLst>
                 <a:ext uri="{91240B29-F687-4f45-9708-019B960494DF}">
-                  <a14:hiddenLine xmlns="" xmlns:a14="http://schemas.microsoft.com/office/drawing/2010/main" w="9525">
+                  <a14:hiddenLine xmlns:a14="http://schemas.microsoft.com/office/drawing/2010/main" xmlns="" w="9525">
                     <a:solidFill>
                       <a:srgbClr val="000000"/>
                     </a:solidFill>
@@ -19452,7 +19454,7 @@
               </a:ln>
               <a:extLst>
                 <a:ext uri="{91240B29-F687-4f45-9708-019B960494DF}">
-                  <a14:hiddenLine xmlns="" xmlns:a14="http://schemas.microsoft.com/office/drawing/2010/main" w="9525">
+                  <a14:hiddenLine xmlns:a14="http://schemas.microsoft.com/office/drawing/2010/main" xmlns="" w="9525">
                     <a:solidFill>
                       <a:srgbClr val="000000"/>
                     </a:solidFill>
@@ -19536,7 +19538,7 @@
               </a:ln>
               <a:extLst>
                 <a:ext uri="{91240B29-F687-4f45-9708-019B960494DF}">
-                  <a14:hiddenLine xmlns="" xmlns:a14="http://schemas.microsoft.com/office/drawing/2010/main" w="9525">
+                  <a14:hiddenLine xmlns:a14="http://schemas.microsoft.com/office/drawing/2010/main" xmlns="" w="9525">
                     <a:solidFill>
                       <a:srgbClr val="000000"/>
                     </a:solidFill>
@@ -19598,7 +19600,7 @@
               </a:ln>
               <a:extLst>
                 <a:ext uri="{91240B29-F687-4f45-9708-019B960494DF}">
-                  <a14:hiddenLine xmlns="" xmlns:a14="http://schemas.microsoft.com/office/drawing/2010/main" w="9525">
+                  <a14:hiddenLine xmlns:a14="http://schemas.microsoft.com/office/drawing/2010/main" xmlns="" w="9525">
                     <a:solidFill>
                       <a:srgbClr val="000000"/>
                     </a:solidFill>
@@ -19660,7 +19662,7 @@
               </a:ln>
               <a:extLst>
                 <a:ext uri="{91240B29-F687-4f45-9708-019B960494DF}">
-                  <a14:hiddenLine xmlns="" xmlns:a14="http://schemas.microsoft.com/office/drawing/2010/main" w="9525">
+                  <a14:hiddenLine xmlns:a14="http://schemas.microsoft.com/office/drawing/2010/main" xmlns="" w="9525">
                     <a:solidFill>
                       <a:srgbClr val="000000"/>
                     </a:solidFill>
@@ -19750,7 +19752,7 @@
               </a:ln>
               <a:extLst>
                 <a:ext uri="{91240B29-F687-4f45-9708-019B960494DF}">
-                  <a14:hiddenLine xmlns="" xmlns:a14="http://schemas.microsoft.com/office/drawing/2010/main" w="9525">
+                  <a14:hiddenLine xmlns:a14="http://schemas.microsoft.com/office/drawing/2010/main" xmlns="" w="9525">
                     <a:solidFill>
                       <a:srgbClr val="000000"/>
                     </a:solidFill>
@@ -19784,7 +19786,7 @@
               </a:ln>
               <a:extLst>
                 <a:ext uri="{91240B29-F687-4f45-9708-019B960494DF}">
-                  <a14:hiddenLine xmlns="" xmlns:a14="http://schemas.microsoft.com/office/drawing/2010/main" w="9525">
+                  <a14:hiddenLine xmlns:a14="http://schemas.microsoft.com/office/drawing/2010/main" xmlns="" w="9525">
                     <a:solidFill>
                       <a:srgbClr val="000000"/>
                     </a:solidFill>
@@ -19849,7 +19851,7 @@
               </a:ln>
               <a:extLst>
                 <a:ext uri="{91240B29-F687-4f45-9708-019B960494DF}">
-                  <a14:hiddenLine xmlns="" xmlns:a14="http://schemas.microsoft.com/office/drawing/2010/main" w="9525">
+                  <a14:hiddenLine xmlns:a14="http://schemas.microsoft.com/office/drawing/2010/main" xmlns="" w="9525">
                     <a:solidFill>
                       <a:srgbClr val="000000"/>
                     </a:solidFill>
@@ -19939,7 +19941,7 @@
               </a:ln>
               <a:extLst>
                 <a:ext uri="{91240B29-F687-4f45-9708-019B960494DF}">
-                  <a14:hiddenLine xmlns="" xmlns:a14="http://schemas.microsoft.com/office/drawing/2010/main" w="9525">
+                  <a14:hiddenLine xmlns:a14="http://schemas.microsoft.com/office/drawing/2010/main" xmlns="" w="9525">
                     <a:solidFill>
                       <a:srgbClr val="000000"/>
                     </a:solidFill>
@@ -20001,7 +20003,7 @@
               </a:ln>
               <a:extLst>
                 <a:ext uri="{91240B29-F687-4f45-9708-019B960494DF}">
-                  <a14:hiddenLine xmlns="" xmlns:a14="http://schemas.microsoft.com/office/drawing/2010/main" w="9525">
+                  <a14:hiddenLine xmlns:a14="http://schemas.microsoft.com/office/drawing/2010/main" xmlns="" w="9525">
                     <a:solidFill>
                       <a:srgbClr val="000000"/>
                     </a:solidFill>
@@ -20091,7 +20093,7 @@
               </a:ln>
               <a:extLst>
                 <a:ext uri="{91240B29-F687-4f45-9708-019B960494DF}">
-                  <a14:hiddenLine xmlns="" xmlns:a14="http://schemas.microsoft.com/office/drawing/2010/main" w="9525">
+                  <a14:hiddenLine xmlns:a14="http://schemas.microsoft.com/office/drawing/2010/main" xmlns="" w="9525">
                     <a:solidFill>
                       <a:srgbClr val="000000"/>
                     </a:solidFill>
@@ -20156,7 +20158,7 @@
               </a:ln>
               <a:extLst>
                 <a:ext uri="{91240B29-F687-4f45-9708-019B960494DF}">
-                  <a14:hiddenLine xmlns="" xmlns:a14="http://schemas.microsoft.com/office/drawing/2010/main" w="9525">
+                  <a14:hiddenLine xmlns:a14="http://schemas.microsoft.com/office/drawing/2010/main" xmlns="" w="9525">
                     <a:solidFill>
                       <a:srgbClr val="000000"/>
                     </a:solidFill>
@@ -20218,7 +20220,7 @@
               </a:ln>
               <a:extLst>
                 <a:ext uri="{91240B29-F687-4f45-9708-019B960494DF}">
-                  <a14:hiddenLine xmlns="" xmlns:a14="http://schemas.microsoft.com/office/drawing/2010/main" w="9525">
+                  <a14:hiddenLine xmlns:a14="http://schemas.microsoft.com/office/drawing/2010/main" xmlns="" w="9525">
                     <a:solidFill>
                       <a:srgbClr val="000000"/>
                     </a:solidFill>
@@ -20308,7 +20310,7 @@
               </a:ln>
               <a:extLst>
                 <a:ext uri="{91240B29-F687-4f45-9708-019B960494DF}">
-                  <a14:hiddenLine xmlns="" xmlns:a14="http://schemas.microsoft.com/office/drawing/2010/main" w="9525">
+                  <a14:hiddenLine xmlns:a14="http://schemas.microsoft.com/office/drawing/2010/main" xmlns="" w="9525">
                     <a:solidFill>
                       <a:srgbClr val="000000"/>
                     </a:solidFill>
@@ -20398,7 +20400,7 @@
               </a:ln>
               <a:extLst>
                 <a:ext uri="{91240B29-F687-4f45-9708-019B960494DF}">
-                  <a14:hiddenLine xmlns="" xmlns:a14="http://schemas.microsoft.com/office/drawing/2010/main" w="9525">
+                  <a14:hiddenLine xmlns:a14="http://schemas.microsoft.com/office/drawing/2010/main" xmlns="" w="9525">
                     <a:solidFill>
                       <a:srgbClr val="000000"/>
                     </a:solidFill>
@@ -20463,7 +20465,7 @@
               </a:ln>
               <a:extLst>
                 <a:ext uri="{91240B29-F687-4f45-9708-019B960494DF}">
-                  <a14:hiddenLine xmlns="" xmlns:a14="http://schemas.microsoft.com/office/drawing/2010/main" w="9525">
+                  <a14:hiddenLine xmlns:a14="http://schemas.microsoft.com/office/drawing/2010/main" xmlns="" w="9525">
                     <a:solidFill>
                       <a:srgbClr val="000000"/>
                     </a:solidFill>
@@ -20583,7 +20585,7 @@
               </a:ln>
               <a:extLst>
                 <a:ext uri="{91240B29-F687-4f45-9708-019B960494DF}">
-                  <a14:hiddenLine xmlns="" xmlns:a14="http://schemas.microsoft.com/office/drawing/2010/main" w="9525">
+                  <a14:hiddenLine xmlns:a14="http://schemas.microsoft.com/office/drawing/2010/main" xmlns="" w="9525">
                     <a:solidFill>
                       <a:srgbClr val="000000"/>
                     </a:solidFill>
@@ -20664,7 +20666,7 @@
               </a:ln>
               <a:extLst>
                 <a:ext uri="{91240B29-F687-4f45-9708-019B960494DF}">
-                  <a14:hiddenLine xmlns="" xmlns:a14="http://schemas.microsoft.com/office/drawing/2010/main" w="9525">
+                  <a14:hiddenLine xmlns:a14="http://schemas.microsoft.com/office/drawing/2010/main" xmlns="" w="9525">
                     <a:solidFill>
                       <a:srgbClr val="000000"/>
                     </a:solidFill>
@@ -20779,7 +20781,7 @@
               </a:ln>
               <a:extLst>
                 <a:ext uri="{91240B29-F687-4f45-9708-019B960494DF}">
-                  <a14:hiddenLine xmlns="" xmlns:a14="http://schemas.microsoft.com/office/drawing/2010/main" w="9525">
+                  <a14:hiddenLine xmlns:a14="http://schemas.microsoft.com/office/drawing/2010/main" xmlns="" w="9525">
                     <a:solidFill>
                       <a:srgbClr val="000000"/>
                     </a:solidFill>
@@ -20869,7 +20871,7 @@
               </a:ln>
               <a:extLst>
                 <a:ext uri="{91240B29-F687-4f45-9708-019B960494DF}">
-                  <a14:hiddenLine xmlns="" xmlns:a14="http://schemas.microsoft.com/office/drawing/2010/main" w="9525">
+                  <a14:hiddenLine xmlns:a14="http://schemas.microsoft.com/office/drawing/2010/main" xmlns="" w="9525">
                     <a:solidFill>
                       <a:srgbClr val="000000"/>
                     </a:solidFill>
@@ -20934,7 +20936,7 @@
               </a:ln>
               <a:extLst>
                 <a:ext uri="{91240B29-F687-4f45-9708-019B960494DF}">
-                  <a14:hiddenLine xmlns="" xmlns:a14="http://schemas.microsoft.com/office/drawing/2010/main" w="9525">
+                  <a14:hiddenLine xmlns:a14="http://schemas.microsoft.com/office/drawing/2010/main" xmlns="" w="9525">
                     <a:solidFill>
                       <a:srgbClr val="000000"/>
                     </a:solidFill>
@@ -21024,7 +21026,7 @@
               </a:ln>
               <a:extLst>
                 <a:ext uri="{91240B29-F687-4f45-9708-019B960494DF}">
-                  <a14:hiddenLine xmlns="" xmlns:a14="http://schemas.microsoft.com/office/drawing/2010/main" w="9525">
+                  <a14:hiddenLine xmlns:a14="http://schemas.microsoft.com/office/drawing/2010/main" xmlns="" w="9525">
                     <a:solidFill>
                       <a:srgbClr val="000000"/>
                     </a:solidFill>
@@ -21092,7 +21094,7 @@
               </a:ln>
               <a:extLst>
                 <a:ext uri="{91240B29-F687-4f45-9708-019B960494DF}">
-                  <a14:hiddenLine xmlns="" xmlns:a14="http://schemas.microsoft.com/office/drawing/2010/main" w="9525">
+                  <a14:hiddenLine xmlns:a14="http://schemas.microsoft.com/office/drawing/2010/main" xmlns="" w="9525">
                     <a:solidFill>
                       <a:srgbClr val="000000"/>
                     </a:solidFill>
@@ -21182,7 +21184,7 @@
               </a:ln>
               <a:extLst>
                 <a:ext uri="{91240B29-F687-4f45-9708-019B960494DF}">
-                  <a14:hiddenLine xmlns="" xmlns:a14="http://schemas.microsoft.com/office/drawing/2010/main" w="9525">
+                  <a14:hiddenLine xmlns:a14="http://schemas.microsoft.com/office/drawing/2010/main" xmlns="" w="9525">
                     <a:solidFill>
                       <a:srgbClr val="000000"/>
                     </a:solidFill>
@@ -21250,7 +21252,7 @@
               </a:ln>
               <a:extLst>
                 <a:ext uri="{91240B29-F687-4f45-9708-019B960494DF}">
-                  <a14:hiddenLine xmlns="" xmlns:a14="http://schemas.microsoft.com/office/drawing/2010/main" w="9525">
+                  <a14:hiddenLine xmlns:a14="http://schemas.microsoft.com/office/drawing/2010/main" xmlns="" w="9525">
                     <a:solidFill>
                       <a:srgbClr val="000000"/>
                     </a:solidFill>
@@ -21340,7 +21342,7 @@
               </a:ln>
               <a:extLst>
                 <a:ext uri="{91240B29-F687-4f45-9708-019B960494DF}">
-                  <a14:hiddenLine xmlns="" xmlns:a14="http://schemas.microsoft.com/office/drawing/2010/main" w="9525">
+                  <a14:hiddenLine xmlns:a14="http://schemas.microsoft.com/office/drawing/2010/main" xmlns="" w="9525">
                     <a:solidFill>
                       <a:srgbClr val="000000"/>
                     </a:solidFill>
@@ -21374,7 +21376,7 @@
               </a:ln>
               <a:extLst>
                 <a:ext uri="{91240B29-F687-4f45-9708-019B960494DF}">
-                  <a14:hiddenLine xmlns="" xmlns:a14="http://schemas.microsoft.com/office/drawing/2010/main" w="9525">
+                  <a14:hiddenLine xmlns:a14="http://schemas.microsoft.com/office/drawing/2010/main" xmlns="" w="9525">
                     <a:solidFill>
                       <a:srgbClr val="000000"/>
                     </a:solidFill>
@@ -21514,7 +21516,7 @@
           <a:p>
             <a:fld id="{4559D4BB-A0F9-4B27-80E6-E5E59F9288D1}" type="datetimeFigureOut">
               <a:rPr lang="en-US" smtClean="0"/>
-              <a:t>2/15/2026</a:t>
+              <a:t>2/16/2026</a:t>
             </a:fld>
             <a:endParaRPr lang="en-US"/>
           </a:p>
@@ -21972,7 +21974,7 @@
           <a:noFill/>
           <a:extLst>
             <a:ext uri="{909E8E84-426E-40dd-AFC4-6F175D3DCCD1}">
-              <a14:hiddenFill xmlns="" xmlns:a14="http://schemas.microsoft.com/office/drawing/2010/main">
+              <a14:hiddenFill xmlns:a14="http://schemas.microsoft.com/office/drawing/2010/main" xmlns="">
                 <a:solidFill>
                   <a:srgbClr val="FFFFFF"/>
                 </a:solidFill>
@@ -22046,7 +22048,7 @@
               </a:ln>
               <a:extLst>
                 <a:ext uri="{91240B29-F687-4f45-9708-019B960494DF}">
-                  <a14:hiddenLine xmlns="" xmlns:a14="http://schemas.microsoft.com/office/drawing/2010/main" w="9525">
+                  <a14:hiddenLine xmlns:a14="http://schemas.microsoft.com/office/drawing/2010/main" xmlns="" w="9525">
                     <a:solidFill>
                       <a:srgbClr val="000000"/>
                     </a:solidFill>
@@ -22136,7 +22138,7 @@
               </a:ln>
               <a:extLst>
                 <a:ext uri="{91240B29-F687-4f45-9708-019B960494DF}">
-                  <a14:hiddenLine xmlns="" xmlns:a14="http://schemas.microsoft.com/office/drawing/2010/main" w="9525">
+                  <a14:hiddenLine xmlns:a14="http://schemas.microsoft.com/office/drawing/2010/main" xmlns="" w="9525">
                     <a:solidFill>
                       <a:srgbClr val="000000"/>
                     </a:solidFill>
@@ -22226,7 +22228,7 @@
               </a:ln>
               <a:extLst>
                 <a:ext uri="{91240B29-F687-4f45-9708-019B960494DF}">
-                  <a14:hiddenLine xmlns="" xmlns:a14="http://schemas.microsoft.com/office/drawing/2010/main" w="9525">
+                  <a14:hiddenLine xmlns:a14="http://schemas.microsoft.com/office/drawing/2010/main" xmlns="" w="9525">
                     <a:solidFill>
                       <a:srgbClr val="000000"/>
                     </a:solidFill>
@@ -22288,7 +22290,7 @@
               </a:ln>
               <a:extLst>
                 <a:ext uri="{91240B29-F687-4f45-9708-019B960494DF}">
-                  <a14:hiddenLine xmlns="" xmlns:a14="http://schemas.microsoft.com/office/drawing/2010/main" w="9525">
+                  <a14:hiddenLine xmlns:a14="http://schemas.microsoft.com/office/drawing/2010/main" xmlns="" w="9525">
                     <a:solidFill>
                       <a:srgbClr val="000000"/>
                     </a:solidFill>
@@ -22378,7 +22380,7 @@
               </a:ln>
               <a:extLst>
                 <a:ext uri="{91240B29-F687-4f45-9708-019B960494DF}">
-                  <a14:hiddenLine xmlns="" xmlns:a14="http://schemas.microsoft.com/office/drawing/2010/main" w="9525">
+                  <a14:hiddenLine xmlns:a14="http://schemas.microsoft.com/office/drawing/2010/main" xmlns="" w="9525">
                     <a:solidFill>
                       <a:srgbClr val="000000"/>
                     </a:solidFill>
@@ -22440,7 +22442,7 @@
               </a:ln>
               <a:extLst>
                 <a:ext uri="{91240B29-F687-4f45-9708-019B960494DF}">
-                  <a14:hiddenLine xmlns="" xmlns:a14="http://schemas.microsoft.com/office/drawing/2010/main" w="9525">
+                  <a14:hiddenLine xmlns:a14="http://schemas.microsoft.com/office/drawing/2010/main" xmlns="" w="9525">
                     <a:solidFill>
                       <a:srgbClr val="000000"/>
                     </a:solidFill>
@@ -22502,7 +22504,7 @@
               </a:ln>
               <a:extLst>
                 <a:ext uri="{91240B29-F687-4f45-9708-019B960494DF}">
-                  <a14:hiddenLine xmlns="" xmlns:a14="http://schemas.microsoft.com/office/drawing/2010/main" w="9525">
+                  <a14:hiddenLine xmlns:a14="http://schemas.microsoft.com/office/drawing/2010/main" xmlns="" w="9525">
                     <a:solidFill>
                       <a:srgbClr val="000000"/>
                     </a:solidFill>
@@ -22592,7 +22594,7 @@
               </a:ln>
               <a:extLst>
                 <a:ext uri="{91240B29-F687-4f45-9708-019B960494DF}">
-                  <a14:hiddenLine xmlns="" xmlns:a14="http://schemas.microsoft.com/office/drawing/2010/main" w="9525">
+                  <a14:hiddenLine xmlns:a14="http://schemas.microsoft.com/office/drawing/2010/main" xmlns="" w="9525">
                     <a:solidFill>
                       <a:srgbClr val="000000"/>
                     </a:solidFill>
@@ -22682,7 +22684,7 @@
               </a:ln>
               <a:extLst>
                 <a:ext uri="{91240B29-F687-4f45-9708-019B960494DF}">
-                  <a14:hiddenLine xmlns="" xmlns:a14="http://schemas.microsoft.com/office/drawing/2010/main" w="9525">
+                  <a14:hiddenLine xmlns:a14="http://schemas.microsoft.com/office/drawing/2010/main" xmlns="" w="9525">
                     <a:solidFill>
                       <a:srgbClr val="000000"/>
                     </a:solidFill>
@@ -22744,7 +22746,7 @@
               </a:ln>
               <a:extLst>
                 <a:ext uri="{91240B29-F687-4f45-9708-019B960494DF}">
-                  <a14:hiddenLine xmlns="" xmlns:a14="http://schemas.microsoft.com/office/drawing/2010/main" w="9525">
+                  <a14:hiddenLine xmlns:a14="http://schemas.microsoft.com/office/drawing/2010/main" xmlns="" w="9525">
                     <a:solidFill>
                       <a:srgbClr val="000000"/>
                     </a:solidFill>
@@ -22854,7 +22856,7 @@
               </a:ln>
               <a:extLst>
                 <a:ext uri="{91240B29-F687-4f45-9708-019B960494DF}">
-                  <a14:hiddenLine xmlns="" xmlns:a14="http://schemas.microsoft.com/office/drawing/2010/main" w="9525">
+                  <a14:hiddenLine xmlns:a14="http://schemas.microsoft.com/office/drawing/2010/main" xmlns="" w="9525">
                     <a:solidFill>
                       <a:srgbClr val="000000"/>
                     </a:solidFill>
@@ -22938,7 +22940,7 @@
               </a:ln>
               <a:extLst>
                 <a:ext uri="{91240B29-F687-4f45-9708-019B960494DF}">
-                  <a14:hiddenLine xmlns="" xmlns:a14="http://schemas.microsoft.com/office/drawing/2010/main" w="9525">
+                  <a14:hiddenLine xmlns:a14="http://schemas.microsoft.com/office/drawing/2010/main" xmlns="" w="9525">
                     <a:solidFill>
                       <a:srgbClr val="000000"/>
                     </a:solidFill>
@@ -23000,7 +23002,7 @@
               </a:ln>
               <a:extLst>
                 <a:ext uri="{91240B29-F687-4f45-9708-019B960494DF}">
-                  <a14:hiddenLine xmlns="" xmlns:a14="http://schemas.microsoft.com/office/drawing/2010/main" w="9525">
+                  <a14:hiddenLine xmlns:a14="http://schemas.microsoft.com/office/drawing/2010/main" xmlns="" w="9525">
                     <a:solidFill>
                       <a:srgbClr val="000000"/>
                     </a:solidFill>
@@ -23062,7 +23064,7 @@
               </a:ln>
               <a:extLst>
                 <a:ext uri="{91240B29-F687-4f45-9708-019B960494DF}">
-                  <a14:hiddenLine xmlns="" xmlns:a14="http://schemas.microsoft.com/office/drawing/2010/main" w="9525">
+                  <a14:hiddenLine xmlns:a14="http://schemas.microsoft.com/office/drawing/2010/main" xmlns="" w="9525">
                     <a:solidFill>
                       <a:srgbClr val="000000"/>
                     </a:solidFill>
@@ -23152,7 +23154,7 @@
               </a:ln>
               <a:extLst>
                 <a:ext uri="{91240B29-F687-4f45-9708-019B960494DF}">
-                  <a14:hiddenLine xmlns="" xmlns:a14="http://schemas.microsoft.com/office/drawing/2010/main" w="9525">
+                  <a14:hiddenLine xmlns:a14="http://schemas.microsoft.com/office/drawing/2010/main" xmlns="" w="9525">
                     <a:solidFill>
                       <a:srgbClr val="000000"/>
                     </a:solidFill>
@@ -23186,7 +23188,7 @@
               </a:ln>
               <a:extLst>
                 <a:ext uri="{91240B29-F687-4f45-9708-019B960494DF}">
-                  <a14:hiddenLine xmlns="" xmlns:a14="http://schemas.microsoft.com/office/drawing/2010/main" w="9525">
+                  <a14:hiddenLine xmlns:a14="http://schemas.microsoft.com/office/drawing/2010/main" xmlns="" w="9525">
                     <a:solidFill>
                       <a:srgbClr val="000000"/>
                     </a:solidFill>
@@ -23251,7 +23253,7 @@
               </a:ln>
               <a:extLst>
                 <a:ext uri="{91240B29-F687-4f45-9708-019B960494DF}">
-                  <a14:hiddenLine xmlns="" xmlns:a14="http://schemas.microsoft.com/office/drawing/2010/main" w="9525">
+                  <a14:hiddenLine xmlns:a14="http://schemas.microsoft.com/office/drawing/2010/main" xmlns="" w="9525">
                     <a:solidFill>
                       <a:srgbClr val="000000"/>
                     </a:solidFill>
@@ -23341,7 +23343,7 @@
               </a:ln>
               <a:extLst>
                 <a:ext uri="{91240B29-F687-4f45-9708-019B960494DF}">
-                  <a14:hiddenLine xmlns="" xmlns:a14="http://schemas.microsoft.com/office/drawing/2010/main" w="9525">
+                  <a14:hiddenLine xmlns:a14="http://schemas.microsoft.com/office/drawing/2010/main" xmlns="" w="9525">
                     <a:solidFill>
                       <a:srgbClr val="000000"/>
                     </a:solidFill>
@@ -23403,7 +23405,7 @@
               </a:ln>
               <a:extLst>
                 <a:ext uri="{91240B29-F687-4f45-9708-019B960494DF}">
-                  <a14:hiddenLine xmlns="" xmlns:a14="http://schemas.microsoft.com/office/drawing/2010/main" w="9525">
+                  <a14:hiddenLine xmlns:a14="http://schemas.microsoft.com/office/drawing/2010/main" xmlns="" w="9525">
                     <a:solidFill>
                       <a:srgbClr val="000000"/>
                     </a:solidFill>
@@ -23493,7 +23495,7 @@
               </a:ln>
               <a:extLst>
                 <a:ext uri="{91240B29-F687-4f45-9708-019B960494DF}">
-                  <a14:hiddenLine xmlns="" xmlns:a14="http://schemas.microsoft.com/office/drawing/2010/main" w="9525">
+                  <a14:hiddenLine xmlns:a14="http://schemas.microsoft.com/office/drawing/2010/main" xmlns="" w="9525">
                     <a:solidFill>
                       <a:srgbClr val="000000"/>
                     </a:solidFill>
@@ -23558,7 +23560,7 @@
               </a:ln>
               <a:extLst>
                 <a:ext uri="{91240B29-F687-4f45-9708-019B960494DF}">
-                  <a14:hiddenLine xmlns="" xmlns:a14="http://schemas.microsoft.com/office/drawing/2010/main" w="9525">
+                  <a14:hiddenLine xmlns:a14="http://schemas.microsoft.com/office/drawing/2010/main" xmlns="" w="9525">
                     <a:solidFill>
                       <a:srgbClr val="000000"/>
                     </a:solidFill>
@@ -23620,7 +23622,7 @@
               </a:ln>
               <a:extLst>
                 <a:ext uri="{91240B29-F687-4f45-9708-019B960494DF}">
-                  <a14:hiddenLine xmlns="" xmlns:a14="http://schemas.microsoft.com/office/drawing/2010/main" w="9525">
+                  <a14:hiddenLine xmlns:a14="http://schemas.microsoft.com/office/drawing/2010/main" xmlns="" w="9525">
                     <a:solidFill>
                       <a:srgbClr val="000000"/>
                     </a:solidFill>
@@ -23710,7 +23712,7 @@
               </a:ln>
               <a:extLst>
                 <a:ext uri="{91240B29-F687-4f45-9708-019B960494DF}">
-                  <a14:hiddenLine xmlns="" xmlns:a14="http://schemas.microsoft.com/office/drawing/2010/main" w="9525">
+                  <a14:hiddenLine xmlns:a14="http://schemas.microsoft.com/office/drawing/2010/main" xmlns="" w="9525">
                     <a:solidFill>
                       <a:srgbClr val="000000"/>
                     </a:solidFill>
@@ -23800,7 +23802,7 @@
               </a:ln>
               <a:extLst>
                 <a:ext uri="{91240B29-F687-4f45-9708-019B960494DF}">
-                  <a14:hiddenLine xmlns="" xmlns:a14="http://schemas.microsoft.com/office/drawing/2010/main" w="9525">
+                  <a14:hiddenLine xmlns:a14="http://schemas.microsoft.com/office/drawing/2010/main" xmlns="" w="9525">
                     <a:solidFill>
                       <a:srgbClr val="000000"/>
                     </a:solidFill>
@@ -23865,7 +23867,7 @@
               </a:ln>
               <a:extLst>
                 <a:ext uri="{91240B29-F687-4f45-9708-019B960494DF}">
-                  <a14:hiddenLine xmlns="" xmlns:a14="http://schemas.microsoft.com/office/drawing/2010/main" w="9525">
+                  <a14:hiddenLine xmlns:a14="http://schemas.microsoft.com/office/drawing/2010/main" xmlns="" w="9525">
                     <a:solidFill>
                       <a:srgbClr val="000000"/>
                     </a:solidFill>
@@ -23985,7 +23987,7 @@
               </a:ln>
               <a:extLst>
                 <a:ext uri="{91240B29-F687-4f45-9708-019B960494DF}">
-                  <a14:hiddenLine xmlns="" xmlns:a14="http://schemas.microsoft.com/office/drawing/2010/main" w="9525">
+                  <a14:hiddenLine xmlns:a14="http://schemas.microsoft.com/office/drawing/2010/main" xmlns="" w="9525">
                     <a:solidFill>
                       <a:srgbClr val="000000"/>
                     </a:solidFill>
@@ -24083,7 +24085,7 @@
               </a:ln>
               <a:extLst>
                 <a:ext uri="{91240B29-F687-4f45-9708-019B960494DF}">
-                  <a14:hiddenLine xmlns="" xmlns:a14="http://schemas.microsoft.com/office/drawing/2010/main" w="9525">
+                  <a14:hiddenLine xmlns:a14="http://schemas.microsoft.com/office/drawing/2010/main" xmlns="" w="9525">
                     <a:solidFill>
                       <a:srgbClr val="000000"/>
                     </a:solidFill>
@@ -24198,7 +24200,7 @@
               </a:ln>
               <a:extLst>
                 <a:ext uri="{91240B29-F687-4f45-9708-019B960494DF}">
-                  <a14:hiddenLine xmlns="" xmlns:a14="http://schemas.microsoft.com/office/drawing/2010/main" w="9525">
+                  <a14:hiddenLine xmlns:a14="http://schemas.microsoft.com/office/drawing/2010/main" xmlns="" w="9525">
                     <a:solidFill>
                       <a:srgbClr val="000000"/>
                     </a:solidFill>
@@ -24288,7 +24290,7 @@
               </a:ln>
               <a:extLst>
                 <a:ext uri="{91240B29-F687-4f45-9708-019B960494DF}">
-                  <a14:hiddenLine xmlns="" xmlns:a14="http://schemas.microsoft.com/office/drawing/2010/main" w="9525">
+                  <a14:hiddenLine xmlns:a14="http://schemas.microsoft.com/office/drawing/2010/main" xmlns="" w="9525">
                     <a:solidFill>
                       <a:srgbClr val="000000"/>
                     </a:solidFill>
@@ -24353,7 +24355,7 @@
               </a:ln>
               <a:extLst>
                 <a:ext uri="{91240B29-F687-4f45-9708-019B960494DF}">
-                  <a14:hiddenLine xmlns="" xmlns:a14="http://schemas.microsoft.com/office/drawing/2010/main" w="9525">
+                  <a14:hiddenLine xmlns:a14="http://schemas.microsoft.com/office/drawing/2010/main" xmlns="" w="9525">
                     <a:solidFill>
                       <a:srgbClr val="000000"/>
                     </a:solidFill>
@@ -24443,7 +24445,7 @@
               </a:ln>
               <a:extLst>
                 <a:ext uri="{91240B29-F687-4f45-9708-019B960494DF}">
-                  <a14:hiddenLine xmlns="" xmlns:a14="http://schemas.microsoft.com/office/drawing/2010/main" w="9525">
+                  <a14:hiddenLine xmlns:a14="http://schemas.microsoft.com/office/drawing/2010/main" xmlns="" w="9525">
                     <a:solidFill>
                       <a:srgbClr val="000000"/>
                     </a:solidFill>
@@ -24511,7 +24513,7 @@
               </a:ln>
               <a:extLst>
                 <a:ext uri="{91240B29-F687-4f45-9708-019B960494DF}">
-                  <a14:hiddenLine xmlns="" xmlns:a14="http://schemas.microsoft.com/office/drawing/2010/main" w="9525">
+                  <a14:hiddenLine xmlns:a14="http://schemas.microsoft.com/office/drawing/2010/main" xmlns="" w="9525">
                     <a:solidFill>
                       <a:srgbClr val="000000"/>
                     </a:solidFill>
@@ -24601,7 +24603,7 @@
               </a:ln>
               <a:extLst>
                 <a:ext uri="{91240B29-F687-4f45-9708-019B960494DF}">
-                  <a14:hiddenLine xmlns="" xmlns:a14="http://schemas.microsoft.com/office/drawing/2010/main" w="9525">
+                  <a14:hiddenLine xmlns:a14="http://schemas.microsoft.com/office/drawing/2010/main" xmlns="" w="9525">
                     <a:solidFill>
                       <a:srgbClr val="000000"/>
                     </a:solidFill>
@@ -24669,7 +24671,7 @@
               </a:ln>
               <a:extLst>
                 <a:ext uri="{91240B29-F687-4f45-9708-019B960494DF}">
-                  <a14:hiddenLine xmlns="" xmlns:a14="http://schemas.microsoft.com/office/drawing/2010/main" w="9525">
+                  <a14:hiddenLine xmlns:a14="http://schemas.microsoft.com/office/drawing/2010/main" xmlns="" w="9525">
                     <a:solidFill>
                       <a:srgbClr val="000000"/>
                     </a:solidFill>
@@ -24759,7 +24761,7 @@
               </a:ln>
               <a:extLst>
                 <a:ext uri="{91240B29-F687-4f45-9708-019B960494DF}">
-                  <a14:hiddenLine xmlns="" xmlns:a14="http://schemas.microsoft.com/office/drawing/2010/main" w="9525">
+                  <a14:hiddenLine xmlns:a14="http://schemas.microsoft.com/office/drawing/2010/main" xmlns="" w="9525">
                     <a:solidFill>
                       <a:srgbClr val="000000"/>
                     </a:solidFill>
@@ -24793,7 +24795,7 @@
               </a:ln>
               <a:extLst>
                 <a:ext uri="{91240B29-F687-4f45-9708-019B960494DF}">
-                  <a14:hiddenLine xmlns="" xmlns:a14="http://schemas.microsoft.com/office/drawing/2010/main" w="9525">
+                  <a14:hiddenLine xmlns:a14="http://schemas.microsoft.com/office/drawing/2010/main" xmlns="" w="9525">
                     <a:solidFill>
                       <a:srgbClr val="000000"/>
                     </a:solidFill>
@@ -24933,7 +24935,7 @@
           <a:p>
             <a:fld id="{4559D4BB-A0F9-4B27-80E6-E5E59F9288D1}" type="datetimeFigureOut">
               <a:rPr lang="en-US" smtClean="0"/>
-              <a:t>2/15/2026</a:t>
+              <a:t>2/16/2026</a:t>
             </a:fld>
             <a:endParaRPr lang="en-US"/>
           </a:p>
@@ -26526,7 +26528,7 @@
         </p:spPr>
         <p:txBody>
           <a:bodyPr>
-            <a:normAutofit fontScale="92500" lnSpcReduction="20000"/>
+            <a:normAutofit lnSpcReduction="10000"/>
           </a:bodyPr>
           <a:lstStyle/>
           <a:p>
@@ -26622,12 +26624,6 @@
             <a:r>
               <a:rPr lang="en-US" sz="2000" dirty="0"/>
               <a:t>However, by statistical analysis of the plain text the code can be broken easily.</a:t>
-            </a:r>
-          </a:p>
-          <a:p>
-            <a:r>
-              <a:rPr lang="en-US" sz="2000" dirty="0"/>
-              <a:t>Types of attacks: Ciphertext-only attack, Known-plaintext attack, Chosen-plaintext attack</a:t>
             </a:r>
           </a:p>
           <a:p>
@@ -27026,7 +27022,7 @@
             </a:pPr>
             <a:r>
               <a:rPr lang="en-US" dirty="0"/>
-              <a:t>In a block cipher, the message to be encrypted is processed in blocks of k bits. For example, if k = 64, then the message is broken into 64-bit blocks, and each block is encrypted independently. To encode a block, the cipher uses a one-to-one mapping to map .the k-bit block of cleartext to a k-bit block of ciphertext</a:t>
+              <a:t>In a block cipher, the message to be encrypted is processed in blocks of k bits. For example, if k = 64, then the message is broken into 64-bit blocks, and each block is encrypted independently. To encode a block, the cipher uses a one-to-one mapping to map the k-bit block of cleartext to a k-bit block of ciphertext</a:t>
             </a:r>
           </a:p>
         </p:txBody>
@@ -28274,8 +28270,8 @@
           </a:p>
         </p:txBody>
       </p:sp>
-      <mc:AlternateContent xmlns:mc="http://schemas.openxmlformats.org/markup-compatibility/2006" xmlns:a14="http://schemas.microsoft.com/office/drawing/2010/main">
-        <mc:Choice Requires="a14">
+      <mc:AlternateContent xmlns:mc="http://schemas.openxmlformats.org/markup-compatibility/2006">
+        <mc:Choice xmlns:a14="http://schemas.microsoft.com/office/drawing/2010/main" Requires="a14">
           <p:sp>
             <p:nvSpPr>
               <p:cNvPr id="3" name="Content Placeholder 2">
@@ -28323,7 +28319,15 @@
                 </a:pPr>
                 <a:r>
                   <a:rPr lang="en-US" dirty="0"/>
-                  <a:t>For the first block, the sender calculates M(1) C(0), that is, calculates the exclusive-or of the first block of cleartext with the IV. It then runs the result through the block-cipher algorithm to get the corresponding ciphertext block; that is, C(1) = </a:t>
+                  <a:t>For the first block, the sender calculates M(1) </a:t>
+                </a:r>
+                <a:r>
+                  <a:rPr lang="en-US" dirty="0" err="1"/>
+                  <a:t>xor</a:t>
+                </a:r>
+                <a:r>
+                  <a:rPr lang="en-US" dirty="0"/>
+                  <a:t> C(0), that is, calculates the exclusive-or of the first block of cleartext with the IV. It then runs the result through the block-cipher algorithm to get the corresponding ciphertext block; that is, C(1) = </a:t>
                 </a:r>
                 <a14:m>
                   <m:oMath xmlns:m="http://schemas.openxmlformats.org/officeDocument/2006/math">
@@ -28384,15 +28388,6 @@
                         <m:nor/>
                       </m:rPr>
                       <a:rPr lang="en-US"/>
-                      <m:t>)</m:t>
-                    </m:r>
-                    <m:r>
-                      <m:rPr>
-                        <m:nor/>
-                      </m:rPr>
-                      <a:rPr lang="en-US">
-                        <a:latin typeface="Cambria Math" panose="02040503050406030204" pitchFamily="18" charset="0"/>
-                      </a:rPr>
                       <m:t>)</m:t>
                     </m:r>
                     <m:r>
@@ -28516,7 +28511,7 @@
                       <a:rPr lang="en-US">
                         <a:latin typeface="Cambria Math" panose="02040503050406030204" pitchFamily="18" charset="0"/>
                       </a:rPr>
-                      <m:t>) </m:t>
+                      <m:t> </m:t>
                     </m:r>
                   </m:oMath>
                 </a14:m>
@@ -28532,7 +28527,7 @@
             </p:txBody>
           </p:sp>
         </mc:Choice>
-        <mc:Fallback xmlns="">
+        <mc:Fallback>
           <p:sp>
             <p:nvSpPr>
               <p:cNvPr id="3" name="Content Placeholder 2">
@@ -28553,7 +28548,7 @@
               <a:blipFill>
                 <a:blip r:embed="rId2"/>
                 <a:stretch>
-                  <a:fillRect l="-985" t="-2410" r="-431"/>
+                  <a:fillRect l="-985" t="-2410" r="-1477"/>
                 </a:stretch>
               </a:blipFill>
             </p:spPr>
@@ -28671,8 +28666,8 @@
           </a:prstGeom>
         </p:spPr>
       </p:pic>
-      <mc:AlternateContent xmlns:mc="http://schemas.openxmlformats.org/markup-compatibility/2006" xmlns:a14="http://schemas.microsoft.com/office/drawing/2010/main">
-        <mc:Choice Requires="a14">
+      <mc:AlternateContent xmlns:mc="http://schemas.openxmlformats.org/markup-compatibility/2006">
+        <mc:Choice xmlns:a14="http://schemas.microsoft.com/office/drawing/2010/main" Requires="a14">
           <p:sp>
             <p:nvSpPr>
               <p:cNvPr id="6" name="TextBox 5">
@@ -28994,10 +28989,6 @@
                 </a:r>
               </a:p>
               <a:p>
-                <a:pPr marL="285750" indent="-285750">
-                  <a:buFont typeface="Arial" panose="020B0604020202020204" pitchFamily="34" charset="0"/>
-                  <a:buChar char="•"/>
-                </a:pPr>
                 <a:r>
                   <a:rPr lang="en-US" dirty="0"/>
                   <a:t> </a:t>
@@ -29110,7 +29101,7 @@
             </p:txBody>
           </p:sp>
         </mc:Choice>
-        <mc:Fallback xmlns="">
+        <mc:Fallback>
           <p:sp>
             <p:nvSpPr>
               <p:cNvPr id="6" name="TextBox 5">
@@ -29835,8 +29826,8 @@
           </a:p>
         </p:txBody>
       </p:sp>
-      <mc:AlternateContent xmlns:mc="http://schemas.openxmlformats.org/markup-compatibility/2006" xmlns:a14="http://schemas.microsoft.com/office/drawing/2010/main">
-        <mc:Choice Requires="a14">
+      <mc:AlternateContent xmlns:mc="http://schemas.openxmlformats.org/markup-compatibility/2006">
+        <mc:Choice xmlns:a14="http://schemas.microsoft.com/office/drawing/2010/main" Requires="a14">
           <p:sp>
             <p:nvSpPr>
               <p:cNvPr id="3" name="Content Placeholder 2">
@@ -29969,13 +29960,46 @@
                 </a14:m>
                 <a:r>
                   <a:rPr lang="en-US" dirty="0"/>
-                  <a:t> mod n. Bob receives the RSA-encrypted session key, c, and decrypts it to obtain the session key, KS. Bob now knows the session key that Alice will use for her encrypted data transfer.</a:t>
+                  <a:t> mod n. Bob receives the RSA-encrypted session key, c, and decrypts it to obtain the session key, </a:t>
+                </a:r>
+                <a14:m>
+                  <m:oMath xmlns:m="http://schemas.openxmlformats.org/officeDocument/2006/math">
+                    <m:sSub>
+                      <m:sSubPr>
+                        <m:ctrlPr>
+                          <a:rPr lang="en-US" i="1">
+                            <a:latin typeface="Cambria Math" panose="02040503050406030204" pitchFamily="18" charset="0"/>
+                          </a:rPr>
+                        </m:ctrlPr>
+                      </m:sSubPr>
+                      <m:e>
+                        <m:r>
+                          <a:rPr lang="en-US" i="1">
+                            <a:latin typeface="Cambria Math" panose="02040503050406030204" pitchFamily="18" charset="0"/>
+                          </a:rPr>
+                          <m:t>𝐾</m:t>
+                        </m:r>
+                      </m:e>
+                      <m:sub>
+                        <m:r>
+                          <a:rPr lang="en-US" i="1">
+                            <a:latin typeface="Cambria Math" panose="02040503050406030204" pitchFamily="18" charset="0"/>
+                          </a:rPr>
+                          <m:t>𝑆</m:t>
+                        </m:r>
+                      </m:sub>
+                    </m:sSub>
+                  </m:oMath>
+                </a14:m>
+                <a:r>
+                  <a:rPr lang="en-US" dirty="0"/>
+                  <a:t>. Bob now knows the session key that Alice will use for her encrypted data transfer.</a:t>
                 </a:r>
               </a:p>
             </p:txBody>
           </p:sp>
         </mc:Choice>
-        <mc:Fallback xmlns="">
+        <mc:Fallback>
           <p:sp>
             <p:nvSpPr>
               <p:cNvPr id="3" name="Content Placeholder 2">
@@ -30000,7 +30024,7 @@
               <a:blipFill>
                 <a:blip r:embed="rId2"/>
                 <a:stretch>
-                  <a:fillRect l="-579" t="-1181" r="-322"/>
+                  <a:fillRect l="-579" t="-1181" r="-386"/>
                 </a:stretch>
               </a:blipFill>
             </p:spPr>
@@ -30446,7 +30470,15 @@
             </a:pPr>
             <a:r>
               <a:rPr lang="en-US" dirty="0"/>
-              <a:t>Alice creates message m, concatenates s with m to create m + s, and calculates the hash        H(m + s) (for example, with SHA-1). H(m + s) is called the message </a:t>
+              <a:t>Alice creates message m, concatenates s with m to create m + s, and calculates the hash        H(m + s) (for example, with SHA-1). H(m + s) is called the </a:t>
+            </a:r>
+            <a:r>
+              <a:rPr lang="en-US" b="1" dirty="0"/>
+              <a:t>message</a:t>
+            </a:r>
+            <a:r>
+              <a:rPr lang="en-US" dirty="0"/>
+              <a:t> </a:t>
             </a:r>
             <a:r>
               <a:rPr lang="en-US" b="1" dirty="0"/>
@@ -31043,7 +31075,7 @@
                 </a:pPr>
                 <a:r>
                   <a:rPr lang="en-US" dirty="0"/>
-                  <a:t> Does the digital signature </a:t>
+                  <a:t>Does the digital signature </a:t>
                 </a:r>
                 <a14:m>
                   <m:oMath xmlns:m="http://schemas.openxmlformats.org/officeDocument/2006/math">
@@ -31441,8 +31473,8 @@
           </a:p>
         </p:txBody>
       </p:sp>
-      <mc:AlternateContent xmlns:mc="http://schemas.openxmlformats.org/markup-compatibility/2006">
-        <mc:Choice xmlns:a14="http://schemas.microsoft.com/office/drawing/2010/main" Requires="a14">
+      <mc:AlternateContent xmlns:mc="http://schemas.openxmlformats.org/markup-compatibility/2006" xmlns:a14="http://schemas.microsoft.com/office/drawing/2010/main">
+        <mc:Choice Requires="a14">
           <p:sp>
             <p:nvSpPr>
               <p:cNvPr id="3" name="Content Placeholder 2">
@@ -31977,7 +32009,7 @@
             </p:txBody>
           </p:sp>
         </mc:Choice>
-        <mc:Fallback>
+        <mc:Fallback xmlns="">
           <p:sp>
             <p:nvSpPr>
               <p:cNvPr id="3" name="Content Placeholder 2">
@@ -32300,7 +32332,7 @@
           <a:p>
             <a:r>
               <a:rPr lang="en-US" dirty="0"/>
-              <a:t>Trudy is the intruder which might be quite a clever one!!.</a:t>
+              <a:t>Trudy is the intruder which seems to be quite a clever one!!.</a:t>
             </a:r>
           </a:p>
         </p:txBody>
@@ -32552,6 +32584,136 @@
 </p:sld>
 </file>
 
+<file path=ppt/slides/slide38.xml><?xml version="1.0" encoding="utf-8"?>
+<p:sld xmlns:a="http://schemas.openxmlformats.org/drawingml/2006/main" xmlns:r="http://schemas.openxmlformats.org/officeDocument/2006/relationships" xmlns:p="http://schemas.openxmlformats.org/presentationml/2006/main">
+  <p:cSld>
+    <p:spTree>
+      <p:nvGrpSpPr>
+        <p:cNvPr id="1" name=""/>
+        <p:cNvGrpSpPr/>
+        <p:nvPr/>
+      </p:nvGrpSpPr>
+      <p:grpSpPr>
+        <a:xfrm>
+          <a:off x="0" y="0"/>
+          <a:ext cx="0" cy="0"/>
+          <a:chOff x="0" y="0"/>
+          <a:chExt cx="0" cy="0"/>
+        </a:xfrm>
+      </p:grpSpPr>
+      <p:sp>
+        <p:nvSpPr>
+          <p:cNvPr id="2" name="Title 1">
+            <a:extLst>
+              <a:ext uri="{FF2B5EF4-FFF2-40B4-BE49-F238E27FC236}">
+                <a16:creationId xmlns:a16="http://schemas.microsoft.com/office/drawing/2014/main" id="{33E1568E-3E86-ADB9-EAD8-3FDFD70054AE}"/>
+              </a:ext>
+            </a:extLst>
+          </p:cNvPr>
+          <p:cNvSpPr>
+            <a:spLocks noGrp="1"/>
+          </p:cNvSpPr>
+          <p:nvPr>
+            <p:ph type="title"/>
+          </p:nvPr>
+        </p:nvSpPr>
+        <p:spPr/>
+        <p:txBody>
+          <a:bodyPr/>
+          <a:lstStyle/>
+          <a:p>
+            <a:r>
+              <a:rPr lang="en-US" dirty="0"/>
+              <a:t> </a:t>
+            </a:r>
+          </a:p>
+        </p:txBody>
+      </p:sp>
+      <p:sp>
+        <p:nvSpPr>
+          <p:cNvPr id="3" name="Content Placeholder 2">
+            <a:extLst>
+              <a:ext uri="{FF2B5EF4-FFF2-40B4-BE49-F238E27FC236}">
+                <a16:creationId xmlns:a16="http://schemas.microsoft.com/office/drawing/2014/main" id="{F1421A1A-8209-4A4B-3CF0-97101E6367E4}"/>
+              </a:ext>
+            </a:extLst>
+          </p:cNvPr>
+          <p:cNvSpPr>
+            <a:spLocks noGrp="1"/>
+          </p:cNvSpPr>
+          <p:nvPr>
+            <p:ph idx="1"/>
+          </p:nvPr>
+        </p:nvSpPr>
+        <p:spPr>
+          <a:xfrm>
+            <a:off x="1141413" y="731772"/>
+            <a:ext cx="9905999" cy="3541714"/>
+          </a:xfrm>
+        </p:spPr>
+        <p:txBody>
+          <a:bodyPr/>
+          <a:lstStyle/>
+          <a:p>
+            <a:pPr marL="0" indent="0">
+              <a:buNone/>
+            </a:pPr>
+            <a:r>
+              <a:rPr lang="en-US" dirty="0"/>
+              <a:t>When Bob places his order he also sends his CA-signed certificate. Alice uses the CA’s public key to check the validity of Bob’s certificate and extract Bob’s public key.</a:t>
+            </a:r>
+          </a:p>
+        </p:txBody>
+      </p:sp>
+      <p:pic>
+        <p:nvPicPr>
+          <p:cNvPr id="5" name="Picture 4">
+            <a:extLst>
+              <a:ext uri="{FF2B5EF4-FFF2-40B4-BE49-F238E27FC236}">
+                <a16:creationId xmlns:a16="http://schemas.microsoft.com/office/drawing/2014/main" id="{5F02FA49-E02B-37DD-D664-844BC3A245B9}"/>
+              </a:ext>
+            </a:extLst>
+          </p:cNvPr>
+          <p:cNvPicPr>
+            <a:picLocks noChangeAspect="1"/>
+          </p:cNvPicPr>
+          <p:nvPr/>
+        </p:nvPicPr>
+        <p:blipFill>
+          <a:blip r:embed="rId3">
+            <a:extLst>
+              <a:ext uri="{28A0092B-C50C-407E-A947-70E740481C1C}">
+                <a14:useLocalDpi xmlns:a14="http://schemas.microsoft.com/office/drawing/2010/main" val="0"/>
+              </a:ext>
+            </a:extLst>
+          </a:blip>
+          <a:stretch>
+            <a:fillRect/>
+          </a:stretch>
+        </p:blipFill>
+        <p:spPr>
+          <a:xfrm>
+            <a:off x="3109271" y="2356339"/>
+            <a:ext cx="5970282" cy="3610827"/>
+          </a:xfrm>
+          <a:prstGeom prst="rect">
+            <a:avLst/>
+          </a:prstGeom>
+        </p:spPr>
+      </p:pic>
+    </p:spTree>
+    <p:extLst>
+      <p:ext uri="{BB962C8B-B14F-4D97-AF65-F5344CB8AC3E}">
+        <p14:creationId xmlns:p14="http://schemas.microsoft.com/office/powerpoint/2010/main" val="1325818965"/>
+      </p:ext>
+    </p:extLst>
+  </p:cSld>
+  <p:clrMapOvr>
+    <a:masterClrMapping/>
+  </p:clrMapOvr>
+</p:sld>
+</file>
+
 <file path=ppt/slides/slide4.xml><?xml version="1.0" encoding="utf-8"?>
 <p:sld xmlns:a="http://schemas.openxmlformats.org/drawingml/2006/main" xmlns:r="http://schemas.openxmlformats.org/officeDocument/2006/relationships" xmlns:p="http://schemas.openxmlformats.org/presentationml/2006/main">
   <p:cSld>
@@ -32826,23 +32988,7 @@
             </a:pPr>
             <a:r>
               <a:rPr lang="en-US" dirty="0"/>
-              <a:t>Alice and Bob want to ensure that the content of their communication is not altered, either maliciously or by accident, in transit. </a:t>
-            </a:r>
-            <a:r>
-              <a:rPr lang="en-US" dirty="0" err="1"/>
-              <a:t>Exten</a:t>
-            </a:r>
-            <a:r>
-              <a:rPr lang="en-US" dirty="0"/>
-              <a:t> </a:t>
-            </a:r>
-            <a:r>
-              <a:rPr lang="en-US" dirty="0" err="1"/>
-              <a:t>sions</a:t>
-            </a:r>
-            <a:r>
-              <a:rPr lang="en-US" dirty="0"/>
-              <a:t> to the </a:t>
+              <a:t>Alice and Bob want to ensure that the content of their communication is not altered, either maliciously or by accident, in transit. Extensions to the </a:t>
             </a:r>
             <a:r>
               <a:rPr lang="en-US" dirty="0" err="1"/>
@@ -32850,7 +32996,7 @@
             </a:r>
             <a:r>
               <a:rPr lang="en-US" dirty="0"/>
-              <a:t> techniques that we encountered in reliable transport and data link protocols can be used to provide such message integrity. </a:t>
+              <a:t> techniques that have been encountered in reliable transport and data link protocols can be used to provide such message integrity. </a:t>
             </a:r>
           </a:p>
         </p:txBody>
@@ -34408,6 +34554,49 @@
 </a:themeOverride>
 </file>
 
+<file path=ppt/theme/themeOverride19.xml><?xml version="1.0" encoding="utf-8"?>
+<a:themeOverride xmlns:a="http://schemas.openxmlformats.org/drawingml/2006/main">
+  <a:clrScheme name="Violet II">
+    <a:dk1>
+      <a:sysClr val="windowText" lastClr="000000"/>
+    </a:dk1>
+    <a:lt1>
+      <a:sysClr val="window" lastClr="FFFFFF"/>
+    </a:lt1>
+    <a:dk2>
+      <a:srgbClr val="632E62"/>
+    </a:dk2>
+    <a:lt2>
+      <a:srgbClr val="EAE5EB"/>
+    </a:lt2>
+    <a:accent1>
+      <a:srgbClr val="92278F"/>
+    </a:accent1>
+    <a:accent2>
+      <a:srgbClr val="9B57D3"/>
+    </a:accent2>
+    <a:accent3>
+      <a:srgbClr val="755DD9"/>
+    </a:accent3>
+    <a:accent4>
+      <a:srgbClr val="665EB8"/>
+    </a:accent4>
+    <a:accent5>
+      <a:srgbClr val="45A5ED"/>
+    </a:accent5>
+    <a:accent6>
+      <a:srgbClr val="5982DB"/>
+    </a:accent6>
+    <a:hlink>
+      <a:srgbClr val="0066FF"/>
+    </a:hlink>
+    <a:folHlink>
+      <a:srgbClr val="666699"/>
+    </a:folHlink>
+  </a:clrScheme>
+</a:themeOverride>
+</file>
+
 <file path=ppt/theme/themeOverride2.xml><?xml version="1.0" encoding="utf-8"?>
 <a:themeOverride xmlns:a="http://schemas.openxmlformats.org/drawingml/2006/main">
   <a:clrScheme name="Green Yellow">

</xml_diff>

<commit_message>
finished the slides for the seminar
</commit_message>
<xml_diff>
--- a/TLS.pptx
+++ b/TLS.pptx
@@ -6,7 +6,7 @@
     <p:sldMasterId id="2147483750" r:id="rId2"/>
   </p:sldMasterIdLst>
   <p:notesMasterIdLst>
-    <p:notesMasterId r:id="rId41"/>
+    <p:notesMasterId r:id="rId57"/>
   </p:notesMasterIdLst>
   <p:sldIdLst>
     <p:sldId id="256" r:id="rId3"/>
@@ -47,6 +47,22 @@
     <p:sldId id="291" r:id="rId38"/>
     <p:sldId id="292" r:id="rId39"/>
     <p:sldId id="293" r:id="rId40"/>
+    <p:sldId id="294" r:id="rId41"/>
+    <p:sldId id="295" r:id="rId42"/>
+    <p:sldId id="296" r:id="rId43"/>
+    <p:sldId id="297" r:id="rId44"/>
+    <p:sldId id="298" r:id="rId45"/>
+    <p:sldId id="299" r:id="rId46"/>
+    <p:sldId id="300" r:id="rId47"/>
+    <p:sldId id="301" r:id="rId48"/>
+    <p:sldId id="302" r:id="rId49"/>
+    <p:sldId id="303" r:id="rId50"/>
+    <p:sldId id="304" r:id="rId51"/>
+    <p:sldId id="305" r:id="rId52"/>
+    <p:sldId id="306" r:id="rId53"/>
+    <p:sldId id="307" r:id="rId54"/>
+    <p:sldId id="308" r:id="rId55"/>
+    <p:sldId id="309" r:id="rId56"/>
   </p:sldIdLst>
   <p:sldSz cx="12192000" cy="6858000"/>
   <p:notesSz cx="6858000" cy="9144000"/>
@@ -202,6 +218,26 @@
             <p14:sldId id="293"/>
           </p14:sldIdLst>
         </p14:section>
+        <p14:section name="Securing TCP Connections: TLS" id="{AA38E30B-AD15-42E2-A797-0FD51473FFAE}">
+          <p14:sldIdLst>
+            <p14:sldId id="294"/>
+            <p14:sldId id="295"/>
+            <p14:sldId id="296"/>
+            <p14:sldId id="297"/>
+            <p14:sldId id="298"/>
+            <p14:sldId id="299"/>
+            <p14:sldId id="300"/>
+            <p14:sldId id="301"/>
+            <p14:sldId id="302"/>
+            <p14:sldId id="303"/>
+            <p14:sldId id="304"/>
+            <p14:sldId id="305"/>
+            <p14:sldId id="306"/>
+            <p14:sldId id="307"/>
+            <p14:sldId id="308"/>
+            <p14:sldId id="309"/>
+          </p14:sldIdLst>
+        </p14:section>
       </p14:sectionLst>
     </p:ext>
     <p:ext uri="{EFAFB233-063F-42B5-8137-9DF3F51BA10A}">
@@ -293,7 +329,7 @@
           <a:p>
             <a:fld id="{DB2C1E28-4850-40A3-8B1C-AB5C3E19CFA4}" type="datetimeFigureOut">
               <a:rPr lang="en-US" smtClean="0"/>
-              <a:t>2/16/2026</a:t>
+              <a:t>2/17/2026</a:t>
             </a:fld>
             <a:endParaRPr lang="en-US"/>
           </a:p>
@@ -5010,7 +5046,7 @@
           <a:p>
             <a:fld id="{4559D4BB-A0F9-4B27-80E6-E5E59F9288D1}" type="datetimeFigureOut">
               <a:rPr lang="en-US" smtClean="0"/>
-              <a:t>2/16/2026</a:t>
+              <a:t>2/17/2026</a:t>
             </a:fld>
             <a:endParaRPr lang="en-US"/>
           </a:p>
@@ -5277,7 +5313,7 @@
           <a:p>
             <a:fld id="{4559D4BB-A0F9-4B27-80E6-E5E59F9288D1}" type="datetimeFigureOut">
               <a:rPr lang="en-US" smtClean="0"/>
-              <a:t>2/16/2026</a:t>
+              <a:t>2/17/2026</a:t>
             </a:fld>
             <a:endParaRPr lang="en-US"/>
           </a:p>
@@ -5473,7 +5509,7 @@
           <a:p>
             <a:fld id="{4559D4BB-A0F9-4B27-80E6-E5E59F9288D1}" type="datetimeFigureOut">
               <a:rPr lang="en-US" smtClean="0"/>
-              <a:t>2/16/2026</a:t>
+              <a:t>2/17/2026</a:t>
             </a:fld>
             <a:endParaRPr lang="en-US"/>
           </a:p>
@@ -5736,7 +5772,7 @@
           <a:p>
             <a:fld id="{4559D4BB-A0F9-4B27-80E6-E5E59F9288D1}" type="datetimeFigureOut">
               <a:rPr lang="en-US" smtClean="0"/>
-              <a:t>2/16/2026</a:t>
+              <a:t>2/17/2026</a:t>
             </a:fld>
             <a:endParaRPr lang="en-US"/>
           </a:p>
@@ -6170,7 +6206,7 @@
           <a:p>
             <a:fld id="{4559D4BB-A0F9-4B27-80E6-E5E59F9288D1}" type="datetimeFigureOut">
               <a:rPr lang="en-US" smtClean="0"/>
-              <a:t>2/16/2026</a:t>
+              <a:t>2/17/2026</a:t>
             </a:fld>
             <a:endParaRPr lang="en-US"/>
           </a:p>
@@ -6716,7 +6752,7 @@
           <a:p>
             <a:fld id="{4559D4BB-A0F9-4B27-80E6-E5E59F9288D1}" type="datetimeFigureOut">
               <a:rPr lang="en-US" smtClean="0"/>
-              <a:t>2/16/2026</a:t>
+              <a:t>2/17/2026</a:t>
             </a:fld>
             <a:endParaRPr lang="en-US"/>
           </a:p>
@@ -7436,7 +7472,7 @@
           <a:p>
             <a:fld id="{4559D4BB-A0F9-4B27-80E6-E5E59F9288D1}" type="datetimeFigureOut">
               <a:rPr lang="en-US" smtClean="0"/>
-              <a:t>2/16/2026</a:t>
+              <a:t>2/17/2026</a:t>
             </a:fld>
             <a:endParaRPr lang="en-US"/>
           </a:p>
@@ -7606,7 +7642,7 @@
           <a:p>
             <a:fld id="{4559D4BB-A0F9-4B27-80E6-E5E59F9288D1}" type="datetimeFigureOut">
               <a:rPr lang="en-US" smtClean="0"/>
-              <a:t>2/16/2026</a:t>
+              <a:t>2/17/2026</a:t>
             </a:fld>
             <a:endParaRPr lang="en-US"/>
           </a:p>
@@ -7786,7 +7822,7 @@
           <a:p>
             <a:fld id="{4559D4BB-A0F9-4B27-80E6-E5E59F9288D1}" type="datetimeFigureOut">
               <a:rPr lang="en-US" smtClean="0"/>
-              <a:t>2/16/2026</a:t>
+              <a:t>2/17/2026</a:t>
             </a:fld>
             <a:endParaRPr lang="en-US"/>
           </a:p>
@@ -12123,7 +12159,7 @@
           <a:p>
             <a:fld id="{4559D4BB-A0F9-4B27-80E6-E5E59F9288D1}" type="datetimeFigureOut">
               <a:rPr lang="en-US" smtClean="0"/>
-              <a:t>2/16/2026</a:t>
+              <a:t>2/17/2026</a:t>
             </a:fld>
             <a:endParaRPr lang="en-US"/>
           </a:p>
@@ -12303,7 +12339,7 @@
           <a:p>
             <a:fld id="{4559D4BB-A0F9-4B27-80E6-E5E59F9288D1}" type="datetimeFigureOut">
               <a:rPr lang="en-US" smtClean="0"/>
-              <a:t>2/16/2026</a:t>
+              <a:t>2/17/2026</a:t>
             </a:fld>
             <a:endParaRPr lang="en-US"/>
           </a:p>
@@ -12473,7 +12509,7 @@
           <a:p>
             <a:fld id="{4559D4BB-A0F9-4B27-80E6-E5E59F9288D1}" type="datetimeFigureOut">
               <a:rPr lang="en-US" smtClean="0"/>
-              <a:t>2/16/2026</a:t>
+              <a:t>2/17/2026</a:t>
             </a:fld>
             <a:endParaRPr lang="en-US"/>
           </a:p>
@@ -12723,7 +12759,7 @@
           <a:p>
             <a:fld id="{4559D4BB-A0F9-4B27-80E6-E5E59F9288D1}" type="datetimeFigureOut">
               <a:rPr lang="en-US" smtClean="0"/>
-              <a:t>2/16/2026</a:t>
+              <a:t>2/17/2026</a:t>
             </a:fld>
             <a:endParaRPr lang="en-US"/>
           </a:p>
@@ -12955,7 +12991,7 @@
           <a:p>
             <a:fld id="{4559D4BB-A0F9-4B27-80E6-E5E59F9288D1}" type="datetimeFigureOut">
               <a:rPr lang="en-US" smtClean="0"/>
-              <a:t>2/16/2026</a:t>
+              <a:t>2/17/2026</a:t>
             </a:fld>
             <a:endParaRPr lang="en-US"/>
           </a:p>
@@ -13336,7 +13372,7 @@
           <a:p>
             <a:fld id="{4559D4BB-A0F9-4B27-80E6-E5E59F9288D1}" type="datetimeFigureOut">
               <a:rPr lang="en-US" smtClean="0"/>
-              <a:t>2/16/2026</a:t>
+              <a:t>2/17/2026</a:t>
             </a:fld>
             <a:endParaRPr lang="en-US"/>
           </a:p>
@@ -13454,7 +13490,7 @@
           <a:p>
             <a:fld id="{4559D4BB-A0F9-4B27-80E6-E5E59F9288D1}" type="datetimeFigureOut">
               <a:rPr lang="en-US" smtClean="0"/>
-              <a:t>2/16/2026</a:t>
+              <a:t>2/17/2026</a:t>
             </a:fld>
             <a:endParaRPr lang="en-US"/>
           </a:p>
@@ -13549,7 +13585,7 @@
           <a:p>
             <a:fld id="{4559D4BB-A0F9-4B27-80E6-E5E59F9288D1}" type="datetimeFigureOut">
               <a:rPr lang="en-US" smtClean="0"/>
-              <a:t>2/16/2026</a:t>
+              <a:t>2/17/2026</a:t>
             </a:fld>
             <a:endParaRPr lang="en-US"/>
           </a:p>
@@ -13798,7 +13834,7 @@
           <a:p>
             <a:fld id="{4559D4BB-A0F9-4B27-80E6-E5E59F9288D1}" type="datetimeFigureOut">
               <a:rPr lang="en-US" smtClean="0"/>
-              <a:t>2/16/2026</a:t>
+              <a:t>2/17/2026</a:t>
             </a:fld>
             <a:endParaRPr lang="en-US"/>
           </a:p>
@@ -14078,7 +14114,7 @@
           <a:p>
             <a:fld id="{4559D4BB-A0F9-4B27-80E6-E5E59F9288D1}" type="datetimeFigureOut">
               <a:rPr lang="en-US" smtClean="0"/>
-              <a:t>2/16/2026</a:t>
+              <a:t>2/17/2026</a:t>
             </a:fld>
             <a:endParaRPr lang="en-US"/>
           </a:p>
@@ -14335,7 +14371,7 @@
           <a:p>
             <a:fld id="{4559D4BB-A0F9-4B27-80E6-E5E59F9288D1}" type="datetimeFigureOut">
               <a:rPr lang="en-US" smtClean="0"/>
-              <a:t>2/16/2026</a:t>
+              <a:t>2/17/2026</a:t>
             </a:fld>
             <a:endParaRPr lang="en-US"/>
           </a:p>
@@ -14531,7 +14567,7 @@
           <a:p>
             <a:fld id="{4559D4BB-A0F9-4B27-80E6-E5E59F9288D1}" type="datetimeFigureOut">
               <a:rPr lang="en-US" smtClean="0"/>
-              <a:t>2/16/2026</a:t>
+              <a:t>2/17/2026</a:t>
             </a:fld>
             <a:endParaRPr lang="en-US"/>
           </a:p>
@@ -14794,7 +14830,7 @@
           <a:p>
             <a:fld id="{4559D4BB-A0F9-4B27-80E6-E5E59F9288D1}" type="datetimeFigureOut">
               <a:rPr lang="en-US" smtClean="0"/>
-              <a:t>2/16/2026</a:t>
+              <a:t>2/17/2026</a:t>
             </a:fld>
             <a:endParaRPr lang="en-US"/>
           </a:p>
@@ -15282,7 +15318,7 @@
           <a:p>
             <a:fld id="{4559D4BB-A0F9-4B27-80E6-E5E59F9288D1}" type="datetimeFigureOut">
               <a:rPr lang="en-US" smtClean="0"/>
-              <a:t>2/16/2026</a:t>
+              <a:t>2/17/2026</a:t>
             </a:fld>
             <a:endParaRPr lang="en-US"/>
           </a:p>
@@ -15478,7 +15514,7 @@
           <a:p>
             <a:fld id="{4559D4BB-A0F9-4B27-80E6-E5E59F9288D1}" type="datetimeFigureOut">
               <a:rPr lang="en-US" smtClean="0"/>
-              <a:t>2/16/2026</a:t>
+              <a:t>2/17/2026</a:t>
             </a:fld>
             <a:endParaRPr lang="en-US"/>
           </a:p>
@@ -16024,7 +16060,7 @@
           <a:p>
             <a:fld id="{4559D4BB-A0F9-4B27-80E6-E5E59F9288D1}" type="datetimeFigureOut">
               <a:rPr lang="en-US" smtClean="0"/>
-              <a:t>2/16/2026</a:t>
+              <a:t>2/17/2026</a:t>
             </a:fld>
             <a:endParaRPr lang="en-US"/>
           </a:p>
@@ -16744,7 +16780,7 @@
           <a:p>
             <a:fld id="{4559D4BB-A0F9-4B27-80E6-E5E59F9288D1}" type="datetimeFigureOut">
               <a:rPr lang="en-US" smtClean="0"/>
-              <a:t>2/16/2026</a:t>
+              <a:t>2/17/2026</a:t>
             </a:fld>
             <a:endParaRPr lang="en-US"/>
           </a:p>
@@ -16914,7 +16950,7 @@
           <a:p>
             <a:fld id="{4559D4BB-A0F9-4B27-80E6-E5E59F9288D1}" type="datetimeFigureOut">
               <a:rPr lang="en-US" smtClean="0"/>
-              <a:t>2/16/2026</a:t>
+              <a:t>2/17/2026</a:t>
             </a:fld>
             <a:endParaRPr lang="en-US"/>
           </a:p>
@@ -17094,7 +17130,7 @@
           <a:p>
             <a:fld id="{4559D4BB-A0F9-4B27-80E6-E5E59F9288D1}" type="datetimeFigureOut">
               <a:rPr lang="en-US" smtClean="0"/>
-              <a:t>2/16/2026</a:t>
+              <a:t>2/17/2026</a:t>
             </a:fld>
             <a:endParaRPr lang="en-US"/>
           </a:p>
@@ -17326,7 +17362,7 @@
           <a:p>
             <a:fld id="{4559D4BB-A0F9-4B27-80E6-E5E59F9288D1}" type="datetimeFigureOut">
               <a:rPr lang="en-US" smtClean="0"/>
-              <a:t>2/16/2026</a:t>
+              <a:t>2/17/2026</a:t>
             </a:fld>
             <a:endParaRPr lang="en-US"/>
           </a:p>
@@ -17707,7 +17743,7 @@
           <a:p>
             <a:fld id="{4559D4BB-A0F9-4B27-80E6-E5E59F9288D1}" type="datetimeFigureOut">
               <a:rPr lang="en-US" smtClean="0"/>
-              <a:t>2/16/2026</a:t>
+              <a:t>2/17/2026</a:t>
             </a:fld>
             <a:endParaRPr lang="en-US"/>
           </a:p>
@@ -17825,7 +17861,7 @@
           <a:p>
             <a:fld id="{4559D4BB-A0F9-4B27-80E6-E5E59F9288D1}" type="datetimeFigureOut">
               <a:rPr lang="en-US" smtClean="0"/>
-              <a:t>2/16/2026</a:t>
+              <a:t>2/17/2026</a:t>
             </a:fld>
             <a:endParaRPr lang="en-US"/>
           </a:p>
@@ -17920,7 +17956,7 @@
           <a:p>
             <a:fld id="{4559D4BB-A0F9-4B27-80E6-E5E59F9288D1}" type="datetimeFigureOut">
               <a:rPr lang="en-US" smtClean="0"/>
-              <a:t>2/16/2026</a:t>
+              <a:t>2/17/2026</a:t>
             </a:fld>
             <a:endParaRPr lang="en-US"/>
           </a:p>
@@ -18169,7 +18205,7 @@
           <a:p>
             <a:fld id="{4559D4BB-A0F9-4B27-80E6-E5E59F9288D1}" type="datetimeFigureOut">
               <a:rPr lang="en-US" smtClean="0"/>
-              <a:t>2/16/2026</a:t>
+              <a:t>2/17/2026</a:t>
             </a:fld>
             <a:endParaRPr lang="en-US"/>
           </a:p>
@@ -18449,7 +18485,7 @@
           <a:p>
             <a:fld id="{4559D4BB-A0F9-4B27-80E6-E5E59F9288D1}" type="datetimeFigureOut">
               <a:rPr lang="en-US" smtClean="0"/>
-              <a:t>2/16/2026</a:t>
+              <a:t>2/17/2026</a:t>
             </a:fld>
             <a:endParaRPr lang="en-US"/>
           </a:p>
@@ -21516,7 +21552,7 @@
           <a:p>
             <a:fld id="{4559D4BB-A0F9-4B27-80E6-E5E59F9288D1}" type="datetimeFigureOut">
               <a:rPr lang="en-US" smtClean="0"/>
-              <a:t>2/16/2026</a:t>
+              <a:t>2/17/2026</a:t>
             </a:fld>
             <a:endParaRPr lang="en-US"/>
           </a:p>
@@ -24935,7 +24971,7 @@
           <a:p>
             <a:fld id="{4559D4BB-A0F9-4B27-80E6-E5E59F9288D1}" type="datetimeFigureOut">
               <a:rPr lang="en-US" smtClean="0"/>
-              <a:t>2/16/2026</a:t>
+              <a:t>2/17/2026</a:t>
             </a:fld>
             <a:endParaRPr lang="en-US"/>
           </a:p>
@@ -27431,16 +27467,6 @@
             <a:r>
               <a:rPr lang="en-US" dirty="0"/>
               <a:t>Message Integrity and Digital Signatures</a:t>
-            </a:r>
-          </a:p>
-          <a:p>
-            <a:pPr marL="457200" indent="-457200">
-              <a:buFont typeface="+mj-lt"/>
-              <a:buAutoNum type="arabicPeriod"/>
-            </a:pPr>
-            <a:r>
-              <a:rPr lang="en-US" dirty="0"/>
-              <a:t>End-Point Authentication</a:t>
             </a:r>
           </a:p>
           <a:p>
@@ -28270,8 +28296,8 @@
           </a:p>
         </p:txBody>
       </p:sp>
-      <mc:AlternateContent xmlns:mc="http://schemas.openxmlformats.org/markup-compatibility/2006">
-        <mc:Choice xmlns:a14="http://schemas.microsoft.com/office/drawing/2010/main" Requires="a14">
+      <mc:AlternateContent xmlns:mc="http://schemas.openxmlformats.org/markup-compatibility/2006" xmlns:a14="http://schemas.microsoft.com/office/drawing/2010/main">
+        <mc:Choice Requires="a14">
           <p:sp>
             <p:nvSpPr>
               <p:cNvPr id="3" name="Content Placeholder 2">
@@ -28527,7 +28553,7 @@
             </p:txBody>
           </p:sp>
         </mc:Choice>
-        <mc:Fallback>
+        <mc:Fallback xmlns="">
           <p:sp>
             <p:nvSpPr>
               <p:cNvPr id="3" name="Content Placeholder 2">
@@ -28997,7 +29023,7 @@
               <a:p>
                 <a:r>
                   <a:rPr lang="en-US" dirty="0"/>
-                  <a:t>					</a:t>
+                  <a:t>			</a:t>
                 </a:r>
                 <a14:m>
                   <m:oMath xmlns:m="http://schemas.openxmlformats.org/officeDocument/2006/math">
@@ -29079,7 +29105,89 @@
                 </a14:m>
                 <a:r>
                   <a:rPr lang="en-US" dirty="0"/>
-                  <a:t>(M)) = M</a:t>
+                  <a:t>(M)) = </a:t>
+                </a:r>
+                <a14:m>
+                  <m:oMath xmlns:m="http://schemas.openxmlformats.org/officeDocument/2006/math">
+                    <m:sSubSup>
+                      <m:sSubSupPr>
+                        <m:ctrlPr>
+                          <a:rPr lang="en-US" i="1">
+                            <a:latin typeface="Cambria Math" panose="02040503050406030204" pitchFamily="18" charset="0"/>
+                          </a:rPr>
+                        </m:ctrlPr>
+                      </m:sSubSupPr>
+                      <m:e>
+                        <m:r>
+                          <a:rPr lang="en-US" i="1">
+                            <a:latin typeface="Cambria Math" panose="02040503050406030204" pitchFamily="18" charset="0"/>
+                          </a:rPr>
+                          <m:t>𝐾</m:t>
+                        </m:r>
+                      </m:e>
+                      <m:sub>
+                        <m:r>
+                          <a:rPr lang="en-US" i="1">
+                            <a:latin typeface="Cambria Math" panose="02040503050406030204" pitchFamily="18" charset="0"/>
+                          </a:rPr>
+                          <m:t>𝐵</m:t>
+                        </m:r>
+                      </m:sub>
+                      <m:sup>
+                        <m:r>
+                          <a:rPr lang="en-US" b="0" i="1" smtClean="0">
+                            <a:latin typeface="Cambria Math" panose="02040503050406030204" pitchFamily="18" charset="0"/>
+                          </a:rPr>
+                          <m:t>+</m:t>
+                        </m:r>
+                      </m:sup>
+                    </m:sSubSup>
+                  </m:oMath>
+                </a14:m>
+                <a:r>
+                  <a:rPr lang="en-US" dirty="0"/>
+                  <a:t>(</a:t>
+                </a:r>
+                <a14:m>
+                  <m:oMath xmlns:m="http://schemas.openxmlformats.org/officeDocument/2006/math">
+                    <m:sSubSup>
+                      <m:sSubSupPr>
+                        <m:ctrlPr>
+                          <a:rPr lang="en-US" i="1">
+                            <a:latin typeface="Cambria Math" panose="02040503050406030204" pitchFamily="18" charset="0"/>
+                          </a:rPr>
+                        </m:ctrlPr>
+                      </m:sSubSupPr>
+                      <m:e>
+                        <m:r>
+                          <a:rPr lang="en-US" i="1">
+                            <a:latin typeface="Cambria Math" panose="02040503050406030204" pitchFamily="18" charset="0"/>
+                          </a:rPr>
+                          <m:t>𝐾</m:t>
+                        </m:r>
+                      </m:e>
+                      <m:sub>
+                        <m:r>
+                          <a:rPr lang="en-US" i="1">
+                            <a:latin typeface="Cambria Math" panose="02040503050406030204" pitchFamily="18" charset="0"/>
+                          </a:rPr>
+                          <m:t>𝐵</m:t>
+                        </m:r>
+                      </m:sub>
+                      <m:sup>
+                        <m:r>
+                          <a:rPr lang="en-US" b="0" i="1" smtClean="0">
+                            <a:latin typeface="Cambria Math" panose="02040503050406030204" pitchFamily="18" charset="0"/>
+                          </a:rPr>
+                          <m:t>−</m:t>
+                        </m:r>
+                      </m:sup>
+                    </m:sSubSup>
+                  </m:oMath>
+                </a14:m>
+                <a:r>
+                  <a:rPr lang="en-US" dirty="0"/>
+                  <a:t>(M))  = M</a:t>
                 </a:r>
               </a:p>
               <a:p>
@@ -29826,8 +29934,8 @@
           </a:p>
         </p:txBody>
       </p:sp>
-      <mc:AlternateContent xmlns:mc="http://schemas.openxmlformats.org/markup-compatibility/2006">
-        <mc:Choice xmlns:a14="http://schemas.microsoft.com/office/drawing/2010/main" Requires="a14">
+      <mc:AlternateContent xmlns:mc="http://schemas.openxmlformats.org/markup-compatibility/2006" xmlns:a14="http://schemas.microsoft.com/office/drawing/2010/main">
+        <mc:Choice Requires="a14">
           <p:sp>
             <p:nvSpPr>
               <p:cNvPr id="3" name="Content Placeholder 2">
@@ -29999,7 +30107,7 @@
             </p:txBody>
           </p:sp>
         </mc:Choice>
-        <mc:Fallback>
+        <mc:Fallback xmlns="">
           <p:sp>
             <p:nvSpPr>
               <p:cNvPr id="3" name="Content Placeholder 2">
@@ -31040,8 +31148,8 @@
           </a:p>
         </p:txBody>
       </p:sp>
-      <mc:AlternateContent xmlns:mc="http://schemas.openxmlformats.org/markup-compatibility/2006">
-        <mc:Choice xmlns:a14="http://schemas.microsoft.com/office/drawing/2010/main" Requires="a14">
+      <mc:AlternateContent xmlns:mc="http://schemas.openxmlformats.org/markup-compatibility/2006" xmlns:a14="http://schemas.microsoft.com/office/drawing/2010/main">
+        <mc:Choice Requires="a14">
           <p:sp>
             <p:nvSpPr>
               <p:cNvPr id="3" name="Content Placeholder 2">
@@ -31335,7 +31443,7 @@
             </p:txBody>
           </p:sp>
         </mc:Choice>
-        <mc:Fallback>
+        <mc:Fallback xmlns="">
           <p:sp>
             <p:nvSpPr>
               <p:cNvPr id="3" name="Content Placeholder 2">
@@ -32512,65 +32620,49 @@
         </p:nvSpPr>
         <p:spPr>
           <a:xfrm>
-            <a:off x="976463" y="2097088"/>
-            <a:ext cx="5102277" cy="3717681"/>
+            <a:off x="1096422" y="2097088"/>
+            <a:ext cx="9995980" cy="3502434"/>
           </a:xfrm>
         </p:spPr>
         <p:txBody>
           <a:bodyPr>
-            <a:normAutofit fontScale="77500" lnSpcReduction="20000"/>
+            <a:normAutofit fontScale="85000" lnSpcReduction="10000"/>
           </a:bodyPr>
           <a:lstStyle/>
           <a:p>
             <a:r>
               <a:rPr lang="en-US" dirty="0"/>
-              <a:t>Binding a public key to a particular entity is typically done by a Certification Authority (CA), whose job is to validate identities and issue certificates.</a:t>
-            </a:r>
-          </a:p>
-          <a:p>
+              <a:t>Binding a public key to a particular entity is typically done by a Certification Authority (CA), whose job is to validate identities and issue certificates. A CA has the following roles:</a:t>
+            </a:r>
+          </a:p>
+          <a:p>
+            <a:pPr marL="457200" indent="-457200">
+              <a:buFont typeface="+mj-lt"/>
+              <a:buAutoNum type="arabicPeriod"/>
+            </a:pPr>
+            <a:r>
+              <a:rPr lang="en-US" dirty="0"/>
+              <a:t>A CA verifies that an entity (a person, a router, and so on) is who it says it is. There are no mandated procedures for how certification is done. When dealing with a CA, one must trust the CA to have performed a suitably rigorous identity verification.</a:t>
+            </a:r>
+          </a:p>
+          <a:p>
+            <a:pPr marL="457200" indent="-457200">
+              <a:buFont typeface="+mj-lt"/>
+              <a:buAutoNum type="arabicPeriod"/>
+            </a:pPr>
             <a:r>
               <a:rPr lang="en-US" dirty="0"/>
               <a:t>Once the CA verifies the identity of the entity, the CA creates a certificate that binds the public key of the entity to the identity. The certificate contains the public key and globally unique identifying information about the owner of the public key (for example, a human name or an IP address). The certificate is digitally signed by the CA. </a:t>
             </a:r>
           </a:p>
+          <a:p>
+            <a:pPr marL="0" indent="0">
+              <a:buNone/>
+            </a:pPr>
+            <a:endParaRPr lang="en-US" dirty="0"/>
+          </a:p>
         </p:txBody>
       </p:sp>
-      <p:pic>
-        <p:nvPicPr>
-          <p:cNvPr id="5" name="Picture 4">
-            <a:extLst>
-              <a:ext uri="{FF2B5EF4-FFF2-40B4-BE49-F238E27FC236}">
-                <a16:creationId xmlns:a16="http://schemas.microsoft.com/office/drawing/2014/main" id="{1598310E-9C61-F881-6B04-183CFE87364B}"/>
-              </a:ext>
-            </a:extLst>
-          </p:cNvPr>
-          <p:cNvPicPr>
-            <a:picLocks noChangeAspect="1"/>
-          </p:cNvPicPr>
-          <p:nvPr/>
-        </p:nvPicPr>
-        <p:blipFill>
-          <a:blip r:embed="rId4">
-            <a:extLst>
-              <a:ext uri="{28A0092B-C50C-407E-A947-70E740481C1C}">
-                <a14:useLocalDpi xmlns:a14="http://schemas.microsoft.com/office/drawing/2010/main" val="0"/>
-              </a:ext>
-            </a:extLst>
-          </a:blip>
-          <a:stretch>
-            <a:fillRect/>
-          </a:stretch>
-        </p:blipFill>
-        <p:spPr>
-          <a:xfrm>
-            <a:off x="6246866" y="2285624"/>
-            <a:ext cx="4968671" cy="3124471"/>
-          </a:xfrm>
-          <a:prstGeom prst="rect">
-            <a:avLst/>
-          </a:prstGeom>
-        </p:spPr>
-      </p:pic>
     </p:spTree>
     <p:extLst>
       <p:ext uri="{BB962C8B-B14F-4D97-AF65-F5344CB8AC3E}">
@@ -32714,6 +32806,139 @@
 </p:sld>
 </file>
 
+<file path=ppt/slides/slide39.xml><?xml version="1.0" encoding="utf-8"?>
+<p:sld xmlns:a="http://schemas.openxmlformats.org/drawingml/2006/main" xmlns:r="http://schemas.openxmlformats.org/officeDocument/2006/relationships" xmlns:p="http://schemas.openxmlformats.org/presentationml/2006/main">
+  <p:cSld>
+    <p:spTree>
+      <p:nvGrpSpPr>
+        <p:cNvPr id="1" name=""/>
+        <p:cNvGrpSpPr/>
+        <p:nvPr/>
+      </p:nvGrpSpPr>
+      <p:grpSpPr>
+        <a:xfrm>
+          <a:off x="0" y="0"/>
+          <a:ext cx="0" cy="0"/>
+          <a:chOff x="0" y="0"/>
+          <a:chExt cx="0" cy="0"/>
+        </a:xfrm>
+      </p:grpSpPr>
+      <p:sp>
+        <p:nvSpPr>
+          <p:cNvPr id="2" name="Title 1">
+            <a:extLst>
+              <a:ext uri="{FF2B5EF4-FFF2-40B4-BE49-F238E27FC236}">
+                <a16:creationId xmlns:a16="http://schemas.microsoft.com/office/drawing/2014/main" id="{BC526789-ECB7-7B3F-30B9-24F34570ADC1}"/>
+              </a:ext>
+            </a:extLst>
+          </p:cNvPr>
+          <p:cNvSpPr>
+            <a:spLocks noGrp="1"/>
+          </p:cNvSpPr>
+          <p:nvPr>
+            <p:ph type="title"/>
+          </p:nvPr>
+        </p:nvSpPr>
+        <p:spPr/>
+        <p:txBody>
+          <a:bodyPr/>
+          <a:lstStyle/>
+          <a:p>
+            <a:r>
+              <a:rPr lang="en-US" dirty="0"/>
+              <a:t>Transport Layer Security (TLS)</a:t>
+            </a:r>
+          </a:p>
+        </p:txBody>
+      </p:sp>
+      <p:sp>
+        <p:nvSpPr>
+          <p:cNvPr id="3" name="Content Placeholder 2">
+            <a:extLst>
+              <a:ext uri="{FF2B5EF4-FFF2-40B4-BE49-F238E27FC236}">
+                <a16:creationId xmlns:a16="http://schemas.microsoft.com/office/drawing/2014/main" id="{6B4CDD84-8D50-2468-1845-3C830815A352}"/>
+              </a:ext>
+            </a:extLst>
+          </p:cNvPr>
+          <p:cNvSpPr>
+            <a:spLocks noGrp="1"/>
+          </p:cNvSpPr>
+          <p:nvPr>
+            <p:ph idx="1"/>
+          </p:nvPr>
+        </p:nvSpPr>
+        <p:spPr/>
+        <p:txBody>
+          <a:bodyPr>
+            <a:normAutofit fontScale="92500" lnSpcReduction="10000"/>
+          </a:bodyPr>
+          <a:lstStyle/>
+          <a:p>
+            <a:pPr marL="0" indent="0">
+              <a:buNone/>
+            </a:pPr>
+            <a:r>
+              <a:rPr lang="en-US" dirty="0"/>
+              <a:t>we’ll drop down a layer in the protocol stack and examine how cryptography can enhance TCP with security services, including confidentiality, data integrity, and end-point authentication. This enhanced version of TCP is commonly known as </a:t>
+            </a:r>
+            <a:r>
+              <a:rPr lang="en-US" b="1" dirty="0"/>
+              <a:t>Transport Layer Security (TLS)</a:t>
+            </a:r>
+            <a:r>
+              <a:rPr lang="en-US" dirty="0"/>
+              <a:t>.</a:t>
+            </a:r>
+          </a:p>
+          <a:p>
+            <a:r>
+              <a:rPr lang="en-US" dirty="0"/>
+              <a:t>An earlier and similar version of this protocol is SSL version 3.</a:t>
+            </a:r>
+          </a:p>
+          <a:p>
+            <a:r>
+              <a:rPr lang="en-US" dirty="0"/>
+              <a:t>TLS is supported by all popular Web browsers and Web servers.</a:t>
+            </a:r>
+          </a:p>
+          <a:p>
+            <a:r>
+              <a:rPr lang="en-US" dirty="0"/>
+              <a:t>You can identify that TLS is being used by your browser when the URL begins with </a:t>
+            </a:r>
+            <a:r>
+              <a:rPr lang="en-US" b="1" dirty="0"/>
+              <a:t>https: </a:t>
+            </a:r>
+            <a:r>
+              <a:rPr lang="en-US" dirty="0"/>
+              <a:t>rather than </a:t>
+            </a:r>
+            <a:r>
+              <a:rPr lang="en-US" b="1" dirty="0"/>
+              <a:t>http</a:t>
+            </a:r>
+            <a:r>
+              <a:rPr lang="en-US" dirty="0"/>
+              <a:t>.</a:t>
+            </a:r>
+          </a:p>
+        </p:txBody>
+      </p:sp>
+    </p:spTree>
+    <p:extLst>
+      <p:ext uri="{BB962C8B-B14F-4D97-AF65-F5344CB8AC3E}">
+        <p14:creationId xmlns:p14="http://schemas.microsoft.com/office/powerpoint/2010/main" val="466660757"/>
+      </p:ext>
+    </p:extLst>
+  </p:cSld>
+  <p:clrMapOvr>
+    <a:masterClrMapping/>
+  </p:clrMapOvr>
+</p:sld>
+</file>
+
 <file path=ppt/slides/slide4.xml><?xml version="1.0" encoding="utf-8"?>
 <p:sld xmlns:a="http://schemas.openxmlformats.org/drawingml/2006/main" xmlns:r="http://schemas.openxmlformats.org/officeDocument/2006/relationships" xmlns:p="http://schemas.openxmlformats.org/presentationml/2006/main">
   <p:cSld>
@@ -32811,6 +33036,1601 @@
     <p:extLst>
       <p:ext uri="{BB962C8B-B14F-4D97-AF65-F5344CB8AC3E}">
         <p14:creationId xmlns:p14="http://schemas.microsoft.com/office/powerpoint/2010/main" val="2205686605"/>
+      </p:ext>
+    </p:extLst>
+  </p:cSld>
+  <p:clrMapOvr>
+    <a:masterClrMapping/>
+  </p:clrMapOvr>
+</p:sld>
+</file>
+
+<file path=ppt/slides/slide40.xml><?xml version="1.0" encoding="utf-8"?>
+<p:sld xmlns:a="http://schemas.openxmlformats.org/drawingml/2006/main" xmlns:r="http://schemas.openxmlformats.org/officeDocument/2006/relationships" xmlns:p="http://schemas.openxmlformats.org/presentationml/2006/main">
+  <p:cSld>
+    <p:spTree>
+      <p:nvGrpSpPr>
+        <p:cNvPr id="1" name=""/>
+        <p:cNvGrpSpPr/>
+        <p:nvPr/>
+      </p:nvGrpSpPr>
+      <p:grpSpPr>
+        <a:xfrm>
+          <a:off x="0" y="0"/>
+          <a:ext cx="0" cy="0"/>
+          <a:chOff x="0" y="0"/>
+          <a:chExt cx="0" cy="0"/>
+        </a:xfrm>
+      </p:grpSpPr>
+      <p:sp>
+        <p:nvSpPr>
+          <p:cNvPr id="2" name="Title 1">
+            <a:extLst>
+              <a:ext uri="{FF2B5EF4-FFF2-40B4-BE49-F238E27FC236}">
+                <a16:creationId xmlns:a16="http://schemas.microsoft.com/office/drawing/2014/main" id="{F2074F09-DD9E-A28B-A083-0C1A12329E0A}"/>
+              </a:ext>
+            </a:extLst>
+          </p:cNvPr>
+          <p:cNvSpPr>
+            <a:spLocks noGrp="1"/>
+          </p:cNvSpPr>
+          <p:nvPr>
+            <p:ph type="title"/>
+          </p:nvPr>
+        </p:nvSpPr>
+        <p:spPr/>
+        <p:txBody>
+          <a:bodyPr/>
+          <a:lstStyle/>
+          <a:p>
+            <a:r>
+              <a:rPr lang="en-US" dirty="0"/>
+              <a:t>Example of why </a:t>
+            </a:r>
+            <a:r>
+              <a:rPr lang="en-US" dirty="0" err="1"/>
+              <a:t>tls</a:t>
+            </a:r>
+            <a:r>
+              <a:rPr lang="en-US" dirty="0"/>
+              <a:t> is needed</a:t>
+            </a:r>
+          </a:p>
+        </p:txBody>
+      </p:sp>
+      <p:sp>
+        <p:nvSpPr>
+          <p:cNvPr id="3" name="Content Placeholder 2">
+            <a:extLst>
+              <a:ext uri="{FF2B5EF4-FFF2-40B4-BE49-F238E27FC236}">
+                <a16:creationId xmlns:a16="http://schemas.microsoft.com/office/drawing/2014/main" id="{4226F2F4-5742-881B-8128-2C1FAB1B4AAD}"/>
+              </a:ext>
+            </a:extLst>
+          </p:cNvPr>
+          <p:cNvSpPr>
+            <a:spLocks noGrp="1"/>
+          </p:cNvSpPr>
+          <p:nvPr>
+            <p:ph idx="1"/>
+          </p:nvPr>
+        </p:nvSpPr>
+        <p:spPr/>
+        <p:txBody>
+          <a:bodyPr>
+            <a:normAutofit lnSpcReduction="10000"/>
+          </a:bodyPr>
+          <a:lstStyle/>
+          <a:p>
+            <a:r>
+              <a:rPr lang="en-US" dirty="0"/>
+              <a:t>Alice has an incorporated ecommerce site.</a:t>
+            </a:r>
+          </a:p>
+          <a:p>
+            <a:r>
+              <a:rPr lang="en-US" dirty="0"/>
+              <a:t>Bob is surfing the web and orders his favorite perfume from Alice’s site.</a:t>
+            </a:r>
+          </a:p>
+          <a:p>
+            <a:pPr marL="0" indent="0">
+              <a:buNone/>
+            </a:pPr>
+            <a:endParaRPr lang="en-US" dirty="0"/>
+          </a:p>
+          <a:p>
+            <a:pPr marL="0" indent="0">
+              <a:buNone/>
+            </a:pPr>
+            <a:r>
+              <a:rPr lang="en-US" b="1" dirty="0"/>
+              <a:t>No Confidentiality!!	No Data Integrity!!	No Server Authentication!!	</a:t>
+            </a:r>
+          </a:p>
+          <a:p>
+            <a:pPr marL="0" indent="0">
+              <a:buNone/>
+            </a:pPr>
+            <a:endParaRPr lang="en-US" b="1" dirty="0"/>
+          </a:p>
+          <a:p>
+            <a:pPr marL="0" indent="0">
+              <a:buNone/>
+            </a:pPr>
+            <a:r>
+              <a:rPr lang="en-US" dirty="0"/>
+              <a:t>TLS addresses these issues by enhancing TCP with confidentiality, data integrity, server authentication, and client authentication.</a:t>
+            </a:r>
+            <a:endParaRPr lang="en-US" b="1" dirty="0"/>
+          </a:p>
+        </p:txBody>
+      </p:sp>
+    </p:spTree>
+    <p:extLst>
+      <p:ext uri="{BB962C8B-B14F-4D97-AF65-F5344CB8AC3E}">
+        <p14:creationId xmlns:p14="http://schemas.microsoft.com/office/powerpoint/2010/main" val="2306485388"/>
+      </p:ext>
+    </p:extLst>
+  </p:cSld>
+  <p:clrMapOvr>
+    <a:masterClrMapping/>
+  </p:clrMapOvr>
+</p:sld>
+</file>
+
+<file path=ppt/slides/slide41.xml><?xml version="1.0" encoding="utf-8"?>
+<p:sld xmlns:a="http://schemas.openxmlformats.org/drawingml/2006/main" xmlns:r="http://schemas.openxmlformats.org/officeDocument/2006/relationships" xmlns:p="http://schemas.openxmlformats.org/presentationml/2006/main">
+  <p:cSld>
+    <p:spTree>
+      <p:nvGrpSpPr>
+        <p:cNvPr id="1" name=""/>
+        <p:cNvGrpSpPr/>
+        <p:nvPr/>
+      </p:nvGrpSpPr>
+      <p:grpSpPr>
+        <a:xfrm>
+          <a:off x="0" y="0"/>
+          <a:ext cx="0" cy="0"/>
+          <a:chOff x="0" y="0"/>
+          <a:chExt cx="0" cy="0"/>
+        </a:xfrm>
+      </p:grpSpPr>
+      <p:sp>
+        <p:nvSpPr>
+          <p:cNvPr id="2" name="Title 1">
+            <a:extLst>
+              <a:ext uri="{FF2B5EF4-FFF2-40B4-BE49-F238E27FC236}">
+                <a16:creationId xmlns:a16="http://schemas.microsoft.com/office/drawing/2014/main" id="{E6A2DB10-DD80-C0A2-C692-DFDF93022B23}"/>
+              </a:ext>
+            </a:extLst>
+          </p:cNvPr>
+          <p:cNvSpPr>
+            <a:spLocks noGrp="1"/>
+          </p:cNvSpPr>
+          <p:nvPr>
+            <p:ph type="title"/>
+          </p:nvPr>
+        </p:nvSpPr>
+        <p:spPr/>
+        <p:txBody>
+          <a:bodyPr/>
+          <a:lstStyle/>
+          <a:p>
+            <a:r>
+              <a:rPr lang="en-US" dirty="0"/>
+              <a:t> </a:t>
+            </a:r>
+          </a:p>
+        </p:txBody>
+      </p:sp>
+      <p:sp>
+        <p:nvSpPr>
+          <p:cNvPr id="3" name="Content Placeholder 2">
+            <a:extLst>
+              <a:ext uri="{FF2B5EF4-FFF2-40B4-BE49-F238E27FC236}">
+                <a16:creationId xmlns:a16="http://schemas.microsoft.com/office/drawing/2014/main" id="{23683FC5-6DBF-2F7E-D533-11D1B7759391}"/>
+              </a:ext>
+            </a:extLst>
+          </p:cNvPr>
+          <p:cNvSpPr>
+            <a:spLocks noGrp="1"/>
+          </p:cNvSpPr>
+          <p:nvPr>
+            <p:ph idx="1"/>
+          </p:nvPr>
+        </p:nvSpPr>
+        <p:spPr>
+          <a:xfrm>
+            <a:off x="1141413" y="1118271"/>
+            <a:ext cx="9905999" cy="3541714"/>
+          </a:xfrm>
+        </p:spPr>
+        <p:txBody>
+          <a:bodyPr/>
+          <a:lstStyle/>
+          <a:p>
+            <a:pPr marL="0" indent="0">
+              <a:buNone/>
+            </a:pPr>
+            <a:r>
+              <a:rPr lang="en-US" dirty="0"/>
+              <a:t>However, because TLS secures TCP, it can be employed by any application that runs over TCP. TLS provides a simple Application Programmer Interface (API) with sockets, which is similar and analogous to TCP’s API.</a:t>
+            </a:r>
+          </a:p>
+          <a:p>
+            <a:pPr marL="0" indent="0">
+              <a:buNone/>
+            </a:pPr>
+            <a:endParaRPr lang="en-US" dirty="0"/>
+          </a:p>
+        </p:txBody>
+      </p:sp>
+      <p:pic>
+        <p:nvPicPr>
+          <p:cNvPr id="5" name="Picture 4">
+            <a:extLst>
+              <a:ext uri="{FF2B5EF4-FFF2-40B4-BE49-F238E27FC236}">
+                <a16:creationId xmlns:a16="http://schemas.microsoft.com/office/drawing/2014/main" id="{B3BFB260-6B4A-918C-C835-4D8B7423825D}"/>
+              </a:ext>
+            </a:extLst>
+          </p:cNvPr>
+          <p:cNvPicPr>
+            <a:picLocks noChangeAspect="1"/>
+          </p:cNvPicPr>
+          <p:nvPr/>
+        </p:nvPicPr>
+        <p:blipFill>
+          <a:blip r:embed="rId3">
+            <a:extLst>
+              <a:ext uri="{28A0092B-C50C-407E-A947-70E740481C1C}">
+                <a14:useLocalDpi xmlns:a14="http://schemas.microsoft.com/office/drawing/2010/main" val="0"/>
+              </a:ext>
+            </a:extLst>
+          </a:blip>
+          <a:stretch>
+            <a:fillRect/>
+          </a:stretch>
+        </p:blipFill>
+        <p:spPr>
+          <a:xfrm>
+            <a:off x="3535734" y="3043940"/>
+            <a:ext cx="5120531" cy="2842182"/>
+          </a:xfrm>
+          <a:prstGeom prst="rect">
+            <a:avLst/>
+          </a:prstGeom>
+        </p:spPr>
+      </p:pic>
+    </p:spTree>
+    <p:extLst>
+      <p:ext uri="{BB962C8B-B14F-4D97-AF65-F5344CB8AC3E}">
+        <p14:creationId xmlns:p14="http://schemas.microsoft.com/office/powerpoint/2010/main" val="2027944738"/>
+      </p:ext>
+    </p:extLst>
+  </p:cSld>
+  <p:clrMapOvr>
+    <a:masterClrMapping/>
+  </p:clrMapOvr>
+</p:sld>
+</file>
+
+<file path=ppt/slides/slide42.xml><?xml version="1.0" encoding="utf-8"?>
+<p:sld xmlns:a="http://schemas.openxmlformats.org/drawingml/2006/main" xmlns:r="http://schemas.openxmlformats.org/officeDocument/2006/relationships" xmlns:p="http://schemas.openxmlformats.org/presentationml/2006/main">
+  <p:cSld>
+    <p:spTree>
+      <p:nvGrpSpPr>
+        <p:cNvPr id="1" name=""/>
+        <p:cNvGrpSpPr/>
+        <p:nvPr/>
+      </p:nvGrpSpPr>
+      <p:grpSpPr>
+        <a:xfrm>
+          <a:off x="0" y="0"/>
+          <a:ext cx="0" cy="0"/>
+          <a:chOff x="0" y="0"/>
+          <a:chExt cx="0" cy="0"/>
+        </a:xfrm>
+      </p:grpSpPr>
+      <p:sp>
+        <p:nvSpPr>
+          <p:cNvPr id="2" name="Title 1">
+            <a:extLst>
+              <a:ext uri="{FF2B5EF4-FFF2-40B4-BE49-F238E27FC236}">
+                <a16:creationId xmlns:a16="http://schemas.microsoft.com/office/drawing/2014/main" id="{684BC959-FFCF-2F48-720F-838D2D1ABDB5}"/>
+              </a:ext>
+            </a:extLst>
+          </p:cNvPr>
+          <p:cNvSpPr>
+            <a:spLocks noGrp="1"/>
+          </p:cNvSpPr>
+          <p:nvPr>
+            <p:ph type="title"/>
+          </p:nvPr>
+        </p:nvSpPr>
+        <p:spPr/>
+        <p:txBody>
+          <a:bodyPr/>
+          <a:lstStyle/>
+          <a:p>
+            <a:r>
+              <a:rPr lang="en-US" dirty="0"/>
+              <a:t>Almost-</a:t>
+            </a:r>
+            <a:r>
+              <a:rPr lang="en-US" dirty="0" err="1"/>
+              <a:t>tls</a:t>
+            </a:r>
+            <a:r>
+              <a:rPr lang="en-US" dirty="0"/>
+              <a:t> (</a:t>
+            </a:r>
+            <a:r>
+              <a:rPr lang="en-US" i="1" dirty="0"/>
+              <a:t>the why and how</a:t>
+            </a:r>
+            <a:r>
+              <a:rPr lang="en-US" dirty="0"/>
+              <a:t>)</a:t>
+            </a:r>
+          </a:p>
+        </p:txBody>
+      </p:sp>
+      <p:sp>
+        <p:nvSpPr>
+          <p:cNvPr id="3" name="Content Placeholder 2">
+            <a:extLst>
+              <a:ext uri="{FF2B5EF4-FFF2-40B4-BE49-F238E27FC236}">
+                <a16:creationId xmlns:a16="http://schemas.microsoft.com/office/drawing/2014/main" id="{2B9BDB28-A034-394C-B5EE-B70E6DF57443}"/>
+              </a:ext>
+            </a:extLst>
+          </p:cNvPr>
+          <p:cNvSpPr>
+            <a:spLocks noGrp="1"/>
+          </p:cNvSpPr>
+          <p:nvPr>
+            <p:ph idx="1"/>
+          </p:nvPr>
+        </p:nvSpPr>
+        <p:spPr/>
+        <p:txBody>
+          <a:bodyPr>
+            <a:normAutofit/>
+          </a:bodyPr>
+          <a:lstStyle/>
+          <a:p>
+            <a:pPr marL="0" indent="0">
+              <a:buNone/>
+            </a:pPr>
+            <a:r>
+              <a:rPr lang="en-US" sz="2800" dirty="0"/>
+              <a:t>Almost-TLS (and TLS) has three phases: </a:t>
+            </a:r>
+          </a:p>
+          <a:p>
+            <a:r>
+              <a:rPr lang="en-US" sz="2800" dirty="0"/>
+              <a:t>Handshake</a:t>
+            </a:r>
+          </a:p>
+          <a:p>
+            <a:r>
+              <a:rPr lang="en-US" sz="2800" dirty="0"/>
+              <a:t>Key Derivation</a:t>
+            </a:r>
+          </a:p>
+          <a:p>
+            <a:r>
+              <a:rPr lang="en-US" sz="2800" dirty="0"/>
+              <a:t>Data Transfer</a:t>
+            </a:r>
+          </a:p>
+        </p:txBody>
+      </p:sp>
+    </p:spTree>
+    <p:extLst>
+      <p:ext uri="{BB962C8B-B14F-4D97-AF65-F5344CB8AC3E}">
+        <p14:creationId xmlns:p14="http://schemas.microsoft.com/office/powerpoint/2010/main" val="85270286"/>
+      </p:ext>
+    </p:extLst>
+  </p:cSld>
+  <p:clrMapOvr>
+    <a:masterClrMapping/>
+  </p:clrMapOvr>
+</p:sld>
+</file>
+
+<file path=ppt/slides/slide43.xml><?xml version="1.0" encoding="utf-8"?>
+<p:sld xmlns:a="http://schemas.openxmlformats.org/drawingml/2006/main" xmlns:r="http://schemas.openxmlformats.org/officeDocument/2006/relationships" xmlns:p="http://schemas.openxmlformats.org/presentationml/2006/main">
+  <p:cSld>
+    <p:spTree>
+      <p:nvGrpSpPr>
+        <p:cNvPr id="1" name=""/>
+        <p:cNvGrpSpPr/>
+        <p:nvPr/>
+      </p:nvGrpSpPr>
+      <p:grpSpPr>
+        <a:xfrm>
+          <a:off x="0" y="0"/>
+          <a:ext cx="0" cy="0"/>
+          <a:chOff x="0" y="0"/>
+          <a:chExt cx="0" cy="0"/>
+        </a:xfrm>
+      </p:grpSpPr>
+      <p:sp>
+        <p:nvSpPr>
+          <p:cNvPr id="2" name="Title 1">
+            <a:extLst>
+              <a:ext uri="{FF2B5EF4-FFF2-40B4-BE49-F238E27FC236}">
+                <a16:creationId xmlns:a16="http://schemas.microsoft.com/office/drawing/2014/main" id="{C6E52A3A-9431-6CF8-DFE7-D3B7510785EB}"/>
+              </a:ext>
+            </a:extLst>
+          </p:cNvPr>
+          <p:cNvSpPr>
+            <a:spLocks noGrp="1"/>
+          </p:cNvSpPr>
+          <p:nvPr>
+            <p:ph type="title"/>
+          </p:nvPr>
+        </p:nvSpPr>
+        <p:spPr/>
+        <p:txBody>
+          <a:bodyPr/>
+          <a:lstStyle/>
+          <a:p>
+            <a:r>
+              <a:rPr lang="en-US" dirty="0"/>
+              <a:t>Phase 1: Handshake</a:t>
+            </a:r>
+          </a:p>
+        </p:txBody>
+      </p:sp>
+      <p:pic>
+        <p:nvPicPr>
+          <p:cNvPr id="5" name="Content Placeholder 4">
+            <a:extLst>
+              <a:ext uri="{FF2B5EF4-FFF2-40B4-BE49-F238E27FC236}">
+                <a16:creationId xmlns:a16="http://schemas.microsoft.com/office/drawing/2014/main" id="{D3257E0A-8ADD-7146-2A81-CD9CA92473E3}"/>
+              </a:ext>
+            </a:extLst>
+          </p:cNvPr>
+          <p:cNvPicPr>
+            <a:picLocks noGrp="1" noChangeAspect="1"/>
+          </p:cNvPicPr>
+          <p:nvPr>
+            <p:ph idx="1"/>
+          </p:nvPr>
+        </p:nvPicPr>
+        <p:blipFill>
+          <a:blip r:embed="rId3"/>
+          <a:stretch>
+            <a:fillRect/>
+          </a:stretch>
+        </p:blipFill>
+        <p:spPr>
+          <a:xfrm>
+            <a:off x="2980988" y="2097088"/>
+            <a:ext cx="6226848" cy="4237469"/>
+          </a:xfrm>
+          <a:prstGeom prst="rect">
+            <a:avLst/>
+          </a:prstGeom>
+        </p:spPr>
+      </p:pic>
+    </p:spTree>
+    <p:extLst>
+      <p:ext uri="{BB962C8B-B14F-4D97-AF65-F5344CB8AC3E}">
+        <p14:creationId xmlns:p14="http://schemas.microsoft.com/office/powerpoint/2010/main" val="1974578224"/>
+      </p:ext>
+    </p:extLst>
+  </p:cSld>
+  <p:clrMapOvr>
+    <a:masterClrMapping/>
+  </p:clrMapOvr>
+</p:sld>
+</file>
+
+<file path=ppt/slides/slide44.xml><?xml version="1.0" encoding="utf-8"?>
+<p:sld xmlns:a="http://schemas.openxmlformats.org/drawingml/2006/main" xmlns:r="http://schemas.openxmlformats.org/officeDocument/2006/relationships" xmlns:p="http://schemas.openxmlformats.org/presentationml/2006/main">
+  <p:cSld>
+    <p:spTree>
+      <p:nvGrpSpPr>
+        <p:cNvPr id="1" name=""/>
+        <p:cNvGrpSpPr/>
+        <p:nvPr/>
+      </p:nvGrpSpPr>
+      <p:grpSpPr>
+        <a:xfrm>
+          <a:off x="0" y="0"/>
+          <a:ext cx="0" cy="0"/>
+          <a:chOff x="0" y="0"/>
+          <a:chExt cx="0" cy="0"/>
+        </a:xfrm>
+      </p:grpSpPr>
+      <p:sp>
+        <p:nvSpPr>
+          <p:cNvPr id="2" name="Title 1">
+            <a:extLst>
+              <a:ext uri="{FF2B5EF4-FFF2-40B4-BE49-F238E27FC236}">
+                <a16:creationId xmlns:a16="http://schemas.microsoft.com/office/drawing/2014/main" id="{22523253-B6D7-F974-1DDA-A3BC89184442}"/>
+              </a:ext>
+            </a:extLst>
+          </p:cNvPr>
+          <p:cNvSpPr>
+            <a:spLocks noGrp="1"/>
+          </p:cNvSpPr>
+          <p:nvPr>
+            <p:ph type="title"/>
+          </p:nvPr>
+        </p:nvSpPr>
+        <p:spPr>
+          <a:xfrm>
+            <a:off x="1143000" y="401701"/>
+            <a:ext cx="9905998" cy="1478570"/>
+          </a:xfrm>
+        </p:spPr>
+        <p:txBody>
+          <a:bodyPr/>
+          <a:lstStyle/>
+          <a:p>
+            <a:r>
+              <a:rPr lang="en-US" dirty="0"/>
+              <a:t>Phase 2: key derivation</a:t>
+            </a:r>
+          </a:p>
+        </p:txBody>
+      </p:sp>
+      <mc:AlternateContent xmlns:mc="http://schemas.openxmlformats.org/markup-compatibility/2006">
+        <mc:Choice xmlns:a14="http://schemas.microsoft.com/office/drawing/2010/main" Requires="a14">
+          <p:sp>
+            <p:nvSpPr>
+              <p:cNvPr id="3" name="Content Placeholder 2">
+                <a:extLst>
+                  <a:ext uri="{FF2B5EF4-FFF2-40B4-BE49-F238E27FC236}">
+                    <a16:creationId xmlns:a16="http://schemas.microsoft.com/office/drawing/2014/main" id="{079172B7-2F31-18B8-666C-008E35490056}"/>
+                  </a:ext>
+                </a:extLst>
+              </p:cNvPr>
+              <p:cNvSpPr>
+                <a:spLocks noGrp="1"/>
+              </p:cNvSpPr>
+              <p:nvPr>
+                <p:ph idx="1"/>
+              </p:nvPr>
+            </p:nvSpPr>
+            <p:spPr>
+              <a:xfrm>
+                <a:off x="878263" y="1778146"/>
+                <a:ext cx="10435473" cy="4302143"/>
+              </a:xfrm>
+            </p:spPr>
+            <p:txBody>
+              <a:bodyPr>
+                <a:normAutofit fontScale="70000" lnSpcReduction="20000"/>
+              </a:bodyPr>
+              <a:lstStyle/>
+              <a:p>
+                <a:pPr marL="0" indent="0">
+                  <a:buNone/>
+                </a:pPr>
+                <a:r>
+                  <a:rPr lang="en-US" dirty="0"/>
+                  <a:t>In principle, the MS, now shared by Bob and Alice, could be used as the symmetric session key for all subsequent encryption and data integrity checking. It is, however, generally considered safer for Alice and Bob to each use different cryptographic keys, and also to use different keys for encryption and integrity checking. Thus, both Alice and Bob use the MS to generate four keys:</a:t>
+                </a:r>
+              </a:p>
+              <a:p>
+                <a14:m>
+                  <m:oMath xmlns:m="http://schemas.openxmlformats.org/officeDocument/2006/math">
+                    <m:sSub>
+                      <m:sSubPr>
+                        <m:ctrlPr>
+                          <a:rPr lang="en-US" i="1" smtClean="0">
+                            <a:latin typeface="Cambria Math" panose="02040503050406030204" pitchFamily="18" charset="0"/>
+                          </a:rPr>
+                        </m:ctrlPr>
+                      </m:sSubPr>
+                      <m:e>
+                        <m:r>
+                          <a:rPr lang="en-US" b="0" i="1" smtClean="0">
+                            <a:latin typeface="Cambria Math" panose="02040503050406030204" pitchFamily="18" charset="0"/>
+                          </a:rPr>
+                          <m:t>𝐸</m:t>
+                        </m:r>
+                      </m:e>
+                      <m:sub>
+                        <m:r>
+                          <a:rPr lang="en-US" b="0" i="1" smtClean="0">
+                            <a:latin typeface="Cambria Math" panose="02040503050406030204" pitchFamily="18" charset="0"/>
+                          </a:rPr>
+                          <m:t>𝐵</m:t>
+                        </m:r>
+                      </m:sub>
+                    </m:sSub>
+                  </m:oMath>
+                </a14:m>
+                <a:r>
+                  <a:rPr lang="en-US" dirty="0"/>
+                  <a:t> = session encryption key for data sent from Bob to Alice.</a:t>
+                </a:r>
+              </a:p>
+              <a:p>
+                <a14:m>
+                  <m:oMath xmlns:m="http://schemas.openxmlformats.org/officeDocument/2006/math">
+                    <m:sSub>
+                      <m:sSubPr>
+                        <m:ctrlPr>
+                          <a:rPr lang="en-US" i="1" smtClean="0">
+                            <a:latin typeface="Cambria Math" panose="02040503050406030204" pitchFamily="18" charset="0"/>
+                          </a:rPr>
+                        </m:ctrlPr>
+                      </m:sSubPr>
+                      <m:e>
+                        <m:r>
+                          <a:rPr lang="en-US" b="0" i="1" smtClean="0">
+                            <a:latin typeface="Cambria Math" panose="02040503050406030204" pitchFamily="18" charset="0"/>
+                          </a:rPr>
+                          <m:t>𝑀</m:t>
+                        </m:r>
+                      </m:e>
+                      <m:sub>
+                        <m:r>
+                          <a:rPr lang="en-US" i="1">
+                            <a:latin typeface="Cambria Math" panose="02040503050406030204" pitchFamily="18" charset="0"/>
+                          </a:rPr>
+                          <m:t>𝐵</m:t>
+                        </m:r>
+                      </m:sub>
+                    </m:sSub>
+                  </m:oMath>
+                </a14:m>
+                <a:r>
+                  <a:rPr lang="en-US" dirty="0"/>
+                  <a:t> = session HMAC key for data sent from Bob to Alice, where HMAC is a standardized hashed message authentication code (MAC). </a:t>
+                </a:r>
+              </a:p>
+              <a:p>
+                <a14:m>
+                  <m:oMath xmlns:m="http://schemas.openxmlformats.org/officeDocument/2006/math">
+                    <m:sSub>
+                      <m:sSubPr>
+                        <m:ctrlPr>
+                          <a:rPr lang="en-US" i="1">
+                            <a:latin typeface="Cambria Math" panose="02040503050406030204" pitchFamily="18" charset="0"/>
+                          </a:rPr>
+                        </m:ctrlPr>
+                      </m:sSubPr>
+                      <m:e>
+                        <m:r>
+                          <a:rPr lang="en-US" i="1">
+                            <a:latin typeface="Cambria Math" panose="02040503050406030204" pitchFamily="18" charset="0"/>
+                          </a:rPr>
+                          <m:t>𝐸</m:t>
+                        </m:r>
+                      </m:e>
+                      <m:sub>
+                        <m:r>
+                          <a:rPr lang="en-US" b="0" i="1" smtClean="0">
+                            <a:latin typeface="Cambria Math" panose="02040503050406030204" pitchFamily="18" charset="0"/>
+                          </a:rPr>
+                          <m:t>𝐴</m:t>
+                        </m:r>
+                      </m:sub>
+                    </m:sSub>
+                  </m:oMath>
+                </a14:m>
+                <a:r>
+                  <a:rPr lang="en-US" dirty="0"/>
+                  <a:t> = session encryption key for data sent from Alice to Bob.</a:t>
+                </a:r>
+              </a:p>
+              <a:p>
+                <a14:m>
+                  <m:oMath xmlns:m="http://schemas.openxmlformats.org/officeDocument/2006/math">
+                    <m:sSub>
+                      <m:sSubPr>
+                        <m:ctrlPr>
+                          <a:rPr lang="en-US" i="1">
+                            <a:latin typeface="Cambria Math" panose="02040503050406030204" pitchFamily="18" charset="0"/>
+                          </a:rPr>
+                        </m:ctrlPr>
+                      </m:sSubPr>
+                      <m:e>
+                        <m:r>
+                          <a:rPr lang="en-US" b="0" i="1" smtClean="0">
+                            <a:latin typeface="Cambria Math" panose="02040503050406030204" pitchFamily="18" charset="0"/>
+                          </a:rPr>
+                          <m:t>𝑀</m:t>
+                        </m:r>
+                      </m:e>
+                      <m:sub>
+                        <m:r>
+                          <a:rPr lang="en-US" b="0" i="1" smtClean="0">
+                            <a:latin typeface="Cambria Math" panose="02040503050406030204" pitchFamily="18" charset="0"/>
+                          </a:rPr>
+                          <m:t>𝐴</m:t>
+                        </m:r>
+                      </m:sub>
+                    </m:sSub>
+                  </m:oMath>
+                </a14:m>
+                <a:r>
+                  <a:rPr lang="en-US" dirty="0"/>
+                  <a:t> = session HMAC key for data sent from Alice to Bob.</a:t>
+                </a:r>
+              </a:p>
+              <a:p>
+                <a:pPr marL="0" indent="0">
+                  <a:buNone/>
+                </a:pPr>
+                <a:r>
+                  <a:rPr lang="en-US" dirty="0"/>
+                  <a:t>Alice and Bob each generate the four keys from the MS. This could be done by simply slicing the MS into four keys. (But in reality TLS it is a little more complicated, as we’ll see.) At the end of the key derivation phase, both Alice and Bob have all four keys. The two encryption keys will be used to encrypt data; the two HMAC keys will be used to verify the integrity of the data.</a:t>
+                </a:r>
+              </a:p>
+            </p:txBody>
+          </p:sp>
+        </mc:Choice>
+        <mc:Fallback>
+          <p:sp>
+            <p:nvSpPr>
+              <p:cNvPr id="3" name="Content Placeholder 2">
+                <a:extLst>
+                  <a:ext uri="{FF2B5EF4-FFF2-40B4-BE49-F238E27FC236}">
+                    <a16:creationId xmlns:a16="http://schemas.microsoft.com/office/drawing/2014/main" id="{079172B7-2F31-18B8-666C-008E35490056}"/>
+                  </a:ext>
+                </a:extLst>
+              </p:cNvPr>
+              <p:cNvSpPr>
+                <a:spLocks noGrp="1" noRot="1" noChangeAspect="1" noMove="1" noResize="1" noEditPoints="1" noAdjustHandles="1" noChangeArrowheads="1" noChangeShapeType="1" noTextEdit="1"/>
+              </p:cNvSpPr>
+              <p:nvPr>
+                <p:ph idx="1"/>
+              </p:nvPr>
+            </p:nvSpPr>
+            <p:spPr>
+              <a:xfrm>
+                <a:off x="878263" y="1778146"/>
+                <a:ext cx="10435473" cy="4302143"/>
+              </a:xfrm>
+              <a:blipFill>
+                <a:blip r:embed="rId3"/>
+                <a:stretch>
+                  <a:fillRect l="-584" t="-567" r="-643"/>
+                </a:stretch>
+              </a:blipFill>
+            </p:spPr>
+            <p:txBody>
+              <a:bodyPr/>
+              <a:lstStyle/>
+              <a:p>
+                <a:r>
+                  <a:rPr lang="en-US">
+                    <a:noFill/>
+                  </a:rPr>
+                  <a:t> </a:t>
+                </a:r>
+              </a:p>
+            </p:txBody>
+          </p:sp>
+        </mc:Fallback>
+      </mc:AlternateContent>
+    </p:spTree>
+    <p:extLst>
+      <p:ext uri="{BB962C8B-B14F-4D97-AF65-F5344CB8AC3E}">
+        <p14:creationId xmlns:p14="http://schemas.microsoft.com/office/powerpoint/2010/main" val="3725406468"/>
+      </p:ext>
+    </p:extLst>
+  </p:cSld>
+  <p:clrMapOvr>
+    <a:masterClrMapping/>
+  </p:clrMapOvr>
+</p:sld>
+</file>
+
+<file path=ppt/slides/slide45.xml><?xml version="1.0" encoding="utf-8"?>
+<p:sld xmlns:a="http://schemas.openxmlformats.org/drawingml/2006/main" xmlns:r="http://schemas.openxmlformats.org/officeDocument/2006/relationships" xmlns:p="http://schemas.openxmlformats.org/presentationml/2006/main">
+  <p:cSld>
+    <p:spTree>
+      <p:nvGrpSpPr>
+        <p:cNvPr id="1" name=""/>
+        <p:cNvGrpSpPr/>
+        <p:nvPr/>
+      </p:nvGrpSpPr>
+      <p:grpSpPr>
+        <a:xfrm>
+          <a:off x="0" y="0"/>
+          <a:ext cx="0" cy="0"/>
+          <a:chOff x="0" y="0"/>
+          <a:chExt cx="0" cy="0"/>
+        </a:xfrm>
+      </p:grpSpPr>
+      <p:sp>
+        <p:nvSpPr>
+          <p:cNvPr id="2" name="Title 1">
+            <a:extLst>
+              <a:ext uri="{FF2B5EF4-FFF2-40B4-BE49-F238E27FC236}">
+                <a16:creationId xmlns:a16="http://schemas.microsoft.com/office/drawing/2014/main" id="{3B06CD36-F43D-BEA6-17CE-52B62D96F7BB}"/>
+              </a:ext>
+            </a:extLst>
+          </p:cNvPr>
+          <p:cNvSpPr>
+            <a:spLocks noGrp="1"/>
+          </p:cNvSpPr>
+          <p:nvPr>
+            <p:ph type="title"/>
+          </p:nvPr>
+        </p:nvSpPr>
+        <p:spPr/>
+        <p:txBody>
+          <a:bodyPr/>
+          <a:lstStyle/>
+          <a:p>
+            <a:r>
+              <a:rPr lang="en-US" dirty="0"/>
+              <a:t>Phase 3: data transfer</a:t>
+            </a:r>
+          </a:p>
+        </p:txBody>
+      </p:sp>
+      <mc:AlternateContent xmlns:mc="http://schemas.openxmlformats.org/markup-compatibility/2006">
+        <mc:Choice xmlns:a14="http://schemas.microsoft.com/office/drawing/2010/main" Requires="a14">
+          <p:sp>
+            <p:nvSpPr>
+              <p:cNvPr id="3" name="Content Placeholder 2">
+                <a:extLst>
+                  <a:ext uri="{FF2B5EF4-FFF2-40B4-BE49-F238E27FC236}">
+                    <a16:creationId xmlns:a16="http://schemas.microsoft.com/office/drawing/2014/main" id="{FEB2C6D0-4B7B-9A6F-93EA-E7C1EB8DC381}"/>
+                  </a:ext>
+                </a:extLst>
+              </p:cNvPr>
+              <p:cNvSpPr>
+                <a:spLocks noGrp="1"/>
+              </p:cNvSpPr>
+              <p:nvPr>
+                <p:ph idx="1"/>
+              </p:nvPr>
+            </p:nvSpPr>
+            <p:spPr/>
+            <p:txBody>
+              <a:bodyPr>
+                <a:normAutofit fontScale="85000" lnSpcReduction="20000"/>
+              </a:bodyPr>
+              <a:lstStyle/>
+              <a:p>
+                <a:pPr marL="0" indent="0">
+                  <a:buNone/>
+                </a:pPr>
+                <a:r>
+                  <a:rPr lang="en-US" dirty="0"/>
+                  <a:t>Now that Alice and Bob share the same four session keys (</a:t>
+                </a:r>
+                <a14:m>
+                  <m:oMath xmlns:m="http://schemas.openxmlformats.org/officeDocument/2006/math">
+                    <m:sSub>
+                      <m:sSubPr>
+                        <m:ctrlPr>
+                          <a:rPr lang="en-US" i="1"/>
+                        </m:ctrlPr>
+                      </m:sSubPr>
+                      <m:e>
+                        <m:r>
+                          <a:rPr lang="en-US" i="1"/>
+                          <m:t>𝐸</m:t>
+                        </m:r>
+                      </m:e>
+                      <m:sub>
+                        <m:r>
+                          <a:rPr lang="en-US" i="1"/>
+                          <m:t>𝐵</m:t>
+                        </m:r>
+                      </m:sub>
+                    </m:sSub>
+                  </m:oMath>
+                </a14:m>
+                <a:r>
+                  <a:rPr lang="en-US" dirty="0"/>
+                  <a:t>, </a:t>
+                </a:r>
+                <a14:m>
+                  <m:oMath xmlns:m="http://schemas.openxmlformats.org/officeDocument/2006/math">
+                    <m:sSub>
+                      <m:sSubPr>
+                        <m:ctrlPr>
+                          <a:rPr lang="en-US" i="1"/>
+                        </m:ctrlPr>
+                      </m:sSubPr>
+                      <m:e>
+                        <m:r>
+                          <a:rPr lang="en-US" i="1"/>
+                          <m:t>𝑀</m:t>
+                        </m:r>
+                      </m:e>
+                      <m:sub>
+                        <m:r>
+                          <a:rPr lang="en-US" i="1"/>
+                          <m:t>𝐵</m:t>
+                        </m:r>
+                      </m:sub>
+                    </m:sSub>
+                  </m:oMath>
+                </a14:m>
+                <a:r>
+                  <a:rPr lang="en-US" dirty="0"/>
+                  <a:t>, </a:t>
+                </a:r>
+                <a14:m>
+                  <m:oMath xmlns:m="http://schemas.openxmlformats.org/officeDocument/2006/math">
+                    <m:sSub>
+                      <m:sSubPr>
+                        <m:ctrlPr>
+                          <a:rPr lang="en-US" i="1"/>
+                        </m:ctrlPr>
+                      </m:sSubPr>
+                      <m:e>
+                        <m:r>
+                          <a:rPr lang="en-US" i="1"/>
+                          <m:t>𝐸</m:t>
+                        </m:r>
+                      </m:e>
+                      <m:sub>
+                        <m:r>
+                          <a:rPr lang="en-US" i="1"/>
+                          <m:t>𝐴</m:t>
+                        </m:r>
+                      </m:sub>
+                    </m:sSub>
+                  </m:oMath>
+                </a14:m>
+                <a:r>
+                  <a:rPr lang="en-US" dirty="0"/>
+                  <a:t>, and </a:t>
+                </a:r>
+                <a14:m>
+                  <m:oMath xmlns:m="http://schemas.openxmlformats.org/officeDocument/2006/math">
+                    <m:sSub>
+                      <m:sSubPr>
+                        <m:ctrlPr>
+                          <a:rPr lang="en-US" i="1"/>
+                        </m:ctrlPr>
+                      </m:sSubPr>
+                      <m:e>
+                        <m:r>
+                          <a:rPr lang="en-US" i="1"/>
+                          <m:t>𝑀</m:t>
+                        </m:r>
+                      </m:e>
+                      <m:sub>
+                        <m:r>
+                          <a:rPr lang="en-US" b="0" i="1" smtClean="0">
+                            <a:latin typeface="Cambria Math" panose="02040503050406030204" pitchFamily="18" charset="0"/>
+                          </a:rPr>
+                          <m:t>𝐴</m:t>
+                        </m:r>
+                      </m:sub>
+                    </m:sSub>
+                  </m:oMath>
+                </a14:m>
+                <a:r>
+                  <a:rPr lang="en-US" dirty="0"/>
+                  <a:t>), they can start to send secured data to each other over the TCP connection. Since TCP is a byte-stream protocol, a natural approach would be for TLS to encrypt application data on the fly and then pass the encrypted data on the fly to TCP. But if we were to do this, where would we put the HMAC for the integrity check? We certainly do not want to wait until the end of the TCP session to verify the integrity of all of Bob’s data that was sent over the entire session! To address this issue, TLS breaks the data stream into records, appends an HMAC to each record for integrity checking, and then encrypts the </a:t>
+                </a:r>
+                <a:r>
+                  <a:rPr lang="en-US" dirty="0" err="1"/>
+                  <a:t>record+HMAC</a:t>
+                </a:r>
+                <a:r>
+                  <a:rPr lang="en-US" dirty="0"/>
+                  <a:t>. To create the HMAC, Bob inputs the record data along with the key </a:t>
+                </a:r>
+                <a14:m>
+                  <m:oMath xmlns:m="http://schemas.openxmlformats.org/officeDocument/2006/math">
+                    <m:sSub>
+                      <m:sSubPr>
+                        <m:ctrlPr>
+                          <a:rPr lang="en-US" i="1">
+                            <a:latin typeface="Cambria Math" panose="02040503050406030204" pitchFamily="18" charset="0"/>
+                          </a:rPr>
+                        </m:ctrlPr>
+                      </m:sSubPr>
+                      <m:e>
+                        <m:r>
+                          <a:rPr lang="en-US" b="0" i="1" smtClean="0">
+                            <a:latin typeface="Cambria Math" panose="02040503050406030204" pitchFamily="18" charset="0"/>
+                          </a:rPr>
+                          <m:t>𝑀</m:t>
+                        </m:r>
+                      </m:e>
+                      <m:sub>
+                        <m:r>
+                          <a:rPr lang="en-US" i="1">
+                            <a:latin typeface="Cambria Math" panose="02040503050406030204" pitchFamily="18" charset="0"/>
+                          </a:rPr>
+                          <m:t>𝐵</m:t>
+                        </m:r>
+                      </m:sub>
+                    </m:sSub>
+                  </m:oMath>
+                </a14:m>
+                <a:r>
+                  <a:rPr lang="en-US" dirty="0"/>
+                  <a:t> into a hash function. To encrypt the package </a:t>
+                </a:r>
+                <a:r>
+                  <a:rPr lang="en-US" dirty="0" err="1"/>
+                  <a:t>record+HMAC</a:t>
+                </a:r>
+                <a:r>
+                  <a:rPr lang="en-US" dirty="0"/>
+                  <a:t>, Bob uses his session encryption key </a:t>
+                </a:r>
+                <a14:m>
+                  <m:oMath xmlns:m="http://schemas.openxmlformats.org/officeDocument/2006/math">
+                    <m:sSub>
+                      <m:sSubPr>
+                        <m:ctrlPr>
+                          <a:rPr lang="en-US" i="1"/>
+                        </m:ctrlPr>
+                      </m:sSubPr>
+                      <m:e>
+                        <m:r>
+                          <a:rPr lang="en-US" i="1"/>
+                          <m:t>𝐸</m:t>
+                        </m:r>
+                      </m:e>
+                      <m:sub>
+                        <m:r>
+                          <a:rPr lang="en-US" i="1"/>
+                          <m:t>𝐵</m:t>
+                        </m:r>
+                      </m:sub>
+                    </m:sSub>
+                  </m:oMath>
+                </a14:m>
+                <a:r>
+                  <a:rPr lang="en-US" dirty="0"/>
+                  <a:t>. This encrypted package is then passed to TCP for transport over the Internet.</a:t>
+                </a:r>
+              </a:p>
+            </p:txBody>
+          </p:sp>
+        </mc:Choice>
+        <mc:Fallback>
+          <p:sp>
+            <p:nvSpPr>
+              <p:cNvPr id="3" name="Content Placeholder 2">
+                <a:extLst>
+                  <a:ext uri="{FF2B5EF4-FFF2-40B4-BE49-F238E27FC236}">
+                    <a16:creationId xmlns:a16="http://schemas.microsoft.com/office/drawing/2014/main" id="{FEB2C6D0-4B7B-9A6F-93EA-E7C1EB8DC381}"/>
+                  </a:ext>
+                </a:extLst>
+              </p:cNvPr>
+              <p:cNvSpPr>
+                <a:spLocks noGrp="1" noRot="1" noChangeAspect="1" noMove="1" noResize="1" noEditPoints="1" noAdjustHandles="1" noChangeArrowheads="1" noChangeShapeType="1" noTextEdit="1"/>
+              </p:cNvSpPr>
+              <p:nvPr>
+                <p:ph idx="1"/>
+              </p:nvPr>
+            </p:nvSpPr>
+            <p:spPr>
+              <a:blipFill>
+                <a:blip r:embed="rId3"/>
+                <a:stretch>
+                  <a:fillRect l="-615" t="-861" r="-1292" b="-344"/>
+                </a:stretch>
+              </a:blipFill>
+            </p:spPr>
+            <p:txBody>
+              <a:bodyPr/>
+              <a:lstStyle/>
+              <a:p>
+                <a:r>
+                  <a:rPr lang="en-US">
+                    <a:noFill/>
+                  </a:rPr>
+                  <a:t> </a:t>
+                </a:r>
+              </a:p>
+            </p:txBody>
+          </p:sp>
+        </mc:Fallback>
+      </mc:AlternateContent>
+    </p:spTree>
+    <p:extLst>
+      <p:ext uri="{BB962C8B-B14F-4D97-AF65-F5344CB8AC3E}">
+        <p14:creationId xmlns:p14="http://schemas.microsoft.com/office/powerpoint/2010/main" val="559556424"/>
+      </p:ext>
+    </p:extLst>
+  </p:cSld>
+  <p:clrMapOvr>
+    <a:masterClrMapping/>
+  </p:clrMapOvr>
+</p:sld>
+</file>
+
+<file path=ppt/slides/slide46.xml><?xml version="1.0" encoding="utf-8"?>
+<p:sld xmlns:a="http://schemas.openxmlformats.org/drawingml/2006/main" xmlns:r="http://schemas.openxmlformats.org/officeDocument/2006/relationships" xmlns:p="http://schemas.openxmlformats.org/presentationml/2006/main">
+  <p:cSld>
+    <p:spTree>
+      <p:nvGrpSpPr>
+        <p:cNvPr id="1" name=""/>
+        <p:cNvGrpSpPr/>
+        <p:nvPr/>
+      </p:nvGrpSpPr>
+      <p:grpSpPr>
+        <a:xfrm>
+          <a:off x="0" y="0"/>
+          <a:ext cx="0" cy="0"/>
+          <a:chOff x="0" y="0"/>
+          <a:chExt cx="0" cy="0"/>
+        </a:xfrm>
+      </p:grpSpPr>
+      <p:sp>
+        <p:nvSpPr>
+          <p:cNvPr id="2" name="Title 1">
+            <a:extLst>
+              <a:ext uri="{FF2B5EF4-FFF2-40B4-BE49-F238E27FC236}">
+                <a16:creationId xmlns:a16="http://schemas.microsoft.com/office/drawing/2014/main" id="{9BD335F5-3155-E235-C82E-6F9E792DD0BA}"/>
+              </a:ext>
+            </a:extLst>
+          </p:cNvPr>
+          <p:cNvSpPr>
+            <a:spLocks noGrp="1"/>
+          </p:cNvSpPr>
+          <p:nvPr>
+            <p:ph type="title"/>
+          </p:nvPr>
+        </p:nvSpPr>
+        <p:spPr/>
+        <p:txBody>
+          <a:bodyPr/>
+          <a:lstStyle/>
+          <a:p>
+            <a:r>
+              <a:rPr lang="en-US" dirty="0"/>
+              <a:t>What could go wrong?</a:t>
+            </a:r>
+          </a:p>
+        </p:txBody>
+      </p:sp>
+      <p:sp>
+        <p:nvSpPr>
+          <p:cNvPr id="3" name="Content Placeholder 2">
+            <a:extLst>
+              <a:ext uri="{FF2B5EF4-FFF2-40B4-BE49-F238E27FC236}">
+                <a16:creationId xmlns:a16="http://schemas.microsoft.com/office/drawing/2014/main" id="{BD4AC439-0309-FC9D-37A7-BB97315A7540}"/>
+              </a:ext>
+            </a:extLst>
+          </p:cNvPr>
+          <p:cNvSpPr>
+            <a:spLocks noGrp="1"/>
+          </p:cNvSpPr>
+          <p:nvPr>
+            <p:ph idx="1"/>
+          </p:nvPr>
+        </p:nvSpPr>
+        <p:spPr/>
+        <p:txBody>
+          <a:bodyPr/>
+          <a:lstStyle/>
+          <a:p>
+            <a:pPr marL="0" indent="0">
+              <a:buNone/>
+            </a:pPr>
+            <a:r>
+              <a:rPr lang="en-US" dirty="0"/>
+              <a:t>Although this approach goes a long way, it still isn’t bullet-proof when it comes to providing data integrity for the entire message stream. In particular, suppose Trudy is a woman-in-the-middle and has the ability to insert, delete, and replace segments in the stream of TCP segments sent between Alice and Bob.</a:t>
+            </a:r>
+          </a:p>
+          <a:p>
+            <a:pPr marL="0" indent="0">
+              <a:buNone/>
+            </a:pPr>
+            <a:r>
+              <a:rPr lang="en-US" b="1" u="sng" dirty="0"/>
+              <a:t>EXAMPLE</a:t>
+            </a:r>
+          </a:p>
+          <a:p>
+            <a:r>
+              <a:rPr lang="en-US" dirty="0"/>
+              <a:t>Trudy captures two segments sent by Bob, reverses the order of these two segments and adjusts the sequence numbers (which are not encrypted).</a:t>
+            </a:r>
+          </a:p>
+        </p:txBody>
+      </p:sp>
+    </p:spTree>
+    <p:extLst>
+      <p:ext uri="{BB962C8B-B14F-4D97-AF65-F5344CB8AC3E}">
+        <p14:creationId xmlns:p14="http://schemas.microsoft.com/office/powerpoint/2010/main" val="3615779034"/>
+      </p:ext>
+    </p:extLst>
+  </p:cSld>
+  <p:clrMapOvr>
+    <a:masterClrMapping/>
+  </p:clrMapOvr>
+</p:sld>
+</file>
+
+<file path=ppt/slides/slide47.xml><?xml version="1.0" encoding="utf-8"?>
+<p:sld xmlns:a="http://schemas.openxmlformats.org/drawingml/2006/main" xmlns:r="http://schemas.openxmlformats.org/officeDocument/2006/relationships" xmlns:p="http://schemas.openxmlformats.org/presentationml/2006/main">
+  <p:cSld>
+    <p:spTree>
+      <p:nvGrpSpPr>
+        <p:cNvPr id="1" name=""/>
+        <p:cNvGrpSpPr/>
+        <p:nvPr/>
+      </p:nvGrpSpPr>
+      <p:grpSpPr>
+        <a:xfrm>
+          <a:off x="0" y="0"/>
+          <a:ext cx="0" cy="0"/>
+          <a:chOff x="0" y="0"/>
+          <a:chExt cx="0" cy="0"/>
+        </a:xfrm>
+      </p:grpSpPr>
+      <p:sp>
+        <p:nvSpPr>
+          <p:cNvPr id="2" name="Title 1">
+            <a:extLst>
+              <a:ext uri="{FF2B5EF4-FFF2-40B4-BE49-F238E27FC236}">
+                <a16:creationId xmlns:a16="http://schemas.microsoft.com/office/drawing/2014/main" id="{5E5F292B-A949-EF46-9944-3E6FD52BE43F}"/>
+              </a:ext>
+            </a:extLst>
+          </p:cNvPr>
+          <p:cNvSpPr>
+            <a:spLocks noGrp="1"/>
+          </p:cNvSpPr>
+          <p:nvPr>
+            <p:ph type="title"/>
+          </p:nvPr>
+        </p:nvSpPr>
+        <p:spPr/>
+        <p:txBody>
+          <a:bodyPr/>
+          <a:lstStyle/>
+          <a:p>
+            <a:r>
+              <a:rPr lang="en-US" dirty="0"/>
+              <a:t>Solution: encrypt the sequence number too</a:t>
+            </a:r>
+          </a:p>
+        </p:txBody>
+      </p:sp>
+      <mc:AlternateContent xmlns:mc="http://schemas.openxmlformats.org/markup-compatibility/2006">
+        <mc:Choice xmlns:a14="http://schemas.microsoft.com/office/drawing/2010/main" Requires="a14">
+          <p:sp>
+            <p:nvSpPr>
+              <p:cNvPr id="3" name="Content Placeholder 2">
+                <a:extLst>
+                  <a:ext uri="{FF2B5EF4-FFF2-40B4-BE49-F238E27FC236}">
+                    <a16:creationId xmlns:a16="http://schemas.microsoft.com/office/drawing/2014/main" id="{FB69046A-1313-62DE-686D-E8F8CEA433BB}"/>
+                  </a:ext>
+                </a:extLst>
+              </p:cNvPr>
+              <p:cNvSpPr>
+                <a:spLocks noGrp="1"/>
+              </p:cNvSpPr>
+              <p:nvPr>
+                <p:ph idx="1"/>
+              </p:nvPr>
+            </p:nvSpPr>
+            <p:spPr/>
+            <p:txBody>
+              <a:bodyPr>
+                <a:normAutofit fontScale="92500" lnSpcReduction="20000"/>
+              </a:bodyPr>
+              <a:lstStyle/>
+              <a:p>
+                <a:pPr marL="0" indent="0">
+                  <a:buNone/>
+                </a:pPr>
+                <a:r>
+                  <a:rPr lang="en-US" dirty="0"/>
+                  <a:t>The solution to this problem, as you probably guessed, is to use sequence numbers. TLS does this as follows. Bob maintains a sequence number counter, which begins at zero and is incremented for each TLS record he sends. Bob doesn’t actually include a sequence number in the record itself, but when he calculates the HMAC, he includes the sequence number in the HMAC calculation. Thus, the HMAC is now a hash of the data plus the HMAC key </a:t>
+                </a:r>
+                <a14:m>
+                  <m:oMath xmlns:m="http://schemas.openxmlformats.org/officeDocument/2006/math">
+                    <m:sSub>
+                      <m:sSubPr>
+                        <m:ctrlPr>
+                          <a:rPr lang="en-US" i="1"/>
+                        </m:ctrlPr>
+                      </m:sSubPr>
+                      <m:e>
+                        <m:r>
+                          <a:rPr lang="en-US" i="1"/>
+                          <m:t>𝑀</m:t>
+                        </m:r>
+                      </m:e>
+                      <m:sub>
+                        <m:r>
+                          <a:rPr lang="en-US" i="1"/>
+                          <m:t>𝐵</m:t>
+                        </m:r>
+                      </m:sub>
+                    </m:sSub>
+                    <m:r>
+                      <a:rPr lang="en-US" i="1"/>
+                      <m:t> </m:t>
+                    </m:r>
+                  </m:oMath>
+                </a14:m>
+                <a:r>
+                  <a:rPr lang="en-US" dirty="0"/>
+                  <a:t>plus the current sequence number. Alice tracks Bob’s sequence numbers, allowing her to verify the data integrity of a record by including the appropriate sequence number in the HMAC calculation. This use of TLS sequence numbers prevents Trudy from carrying out a woman-in-the-middle attack, such as reordering or replaying segments.</a:t>
+                </a:r>
+              </a:p>
+            </p:txBody>
+          </p:sp>
+        </mc:Choice>
+        <mc:Fallback>
+          <p:sp>
+            <p:nvSpPr>
+              <p:cNvPr id="3" name="Content Placeholder 2">
+                <a:extLst>
+                  <a:ext uri="{FF2B5EF4-FFF2-40B4-BE49-F238E27FC236}">
+                    <a16:creationId xmlns:a16="http://schemas.microsoft.com/office/drawing/2014/main" id="{FB69046A-1313-62DE-686D-E8F8CEA433BB}"/>
+                  </a:ext>
+                </a:extLst>
+              </p:cNvPr>
+              <p:cNvSpPr>
+                <a:spLocks noGrp="1" noRot="1" noChangeAspect="1" noMove="1" noResize="1" noEditPoints="1" noAdjustHandles="1" noChangeArrowheads="1" noChangeShapeType="1" noTextEdit="1"/>
+              </p:cNvSpPr>
+              <p:nvPr>
+                <p:ph idx="1"/>
+              </p:nvPr>
+            </p:nvSpPr>
+            <p:spPr>
+              <a:blipFill>
+                <a:blip r:embed="rId3"/>
+                <a:stretch>
+                  <a:fillRect l="-800" t="-1205" r="-185" b="-861"/>
+                </a:stretch>
+              </a:blipFill>
+            </p:spPr>
+            <p:txBody>
+              <a:bodyPr/>
+              <a:lstStyle/>
+              <a:p>
+                <a:r>
+                  <a:rPr lang="en-US">
+                    <a:noFill/>
+                  </a:rPr>
+                  <a:t> </a:t>
+                </a:r>
+              </a:p>
+            </p:txBody>
+          </p:sp>
+        </mc:Fallback>
+      </mc:AlternateContent>
+    </p:spTree>
+    <p:extLst>
+      <p:ext uri="{BB962C8B-B14F-4D97-AF65-F5344CB8AC3E}">
+        <p14:creationId xmlns:p14="http://schemas.microsoft.com/office/powerpoint/2010/main" val="177454765"/>
+      </p:ext>
+    </p:extLst>
+  </p:cSld>
+  <p:clrMapOvr>
+    <a:masterClrMapping/>
+  </p:clrMapOvr>
+</p:sld>
+</file>
+
+<file path=ppt/slides/slide48.xml><?xml version="1.0" encoding="utf-8"?>
+<p:sld xmlns:a="http://schemas.openxmlformats.org/drawingml/2006/main" xmlns:r="http://schemas.openxmlformats.org/officeDocument/2006/relationships" xmlns:p="http://schemas.openxmlformats.org/presentationml/2006/main">
+  <p:cSld>
+    <p:spTree>
+      <p:nvGrpSpPr>
+        <p:cNvPr id="1" name=""/>
+        <p:cNvGrpSpPr/>
+        <p:nvPr/>
+      </p:nvGrpSpPr>
+      <p:grpSpPr>
+        <a:xfrm>
+          <a:off x="0" y="0"/>
+          <a:ext cx="0" cy="0"/>
+          <a:chOff x="0" y="0"/>
+          <a:chExt cx="0" cy="0"/>
+        </a:xfrm>
+      </p:grpSpPr>
+      <p:sp>
+        <p:nvSpPr>
+          <p:cNvPr id="2" name="Title 1">
+            <a:extLst>
+              <a:ext uri="{FF2B5EF4-FFF2-40B4-BE49-F238E27FC236}">
+                <a16:creationId xmlns:a16="http://schemas.microsoft.com/office/drawing/2014/main" id="{416FD543-56D8-B738-6B25-EEE26285C674}"/>
+              </a:ext>
+            </a:extLst>
+          </p:cNvPr>
+          <p:cNvSpPr>
+            <a:spLocks noGrp="1"/>
+          </p:cNvSpPr>
+          <p:nvPr>
+            <p:ph type="title"/>
+          </p:nvPr>
+        </p:nvSpPr>
+        <p:spPr/>
+        <p:txBody>
+          <a:bodyPr/>
+          <a:lstStyle/>
+          <a:p>
+            <a:r>
+              <a:rPr lang="en-US" dirty="0" err="1"/>
+              <a:t>Tls</a:t>
+            </a:r>
+            <a:r>
+              <a:rPr lang="en-US" dirty="0"/>
+              <a:t> record</a:t>
+            </a:r>
+          </a:p>
+        </p:txBody>
+      </p:sp>
+      <p:sp>
+        <p:nvSpPr>
+          <p:cNvPr id="3" name="Content Placeholder 2">
+            <a:extLst>
+              <a:ext uri="{FF2B5EF4-FFF2-40B4-BE49-F238E27FC236}">
+                <a16:creationId xmlns:a16="http://schemas.microsoft.com/office/drawing/2014/main" id="{1400CDDA-EBCD-5788-B9F0-312A8260D203}"/>
+              </a:ext>
+            </a:extLst>
+          </p:cNvPr>
+          <p:cNvSpPr>
+            <a:spLocks noGrp="1"/>
+          </p:cNvSpPr>
+          <p:nvPr>
+            <p:ph idx="1"/>
+          </p:nvPr>
+        </p:nvSpPr>
+        <p:spPr>
+          <a:xfrm>
+            <a:off x="1556192" y="1880272"/>
+            <a:ext cx="8888708" cy="2511426"/>
+          </a:xfrm>
+        </p:spPr>
+        <p:txBody>
+          <a:bodyPr>
+            <a:normAutofit fontScale="92500" lnSpcReduction="20000"/>
+          </a:bodyPr>
+          <a:lstStyle/>
+          <a:p>
+            <a:pPr marL="0" indent="0">
+              <a:buNone/>
+            </a:pPr>
+            <a:r>
+              <a:rPr lang="en-US" dirty="0"/>
+              <a:t>The TLS record (as well as the almost-TLS record) is shown below. The record consists of a type field, version field, length field, data field, and HMAC field. Note that the first three fields are not encrypted. The type field indicates whether the record is a handshake message or a message that contains application data. It is also used to close the TLS connection. TLS at the receiving end uses the length field to extract the TLS records out of the incoming TCP byte stream. The version field is self-explanatory.</a:t>
+            </a:r>
+          </a:p>
+        </p:txBody>
+      </p:sp>
+      <p:pic>
+        <p:nvPicPr>
+          <p:cNvPr id="5" name="Picture 4">
+            <a:extLst>
+              <a:ext uri="{FF2B5EF4-FFF2-40B4-BE49-F238E27FC236}">
+                <a16:creationId xmlns:a16="http://schemas.microsoft.com/office/drawing/2014/main" id="{4BCAAFB5-2DCB-5A48-730B-E685B8F44397}"/>
+              </a:ext>
+            </a:extLst>
+          </p:cNvPr>
+          <p:cNvPicPr>
+            <a:picLocks noChangeAspect="1"/>
+          </p:cNvPicPr>
+          <p:nvPr/>
+        </p:nvPicPr>
+        <p:blipFill>
+          <a:blip r:embed="rId3">
+            <a:extLst>
+              <a:ext uri="{28A0092B-C50C-407E-A947-70E740481C1C}">
+                <a14:useLocalDpi xmlns:a14="http://schemas.microsoft.com/office/drawing/2010/main" val="0"/>
+              </a:ext>
+            </a:extLst>
+          </a:blip>
+          <a:stretch>
+            <a:fillRect/>
+          </a:stretch>
+        </p:blipFill>
+        <p:spPr>
+          <a:xfrm>
+            <a:off x="2467617" y="4771685"/>
+            <a:ext cx="7256765" cy="1327457"/>
+          </a:xfrm>
+          <a:prstGeom prst="rect">
+            <a:avLst/>
+          </a:prstGeom>
+        </p:spPr>
+      </p:pic>
+    </p:spTree>
+    <p:extLst>
+      <p:ext uri="{BB962C8B-B14F-4D97-AF65-F5344CB8AC3E}">
+        <p14:creationId xmlns:p14="http://schemas.microsoft.com/office/powerpoint/2010/main" val="3449803954"/>
+      </p:ext>
+    </p:extLst>
+  </p:cSld>
+  <p:clrMapOvr>
+    <a:masterClrMapping/>
+  </p:clrMapOvr>
+</p:sld>
+</file>
+
+<file path=ppt/slides/slide49.xml><?xml version="1.0" encoding="utf-8"?>
+<p:sld xmlns:a="http://schemas.openxmlformats.org/drawingml/2006/main" xmlns:r="http://schemas.openxmlformats.org/officeDocument/2006/relationships" xmlns:p="http://schemas.openxmlformats.org/presentationml/2006/main">
+  <p:cSld>
+    <p:spTree>
+      <p:nvGrpSpPr>
+        <p:cNvPr id="1" name=""/>
+        <p:cNvGrpSpPr/>
+        <p:nvPr/>
+      </p:nvGrpSpPr>
+      <p:grpSpPr>
+        <a:xfrm>
+          <a:off x="0" y="0"/>
+          <a:ext cx="0" cy="0"/>
+          <a:chOff x="0" y="0"/>
+          <a:chExt cx="0" cy="0"/>
+        </a:xfrm>
+      </p:grpSpPr>
+      <p:sp>
+        <p:nvSpPr>
+          <p:cNvPr id="2" name="Title 1">
+            <a:extLst>
+              <a:ext uri="{FF2B5EF4-FFF2-40B4-BE49-F238E27FC236}">
+                <a16:creationId xmlns:a16="http://schemas.microsoft.com/office/drawing/2014/main" id="{7BB2F507-51AB-2C66-B7C6-249A44CEA01E}"/>
+              </a:ext>
+            </a:extLst>
+          </p:cNvPr>
+          <p:cNvSpPr>
+            <a:spLocks noGrp="1"/>
+          </p:cNvSpPr>
+          <p:nvPr>
+            <p:ph type="title"/>
+          </p:nvPr>
+        </p:nvSpPr>
+        <p:spPr/>
+        <p:txBody>
+          <a:bodyPr/>
+          <a:lstStyle/>
+          <a:p>
+            <a:r>
+              <a:rPr lang="en-US" dirty="0"/>
+              <a:t>A more complete picture</a:t>
+            </a:r>
+          </a:p>
+        </p:txBody>
+      </p:sp>
+      <p:sp>
+        <p:nvSpPr>
+          <p:cNvPr id="3" name="Content Placeholder 2">
+            <a:extLst>
+              <a:ext uri="{FF2B5EF4-FFF2-40B4-BE49-F238E27FC236}">
+                <a16:creationId xmlns:a16="http://schemas.microsoft.com/office/drawing/2014/main" id="{F3BF11A9-C8D1-07D6-EB05-105EE7A43F07}"/>
+              </a:ext>
+            </a:extLst>
+          </p:cNvPr>
+          <p:cNvSpPr>
+            <a:spLocks noGrp="1"/>
+          </p:cNvSpPr>
+          <p:nvPr>
+            <p:ph idx="1"/>
+          </p:nvPr>
+        </p:nvSpPr>
+        <p:spPr/>
+        <p:txBody>
+          <a:bodyPr/>
+          <a:lstStyle/>
+          <a:p>
+            <a:pPr marL="0" indent="0">
+              <a:buNone/>
+            </a:pPr>
+            <a:r>
+              <a:rPr lang="en-US" dirty="0"/>
+              <a:t>The previous subsection covered the almost-TLS protocol; it served to give us a basic understanding of the why and how of TLS. Now that we have a basic under standing, we can dig a little deeper and examine the essentials of the actual TLS protocol.</a:t>
+            </a:r>
+          </a:p>
+        </p:txBody>
+      </p:sp>
+    </p:spTree>
+    <p:extLst>
+      <p:ext uri="{BB962C8B-B14F-4D97-AF65-F5344CB8AC3E}">
+        <p14:creationId xmlns:p14="http://schemas.microsoft.com/office/powerpoint/2010/main" val="3456571525"/>
       </p:ext>
     </p:extLst>
   </p:cSld>
@@ -32908,6 +34728,723 @@
     <p:extLst>
       <p:ext uri="{BB962C8B-B14F-4D97-AF65-F5344CB8AC3E}">
         <p14:creationId xmlns:p14="http://schemas.microsoft.com/office/powerpoint/2010/main" val="2964984388"/>
+      </p:ext>
+    </p:extLst>
+  </p:cSld>
+  <p:clrMapOvr>
+    <a:masterClrMapping/>
+  </p:clrMapOvr>
+</p:sld>
+</file>
+
+<file path=ppt/slides/slide50.xml><?xml version="1.0" encoding="utf-8"?>
+<p:sld xmlns:a="http://schemas.openxmlformats.org/drawingml/2006/main" xmlns:r="http://schemas.openxmlformats.org/officeDocument/2006/relationships" xmlns:p="http://schemas.openxmlformats.org/presentationml/2006/main">
+  <p:cSld>
+    <p:spTree>
+      <p:nvGrpSpPr>
+        <p:cNvPr id="1" name=""/>
+        <p:cNvGrpSpPr/>
+        <p:nvPr/>
+      </p:nvGrpSpPr>
+      <p:grpSpPr>
+        <a:xfrm>
+          <a:off x="0" y="0"/>
+          <a:ext cx="0" cy="0"/>
+          <a:chOff x="0" y="0"/>
+          <a:chExt cx="0" cy="0"/>
+        </a:xfrm>
+      </p:grpSpPr>
+      <p:sp>
+        <p:nvSpPr>
+          <p:cNvPr id="2" name="Title 1">
+            <a:extLst>
+              <a:ext uri="{FF2B5EF4-FFF2-40B4-BE49-F238E27FC236}">
+                <a16:creationId xmlns:a16="http://schemas.microsoft.com/office/drawing/2014/main" id="{49D93FD3-F867-3E39-9CCF-D3D1AC759DEB}"/>
+              </a:ext>
+            </a:extLst>
+          </p:cNvPr>
+          <p:cNvSpPr>
+            <a:spLocks noGrp="1"/>
+          </p:cNvSpPr>
+          <p:nvPr>
+            <p:ph type="title"/>
+          </p:nvPr>
+        </p:nvSpPr>
+        <p:spPr/>
+        <p:txBody>
+          <a:bodyPr/>
+          <a:lstStyle/>
+          <a:p>
+            <a:r>
+              <a:rPr lang="en-US" dirty="0"/>
+              <a:t>TLS Handshake</a:t>
+            </a:r>
+          </a:p>
+        </p:txBody>
+      </p:sp>
+      <mc:AlternateContent xmlns:mc="http://schemas.openxmlformats.org/markup-compatibility/2006">
+        <mc:Choice xmlns:a14="http://schemas.microsoft.com/office/drawing/2010/main" Requires="a14">
+          <p:sp>
+            <p:nvSpPr>
+              <p:cNvPr id="3" name="Content Placeholder 2">
+                <a:extLst>
+                  <a:ext uri="{FF2B5EF4-FFF2-40B4-BE49-F238E27FC236}">
+                    <a16:creationId xmlns:a16="http://schemas.microsoft.com/office/drawing/2014/main" id="{F077D6DA-70DE-FC74-97BA-493E78EC0735}"/>
+                  </a:ext>
+                </a:extLst>
+              </p:cNvPr>
+              <p:cNvSpPr>
+                <a:spLocks noGrp="1"/>
+              </p:cNvSpPr>
+              <p:nvPr>
+                <p:ph idx="1"/>
+              </p:nvPr>
+            </p:nvSpPr>
+            <p:spPr/>
+            <p:txBody>
+              <a:bodyPr/>
+              <a:lstStyle/>
+              <a:p>
+                <a:pPr marL="0" indent="0">
+                  <a:buNone/>
+                </a:pPr>
+                <a:r>
+                  <a:rPr lang="en-US" dirty="0"/>
+                  <a:t>SSL does not mandate that Alice and Bob use a specific symmetric key algorithm or a specific public-key algorithm. Instead, TLS allows Alice and Bob to agree on the cryptographic algorithms at the beginning of the TLS session, during the handshake phase. Additionally, during the handshake phase, Alice and Bob send nonces to each other, which are used in the creation of the session keys (</a:t>
+                </a:r>
+                <a14:m>
+                  <m:oMath xmlns:m="http://schemas.openxmlformats.org/officeDocument/2006/math">
+                    <m:sSub>
+                      <m:sSubPr>
+                        <m:ctrlPr>
+                          <a:rPr lang="en-US" i="1">
+                            <a:latin typeface="Cambria Math" panose="02040503050406030204" pitchFamily="18" charset="0"/>
+                          </a:rPr>
+                        </m:ctrlPr>
+                      </m:sSubPr>
+                      <m:e>
+                        <m:r>
+                          <a:rPr lang="en-US" i="1">
+                            <a:latin typeface="Cambria Math" panose="02040503050406030204" pitchFamily="18" charset="0"/>
+                          </a:rPr>
+                          <m:t>𝐸</m:t>
+                        </m:r>
+                      </m:e>
+                      <m:sub>
+                        <m:r>
+                          <a:rPr lang="en-US" i="1">
+                            <a:latin typeface="Cambria Math" panose="02040503050406030204" pitchFamily="18" charset="0"/>
+                          </a:rPr>
+                          <m:t>𝐵</m:t>
+                        </m:r>
+                      </m:sub>
+                    </m:sSub>
+                  </m:oMath>
+                </a14:m>
+                <a:r>
+                  <a:rPr lang="en-US" dirty="0"/>
+                  <a:t>, </a:t>
+                </a:r>
+                <a14:m>
+                  <m:oMath xmlns:m="http://schemas.openxmlformats.org/officeDocument/2006/math">
+                    <m:sSub>
+                      <m:sSubPr>
+                        <m:ctrlPr>
+                          <a:rPr lang="en-US" i="1">
+                            <a:latin typeface="Cambria Math" panose="02040503050406030204" pitchFamily="18" charset="0"/>
+                          </a:rPr>
+                        </m:ctrlPr>
+                      </m:sSubPr>
+                      <m:e>
+                        <m:r>
+                          <a:rPr lang="en-US" b="0" i="1" smtClean="0">
+                            <a:latin typeface="Cambria Math" panose="02040503050406030204" pitchFamily="18" charset="0"/>
+                          </a:rPr>
+                          <m:t>𝑀</m:t>
+                        </m:r>
+                      </m:e>
+                      <m:sub>
+                        <m:r>
+                          <a:rPr lang="en-US" i="1">
+                            <a:latin typeface="Cambria Math" panose="02040503050406030204" pitchFamily="18" charset="0"/>
+                          </a:rPr>
+                          <m:t>𝐵</m:t>
+                        </m:r>
+                      </m:sub>
+                    </m:sSub>
+                  </m:oMath>
+                </a14:m>
+                <a:r>
+                  <a:rPr lang="en-US" dirty="0"/>
+                  <a:t>, </a:t>
+                </a:r>
+                <a14:m>
+                  <m:oMath xmlns:m="http://schemas.openxmlformats.org/officeDocument/2006/math">
+                    <m:sSub>
+                      <m:sSubPr>
+                        <m:ctrlPr>
+                          <a:rPr lang="en-US" i="1">
+                            <a:latin typeface="Cambria Math" panose="02040503050406030204" pitchFamily="18" charset="0"/>
+                          </a:rPr>
+                        </m:ctrlPr>
+                      </m:sSubPr>
+                      <m:e>
+                        <m:r>
+                          <a:rPr lang="en-US" i="1">
+                            <a:latin typeface="Cambria Math" panose="02040503050406030204" pitchFamily="18" charset="0"/>
+                          </a:rPr>
+                          <m:t>𝐸</m:t>
+                        </m:r>
+                      </m:e>
+                      <m:sub>
+                        <m:r>
+                          <a:rPr lang="en-US" b="0" i="1" smtClean="0">
+                            <a:latin typeface="Cambria Math" panose="02040503050406030204" pitchFamily="18" charset="0"/>
+                          </a:rPr>
+                          <m:t>𝐴</m:t>
+                        </m:r>
+                      </m:sub>
+                    </m:sSub>
+                  </m:oMath>
+                </a14:m>
+                <a:r>
+                  <a:rPr lang="en-US" dirty="0"/>
+                  <a:t>, and </a:t>
+                </a:r>
+                <a14:m>
+                  <m:oMath xmlns:m="http://schemas.openxmlformats.org/officeDocument/2006/math">
+                    <m:sSub>
+                      <m:sSubPr>
+                        <m:ctrlPr>
+                          <a:rPr lang="en-US" i="1">
+                            <a:latin typeface="Cambria Math" panose="02040503050406030204" pitchFamily="18" charset="0"/>
+                          </a:rPr>
+                        </m:ctrlPr>
+                      </m:sSubPr>
+                      <m:e>
+                        <m:r>
+                          <a:rPr lang="en-US" b="0" i="1" smtClean="0">
+                            <a:latin typeface="Cambria Math" panose="02040503050406030204" pitchFamily="18" charset="0"/>
+                          </a:rPr>
+                          <m:t>𝑀</m:t>
+                        </m:r>
+                      </m:e>
+                      <m:sub>
+                        <m:r>
+                          <a:rPr lang="en-US" b="0" i="1" smtClean="0">
+                            <a:latin typeface="Cambria Math" panose="02040503050406030204" pitchFamily="18" charset="0"/>
+                          </a:rPr>
+                          <m:t>𝐴</m:t>
+                        </m:r>
+                      </m:sub>
+                    </m:sSub>
+                  </m:oMath>
+                </a14:m>
+                <a:r>
+                  <a:rPr lang="en-US" dirty="0"/>
+                  <a:t>). The steps of the real TLS handshake are as follows:</a:t>
+                </a:r>
+              </a:p>
+            </p:txBody>
+          </p:sp>
+        </mc:Choice>
+        <mc:Fallback>
+          <p:sp>
+            <p:nvSpPr>
+              <p:cNvPr id="3" name="Content Placeholder 2">
+                <a:extLst>
+                  <a:ext uri="{FF2B5EF4-FFF2-40B4-BE49-F238E27FC236}">
+                    <a16:creationId xmlns:a16="http://schemas.microsoft.com/office/drawing/2014/main" id="{F077D6DA-70DE-FC74-97BA-493E78EC0735}"/>
+                  </a:ext>
+                </a:extLst>
+              </p:cNvPr>
+              <p:cNvSpPr>
+                <a:spLocks noGrp="1" noRot="1" noChangeAspect="1" noMove="1" noResize="1" noEditPoints="1" noAdjustHandles="1" noChangeArrowheads="1" noChangeShapeType="1" noTextEdit="1"/>
+              </p:cNvSpPr>
+              <p:nvPr>
+                <p:ph idx="1"/>
+              </p:nvPr>
+            </p:nvSpPr>
+            <p:spPr>
+              <a:blipFill>
+                <a:blip r:embed="rId3"/>
+                <a:stretch>
+                  <a:fillRect l="-923" t="-172" r="-1231"/>
+                </a:stretch>
+              </a:blipFill>
+            </p:spPr>
+            <p:txBody>
+              <a:bodyPr/>
+              <a:lstStyle/>
+              <a:p>
+                <a:r>
+                  <a:rPr lang="en-US">
+                    <a:noFill/>
+                  </a:rPr>
+                  <a:t> </a:t>
+                </a:r>
+              </a:p>
+            </p:txBody>
+          </p:sp>
+        </mc:Fallback>
+      </mc:AlternateContent>
+    </p:spTree>
+    <p:extLst>
+      <p:ext uri="{BB962C8B-B14F-4D97-AF65-F5344CB8AC3E}">
+        <p14:creationId xmlns:p14="http://schemas.microsoft.com/office/powerpoint/2010/main" val="1904911797"/>
+      </p:ext>
+    </p:extLst>
+  </p:cSld>
+  <p:clrMapOvr>
+    <a:masterClrMapping/>
+  </p:clrMapOvr>
+</p:sld>
+</file>
+
+<file path=ppt/slides/slide51.xml><?xml version="1.0" encoding="utf-8"?>
+<p:sld xmlns:a="http://schemas.openxmlformats.org/drawingml/2006/main" xmlns:r="http://schemas.openxmlformats.org/officeDocument/2006/relationships" xmlns:p="http://schemas.openxmlformats.org/presentationml/2006/main">
+  <p:cSld>
+    <p:spTree>
+      <p:nvGrpSpPr>
+        <p:cNvPr id="1" name=""/>
+        <p:cNvGrpSpPr/>
+        <p:nvPr/>
+      </p:nvGrpSpPr>
+      <p:grpSpPr>
+        <a:xfrm>
+          <a:off x="0" y="0"/>
+          <a:ext cx="0" cy="0"/>
+          <a:chOff x="0" y="0"/>
+          <a:chExt cx="0" cy="0"/>
+        </a:xfrm>
+      </p:grpSpPr>
+      <p:sp>
+        <p:nvSpPr>
+          <p:cNvPr id="2" name="Title 1">
+            <a:extLst>
+              <a:ext uri="{FF2B5EF4-FFF2-40B4-BE49-F238E27FC236}">
+                <a16:creationId xmlns:a16="http://schemas.microsoft.com/office/drawing/2014/main" id="{7F419B23-C5DA-F581-0954-E5D10501770C}"/>
+              </a:ext>
+            </a:extLst>
+          </p:cNvPr>
+          <p:cNvSpPr>
+            <a:spLocks noGrp="1"/>
+          </p:cNvSpPr>
+          <p:nvPr>
+            <p:ph type="title"/>
+          </p:nvPr>
+        </p:nvSpPr>
+        <p:spPr/>
+        <p:txBody>
+          <a:bodyPr/>
+          <a:lstStyle/>
+          <a:p>
+            <a:r>
+              <a:rPr lang="en-US" dirty="0"/>
+              <a:t> </a:t>
+            </a:r>
+          </a:p>
+        </p:txBody>
+      </p:sp>
+      <p:sp>
+        <p:nvSpPr>
+          <p:cNvPr id="3" name="Content Placeholder 2">
+            <a:extLst>
+              <a:ext uri="{FF2B5EF4-FFF2-40B4-BE49-F238E27FC236}">
+                <a16:creationId xmlns:a16="http://schemas.microsoft.com/office/drawing/2014/main" id="{88166541-441E-C9DF-EFDE-B1D192C083B2}"/>
+              </a:ext>
+            </a:extLst>
+          </p:cNvPr>
+          <p:cNvSpPr>
+            <a:spLocks noGrp="1"/>
+          </p:cNvSpPr>
+          <p:nvPr>
+            <p:ph idx="1"/>
+          </p:nvPr>
+        </p:nvSpPr>
+        <p:spPr>
+          <a:xfrm>
+            <a:off x="1141412" y="1357803"/>
+            <a:ext cx="9905999" cy="3541714"/>
+          </a:xfrm>
+        </p:spPr>
+        <p:txBody>
+          <a:bodyPr>
+            <a:normAutofit fontScale="92500" lnSpcReduction="20000"/>
+          </a:bodyPr>
+          <a:lstStyle/>
+          <a:p>
+            <a:pPr marL="457200" indent="-457200">
+              <a:buFont typeface="+mj-lt"/>
+              <a:buAutoNum type="arabicPeriod"/>
+            </a:pPr>
+            <a:r>
+              <a:rPr lang="en-US" dirty="0"/>
+              <a:t>The client sends a list of cryptographic algorithms it supports, along with a client nonce.</a:t>
+            </a:r>
+          </a:p>
+          <a:p>
+            <a:pPr marL="457200" indent="-457200">
+              <a:buFont typeface="+mj-lt"/>
+              <a:buAutoNum type="arabicPeriod"/>
+            </a:pPr>
+            <a:r>
+              <a:rPr lang="en-US" dirty="0"/>
+              <a:t>From the list, the server chooses a symmetric algorithm (for example, AES) and a public key algorithm (for example, RSA with a specific key length), and HMAC algorithm (MD5 or SHA-1) along with the HMAC keys. It sends back to the client its choices, as well as a certificate and a server nonce.</a:t>
+            </a:r>
+          </a:p>
+          <a:p>
+            <a:pPr marL="457200" indent="-457200">
+              <a:buFont typeface="+mj-lt"/>
+              <a:buAutoNum type="arabicPeriod"/>
+            </a:pPr>
+            <a:r>
+              <a:rPr lang="en-US" dirty="0"/>
+              <a:t>The client verifies the certificate, extracts the server’s public key, generates a Pre-Master Secret (PMS), encrypts the PMS with the server’s public key, and sends the encrypted PMS to the server.</a:t>
+            </a:r>
+          </a:p>
+          <a:p>
+            <a:pPr marL="457200" indent="-457200">
+              <a:buFont typeface="+mj-lt"/>
+              <a:buAutoNum type="arabicPeriod"/>
+            </a:pPr>
+            <a:endParaRPr lang="en-US" dirty="0"/>
+          </a:p>
+        </p:txBody>
+      </p:sp>
+    </p:spTree>
+    <p:extLst>
+      <p:ext uri="{BB962C8B-B14F-4D97-AF65-F5344CB8AC3E}">
+        <p14:creationId xmlns:p14="http://schemas.microsoft.com/office/powerpoint/2010/main" val="2505524179"/>
+      </p:ext>
+    </p:extLst>
+  </p:cSld>
+  <p:clrMapOvr>
+    <a:masterClrMapping/>
+  </p:clrMapOvr>
+</p:sld>
+</file>
+
+<file path=ppt/slides/slide52.xml><?xml version="1.0" encoding="utf-8"?>
+<p:sld xmlns:a="http://schemas.openxmlformats.org/drawingml/2006/main" xmlns:r="http://schemas.openxmlformats.org/officeDocument/2006/relationships" xmlns:p="http://schemas.openxmlformats.org/presentationml/2006/main">
+  <p:cSld>
+    <p:spTree>
+      <p:nvGrpSpPr>
+        <p:cNvPr id="1" name=""/>
+        <p:cNvGrpSpPr/>
+        <p:nvPr/>
+      </p:nvGrpSpPr>
+      <p:grpSpPr>
+        <a:xfrm>
+          <a:off x="0" y="0"/>
+          <a:ext cx="0" cy="0"/>
+          <a:chOff x="0" y="0"/>
+          <a:chExt cx="0" cy="0"/>
+        </a:xfrm>
+      </p:grpSpPr>
+      <p:sp>
+        <p:nvSpPr>
+          <p:cNvPr id="2" name="Title 1">
+            <a:extLst>
+              <a:ext uri="{FF2B5EF4-FFF2-40B4-BE49-F238E27FC236}">
+                <a16:creationId xmlns:a16="http://schemas.microsoft.com/office/drawing/2014/main" id="{0320F480-2140-7995-159A-60DC45982D4A}"/>
+              </a:ext>
+            </a:extLst>
+          </p:cNvPr>
+          <p:cNvSpPr>
+            <a:spLocks noGrp="1"/>
+          </p:cNvSpPr>
+          <p:nvPr>
+            <p:ph type="title"/>
+          </p:nvPr>
+        </p:nvSpPr>
+        <p:spPr/>
+        <p:txBody>
+          <a:bodyPr/>
+          <a:lstStyle/>
+          <a:p>
+            <a:r>
+              <a:rPr lang="en-US" dirty="0"/>
+              <a:t> </a:t>
+            </a:r>
+          </a:p>
+        </p:txBody>
+      </p:sp>
+      <p:sp>
+        <p:nvSpPr>
+          <p:cNvPr id="3" name="Content Placeholder 2">
+            <a:extLst>
+              <a:ext uri="{FF2B5EF4-FFF2-40B4-BE49-F238E27FC236}">
+                <a16:creationId xmlns:a16="http://schemas.microsoft.com/office/drawing/2014/main" id="{2DD017DD-8B53-5A84-ADCC-76BDBE6BB607}"/>
+              </a:ext>
+            </a:extLst>
+          </p:cNvPr>
+          <p:cNvSpPr>
+            <a:spLocks noGrp="1"/>
+          </p:cNvSpPr>
+          <p:nvPr>
+            <p:ph idx="1"/>
+          </p:nvPr>
+        </p:nvSpPr>
+        <p:spPr>
+          <a:xfrm>
+            <a:off x="1141412" y="1457635"/>
+            <a:ext cx="9905999" cy="3541714"/>
+          </a:xfrm>
+        </p:spPr>
+        <p:txBody>
+          <a:bodyPr>
+            <a:normAutofit fontScale="92500" lnSpcReduction="20000"/>
+          </a:bodyPr>
+          <a:lstStyle/>
+          <a:p>
+            <a:pPr marL="457200" indent="-457200">
+              <a:buFont typeface="+mj-lt"/>
+              <a:buAutoNum type="arabicPeriod" startAt="4"/>
+            </a:pPr>
+            <a:r>
+              <a:rPr lang="en-US" dirty="0"/>
+              <a:t>Using the same key derivation function (as specified by the TLS standard), the client and server independently compute the Master Secret (MS) from the PMS and nonces. The MS is then sliced up to generate the two encryption and two HMAC keys. Furthermore, when the chosen symmetric cipher employs CBC (such as 3DES or AES), then two Initialization Vectors (IVs)—one for each side of the connection—are also obtained from the MS. Henceforth, all messages sent between client and server are encrypted and authenticated (with the HMAC).</a:t>
+            </a:r>
+          </a:p>
+          <a:p>
+            <a:pPr marL="457200" indent="-457200">
+              <a:buFont typeface="+mj-lt"/>
+              <a:buAutoNum type="arabicPeriod" startAt="4"/>
+            </a:pPr>
+            <a:r>
+              <a:rPr lang="en-US" dirty="0"/>
+              <a:t>The client sends the HMAC of all the handshake messages.</a:t>
+            </a:r>
+          </a:p>
+          <a:p>
+            <a:pPr marL="457200" indent="-457200">
+              <a:buFont typeface="+mj-lt"/>
+              <a:buAutoNum type="arabicPeriod" startAt="4"/>
+            </a:pPr>
+            <a:r>
+              <a:rPr lang="en-US" dirty="0"/>
+              <a:t>The server sends the HMAC of all the handshake messages.</a:t>
+            </a:r>
+          </a:p>
+        </p:txBody>
+      </p:sp>
+    </p:spTree>
+    <p:extLst>
+      <p:ext uri="{BB962C8B-B14F-4D97-AF65-F5344CB8AC3E}">
+        <p14:creationId xmlns:p14="http://schemas.microsoft.com/office/powerpoint/2010/main" val="843205153"/>
+      </p:ext>
+    </p:extLst>
+  </p:cSld>
+  <p:clrMapOvr>
+    <a:masterClrMapping/>
+  </p:clrMapOvr>
+</p:sld>
+</file>
+
+<file path=ppt/slides/slide53.xml><?xml version="1.0" encoding="utf-8"?>
+<p:sld xmlns:a="http://schemas.openxmlformats.org/drawingml/2006/main" xmlns:r="http://schemas.openxmlformats.org/officeDocument/2006/relationships" xmlns:p="http://schemas.openxmlformats.org/presentationml/2006/main">
+  <p:cSld>
+    <p:spTree>
+      <p:nvGrpSpPr>
+        <p:cNvPr id="1" name=""/>
+        <p:cNvGrpSpPr/>
+        <p:nvPr/>
+      </p:nvGrpSpPr>
+      <p:grpSpPr>
+        <a:xfrm>
+          <a:off x="0" y="0"/>
+          <a:ext cx="0" cy="0"/>
+          <a:chOff x="0" y="0"/>
+          <a:chExt cx="0" cy="0"/>
+        </a:xfrm>
+      </p:grpSpPr>
+      <p:sp>
+        <p:nvSpPr>
+          <p:cNvPr id="2" name="Title 1">
+            <a:extLst>
+              <a:ext uri="{FF2B5EF4-FFF2-40B4-BE49-F238E27FC236}">
+                <a16:creationId xmlns:a16="http://schemas.microsoft.com/office/drawing/2014/main" id="{96A18918-206E-2F4A-2101-A12C14F4AEC9}"/>
+              </a:ext>
+            </a:extLst>
+          </p:cNvPr>
+          <p:cNvSpPr>
+            <a:spLocks noGrp="1"/>
+          </p:cNvSpPr>
+          <p:nvPr>
+            <p:ph type="title"/>
+          </p:nvPr>
+        </p:nvSpPr>
+        <p:spPr/>
+        <p:txBody>
+          <a:bodyPr/>
+          <a:lstStyle/>
+          <a:p>
+            <a:r>
+              <a:rPr lang="en-US" dirty="0"/>
+              <a:t>Connection closure</a:t>
+            </a:r>
+          </a:p>
+        </p:txBody>
+      </p:sp>
+      <p:sp>
+        <p:nvSpPr>
+          <p:cNvPr id="3" name="Content Placeholder 2">
+            <a:extLst>
+              <a:ext uri="{FF2B5EF4-FFF2-40B4-BE49-F238E27FC236}">
+                <a16:creationId xmlns:a16="http://schemas.microsoft.com/office/drawing/2014/main" id="{2501865C-0C96-26B9-EC64-C403A8CE02C8}"/>
+              </a:ext>
+            </a:extLst>
+          </p:cNvPr>
+          <p:cNvSpPr>
+            <a:spLocks noGrp="1"/>
+          </p:cNvSpPr>
+          <p:nvPr>
+            <p:ph idx="1"/>
+          </p:nvPr>
+        </p:nvSpPr>
+        <p:spPr/>
+        <p:txBody>
+          <a:bodyPr>
+            <a:normAutofit fontScale="85000" lnSpcReduction="10000"/>
+          </a:bodyPr>
+          <a:lstStyle/>
+          <a:p>
+            <a:pPr marL="0" indent="0">
+              <a:buNone/>
+            </a:pPr>
+            <a:r>
+              <a:rPr lang="en-US" dirty="0"/>
+              <a:t>At some point, either Bob or Alice will want to end the TLS session. One approach would be to let Bob end the TLS session by simply terminating the underlying TCP connection—that is, by having Bob send a TCP FIN segment to Alice. But such a naive design sets the stage for the truncation attack whereby Trudy once again gets in the middle of an ongoing TLS session and ends the session early with a TCP FIN. If Trudy were to do this, Alice would think she received all of Bob’s data when actuality she only received a portion of it. The solution to this problem is to indicate in the type field whether the record serves to terminate the TLS session. (Although the TLS type is sent in the clear, it is authenticated at the receiver using the record’s HMAC.) By including such a field, if Alice were to receive a TCP FIN before receiving a closure TLS record, she would know that something funny was going on.</a:t>
+            </a:r>
+          </a:p>
+        </p:txBody>
+      </p:sp>
+    </p:spTree>
+    <p:extLst>
+      <p:ext uri="{BB962C8B-B14F-4D97-AF65-F5344CB8AC3E}">
+        <p14:creationId xmlns:p14="http://schemas.microsoft.com/office/powerpoint/2010/main" val="588135127"/>
+      </p:ext>
+    </p:extLst>
+  </p:cSld>
+  <p:clrMapOvr>
+    <a:masterClrMapping/>
+  </p:clrMapOvr>
+</p:sld>
+</file>
+
+<file path=ppt/slides/slide54.xml><?xml version="1.0" encoding="utf-8"?>
+<p:sld xmlns:a="http://schemas.openxmlformats.org/drawingml/2006/main" xmlns:r="http://schemas.openxmlformats.org/officeDocument/2006/relationships" xmlns:p="http://schemas.openxmlformats.org/presentationml/2006/main">
+  <p:cSld>
+    <p:spTree>
+      <p:nvGrpSpPr>
+        <p:cNvPr id="1" name=""/>
+        <p:cNvGrpSpPr/>
+        <p:nvPr/>
+      </p:nvGrpSpPr>
+      <p:grpSpPr>
+        <a:xfrm>
+          <a:off x="0" y="0"/>
+          <a:ext cx="0" cy="0"/>
+          <a:chOff x="0" y="0"/>
+          <a:chExt cx="0" cy="0"/>
+        </a:xfrm>
+      </p:grpSpPr>
+      <p:sp>
+        <p:nvSpPr>
+          <p:cNvPr id="2" name="Title 1">
+            <a:extLst>
+              <a:ext uri="{FF2B5EF4-FFF2-40B4-BE49-F238E27FC236}">
+                <a16:creationId xmlns:a16="http://schemas.microsoft.com/office/drawing/2014/main" id="{EDABB022-A8E6-B822-ED5C-C487E55224A0}"/>
+              </a:ext>
+            </a:extLst>
+          </p:cNvPr>
+          <p:cNvSpPr>
+            <a:spLocks noGrp="1"/>
+          </p:cNvSpPr>
+          <p:nvPr>
+            <p:ph type="title"/>
+          </p:nvPr>
+        </p:nvSpPr>
+        <p:spPr/>
+        <p:txBody>
+          <a:bodyPr/>
+          <a:lstStyle/>
+          <a:p>
+            <a:r>
+              <a:rPr lang="en-US" dirty="0"/>
+              <a:t> </a:t>
+            </a:r>
+          </a:p>
+        </p:txBody>
+      </p:sp>
+      <p:sp>
+        <p:nvSpPr>
+          <p:cNvPr id="3" name="Content Placeholder 2">
+            <a:extLst>
+              <a:ext uri="{FF2B5EF4-FFF2-40B4-BE49-F238E27FC236}">
+                <a16:creationId xmlns:a16="http://schemas.microsoft.com/office/drawing/2014/main" id="{2C56326E-D7F2-629D-DB01-968ECF6D8365}"/>
+              </a:ext>
+            </a:extLst>
+          </p:cNvPr>
+          <p:cNvSpPr>
+            <a:spLocks noGrp="1"/>
+          </p:cNvSpPr>
+          <p:nvPr>
+            <p:ph idx="1"/>
+          </p:nvPr>
+        </p:nvSpPr>
+        <p:spPr>
+          <a:xfrm>
+            <a:off x="1141412" y="1523623"/>
+            <a:ext cx="9905999" cy="3541714"/>
+          </a:xfrm>
+        </p:spPr>
+        <p:txBody>
+          <a:bodyPr>
+            <a:normAutofit fontScale="92500" lnSpcReduction="10000"/>
+          </a:bodyPr>
+          <a:lstStyle/>
+          <a:p>
+            <a:r>
+              <a:rPr lang="en-US" dirty="0"/>
+              <a:t>This completes our introduction to TLS. We’ve seen that it uses many of the cryptography principles discussed in Sections 2 and 3.</a:t>
+            </a:r>
+          </a:p>
+          <a:p>
+            <a:pPr marL="0" indent="0">
+              <a:buNone/>
+            </a:pPr>
+            <a:endParaRPr lang="en-US" dirty="0"/>
+          </a:p>
+          <a:p>
+            <a:r>
+              <a:rPr lang="en-US" dirty="0"/>
+              <a:t>References: James F. Kurose, Keith W. Ross - Computer Networking _ A Top-Down Approach-Pearson (8th edition - 2021) </a:t>
+            </a:r>
+          </a:p>
+          <a:p>
+            <a:pPr marL="0" indent="0">
+              <a:buNone/>
+            </a:pPr>
+            <a:endParaRPr lang="en-US" sz="3200" b="1" i="1" dirty="0"/>
+          </a:p>
+          <a:p>
+            <a:pPr marL="0" indent="0">
+              <a:buNone/>
+            </a:pPr>
+            <a:r>
+              <a:rPr lang="en-US" sz="3200" b="1" i="1" dirty="0"/>
+              <a:t>	Thank you for your time.</a:t>
+            </a:r>
+            <a:endParaRPr lang="en-US" b="1" i="1" dirty="0"/>
+          </a:p>
+        </p:txBody>
+      </p:sp>
+    </p:spTree>
+    <p:extLst>
+      <p:ext uri="{BB962C8B-B14F-4D97-AF65-F5344CB8AC3E}">
+        <p14:creationId xmlns:p14="http://schemas.microsoft.com/office/powerpoint/2010/main" val="3026924153"/>
       </p:ext>
     </p:extLst>
   </p:cSld>
@@ -34640,6 +37177,436 @@
 </a:themeOverride>
 </file>
 
+<file path=ppt/theme/themeOverride20.xml><?xml version="1.0" encoding="utf-8"?>
+<a:themeOverride xmlns:a="http://schemas.openxmlformats.org/drawingml/2006/main">
+  <a:clrScheme name="Red">
+    <a:dk1>
+      <a:sysClr val="windowText" lastClr="000000"/>
+    </a:dk1>
+    <a:lt1>
+      <a:sysClr val="window" lastClr="FFFFFF"/>
+    </a:lt1>
+    <a:dk2>
+      <a:srgbClr val="323232"/>
+    </a:dk2>
+    <a:lt2>
+      <a:srgbClr val="E5C243"/>
+    </a:lt2>
+    <a:accent1>
+      <a:srgbClr val="A5300F"/>
+    </a:accent1>
+    <a:accent2>
+      <a:srgbClr val="D55816"/>
+    </a:accent2>
+    <a:accent3>
+      <a:srgbClr val="E19825"/>
+    </a:accent3>
+    <a:accent4>
+      <a:srgbClr val="B19C7D"/>
+    </a:accent4>
+    <a:accent5>
+      <a:srgbClr val="7F5F52"/>
+    </a:accent5>
+    <a:accent6>
+      <a:srgbClr val="B27D49"/>
+    </a:accent6>
+    <a:hlink>
+      <a:srgbClr val="6B9F25"/>
+    </a:hlink>
+    <a:folHlink>
+      <a:srgbClr val="B26B02"/>
+    </a:folHlink>
+  </a:clrScheme>
+</a:themeOverride>
+</file>
+
+<file path=ppt/theme/themeOverride21.xml><?xml version="1.0" encoding="utf-8"?>
+<a:themeOverride xmlns:a="http://schemas.openxmlformats.org/drawingml/2006/main">
+  <a:clrScheme name="Red">
+    <a:dk1>
+      <a:sysClr val="windowText" lastClr="000000"/>
+    </a:dk1>
+    <a:lt1>
+      <a:sysClr val="window" lastClr="FFFFFF"/>
+    </a:lt1>
+    <a:dk2>
+      <a:srgbClr val="323232"/>
+    </a:dk2>
+    <a:lt2>
+      <a:srgbClr val="E5C243"/>
+    </a:lt2>
+    <a:accent1>
+      <a:srgbClr val="A5300F"/>
+    </a:accent1>
+    <a:accent2>
+      <a:srgbClr val="D55816"/>
+    </a:accent2>
+    <a:accent3>
+      <a:srgbClr val="E19825"/>
+    </a:accent3>
+    <a:accent4>
+      <a:srgbClr val="B19C7D"/>
+    </a:accent4>
+    <a:accent5>
+      <a:srgbClr val="7F5F52"/>
+    </a:accent5>
+    <a:accent6>
+      <a:srgbClr val="B27D49"/>
+    </a:accent6>
+    <a:hlink>
+      <a:srgbClr val="6B9F25"/>
+    </a:hlink>
+    <a:folHlink>
+      <a:srgbClr val="B26B02"/>
+    </a:folHlink>
+  </a:clrScheme>
+</a:themeOverride>
+</file>
+
+<file path=ppt/theme/themeOverride22.xml><?xml version="1.0" encoding="utf-8"?>
+<a:themeOverride xmlns:a="http://schemas.openxmlformats.org/drawingml/2006/main">
+  <a:clrScheme name="Red">
+    <a:dk1>
+      <a:sysClr val="windowText" lastClr="000000"/>
+    </a:dk1>
+    <a:lt1>
+      <a:sysClr val="window" lastClr="FFFFFF"/>
+    </a:lt1>
+    <a:dk2>
+      <a:srgbClr val="323232"/>
+    </a:dk2>
+    <a:lt2>
+      <a:srgbClr val="E5C243"/>
+    </a:lt2>
+    <a:accent1>
+      <a:srgbClr val="A5300F"/>
+    </a:accent1>
+    <a:accent2>
+      <a:srgbClr val="D55816"/>
+    </a:accent2>
+    <a:accent3>
+      <a:srgbClr val="E19825"/>
+    </a:accent3>
+    <a:accent4>
+      <a:srgbClr val="B19C7D"/>
+    </a:accent4>
+    <a:accent5>
+      <a:srgbClr val="7F5F52"/>
+    </a:accent5>
+    <a:accent6>
+      <a:srgbClr val="B27D49"/>
+    </a:accent6>
+    <a:hlink>
+      <a:srgbClr val="6B9F25"/>
+    </a:hlink>
+    <a:folHlink>
+      <a:srgbClr val="B26B02"/>
+    </a:folHlink>
+  </a:clrScheme>
+</a:themeOverride>
+</file>
+
+<file path=ppt/theme/themeOverride23.xml><?xml version="1.0" encoding="utf-8"?>
+<a:themeOverride xmlns:a="http://schemas.openxmlformats.org/drawingml/2006/main">
+  <a:clrScheme name="Red">
+    <a:dk1>
+      <a:sysClr val="windowText" lastClr="000000"/>
+    </a:dk1>
+    <a:lt1>
+      <a:sysClr val="window" lastClr="FFFFFF"/>
+    </a:lt1>
+    <a:dk2>
+      <a:srgbClr val="323232"/>
+    </a:dk2>
+    <a:lt2>
+      <a:srgbClr val="E5C243"/>
+    </a:lt2>
+    <a:accent1>
+      <a:srgbClr val="A5300F"/>
+    </a:accent1>
+    <a:accent2>
+      <a:srgbClr val="D55816"/>
+    </a:accent2>
+    <a:accent3>
+      <a:srgbClr val="E19825"/>
+    </a:accent3>
+    <a:accent4>
+      <a:srgbClr val="B19C7D"/>
+    </a:accent4>
+    <a:accent5>
+      <a:srgbClr val="7F5F52"/>
+    </a:accent5>
+    <a:accent6>
+      <a:srgbClr val="B27D49"/>
+    </a:accent6>
+    <a:hlink>
+      <a:srgbClr val="6B9F25"/>
+    </a:hlink>
+    <a:folHlink>
+      <a:srgbClr val="B26B02"/>
+    </a:folHlink>
+  </a:clrScheme>
+</a:themeOverride>
+</file>
+
+<file path=ppt/theme/themeOverride24.xml><?xml version="1.0" encoding="utf-8"?>
+<a:themeOverride xmlns:a="http://schemas.openxmlformats.org/drawingml/2006/main">
+  <a:clrScheme name="Red">
+    <a:dk1>
+      <a:sysClr val="windowText" lastClr="000000"/>
+    </a:dk1>
+    <a:lt1>
+      <a:sysClr val="window" lastClr="FFFFFF"/>
+    </a:lt1>
+    <a:dk2>
+      <a:srgbClr val="323232"/>
+    </a:dk2>
+    <a:lt2>
+      <a:srgbClr val="E5C243"/>
+    </a:lt2>
+    <a:accent1>
+      <a:srgbClr val="A5300F"/>
+    </a:accent1>
+    <a:accent2>
+      <a:srgbClr val="D55816"/>
+    </a:accent2>
+    <a:accent3>
+      <a:srgbClr val="E19825"/>
+    </a:accent3>
+    <a:accent4>
+      <a:srgbClr val="B19C7D"/>
+    </a:accent4>
+    <a:accent5>
+      <a:srgbClr val="7F5F52"/>
+    </a:accent5>
+    <a:accent6>
+      <a:srgbClr val="B27D49"/>
+    </a:accent6>
+    <a:hlink>
+      <a:srgbClr val="6B9F25"/>
+    </a:hlink>
+    <a:folHlink>
+      <a:srgbClr val="B26B02"/>
+    </a:folHlink>
+  </a:clrScheme>
+</a:themeOverride>
+</file>
+
+<file path=ppt/theme/themeOverride25.xml><?xml version="1.0" encoding="utf-8"?>
+<a:themeOverride xmlns:a="http://schemas.openxmlformats.org/drawingml/2006/main">
+  <a:clrScheme name="Red">
+    <a:dk1>
+      <a:sysClr val="windowText" lastClr="000000"/>
+    </a:dk1>
+    <a:lt1>
+      <a:sysClr val="window" lastClr="FFFFFF"/>
+    </a:lt1>
+    <a:dk2>
+      <a:srgbClr val="323232"/>
+    </a:dk2>
+    <a:lt2>
+      <a:srgbClr val="E5C243"/>
+    </a:lt2>
+    <a:accent1>
+      <a:srgbClr val="A5300F"/>
+    </a:accent1>
+    <a:accent2>
+      <a:srgbClr val="D55816"/>
+    </a:accent2>
+    <a:accent3>
+      <a:srgbClr val="E19825"/>
+    </a:accent3>
+    <a:accent4>
+      <a:srgbClr val="B19C7D"/>
+    </a:accent4>
+    <a:accent5>
+      <a:srgbClr val="7F5F52"/>
+    </a:accent5>
+    <a:accent6>
+      <a:srgbClr val="B27D49"/>
+    </a:accent6>
+    <a:hlink>
+      <a:srgbClr val="6B9F25"/>
+    </a:hlink>
+    <a:folHlink>
+      <a:srgbClr val="B26B02"/>
+    </a:folHlink>
+  </a:clrScheme>
+</a:themeOverride>
+</file>
+
+<file path=ppt/theme/themeOverride26.xml><?xml version="1.0" encoding="utf-8"?>
+<a:themeOverride xmlns:a="http://schemas.openxmlformats.org/drawingml/2006/main">
+  <a:clrScheme name="Red">
+    <a:dk1>
+      <a:sysClr val="windowText" lastClr="000000"/>
+    </a:dk1>
+    <a:lt1>
+      <a:sysClr val="window" lastClr="FFFFFF"/>
+    </a:lt1>
+    <a:dk2>
+      <a:srgbClr val="323232"/>
+    </a:dk2>
+    <a:lt2>
+      <a:srgbClr val="E5C243"/>
+    </a:lt2>
+    <a:accent1>
+      <a:srgbClr val="A5300F"/>
+    </a:accent1>
+    <a:accent2>
+      <a:srgbClr val="D55816"/>
+    </a:accent2>
+    <a:accent3>
+      <a:srgbClr val="E19825"/>
+    </a:accent3>
+    <a:accent4>
+      <a:srgbClr val="B19C7D"/>
+    </a:accent4>
+    <a:accent5>
+      <a:srgbClr val="7F5F52"/>
+    </a:accent5>
+    <a:accent6>
+      <a:srgbClr val="B27D49"/>
+    </a:accent6>
+    <a:hlink>
+      <a:srgbClr val="6B9F25"/>
+    </a:hlink>
+    <a:folHlink>
+      <a:srgbClr val="B26B02"/>
+    </a:folHlink>
+  </a:clrScheme>
+</a:themeOverride>
+</file>
+
+<file path=ppt/theme/themeOverride27.xml><?xml version="1.0" encoding="utf-8"?>
+<a:themeOverride xmlns:a="http://schemas.openxmlformats.org/drawingml/2006/main">
+  <a:clrScheme name="Red">
+    <a:dk1>
+      <a:sysClr val="windowText" lastClr="000000"/>
+    </a:dk1>
+    <a:lt1>
+      <a:sysClr val="window" lastClr="FFFFFF"/>
+    </a:lt1>
+    <a:dk2>
+      <a:srgbClr val="323232"/>
+    </a:dk2>
+    <a:lt2>
+      <a:srgbClr val="E5C243"/>
+    </a:lt2>
+    <a:accent1>
+      <a:srgbClr val="A5300F"/>
+    </a:accent1>
+    <a:accent2>
+      <a:srgbClr val="D55816"/>
+    </a:accent2>
+    <a:accent3>
+      <a:srgbClr val="E19825"/>
+    </a:accent3>
+    <a:accent4>
+      <a:srgbClr val="B19C7D"/>
+    </a:accent4>
+    <a:accent5>
+      <a:srgbClr val="7F5F52"/>
+    </a:accent5>
+    <a:accent6>
+      <a:srgbClr val="B27D49"/>
+    </a:accent6>
+    <a:hlink>
+      <a:srgbClr val="6B9F25"/>
+    </a:hlink>
+    <a:folHlink>
+      <a:srgbClr val="B26B02"/>
+    </a:folHlink>
+  </a:clrScheme>
+</a:themeOverride>
+</file>
+
+<file path=ppt/theme/themeOverride28.xml><?xml version="1.0" encoding="utf-8"?>
+<a:themeOverride xmlns:a="http://schemas.openxmlformats.org/drawingml/2006/main">
+  <a:clrScheme name="Red">
+    <a:dk1>
+      <a:sysClr val="windowText" lastClr="000000"/>
+    </a:dk1>
+    <a:lt1>
+      <a:sysClr val="window" lastClr="FFFFFF"/>
+    </a:lt1>
+    <a:dk2>
+      <a:srgbClr val="323232"/>
+    </a:dk2>
+    <a:lt2>
+      <a:srgbClr val="E5C243"/>
+    </a:lt2>
+    <a:accent1>
+      <a:srgbClr val="A5300F"/>
+    </a:accent1>
+    <a:accent2>
+      <a:srgbClr val="D55816"/>
+    </a:accent2>
+    <a:accent3>
+      <a:srgbClr val="E19825"/>
+    </a:accent3>
+    <a:accent4>
+      <a:srgbClr val="B19C7D"/>
+    </a:accent4>
+    <a:accent5>
+      <a:srgbClr val="7F5F52"/>
+    </a:accent5>
+    <a:accent6>
+      <a:srgbClr val="B27D49"/>
+    </a:accent6>
+    <a:hlink>
+      <a:srgbClr val="6B9F25"/>
+    </a:hlink>
+    <a:folHlink>
+      <a:srgbClr val="B26B02"/>
+    </a:folHlink>
+  </a:clrScheme>
+</a:themeOverride>
+</file>
+
+<file path=ppt/theme/themeOverride29.xml><?xml version="1.0" encoding="utf-8"?>
+<a:themeOverride xmlns:a="http://schemas.openxmlformats.org/drawingml/2006/main">
+  <a:clrScheme name="Red">
+    <a:dk1>
+      <a:sysClr val="windowText" lastClr="000000"/>
+    </a:dk1>
+    <a:lt1>
+      <a:sysClr val="window" lastClr="FFFFFF"/>
+    </a:lt1>
+    <a:dk2>
+      <a:srgbClr val="323232"/>
+    </a:dk2>
+    <a:lt2>
+      <a:srgbClr val="E5C243"/>
+    </a:lt2>
+    <a:accent1>
+      <a:srgbClr val="A5300F"/>
+    </a:accent1>
+    <a:accent2>
+      <a:srgbClr val="D55816"/>
+    </a:accent2>
+    <a:accent3>
+      <a:srgbClr val="E19825"/>
+    </a:accent3>
+    <a:accent4>
+      <a:srgbClr val="B19C7D"/>
+    </a:accent4>
+    <a:accent5>
+      <a:srgbClr val="7F5F52"/>
+    </a:accent5>
+    <a:accent6>
+      <a:srgbClr val="B27D49"/>
+    </a:accent6>
+    <a:hlink>
+      <a:srgbClr val="6B9F25"/>
+    </a:hlink>
+    <a:folHlink>
+      <a:srgbClr val="B26B02"/>
+    </a:folHlink>
+  </a:clrScheme>
+</a:themeOverride>
+</file>
+
 <file path=ppt/theme/themeOverride3.xml><?xml version="1.0" encoding="utf-8"?>
 <a:themeOverride xmlns:a="http://schemas.openxmlformats.org/drawingml/2006/main">
   <a:clrScheme name="Green Yellow">
@@ -34678,6 +37645,264 @@
     </a:hlink>
     <a:folHlink>
       <a:srgbClr val="977B2D"/>
+    </a:folHlink>
+  </a:clrScheme>
+</a:themeOverride>
+</file>
+
+<file path=ppt/theme/themeOverride30.xml><?xml version="1.0" encoding="utf-8"?>
+<a:themeOverride xmlns:a="http://schemas.openxmlformats.org/drawingml/2006/main">
+  <a:clrScheme name="Red">
+    <a:dk1>
+      <a:sysClr val="windowText" lastClr="000000"/>
+    </a:dk1>
+    <a:lt1>
+      <a:sysClr val="window" lastClr="FFFFFF"/>
+    </a:lt1>
+    <a:dk2>
+      <a:srgbClr val="323232"/>
+    </a:dk2>
+    <a:lt2>
+      <a:srgbClr val="E5C243"/>
+    </a:lt2>
+    <a:accent1>
+      <a:srgbClr val="A5300F"/>
+    </a:accent1>
+    <a:accent2>
+      <a:srgbClr val="D55816"/>
+    </a:accent2>
+    <a:accent3>
+      <a:srgbClr val="E19825"/>
+    </a:accent3>
+    <a:accent4>
+      <a:srgbClr val="B19C7D"/>
+    </a:accent4>
+    <a:accent5>
+      <a:srgbClr val="7F5F52"/>
+    </a:accent5>
+    <a:accent6>
+      <a:srgbClr val="B27D49"/>
+    </a:accent6>
+    <a:hlink>
+      <a:srgbClr val="6B9F25"/>
+    </a:hlink>
+    <a:folHlink>
+      <a:srgbClr val="B26B02"/>
+    </a:folHlink>
+  </a:clrScheme>
+</a:themeOverride>
+</file>
+
+<file path=ppt/theme/themeOverride31.xml><?xml version="1.0" encoding="utf-8"?>
+<a:themeOverride xmlns:a="http://schemas.openxmlformats.org/drawingml/2006/main">
+  <a:clrScheme name="Red">
+    <a:dk1>
+      <a:sysClr val="windowText" lastClr="000000"/>
+    </a:dk1>
+    <a:lt1>
+      <a:sysClr val="window" lastClr="FFFFFF"/>
+    </a:lt1>
+    <a:dk2>
+      <a:srgbClr val="323232"/>
+    </a:dk2>
+    <a:lt2>
+      <a:srgbClr val="E5C243"/>
+    </a:lt2>
+    <a:accent1>
+      <a:srgbClr val="A5300F"/>
+    </a:accent1>
+    <a:accent2>
+      <a:srgbClr val="D55816"/>
+    </a:accent2>
+    <a:accent3>
+      <a:srgbClr val="E19825"/>
+    </a:accent3>
+    <a:accent4>
+      <a:srgbClr val="B19C7D"/>
+    </a:accent4>
+    <a:accent5>
+      <a:srgbClr val="7F5F52"/>
+    </a:accent5>
+    <a:accent6>
+      <a:srgbClr val="B27D49"/>
+    </a:accent6>
+    <a:hlink>
+      <a:srgbClr val="6B9F25"/>
+    </a:hlink>
+    <a:folHlink>
+      <a:srgbClr val="B26B02"/>
+    </a:folHlink>
+  </a:clrScheme>
+</a:themeOverride>
+</file>
+
+<file path=ppt/theme/themeOverride32.xml><?xml version="1.0" encoding="utf-8"?>
+<a:themeOverride xmlns:a="http://schemas.openxmlformats.org/drawingml/2006/main">
+  <a:clrScheme name="Red">
+    <a:dk1>
+      <a:sysClr val="windowText" lastClr="000000"/>
+    </a:dk1>
+    <a:lt1>
+      <a:sysClr val="window" lastClr="FFFFFF"/>
+    </a:lt1>
+    <a:dk2>
+      <a:srgbClr val="323232"/>
+    </a:dk2>
+    <a:lt2>
+      <a:srgbClr val="E5C243"/>
+    </a:lt2>
+    <a:accent1>
+      <a:srgbClr val="A5300F"/>
+    </a:accent1>
+    <a:accent2>
+      <a:srgbClr val="D55816"/>
+    </a:accent2>
+    <a:accent3>
+      <a:srgbClr val="E19825"/>
+    </a:accent3>
+    <a:accent4>
+      <a:srgbClr val="B19C7D"/>
+    </a:accent4>
+    <a:accent5>
+      <a:srgbClr val="7F5F52"/>
+    </a:accent5>
+    <a:accent6>
+      <a:srgbClr val="B27D49"/>
+    </a:accent6>
+    <a:hlink>
+      <a:srgbClr val="6B9F25"/>
+    </a:hlink>
+    <a:folHlink>
+      <a:srgbClr val="B26B02"/>
+    </a:folHlink>
+  </a:clrScheme>
+</a:themeOverride>
+</file>
+
+<file path=ppt/theme/themeOverride33.xml><?xml version="1.0" encoding="utf-8"?>
+<a:themeOverride xmlns:a="http://schemas.openxmlformats.org/drawingml/2006/main">
+  <a:clrScheme name="Red">
+    <a:dk1>
+      <a:sysClr val="windowText" lastClr="000000"/>
+    </a:dk1>
+    <a:lt1>
+      <a:sysClr val="window" lastClr="FFFFFF"/>
+    </a:lt1>
+    <a:dk2>
+      <a:srgbClr val="323232"/>
+    </a:dk2>
+    <a:lt2>
+      <a:srgbClr val="E5C243"/>
+    </a:lt2>
+    <a:accent1>
+      <a:srgbClr val="A5300F"/>
+    </a:accent1>
+    <a:accent2>
+      <a:srgbClr val="D55816"/>
+    </a:accent2>
+    <a:accent3>
+      <a:srgbClr val="E19825"/>
+    </a:accent3>
+    <a:accent4>
+      <a:srgbClr val="B19C7D"/>
+    </a:accent4>
+    <a:accent5>
+      <a:srgbClr val="7F5F52"/>
+    </a:accent5>
+    <a:accent6>
+      <a:srgbClr val="B27D49"/>
+    </a:accent6>
+    <a:hlink>
+      <a:srgbClr val="6B9F25"/>
+    </a:hlink>
+    <a:folHlink>
+      <a:srgbClr val="B26B02"/>
+    </a:folHlink>
+  </a:clrScheme>
+</a:themeOverride>
+</file>
+
+<file path=ppt/theme/themeOverride34.xml><?xml version="1.0" encoding="utf-8"?>
+<a:themeOverride xmlns:a="http://schemas.openxmlformats.org/drawingml/2006/main">
+  <a:clrScheme name="Red">
+    <a:dk1>
+      <a:sysClr val="windowText" lastClr="000000"/>
+    </a:dk1>
+    <a:lt1>
+      <a:sysClr val="window" lastClr="FFFFFF"/>
+    </a:lt1>
+    <a:dk2>
+      <a:srgbClr val="323232"/>
+    </a:dk2>
+    <a:lt2>
+      <a:srgbClr val="E5C243"/>
+    </a:lt2>
+    <a:accent1>
+      <a:srgbClr val="A5300F"/>
+    </a:accent1>
+    <a:accent2>
+      <a:srgbClr val="D55816"/>
+    </a:accent2>
+    <a:accent3>
+      <a:srgbClr val="E19825"/>
+    </a:accent3>
+    <a:accent4>
+      <a:srgbClr val="B19C7D"/>
+    </a:accent4>
+    <a:accent5>
+      <a:srgbClr val="7F5F52"/>
+    </a:accent5>
+    <a:accent6>
+      <a:srgbClr val="B27D49"/>
+    </a:accent6>
+    <a:hlink>
+      <a:srgbClr val="6B9F25"/>
+    </a:hlink>
+    <a:folHlink>
+      <a:srgbClr val="B26B02"/>
+    </a:folHlink>
+  </a:clrScheme>
+</a:themeOverride>
+</file>
+
+<file path=ppt/theme/themeOverride35.xml><?xml version="1.0" encoding="utf-8"?>
+<a:themeOverride xmlns:a="http://schemas.openxmlformats.org/drawingml/2006/main">
+  <a:clrScheme name="Red">
+    <a:dk1>
+      <a:sysClr val="windowText" lastClr="000000"/>
+    </a:dk1>
+    <a:lt1>
+      <a:sysClr val="window" lastClr="FFFFFF"/>
+    </a:lt1>
+    <a:dk2>
+      <a:srgbClr val="323232"/>
+    </a:dk2>
+    <a:lt2>
+      <a:srgbClr val="E5C243"/>
+    </a:lt2>
+    <a:accent1>
+      <a:srgbClr val="A5300F"/>
+    </a:accent1>
+    <a:accent2>
+      <a:srgbClr val="D55816"/>
+    </a:accent2>
+    <a:accent3>
+      <a:srgbClr val="E19825"/>
+    </a:accent3>
+    <a:accent4>
+      <a:srgbClr val="B19C7D"/>
+    </a:accent4>
+    <a:accent5>
+      <a:srgbClr val="7F5F52"/>
+    </a:accent5>
+    <a:accent6>
+      <a:srgbClr val="B27D49"/>
+    </a:accent6>
+    <a:hlink>
+      <a:srgbClr val="6B9F25"/>
+    </a:hlink>
+    <a:folHlink>
+      <a:srgbClr val="B26B02"/>
     </a:folHlink>
   </a:clrScheme>
 </a:themeOverride>

</xml_diff>